<commit_message>
Aggiornata la presentazione del progetto
</commit_message>
<xml_diff>
--- a/Presentazione Project Giornale.pptx
+++ b/Presentazione Project Giornale.pptx
@@ -12,6 +12,7 @@
     <p:sldId id="259" r:id="rId6"/>
     <p:sldId id="261" r:id="rId7"/>
     <p:sldId id="262" r:id="rId8"/>
+    <p:sldId id="263" r:id="rId9"/>
   </p:sldIdLst>
   <p:sldSz cx="12192000" cy="6858000"/>
   <p:notesSz cx="6858000" cy="9144000"/>
@@ -265,7 +266,7 @@
           <a:p>
             <a:fld id="{C003E3F7-EF49-40BA-83FE-2099FE3A4DFD}" type="datetimeFigureOut">
               <a:rPr lang="it-IT" smtClean="0"/>
-              <a:t>26/05/2022</a:t>
+              <a:t>27/05/2022</a:t>
             </a:fld>
             <a:endParaRPr lang="it-IT"/>
           </a:p>
@@ -463,7 +464,7 @@
           <a:p>
             <a:fld id="{C003E3F7-EF49-40BA-83FE-2099FE3A4DFD}" type="datetimeFigureOut">
               <a:rPr lang="it-IT" smtClean="0"/>
-              <a:t>26/05/2022</a:t>
+              <a:t>27/05/2022</a:t>
             </a:fld>
             <a:endParaRPr lang="it-IT"/>
           </a:p>
@@ -671,7 +672,7 @@
           <a:p>
             <a:fld id="{C003E3F7-EF49-40BA-83FE-2099FE3A4DFD}" type="datetimeFigureOut">
               <a:rPr lang="it-IT" smtClean="0"/>
-              <a:t>26/05/2022</a:t>
+              <a:t>27/05/2022</a:t>
             </a:fld>
             <a:endParaRPr lang="it-IT"/>
           </a:p>
@@ -869,7 +870,7 @@
           <a:p>
             <a:fld id="{C003E3F7-EF49-40BA-83FE-2099FE3A4DFD}" type="datetimeFigureOut">
               <a:rPr lang="it-IT" smtClean="0"/>
-              <a:t>26/05/2022</a:t>
+              <a:t>27/05/2022</a:t>
             </a:fld>
             <a:endParaRPr lang="it-IT"/>
           </a:p>
@@ -1144,7 +1145,7 @@
           <a:p>
             <a:fld id="{C003E3F7-EF49-40BA-83FE-2099FE3A4DFD}" type="datetimeFigureOut">
               <a:rPr lang="it-IT" smtClean="0"/>
-              <a:t>26/05/2022</a:t>
+              <a:t>27/05/2022</a:t>
             </a:fld>
             <a:endParaRPr lang="it-IT"/>
           </a:p>
@@ -1409,7 +1410,7 @@
           <a:p>
             <a:fld id="{C003E3F7-EF49-40BA-83FE-2099FE3A4DFD}" type="datetimeFigureOut">
               <a:rPr lang="it-IT" smtClean="0"/>
-              <a:t>26/05/2022</a:t>
+              <a:t>27/05/2022</a:t>
             </a:fld>
             <a:endParaRPr lang="it-IT"/>
           </a:p>
@@ -1821,7 +1822,7 @@
           <a:p>
             <a:fld id="{C003E3F7-EF49-40BA-83FE-2099FE3A4DFD}" type="datetimeFigureOut">
               <a:rPr lang="it-IT" smtClean="0"/>
-              <a:t>26/05/2022</a:t>
+              <a:t>27/05/2022</a:t>
             </a:fld>
             <a:endParaRPr lang="it-IT"/>
           </a:p>
@@ -1962,7 +1963,7 @@
           <a:p>
             <a:fld id="{C003E3F7-EF49-40BA-83FE-2099FE3A4DFD}" type="datetimeFigureOut">
               <a:rPr lang="it-IT" smtClean="0"/>
-              <a:t>26/05/2022</a:t>
+              <a:t>27/05/2022</a:t>
             </a:fld>
             <a:endParaRPr lang="it-IT"/>
           </a:p>
@@ -2075,7 +2076,7 @@
           <a:p>
             <a:fld id="{C003E3F7-EF49-40BA-83FE-2099FE3A4DFD}" type="datetimeFigureOut">
               <a:rPr lang="it-IT" smtClean="0"/>
-              <a:t>26/05/2022</a:t>
+              <a:t>27/05/2022</a:t>
             </a:fld>
             <a:endParaRPr lang="it-IT"/>
           </a:p>
@@ -2386,7 +2387,7 @@
           <a:p>
             <a:fld id="{C003E3F7-EF49-40BA-83FE-2099FE3A4DFD}" type="datetimeFigureOut">
               <a:rPr lang="it-IT" smtClean="0"/>
-              <a:t>26/05/2022</a:t>
+              <a:t>27/05/2022</a:t>
             </a:fld>
             <a:endParaRPr lang="it-IT"/>
           </a:p>
@@ -2674,7 +2675,7 @@
           <a:p>
             <a:fld id="{C003E3F7-EF49-40BA-83FE-2099FE3A4DFD}" type="datetimeFigureOut">
               <a:rPr lang="it-IT" smtClean="0"/>
-              <a:t>26/05/2022</a:t>
+              <a:t>27/05/2022</a:t>
             </a:fld>
             <a:endParaRPr lang="it-IT"/>
           </a:p>
@@ -2915,7 +2916,7 @@
           <a:p>
             <a:fld id="{C003E3F7-EF49-40BA-83FE-2099FE3A4DFD}" type="datetimeFigureOut">
               <a:rPr lang="it-IT" smtClean="0"/>
-              <a:t>26/05/2022</a:t>
+              <a:t>27/05/2022</a:t>
             </a:fld>
             <a:endParaRPr lang="it-IT"/>
           </a:p>
@@ -3382,8 +3383,65 @@
         </p:nvSpPr>
         <p:spPr>
           <a:xfrm>
-            <a:off x="508220" y="253632"/>
-            <a:ext cx="11175560" cy="707886"/>
+            <a:off x="-565607" y="253632"/>
+            <a:ext cx="13338928" cy="646331"/>
+          </a:xfrm>
+          <a:prstGeom prst="rect">
+            <a:avLst/>
+          </a:prstGeom>
+          <a:noFill/>
+        </p:spPr>
+        <p:txBody>
+          <a:bodyPr wrap="square" lIns="91440" tIns="45720" rIns="91440" bIns="45720">
+            <a:spAutoFit/>
+            <a:scene3d>
+              <a:camera prst="orthographicFront"/>
+              <a:lightRig rig="harsh" dir="t"/>
+            </a:scene3d>
+            <a:sp3d extrusionH="57150" prstMaterial="matte">
+              <a:bevelT w="63500" h="12700" prst="angle"/>
+              <a:contourClr>
+                <a:schemeClr val="bg1">
+                  <a:lumMod val="65000"/>
+                </a:schemeClr>
+              </a:contourClr>
+            </a:sp3d>
+          </a:bodyPr>
+          <a:lstStyle/>
+          <a:p>
+            <a:pPr algn="ctr"/>
+            <a:r>
+              <a:rPr lang="it-IT" sz="3600" b="1" cap="none" spc="0" dirty="0">
+                <a:ln/>
+                <a:solidFill>
+                  <a:schemeClr val="tx1">
+                    <a:lumMod val="65000"/>
+                    <a:lumOff val="35000"/>
+                  </a:schemeClr>
+                </a:solidFill>
+                <a:effectLst/>
+              </a:rPr>
+              <a:t>PRESENTAZIONE PROJECT WORK FINALE: GIORNALE ONLINE</a:t>
+            </a:r>
+          </a:p>
+        </p:txBody>
+      </p:sp>
+      <p:sp>
+        <p:nvSpPr>
+          <p:cNvPr id="10" name="Rettangolo 9">
+            <a:extLst>
+              <a:ext uri="{FF2B5EF4-FFF2-40B4-BE49-F238E27FC236}">
+                <a16:creationId xmlns:a16="http://schemas.microsoft.com/office/drawing/2014/main" id="{07D27842-1EE2-00B6-CF38-C4FEF7AEF856}"/>
+              </a:ext>
+            </a:extLst>
+          </p:cNvPr>
+          <p:cNvSpPr/>
+          <p:nvPr/>
+        </p:nvSpPr>
+        <p:spPr>
+          <a:xfrm>
+            <a:off x="4554282" y="2106049"/>
+            <a:ext cx="4340099" cy="3108543"/>
           </a:xfrm>
           <a:prstGeom prst="rect">
             <a:avLst/>
@@ -3408,63 +3466,6 @@
           </a:bodyPr>
           <a:lstStyle/>
           <a:p>
-            <a:pPr algn="ctr"/>
-            <a:r>
-              <a:rPr lang="it-IT" sz="4000" b="1" cap="none" spc="0" dirty="0">
-                <a:ln/>
-                <a:solidFill>
-                  <a:schemeClr val="tx1">
-                    <a:lumMod val="65000"/>
-                    <a:lumOff val="35000"/>
-                  </a:schemeClr>
-                </a:solidFill>
-                <a:effectLst/>
-              </a:rPr>
-              <a:t>PRESENTAZIONE PROJECT WORK FINALE: GIORNALE</a:t>
-            </a:r>
-          </a:p>
-        </p:txBody>
-      </p:sp>
-      <p:sp>
-        <p:nvSpPr>
-          <p:cNvPr id="10" name="Rettangolo 9">
-            <a:extLst>
-              <a:ext uri="{FF2B5EF4-FFF2-40B4-BE49-F238E27FC236}">
-                <a16:creationId xmlns:a16="http://schemas.microsoft.com/office/drawing/2014/main" id="{07D27842-1EE2-00B6-CF38-C4FEF7AEF856}"/>
-              </a:ext>
-            </a:extLst>
-          </p:cNvPr>
-          <p:cNvSpPr/>
-          <p:nvPr/>
-        </p:nvSpPr>
-        <p:spPr>
-          <a:xfrm>
-            <a:off x="4554282" y="2106049"/>
-            <a:ext cx="4340099" cy="3108543"/>
-          </a:xfrm>
-          <a:prstGeom prst="rect">
-            <a:avLst/>
-          </a:prstGeom>
-          <a:noFill/>
-        </p:spPr>
-        <p:txBody>
-          <a:bodyPr wrap="none" lIns="91440" tIns="45720" rIns="91440" bIns="45720">
-            <a:spAutoFit/>
-            <a:scene3d>
-              <a:camera prst="orthographicFront"/>
-              <a:lightRig rig="harsh" dir="t"/>
-            </a:scene3d>
-            <a:sp3d extrusionH="57150" prstMaterial="matte">
-              <a:bevelT w="63500" h="12700" prst="angle"/>
-              <a:contourClr>
-                <a:schemeClr val="bg1">
-                  <a:lumMod val="65000"/>
-                </a:schemeClr>
-              </a:contourClr>
-            </a:sp3d>
-          </a:bodyPr>
-          <a:lstStyle/>
-          <a:p>
             <a:r>
               <a:rPr lang="it-IT" sz="2800" b="1" cap="none" spc="0" dirty="0">
                 <a:ln/>
@@ -3594,6 +3595,138 @@
   <p:clrMapOvr>
     <a:masterClrMapping/>
   </p:clrMapOvr>
+  <p:timing>
+    <p:tnLst>
+      <p:par>
+        <p:cTn id="1" dur="indefinite" restart="never" nodeType="tmRoot">
+          <p:childTnLst>
+            <p:seq concurrent="1" nextAc="seek">
+              <p:cTn id="2" dur="indefinite" nodeType="mainSeq">
+                <p:childTnLst>
+                  <p:par>
+                    <p:cTn id="3" fill="hold">
+                      <p:stCondLst>
+                        <p:cond delay="indefinite"/>
+                      </p:stCondLst>
+                      <p:childTnLst>
+                        <p:par>
+                          <p:cTn id="4" fill="hold">
+                            <p:stCondLst>
+                              <p:cond delay="0"/>
+                            </p:stCondLst>
+                            <p:childTnLst>
+                              <p:par>
+                                <p:cTn id="5" presetID="42" presetClass="entr" presetSubtype="0" fill="hold" grpId="0" nodeType="clickEffect">
+                                  <p:stCondLst>
+                                    <p:cond delay="0"/>
+                                  </p:stCondLst>
+                                  <p:childTnLst>
+                                    <p:set>
+                                      <p:cBhvr>
+                                        <p:cTn id="6" dur="1" fill="hold">
+                                          <p:stCondLst>
+                                            <p:cond delay="0"/>
+                                          </p:stCondLst>
+                                        </p:cTn>
+                                        <p:tgtEl>
+                                          <p:spTgt spid="10"/>
+                                        </p:tgtEl>
+                                        <p:attrNameLst>
+                                          <p:attrName>style.visibility</p:attrName>
+                                        </p:attrNameLst>
+                                      </p:cBhvr>
+                                      <p:to>
+                                        <p:strVal val="visible"/>
+                                      </p:to>
+                                    </p:set>
+                                    <p:animEffect transition="in" filter="fade">
+                                      <p:cBhvr>
+                                        <p:cTn id="7" dur="1000"/>
+                                        <p:tgtEl>
+                                          <p:spTgt spid="10"/>
+                                        </p:tgtEl>
+                                      </p:cBhvr>
+                                    </p:animEffect>
+                                    <p:anim calcmode="lin" valueType="num">
+                                      <p:cBhvr>
+                                        <p:cTn id="8" dur="1000" fill="hold"/>
+                                        <p:tgtEl>
+                                          <p:spTgt spid="10"/>
+                                        </p:tgtEl>
+                                        <p:attrNameLst>
+                                          <p:attrName>ppt_x</p:attrName>
+                                        </p:attrNameLst>
+                                      </p:cBhvr>
+                                      <p:tavLst>
+                                        <p:tav tm="0">
+                                          <p:val>
+                                            <p:strVal val="#ppt_x"/>
+                                          </p:val>
+                                        </p:tav>
+                                        <p:tav tm="100000">
+                                          <p:val>
+                                            <p:strVal val="#ppt_x"/>
+                                          </p:val>
+                                        </p:tav>
+                                      </p:tavLst>
+                                    </p:anim>
+                                    <p:anim calcmode="lin" valueType="num">
+                                      <p:cBhvr>
+                                        <p:cTn id="9" dur="1000" fill="hold"/>
+                                        <p:tgtEl>
+                                          <p:spTgt spid="10"/>
+                                        </p:tgtEl>
+                                        <p:attrNameLst>
+                                          <p:attrName>ppt_y</p:attrName>
+                                        </p:attrNameLst>
+                                      </p:cBhvr>
+                                      <p:tavLst>
+                                        <p:tav tm="0">
+                                          <p:val>
+                                            <p:strVal val="#ppt_y+.1"/>
+                                          </p:val>
+                                        </p:tav>
+                                        <p:tav tm="100000">
+                                          <p:val>
+                                            <p:strVal val="#ppt_y"/>
+                                          </p:val>
+                                        </p:tav>
+                                      </p:tavLst>
+                                    </p:anim>
+                                  </p:childTnLst>
+                                </p:cTn>
+                              </p:par>
+                            </p:childTnLst>
+                          </p:cTn>
+                        </p:par>
+                      </p:childTnLst>
+                    </p:cTn>
+                  </p:par>
+                </p:childTnLst>
+              </p:cTn>
+              <p:prevCondLst>
+                <p:cond evt="onPrev" delay="0">
+                  <p:tgtEl>
+                    <p:sldTgt/>
+                  </p:tgtEl>
+                </p:cond>
+              </p:prevCondLst>
+              <p:nextCondLst>
+                <p:cond evt="onNext" delay="0">
+                  <p:tgtEl>
+                    <p:sldTgt/>
+                  </p:tgtEl>
+                </p:cond>
+              </p:nextCondLst>
+            </p:seq>
+          </p:childTnLst>
+        </p:cTn>
+      </p:par>
+    </p:tnLst>
+    <p:bldLst>
+      <p:bldP spid="10" grpId="0"/>
+    </p:bldLst>
+  </p:timing>
 </p:sld>
 </file>
 
@@ -3652,10 +3785,10 @@
       </p:pic>
       <p:sp>
         <p:nvSpPr>
-          <p:cNvPr id="5" name="Rettangolo 4">
-            <a:extLst>
-              <a:ext uri="{FF2B5EF4-FFF2-40B4-BE49-F238E27FC236}">
-                <a16:creationId xmlns:a16="http://schemas.microsoft.com/office/drawing/2014/main" id="{40867D1C-1955-484B-6515-780A4066C754}"/>
+          <p:cNvPr id="6" name="Rettangolo 5">
+            <a:extLst>
+              <a:ext uri="{FF2B5EF4-FFF2-40B4-BE49-F238E27FC236}">
+                <a16:creationId xmlns:a16="http://schemas.microsoft.com/office/drawing/2014/main" id="{AA067AAD-9A41-3F5E-A3BA-CE0387E7EFE0}"/>
               </a:ext>
             </a:extLst>
           </p:cNvPr>
@@ -3664,8 +3797,8 @@
         </p:nvSpPr>
         <p:spPr>
           <a:xfrm>
-            <a:off x="508220" y="253632"/>
-            <a:ext cx="11175560" cy="707886"/>
+            <a:off x="4454908" y="2209852"/>
+            <a:ext cx="3282181" cy="1077218"/>
           </a:xfrm>
           <a:prstGeom prst="rect">
             <a:avLst/>
@@ -3690,9 +3823,36 @@
           </a:bodyPr>
           <a:lstStyle/>
           <a:p>
-            <a:pPr algn="ctr"/>
-            <a:r>
-              <a:rPr lang="it-IT" sz="4000" b="1" cap="none" spc="0" dirty="0">
+            <a:r>
+              <a:rPr lang="it-IT" sz="2400" b="1" dirty="0">
+                <a:ln/>
+                <a:solidFill>
+                  <a:schemeClr val="tx1">
+                    <a:lumMod val="65000"/>
+                    <a:lumOff val="35000"/>
+                  </a:schemeClr>
+                </a:solidFill>
+              </a:rPr>
+              <a:t>BACK-END:</a:t>
+            </a:r>
+            <a:endParaRPr lang="it-IT" sz="2400" b="1" cap="none" spc="0" dirty="0">
+              <a:ln/>
+              <a:solidFill>
+                <a:schemeClr val="tx1">
+                  <a:lumMod val="65000"/>
+                  <a:lumOff val="35000"/>
+                </a:schemeClr>
+              </a:solidFill>
+              <a:effectLst/>
+            </a:endParaRPr>
+          </a:p>
+          <a:p>
+            <a:pPr marL="457200" indent="-457200">
+              <a:buFont typeface="Arial" panose="020B0604020202020204" pitchFamily="34" charset="0"/>
+              <a:buChar char="•"/>
+            </a:pPr>
+            <a:r>
+              <a:rPr lang="it-IT" sz="2000" b="1" cap="none" spc="0" dirty="0">
                 <a:ln/>
                 <a:solidFill>
                   <a:schemeClr val="tx1">
@@ -3702,17 +3862,35 @@
                 </a:solidFill>
                 <a:effectLst/>
               </a:rPr>
-              <a:t>PRESENTAZIONE PROJECT WORK FINALE: GIORNALE</a:t>
-            </a:r>
-          </a:p>
-        </p:txBody>
-      </p:sp>
-      <p:sp>
-        <p:nvSpPr>
-          <p:cNvPr id="6" name="Rettangolo 5">
-            <a:extLst>
-              <a:ext uri="{FF2B5EF4-FFF2-40B4-BE49-F238E27FC236}">
-                <a16:creationId xmlns:a16="http://schemas.microsoft.com/office/drawing/2014/main" id="{AA067AAD-9A41-3F5E-A3BA-CE0387E7EFE0}"/>
+              <a:t>ANDREA CANNAVO’</a:t>
+            </a:r>
+          </a:p>
+          <a:p>
+            <a:pPr marL="457200" indent="-457200">
+              <a:buFont typeface="Arial" panose="020B0604020202020204" pitchFamily="34" charset="0"/>
+              <a:buChar char="•"/>
+            </a:pPr>
+            <a:r>
+              <a:rPr lang="it-IT" sz="2000" b="1" dirty="0">
+                <a:ln/>
+                <a:solidFill>
+                  <a:schemeClr val="tx1">
+                    <a:lumMod val="65000"/>
+                    <a:lumOff val="35000"/>
+                  </a:schemeClr>
+                </a:solidFill>
+              </a:rPr>
+              <a:t>CIROANDREA GAGLIANO</a:t>
+            </a:r>
+          </a:p>
+        </p:txBody>
+      </p:sp>
+      <p:sp>
+        <p:nvSpPr>
+          <p:cNvPr id="10" name="Rettangolo 9">
+            <a:extLst>
+              <a:ext uri="{FF2B5EF4-FFF2-40B4-BE49-F238E27FC236}">
+                <a16:creationId xmlns:a16="http://schemas.microsoft.com/office/drawing/2014/main" id="{E600AE63-73E0-AB9E-F161-61C9BB22A23E}"/>
               </a:ext>
             </a:extLst>
           </p:cNvPr>
@@ -3721,8 +3899,8 @@
         </p:nvSpPr>
         <p:spPr>
           <a:xfrm>
-            <a:off x="4454908" y="2209852"/>
-            <a:ext cx="3282181" cy="1077218"/>
+            <a:off x="4454908" y="3570931"/>
+            <a:ext cx="2449517" cy="1077218"/>
           </a:xfrm>
           <a:prstGeom prst="rect">
             <a:avLst/>
@@ -3757,7 +3935,7 @@
                   </a:schemeClr>
                 </a:solidFill>
               </a:rPr>
-              <a:t>BACK-END:</a:t>
+              <a:t>FRONT-END:</a:t>
             </a:r>
             <a:endParaRPr lang="it-IT" sz="2400" b="1" cap="none" spc="0" dirty="0">
               <a:ln/>
@@ -3786,7 +3964,7 @@
                 </a:solidFill>
                 <a:effectLst/>
               </a:rPr>
-              <a:t>ANDREA CANNAVO’</a:t>
+              <a:t>ENRICO BERTA</a:t>
             </a:r>
           </a:p>
           <a:p>
@@ -3804,17 +3982,17 @@
                   </a:schemeClr>
                 </a:solidFill>
               </a:rPr>
-              <a:t>CIROANDREA GAGLIANO</a:t>
-            </a:r>
-          </a:p>
-        </p:txBody>
-      </p:sp>
-      <p:sp>
-        <p:nvSpPr>
-          <p:cNvPr id="10" name="Rettangolo 9">
-            <a:extLst>
-              <a:ext uri="{FF2B5EF4-FFF2-40B4-BE49-F238E27FC236}">
-                <a16:creationId xmlns:a16="http://schemas.microsoft.com/office/drawing/2014/main" id="{E600AE63-73E0-AB9E-F161-61C9BB22A23E}"/>
+              <a:t>ALESSIA ALFIERO</a:t>
+            </a:r>
+          </a:p>
+        </p:txBody>
+      </p:sp>
+      <p:sp>
+        <p:nvSpPr>
+          <p:cNvPr id="11" name="Rettangolo 10">
+            <a:extLst>
+              <a:ext uri="{FF2B5EF4-FFF2-40B4-BE49-F238E27FC236}">
+                <a16:creationId xmlns:a16="http://schemas.microsoft.com/office/drawing/2014/main" id="{76A10999-D6E5-62CF-99A8-2DC2D07C630E}"/>
               </a:ext>
             </a:extLst>
           </p:cNvPr>
@@ -3823,8 +4001,8 @@
         </p:nvSpPr>
         <p:spPr>
           <a:xfrm>
-            <a:off x="4454908" y="3570931"/>
-            <a:ext cx="2449517" cy="1077218"/>
+            <a:off x="4454908" y="5002345"/>
+            <a:ext cx="2885342" cy="769441"/>
           </a:xfrm>
           <a:prstGeom prst="rect">
             <a:avLst/>
@@ -3859,7 +4037,7 @@
                   </a:schemeClr>
                 </a:solidFill>
               </a:rPr>
-              <a:t>FRONT-END:</a:t>
+              <a:t>DATABASE:</a:t>
             </a:r>
             <a:endParaRPr lang="it-IT" sz="2400" b="1" cap="none" spc="0" dirty="0">
               <a:ln/>
@@ -3888,35 +4066,26 @@
                 </a:solidFill>
                 <a:effectLst/>
               </a:rPr>
-              <a:t>ENRICO BERTA</a:t>
-            </a:r>
-          </a:p>
-          <a:p>
-            <a:pPr marL="457200" indent="-457200">
-              <a:buFont typeface="Arial" panose="020B0604020202020204" pitchFamily="34" charset="0"/>
-              <a:buChar char="•"/>
-            </a:pPr>
-            <a:r>
-              <a:rPr lang="it-IT" sz="2000" b="1" dirty="0">
-                <a:ln/>
-                <a:solidFill>
-                  <a:schemeClr val="tx1">
-                    <a:lumMod val="65000"/>
-                    <a:lumOff val="35000"/>
-                  </a:schemeClr>
-                </a:solidFill>
-              </a:rPr>
-              <a:t>ALESSIA ALFIERO</a:t>
-            </a:r>
-          </a:p>
-        </p:txBody>
-      </p:sp>
-      <p:sp>
-        <p:nvSpPr>
-          <p:cNvPr id="11" name="Rettangolo 10">
-            <a:extLst>
-              <a:ext uri="{FF2B5EF4-FFF2-40B4-BE49-F238E27FC236}">
-                <a16:creationId xmlns:a16="http://schemas.microsoft.com/office/drawing/2014/main" id="{76A10999-D6E5-62CF-99A8-2DC2D07C630E}"/>
+              <a:t>GABRIELE D’ORTENZI</a:t>
+            </a:r>
+            <a:endParaRPr lang="it-IT" sz="2000" b="1" dirty="0">
+              <a:ln/>
+              <a:solidFill>
+                <a:schemeClr val="tx1">
+                  <a:lumMod val="65000"/>
+                  <a:lumOff val="35000"/>
+                </a:schemeClr>
+              </a:solidFill>
+            </a:endParaRPr>
+          </a:p>
+        </p:txBody>
+      </p:sp>
+      <p:sp>
+        <p:nvSpPr>
+          <p:cNvPr id="12" name="Rettangolo 11">
+            <a:extLst>
+              <a:ext uri="{FF2B5EF4-FFF2-40B4-BE49-F238E27FC236}">
+                <a16:creationId xmlns:a16="http://schemas.microsoft.com/office/drawing/2014/main" id="{70C1C688-AF48-D625-D6DE-D276E8CA8175}"/>
               </a:ext>
             </a:extLst>
           </p:cNvPr>
@@ -3925,8 +4094,8 @@
         </p:nvSpPr>
         <p:spPr>
           <a:xfrm>
-            <a:off x="4454908" y="5002345"/>
-            <a:ext cx="2885342" cy="769441"/>
+            <a:off x="4409480" y="1470934"/>
+            <a:ext cx="3373039" cy="523220"/>
           </a:xfrm>
           <a:prstGeom prst="rect">
             <a:avLst/>
@@ -3952,7 +4121,7 @@
           <a:lstStyle/>
           <a:p>
             <a:r>
-              <a:rPr lang="it-IT" sz="2400" b="1" dirty="0">
+              <a:rPr lang="it-IT" sz="2800" b="1" dirty="0">
                 <a:ln/>
                 <a:solidFill>
                   <a:schemeClr val="tx1">
@@ -3961,55 +4130,17 @@
                   </a:schemeClr>
                 </a:solidFill>
               </a:rPr>
-              <a:t>DATABASE:</a:t>
-            </a:r>
-            <a:endParaRPr lang="it-IT" sz="2400" b="1" cap="none" spc="0" dirty="0">
-              <a:ln/>
-              <a:solidFill>
-                <a:schemeClr val="tx1">
-                  <a:lumMod val="65000"/>
-                  <a:lumOff val="35000"/>
-                </a:schemeClr>
-              </a:solidFill>
-              <a:effectLst/>
-            </a:endParaRPr>
-          </a:p>
-          <a:p>
-            <a:pPr marL="457200" indent="-457200">
-              <a:buFont typeface="Arial" panose="020B0604020202020204" pitchFamily="34" charset="0"/>
-              <a:buChar char="•"/>
-            </a:pPr>
-            <a:r>
-              <a:rPr lang="it-IT" sz="2000" b="1" cap="none" spc="0" dirty="0">
-                <a:ln/>
-                <a:solidFill>
-                  <a:schemeClr val="tx1">
-                    <a:lumMod val="65000"/>
-                    <a:lumOff val="35000"/>
-                  </a:schemeClr>
-                </a:solidFill>
-                <a:effectLst/>
-              </a:rPr>
-              <a:t>GABRIELE D’ORTENZI</a:t>
-            </a:r>
-            <a:endParaRPr lang="it-IT" sz="2000" b="1" dirty="0">
-              <a:ln/>
-              <a:solidFill>
-                <a:schemeClr val="tx1">
-                  <a:lumMod val="65000"/>
-                  <a:lumOff val="35000"/>
-                </a:schemeClr>
-              </a:solidFill>
-            </a:endParaRPr>
-          </a:p>
-        </p:txBody>
-      </p:sp>
-      <p:sp>
-        <p:nvSpPr>
-          <p:cNvPr id="12" name="Rettangolo 11">
-            <a:extLst>
-              <a:ext uri="{FF2B5EF4-FFF2-40B4-BE49-F238E27FC236}">
-                <a16:creationId xmlns:a16="http://schemas.microsoft.com/office/drawing/2014/main" id="{70C1C688-AF48-D625-D6DE-D276E8CA8175}"/>
+              <a:t>SUDDIVISIONE RUOLI</a:t>
+            </a:r>
+          </a:p>
+        </p:txBody>
+      </p:sp>
+      <p:sp>
+        <p:nvSpPr>
+          <p:cNvPr id="9" name="Rettangolo 8">
+            <a:extLst>
+              <a:ext uri="{FF2B5EF4-FFF2-40B4-BE49-F238E27FC236}">
+                <a16:creationId xmlns:a16="http://schemas.microsoft.com/office/drawing/2014/main" id="{B9B2F3D3-82CC-27AA-B4BA-A2669BCE6348}"/>
               </a:ext>
             </a:extLst>
           </p:cNvPr>
@@ -4018,8 +4149,8 @@
         </p:nvSpPr>
         <p:spPr>
           <a:xfrm>
-            <a:off x="4409480" y="1470934"/>
-            <a:ext cx="3373039" cy="523220"/>
+            <a:off x="-565607" y="253632"/>
+            <a:ext cx="13338928" cy="646331"/>
           </a:xfrm>
           <a:prstGeom prst="rect">
             <a:avLst/>
@@ -4027,7 +4158,7 @@
           <a:noFill/>
         </p:spPr>
         <p:txBody>
-          <a:bodyPr wrap="none" lIns="91440" tIns="45720" rIns="91440" bIns="45720">
+          <a:bodyPr wrap="square" lIns="91440" tIns="45720" rIns="91440" bIns="45720">
             <a:spAutoFit/>
             <a:scene3d>
               <a:camera prst="orthographicFront"/>
@@ -4044,8 +4175,9 @@
           </a:bodyPr>
           <a:lstStyle/>
           <a:p>
-            <a:r>
-              <a:rPr lang="it-IT" sz="2800" b="1" dirty="0">
+            <a:pPr algn="ctr"/>
+            <a:r>
+              <a:rPr lang="it-IT" sz="3600" b="1" cap="none" spc="0" dirty="0">
                 <a:ln/>
                 <a:solidFill>
                   <a:schemeClr val="tx1">
@@ -4053,8 +4185,9 @@
                     <a:lumOff val="35000"/>
                   </a:schemeClr>
                 </a:solidFill>
+                <a:effectLst/>
               </a:rPr>
-              <a:t>SUDDIVISIONE RUOLI</a:t>
+              <a:t>PRESENTAZIONE PROJECT WORK FINALE: GIORNALE ONLINE</a:t>
             </a:r>
           </a:p>
         </p:txBody>
@@ -4069,6 +4202,438 @@
   <p:clrMapOvr>
     <a:masterClrMapping/>
   </p:clrMapOvr>
+  <p:timing>
+    <p:tnLst>
+      <p:par>
+        <p:cTn id="1" dur="indefinite" restart="never" nodeType="tmRoot">
+          <p:childTnLst>
+            <p:seq concurrent="1" nextAc="seek">
+              <p:cTn id="2" dur="indefinite" nodeType="mainSeq">
+                <p:childTnLst>
+                  <p:par>
+                    <p:cTn id="3" fill="hold">
+                      <p:stCondLst>
+                        <p:cond delay="indefinite"/>
+                      </p:stCondLst>
+                      <p:childTnLst>
+                        <p:par>
+                          <p:cTn id="4" fill="hold">
+                            <p:stCondLst>
+                              <p:cond delay="0"/>
+                            </p:stCondLst>
+                            <p:childTnLst>
+                              <p:par>
+                                <p:cTn id="5" presetID="42" presetClass="entr" presetSubtype="0" fill="hold" grpId="0" nodeType="clickEffect">
+                                  <p:stCondLst>
+                                    <p:cond delay="0"/>
+                                  </p:stCondLst>
+                                  <p:childTnLst>
+                                    <p:set>
+                                      <p:cBhvr>
+                                        <p:cTn id="6" dur="1" fill="hold">
+                                          <p:stCondLst>
+                                            <p:cond delay="0"/>
+                                          </p:stCondLst>
+                                        </p:cTn>
+                                        <p:tgtEl>
+                                          <p:spTgt spid="12"/>
+                                        </p:tgtEl>
+                                        <p:attrNameLst>
+                                          <p:attrName>style.visibility</p:attrName>
+                                        </p:attrNameLst>
+                                      </p:cBhvr>
+                                      <p:to>
+                                        <p:strVal val="visible"/>
+                                      </p:to>
+                                    </p:set>
+                                    <p:animEffect transition="in" filter="fade">
+                                      <p:cBhvr>
+                                        <p:cTn id="7" dur="1000"/>
+                                        <p:tgtEl>
+                                          <p:spTgt spid="12"/>
+                                        </p:tgtEl>
+                                      </p:cBhvr>
+                                    </p:animEffect>
+                                    <p:anim calcmode="lin" valueType="num">
+                                      <p:cBhvr>
+                                        <p:cTn id="8" dur="1000" fill="hold"/>
+                                        <p:tgtEl>
+                                          <p:spTgt spid="12"/>
+                                        </p:tgtEl>
+                                        <p:attrNameLst>
+                                          <p:attrName>ppt_x</p:attrName>
+                                        </p:attrNameLst>
+                                      </p:cBhvr>
+                                      <p:tavLst>
+                                        <p:tav tm="0">
+                                          <p:val>
+                                            <p:strVal val="#ppt_x"/>
+                                          </p:val>
+                                        </p:tav>
+                                        <p:tav tm="100000">
+                                          <p:val>
+                                            <p:strVal val="#ppt_x"/>
+                                          </p:val>
+                                        </p:tav>
+                                      </p:tavLst>
+                                    </p:anim>
+                                    <p:anim calcmode="lin" valueType="num">
+                                      <p:cBhvr>
+                                        <p:cTn id="9" dur="1000" fill="hold"/>
+                                        <p:tgtEl>
+                                          <p:spTgt spid="12"/>
+                                        </p:tgtEl>
+                                        <p:attrNameLst>
+                                          <p:attrName>ppt_y</p:attrName>
+                                        </p:attrNameLst>
+                                      </p:cBhvr>
+                                      <p:tavLst>
+                                        <p:tav tm="0">
+                                          <p:val>
+                                            <p:strVal val="#ppt_y+.1"/>
+                                          </p:val>
+                                        </p:tav>
+                                        <p:tav tm="100000">
+                                          <p:val>
+                                            <p:strVal val="#ppt_y"/>
+                                          </p:val>
+                                        </p:tav>
+                                      </p:tavLst>
+                                    </p:anim>
+                                  </p:childTnLst>
+                                </p:cTn>
+                              </p:par>
+                            </p:childTnLst>
+                          </p:cTn>
+                        </p:par>
+                      </p:childTnLst>
+                    </p:cTn>
+                  </p:par>
+                  <p:par>
+                    <p:cTn id="10" fill="hold">
+                      <p:stCondLst>
+                        <p:cond delay="indefinite"/>
+                      </p:stCondLst>
+                      <p:childTnLst>
+                        <p:par>
+                          <p:cTn id="11" fill="hold">
+                            <p:stCondLst>
+                              <p:cond delay="0"/>
+                            </p:stCondLst>
+                            <p:childTnLst>
+                              <p:par>
+                                <p:cTn id="12" presetID="42" presetClass="entr" presetSubtype="0" fill="hold" grpId="0" nodeType="clickEffect">
+                                  <p:stCondLst>
+                                    <p:cond delay="0"/>
+                                  </p:stCondLst>
+                                  <p:childTnLst>
+                                    <p:set>
+                                      <p:cBhvr>
+                                        <p:cTn id="13" dur="1" fill="hold">
+                                          <p:stCondLst>
+                                            <p:cond delay="0"/>
+                                          </p:stCondLst>
+                                        </p:cTn>
+                                        <p:tgtEl>
+                                          <p:spTgt spid="6"/>
+                                        </p:tgtEl>
+                                        <p:attrNameLst>
+                                          <p:attrName>style.visibility</p:attrName>
+                                        </p:attrNameLst>
+                                      </p:cBhvr>
+                                      <p:to>
+                                        <p:strVal val="visible"/>
+                                      </p:to>
+                                    </p:set>
+                                    <p:animEffect transition="in" filter="fade">
+                                      <p:cBhvr>
+                                        <p:cTn id="14" dur="1000"/>
+                                        <p:tgtEl>
+                                          <p:spTgt spid="6"/>
+                                        </p:tgtEl>
+                                      </p:cBhvr>
+                                    </p:animEffect>
+                                    <p:anim calcmode="lin" valueType="num">
+                                      <p:cBhvr>
+                                        <p:cTn id="15" dur="1000" fill="hold"/>
+                                        <p:tgtEl>
+                                          <p:spTgt spid="6"/>
+                                        </p:tgtEl>
+                                        <p:attrNameLst>
+                                          <p:attrName>ppt_x</p:attrName>
+                                        </p:attrNameLst>
+                                      </p:cBhvr>
+                                      <p:tavLst>
+                                        <p:tav tm="0">
+                                          <p:val>
+                                            <p:strVal val="#ppt_x"/>
+                                          </p:val>
+                                        </p:tav>
+                                        <p:tav tm="100000">
+                                          <p:val>
+                                            <p:strVal val="#ppt_x"/>
+                                          </p:val>
+                                        </p:tav>
+                                      </p:tavLst>
+                                    </p:anim>
+                                    <p:anim calcmode="lin" valueType="num">
+                                      <p:cBhvr>
+                                        <p:cTn id="16" dur="1000" fill="hold"/>
+                                        <p:tgtEl>
+                                          <p:spTgt spid="6"/>
+                                        </p:tgtEl>
+                                        <p:attrNameLst>
+                                          <p:attrName>ppt_y</p:attrName>
+                                        </p:attrNameLst>
+                                      </p:cBhvr>
+                                      <p:tavLst>
+                                        <p:tav tm="0">
+                                          <p:val>
+                                            <p:strVal val="#ppt_y+.1"/>
+                                          </p:val>
+                                        </p:tav>
+                                        <p:tav tm="100000">
+                                          <p:val>
+                                            <p:strVal val="#ppt_y"/>
+                                          </p:val>
+                                        </p:tav>
+                                      </p:tavLst>
+                                    </p:anim>
+                                  </p:childTnLst>
+                                </p:cTn>
+                              </p:par>
+                            </p:childTnLst>
+                          </p:cTn>
+                        </p:par>
+                      </p:childTnLst>
+                    </p:cTn>
+                  </p:par>
+                  <p:par>
+                    <p:cTn id="17" fill="hold">
+                      <p:stCondLst>
+                        <p:cond delay="indefinite"/>
+                      </p:stCondLst>
+                      <p:childTnLst>
+                        <p:par>
+                          <p:cTn id="18" fill="hold">
+                            <p:stCondLst>
+                              <p:cond delay="0"/>
+                            </p:stCondLst>
+                            <p:childTnLst>
+                              <p:par>
+                                <p:cTn id="19" presetID="42" presetClass="entr" presetSubtype="0" fill="hold" grpId="0" nodeType="clickEffect">
+                                  <p:stCondLst>
+                                    <p:cond delay="0"/>
+                                  </p:stCondLst>
+                                  <p:childTnLst>
+                                    <p:set>
+                                      <p:cBhvr>
+                                        <p:cTn id="20" dur="1" fill="hold">
+                                          <p:stCondLst>
+                                            <p:cond delay="0"/>
+                                          </p:stCondLst>
+                                        </p:cTn>
+                                        <p:tgtEl>
+                                          <p:spTgt spid="10"/>
+                                        </p:tgtEl>
+                                        <p:attrNameLst>
+                                          <p:attrName>style.visibility</p:attrName>
+                                        </p:attrNameLst>
+                                      </p:cBhvr>
+                                      <p:to>
+                                        <p:strVal val="visible"/>
+                                      </p:to>
+                                    </p:set>
+                                    <p:animEffect transition="in" filter="fade">
+                                      <p:cBhvr>
+                                        <p:cTn id="21" dur="1000"/>
+                                        <p:tgtEl>
+                                          <p:spTgt spid="10"/>
+                                        </p:tgtEl>
+                                      </p:cBhvr>
+                                    </p:animEffect>
+                                    <p:anim calcmode="lin" valueType="num">
+                                      <p:cBhvr>
+                                        <p:cTn id="22" dur="1000" fill="hold"/>
+                                        <p:tgtEl>
+                                          <p:spTgt spid="10"/>
+                                        </p:tgtEl>
+                                        <p:attrNameLst>
+                                          <p:attrName>ppt_x</p:attrName>
+                                        </p:attrNameLst>
+                                      </p:cBhvr>
+                                      <p:tavLst>
+                                        <p:tav tm="0">
+                                          <p:val>
+                                            <p:strVal val="#ppt_x"/>
+                                          </p:val>
+                                        </p:tav>
+                                        <p:tav tm="100000">
+                                          <p:val>
+                                            <p:strVal val="#ppt_x"/>
+                                          </p:val>
+                                        </p:tav>
+                                      </p:tavLst>
+                                    </p:anim>
+                                    <p:anim calcmode="lin" valueType="num">
+                                      <p:cBhvr>
+                                        <p:cTn id="23" dur="1000" fill="hold"/>
+                                        <p:tgtEl>
+                                          <p:spTgt spid="10"/>
+                                        </p:tgtEl>
+                                        <p:attrNameLst>
+                                          <p:attrName>ppt_y</p:attrName>
+                                        </p:attrNameLst>
+                                      </p:cBhvr>
+                                      <p:tavLst>
+                                        <p:tav tm="0">
+                                          <p:val>
+                                            <p:strVal val="#ppt_y+.1"/>
+                                          </p:val>
+                                        </p:tav>
+                                        <p:tav tm="100000">
+                                          <p:val>
+                                            <p:strVal val="#ppt_y"/>
+                                          </p:val>
+                                        </p:tav>
+                                      </p:tavLst>
+                                    </p:anim>
+                                  </p:childTnLst>
+                                </p:cTn>
+                              </p:par>
+                            </p:childTnLst>
+                          </p:cTn>
+                        </p:par>
+                      </p:childTnLst>
+                    </p:cTn>
+                  </p:par>
+                  <p:par>
+                    <p:cTn id="24" fill="hold">
+                      <p:stCondLst>
+                        <p:cond delay="indefinite"/>
+                      </p:stCondLst>
+                      <p:childTnLst>
+                        <p:par>
+                          <p:cTn id="25" fill="hold">
+                            <p:stCondLst>
+                              <p:cond delay="0"/>
+                            </p:stCondLst>
+                            <p:childTnLst>
+                              <p:par>
+                                <p:cTn id="26" presetID="42" presetClass="entr" presetSubtype="0" fill="hold" grpId="0" nodeType="clickEffect">
+                                  <p:stCondLst>
+                                    <p:cond delay="0"/>
+                                  </p:stCondLst>
+                                  <p:childTnLst>
+                                    <p:set>
+                                      <p:cBhvr>
+                                        <p:cTn id="27" dur="1" fill="hold">
+                                          <p:stCondLst>
+                                            <p:cond delay="0"/>
+                                          </p:stCondLst>
+                                        </p:cTn>
+                                        <p:tgtEl>
+                                          <p:spTgt spid="11"/>
+                                        </p:tgtEl>
+                                        <p:attrNameLst>
+                                          <p:attrName>style.visibility</p:attrName>
+                                        </p:attrNameLst>
+                                      </p:cBhvr>
+                                      <p:to>
+                                        <p:strVal val="visible"/>
+                                      </p:to>
+                                    </p:set>
+                                    <p:animEffect transition="in" filter="fade">
+                                      <p:cBhvr>
+                                        <p:cTn id="28" dur="1000"/>
+                                        <p:tgtEl>
+                                          <p:spTgt spid="11"/>
+                                        </p:tgtEl>
+                                      </p:cBhvr>
+                                    </p:animEffect>
+                                    <p:anim calcmode="lin" valueType="num">
+                                      <p:cBhvr>
+                                        <p:cTn id="29" dur="1000" fill="hold"/>
+                                        <p:tgtEl>
+                                          <p:spTgt spid="11"/>
+                                        </p:tgtEl>
+                                        <p:attrNameLst>
+                                          <p:attrName>ppt_x</p:attrName>
+                                        </p:attrNameLst>
+                                      </p:cBhvr>
+                                      <p:tavLst>
+                                        <p:tav tm="0">
+                                          <p:val>
+                                            <p:strVal val="#ppt_x"/>
+                                          </p:val>
+                                        </p:tav>
+                                        <p:tav tm="100000">
+                                          <p:val>
+                                            <p:strVal val="#ppt_x"/>
+                                          </p:val>
+                                        </p:tav>
+                                      </p:tavLst>
+                                    </p:anim>
+                                    <p:anim calcmode="lin" valueType="num">
+                                      <p:cBhvr>
+                                        <p:cTn id="30" dur="1000" fill="hold"/>
+                                        <p:tgtEl>
+                                          <p:spTgt spid="11"/>
+                                        </p:tgtEl>
+                                        <p:attrNameLst>
+                                          <p:attrName>ppt_y</p:attrName>
+                                        </p:attrNameLst>
+                                      </p:cBhvr>
+                                      <p:tavLst>
+                                        <p:tav tm="0">
+                                          <p:val>
+                                            <p:strVal val="#ppt_y+.1"/>
+                                          </p:val>
+                                        </p:tav>
+                                        <p:tav tm="100000">
+                                          <p:val>
+                                            <p:strVal val="#ppt_y"/>
+                                          </p:val>
+                                        </p:tav>
+                                      </p:tavLst>
+                                    </p:anim>
+                                  </p:childTnLst>
+                                </p:cTn>
+                              </p:par>
+                            </p:childTnLst>
+                          </p:cTn>
+                        </p:par>
+                      </p:childTnLst>
+                    </p:cTn>
+                  </p:par>
+                </p:childTnLst>
+              </p:cTn>
+              <p:prevCondLst>
+                <p:cond evt="onPrev" delay="0">
+                  <p:tgtEl>
+                    <p:sldTgt/>
+                  </p:tgtEl>
+                </p:cond>
+              </p:prevCondLst>
+              <p:nextCondLst>
+                <p:cond evt="onNext" delay="0">
+                  <p:tgtEl>
+                    <p:sldTgt/>
+                  </p:tgtEl>
+                </p:cond>
+              </p:nextCondLst>
+            </p:seq>
+          </p:childTnLst>
+        </p:cTn>
+      </p:par>
+    </p:tnLst>
+    <p:bldLst>
+      <p:bldP spid="6" grpId="0"/>
+      <p:bldP spid="10" grpId="0"/>
+      <p:bldP spid="11" grpId="0"/>
+      <p:bldP spid="12" grpId="0"/>
+    </p:bldLst>
+  </p:timing>
 </p:sld>
 </file>
 
@@ -4163,10 +4728,10 @@
       </p:pic>
       <p:sp>
         <p:nvSpPr>
-          <p:cNvPr id="7" name="Rettangolo 6">
-            <a:extLst>
-              <a:ext uri="{FF2B5EF4-FFF2-40B4-BE49-F238E27FC236}">
-                <a16:creationId xmlns:a16="http://schemas.microsoft.com/office/drawing/2014/main" id="{9BA3BA0E-BB3E-3A08-CE0C-A5EFFC55CD0D}"/>
+          <p:cNvPr id="8" name="Rettangolo 7">
+            <a:extLst>
+              <a:ext uri="{FF2B5EF4-FFF2-40B4-BE49-F238E27FC236}">
+                <a16:creationId xmlns:a16="http://schemas.microsoft.com/office/drawing/2014/main" id="{6DD07A7E-63B2-A019-2829-236C897DAD8B}"/>
               </a:ext>
             </a:extLst>
           </p:cNvPr>
@@ -4175,8 +4740,8 @@
         </p:nvSpPr>
         <p:spPr>
           <a:xfrm>
-            <a:off x="508220" y="253632"/>
-            <a:ext cx="11175560" cy="707886"/>
+            <a:off x="3763919" y="2065150"/>
+            <a:ext cx="5173212" cy="523220"/>
           </a:xfrm>
           <a:prstGeom prst="rect">
             <a:avLst/>
@@ -4203,7 +4768,7 @@
           <a:p>
             <a:pPr algn="ctr"/>
             <a:r>
-              <a:rPr lang="it-IT" sz="4000" b="1" cap="none" spc="0" dirty="0">
+              <a:rPr lang="it-IT" sz="2800" b="1" dirty="0">
                 <a:ln/>
                 <a:solidFill>
                   <a:schemeClr val="tx1">
@@ -4211,19 +4776,28 @@
                     <a:lumOff val="35000"/>
                   </a:schemeClr>
                 </a:solidFill>
-                <a:effectLst/>
               </a:rPr>
-              <a:t>PRESENTAZIONE PROJECT WORK FINALE: GIORNALE</a:t>
-            </a:r>
-          </a:p>
-        </p:txBody>
-      </p:sp>
-      <p:sp>
-        <p:nvSpPr>
-          <p:cNvPr id="8" name="Rettangolo 7">
-            <a:extLst>
-              <a:ext uri="{FF2B5EF4-FFF2-40B4-BE49-F238E27FC236}">
-                <a16:creationId xmlns:a16="http://schemas.microsoft.com/office/drawing/2014/main" id="{6DD07A7E-63B2-A019-2829-236C897DAD8B}"/>
+              <a:t>INIZIALIZZAZIONE DEL PROGETTO</a:t>
+            </a:r>
+            <a:endParaRPr lang="it-IT" sz="2800" b="1" cap="none" spc="0" dirty="0">
+              <a:ln/>
+              <a:solidFill>
+                <a:schemeClr val="tx1">
+                  <a:lumMod val="65000"/>
+                  <a:lumOff val="35000"/>
+                </a:schemeClr>
+              </a:solidFill>
+              <a:effectLst/>
+            </a:endParaRPr>
+          </a:p>
+        </p:txBody>
+      </p:sp>
+      <p:sp>
+        <p:nvSpPr>
+          <p:cNvPr id="9" name="Rettangolo 8">
+            <a:extLst>
+              <a:ext uri="{FF2B5EF4-FFF2-40B4-BE49-F238E27FC236}">
+                <a16:creationId xmlns:a16="http://schemas.microsoft.com/office/drawing/2014/main" id="{2ACFA890-9D80-AE7C-8440-6CA32739D485}"/>
               </a:ext>
             </a:extLst>
           </p:cNvPr>
@@ -4232,8 +4806,8 @@
         </p:nvSpPr>
         <p:spPr>
           <a:xfrm>
-            <a:off x="3763919" y="2065150"/>
-            <a:ext cx="5173212" cy="523220"/>
+            <a:off x="-565607" y="253632"/>
+            <a:ext cx="13338928" cy="646331"/>
           </a:xfrm>
           <a:prstGeom prst="rect">
             <a:avLst/>
@@ -4241,7 +4815,7 @@
           <a:noFill/>
         </p:spPr>
         <p:txBody>
-          <a:bodyPr wrap="none" lIns="91440" tIns="45720" rIns="91440" bIns="45720">
+          <a:bodyPr wrap="square" lIns="91440" tIns="45720" rIns="91440" bIns="45720">
             <a:spAutoFit/>
             <a:scene3d>
               <a:camera prst="orthographicFront"/>
@@ -4260,7 +4834,7 @@
           <a:p>
             <a:pPr algn="ctr"/>
             <a:r>
-              <a:rPr lang="it-IT" sz="2800" b="1" dirty="0">
+              <a:rPr lang="it-IT" sz="3600" b="1" cap="none" spc="0" dirty="0">
                 <a:ln/>
                 <a:solidFill>
                   <a:schemeClr val="tx1">
@@ -4268,19 +4842,10 @@
                     <a:lumOff val="35000"/>
                   </a:schemeClr>
                 </a:solidFill>
+                <a:effectLst/>
               </a:rPr>
-              <a:t>INIZIALIZZAZIONE DEL PROGETTO</a:t>
-            </a:r>
-            <a:endParaRPr lang="it-IT" sz="2800" b="1" cap="none" spc="0" dirty="0">
-              <a:ln/>
-              <a:solidFill>
-                <a:schemeClr val="tx1">
-                  <a:lumMod val="65000"/>
-                  <a:lumOff val="35000"/>
-                </a:schemeClr>
-              </a:solidFill>
-              <a:effectLst/>
-            </a:endParaRPr>
+              <a:t>PRESENTAZIONE PROJECT WORK FINALE: GIORNALE ONLINE</a:t>
+            </a:r>
           </a:p>
         </p:txBody>
       </p:sp>
@@ -4294,6 +4859,237 @@
   <p:clrMapOvr>
     <a:masterClrMapping/>
   </p:clrMapOvr>
+  <p:timing>
+    <p:tnLst>
+      <p:par>
+        <p:cTn id="1" dur="indefinite" restart="never" nodeType="tmRoot">
+          <p:childTnLst>
+            <p:seq concurrent="1" nextAc="seek">
+              <p:cTn id="2" dur="indefinite" nodeType="mainSeq">
+                <p:childTnLst>
+                  <p:par>
+                    <p:cTn id="3" fill="hold">
+                      <p:stCondLst>
+                        <p:cond delay="indefinite"/>
+                      </p:stCondLst>
+                      <p:childTnLst>
+                        <p:par>
+                          <p:cTn id="4" fill="hold">
+                            <p:stCondLst>
+                              <p:cond delay="0"/>
+                            </p:stCondLst>
+                            <p:childTnLst>
+                              <p:par>
+                                <p:cTn id="5" presetID="42" presetClass="entr" presetSubtype="0" fill="hold" grpId="0" nodeType="clickEffect">
+                                  <p:stCondLst>
+                                    <p:cond delay="0"/>
+                                  </p:stCondLst>
+                                  <p:childTnLst>
+                                    <p:set>
+                                      <p:cBhvr>
+                                        <p:cTn id="6" dur="1" fill="hold">
+                                          <p:stCondLst>
+                                            <p:cond delay="0"/>
+                                          </p:stCondLst>
+                                        </p:cTn>
+                                        <p:tgtEl>
+                                          <p:spTgt spid="8"/>
+                                        </p:tgtEl>
+                                        <p:attrNameLst>
+                                          <p:attrName>style.visibility</p:attrName>
+                                        </p:attrNameLst>
+                                      </p:cBhvr>
+                                      <p:to>
+                                        <p:strVal val="visible"/>
+                                      </p:to>
+                                    </p:set>
+                                    <p:animEffect transition="in" filter="fade">
+                                      <p:cBhvr>
+                                        <p:cTn id="7" dur="1000"/>
+                                        <p:tgtEl>
+                                          <p:spTgt spid="8"/>
+                                        </p:tgtEl>
+                                      </p:cBhvr>
+                                    </p:animEffect>
+                                    <p:anim calcmode="lin" valueType="num">
+                                      <p:cBhvr>
+                                        <p:cTn id="8" dur="1000" fill="hold"/>
+                                        <p:tgtEl>
+                                          <p:spTgt spid="8"/>
+                                        </p:tgtEl>
+                                        <p:attrNameLst>
+                                          <p:attrName>ppt_x</p:attrName>
+                                        </p:attrNameLst>
+                                      </p:cBhvr>
+                                      <p:tavLst>
+                                        <p:tav tm="0">
+                                          <p:val>
+                                            <p:strVal val="#ppt_x"/>
+                                          </p:val>
+                                        </p:tav>
+                                        <p:tav tm="100000">
+                                          <p:val>
+                                            <p:strVal val="#ppt_x"/>
+                                          </p:val>
+                                        </p:tav>
+                                      </p:tavLst>
+                                    </p:anim>
+                                    <p:anim calcmode="lin" valueType="num">
+                                      <p:cBhvr>
+                                        <p:cTn id="9" dur="1000" fill="hold"/>
+                                        <p:tgtEl>
+                                          <p:spTgt spid="8"/>
+                                        </p:tgtEl>
+                                        <p:attrNameLst>
+                                          <p:attrName>ppt_y</p:attrName>
+                                        </p:attrNameLst>
+                                      </p:cBhvr>
+                                      <p:tavLst>
+                                        <p:tav tm="0">
+                                          <p:val>
+                                            <p:strVal val="#ppt_y+.1"/>
+                                          </p:val>
+                                        </p:tav>
+                                        <p:tav tm="100000">
+                                          <p:val>
+                                            <p:strVal val="#ppt_y"/>
+                                          </p:val>
+                                        </p:tav>
+                                      </p:tavLst>
+                                    </p:anim>
+                                  </p:childTnLst>
+                                </p:cTn>
+                              </p:par>
+                            </p:childTnLst>
+                          </p:cTn>
+                        </p:par>
+                      </p:childTnLst>
+                    </p:cTn>
+                  </p:par>
+                  <p:par>
+                    <p:cTn id="10" fill="hold">
+                      <p:stCondLst>
+                        <p:cond delay="indefinite"/>
+                      </p:stCondLst>
+                      <p:childTnLst>
+                        <p:par>
+                          <p:cTn id="11" fill="hold">
+                            <p:stCondLst>
+                              <p:cond delay="0"/>
+                            </p:stCondLst>
+                            <p:childTnLst>
+                              <p:par>
+                                <p:cTn id="12" presetID="42" presetClass="entr" presetSubtype="0" fill="hold" nodeType="clickEffect">
+                                  <p:stCondLst>
+                                    <p:cond delay="0"/>
+                                  </p:stCondLst>
+                                  <p:childTnLst>
+                                    <p:set>
+                                      <p:cBhvr>
+                                        <p:cTn id="13" dur="1" fill="hold">
+                                          <p:stCondLst>
+                                            <p:cond delay="0"/>
+                                          </p:stCondLst>
+                                        </p:cTn>
+                                        <p:tgtEl>
+                                          <p:spTgt spid="5"/>
+                                        </p:tgtEl>
+                                        <p:attrNameLst>
+                                          <p:attrName>style.visibility</p:attrName>
+                                        </p:attrNameLst>
+                                      </p:cBhvr>
+                                      <p:to>
+                                        <p:strVal val="visible"/>
+                                      </p:to>
+                                    </p:set>
+                                    <p:animEffect transition="in" filter="fade">
+                                      <p:cBhvr>
+                                        <p:cTn id="14" dur="1000"/>
+                                        <p:tgtEl>
+                                          <p:spTgt spid="5"/>
+                                        </p:tgtEl>
+                                      </p:cBhvr>
+                                    </p:animEffect>
+                                    <p:anim calcmode="lin" valueType="num">
+                                      <p:cBhvr>
+                                        <p:cTn id="15" dur="1000" fill="hold"/>
+                                        <p:tgtEl>
+                                          <p:spTgt spid="5"/>
+                                        </p:tgtEl>
+                                        <p:attrNameLst>
+                                          <p:attrName>ppt_x</p:attrName>
+                                        </p:attrNameLst>
+                                      </p:cBhvr>
+                                      <p:tavLst>
+                                        <p:tav tm="0">
+                                          <p:val>
+                                            <p:strVal val="#ppt_x"/>
+                                          </p:val>
+                                        </p:tav>
+                                        <p:tav tm="100000">
+                                          <p:val>
+                                            <p:strVal val="#ppt_x"/>
+                                          </p:val>
+                                        </p:tav>
+                                      </p:tavLst>
+                                    </p:anim>
+                                    <p:anim calcmode="lin" valueType="num">
+                                      <p:cBhvr>
+                                        <p:cTn id="16" dur="1000" fill="hold"/>
+                                        <p:tgtEl>
+                                          <p:spTgt spid="5"/>
+                                        </p:tgtEl>
+                                        <p:attrNameLst>
+                                          <p:attrName>ppt_y</p:attrName>
+                                        </p:attrNameLst>
+                                      </p:cBhvr>
+                                      <p:tavLst>
+                                        <p:tav tm="0">
+                                          <p:val>
+                                            <p:strVal val="#ppt_y+.1"/>
+                                          </p:val>
+                                        </p:tav>
+                                        <p:tav tm="100000">
+                                          <p:val>
+                                            <p:strVal val="#ppt_y"/>
+                                          </p:val>
+                                        </p:tav>
+                                      </p:tavLst>
+                                    </p:anim>
+                                  </p:childTnLst>
+                                </p:cTn>
+                              </p:par>
+                            </p:childTnLst>
+                          </p:cTn>
+                        </p:par>
+                      </p:childTnLst>
+                    </p:cTn>
+                  </p:par>
+                </p:childTnLst>
+              </p:cTn>
+              <p:prevCondLst>
+                <p:cond evt="onPrev" delay="0">
+                  <p:tgtEl>
+                    <p:sldTgt/>
+                  </p:tgtEl>
+                </p:cond>
+              </p:prevCondLst>
+              <p:nextCondLst>
+                <p:cond evt="onNext" delay="0">
+                  <p:tgtEl>
+                    <p:sldTgt/>
+                  </p:tgtEl>
+                </p:cond>
+              </p:nextCondLst>
+            </p:seq>
+          </p:childTnLst>
+        </p:cTn>
+      </p:par>
+    </p:tnLst>
+    <p:bldLst>
+      <p:bldP spid="8" grpId="0"/>
+    </p:bldLst>
+  </p:timing>
 </p:sld>
 </file>
 
@@ -4352,10 +5148,10 @@
       </p:pic>
       <p:sp>
         <p:nvSpPr>
-          <p:cNvPr id="6" name="Rettangolo 5">
-            <a:extLst>
-              <a:ext uri="{FF2B5EF4-FFF2-40B4-BE49-F238E27FC236}">
-                <a16:creationId xmlns:a16="http://schemas.microsoft.com/office/drawing/2014/main" id="{A1B42F9F-5B23-3CF4-0C1E-B6DC1E0AEF93}"/>
+          <p:cNvPr id="7" name="Rettangolo 6">
+            <a:extLst>
+              <a:ext uri="{FF2B5EF4-FFF2-40B4-BE49-F238E27FC236}">
+                <a16:creationId xmlns:a16="http://schemas.microsoft.com/office/drawing/2014/main" id="{D9BFFFC5-47EC-7C5F-070F-400B667CCFAD}"/>
               </a:ext>
             </a:extLst>
           </p:cNvPr>
@@ -4364,8 +5160,8 @@
         </p:nvSpPr>
         <p:spPr>
           <a:xfrm>
-            <a:off x="508220" y="253632"/>
-            <a:ext cx="11175560" cy="707886"/>
+            <a:off x="3765875" y="1716358"/>
+            <a:ext cx="5093895" cy="830997"/>
           </a:xfrm>
           <a:prstGeom prst="rect">
             <a:avLst/>
@@ -4392,7 +5188,22 @@
           <a:p>
             <a:pPr algn="ctr"/>
             <a:r>
-              <a:rPr lang="it-IT" sz="4000" b="1" cap="none" spc="0" dirty="0">
+              <a:rPr lang="it-IT" sz="2800" b="1" dirty="0">
+                <a:ln/>
+                <a:solidFill>
+                  <a:schemeClr val="tx1">
+                    <a:lumMod val="65000"/>
+                    <a:lumOff val="35000"/>
+                  </a:schemeClr>
+                </a:solidFill>
+              </a:rPr>
+              <a:t>CREAZIONE REPOSITORY GITHUB</a:t>
+            </a:r>
+          </a:p>
+          <a:p>
+            <a:pPr algn="ctr"/>
+            <a:r>
+              <a:rPr lang="it-IT" sz="2000" b="1" cap="none" spc="0" dirty="0">
                 <a:ln/>
                 <a:solidFill>
                   <a:schemeClr val="tx1">
@@ -4401,18 +5212,65 @@
                   </a:schemeClr>
                 </a:solidFill>
                 <a:effectLst/>
+                <a:hlinkClick r:id="rId3"/>
               </a:rPr>
-              <a:t>PRESENTAZIONE PROJECT WORK FINALE: GIORNALE</a:t>
-            </a:r>
-          </a:p>
-        </p:txBody>
-      </p:sp>
-      <p:sp>
-        <p:nvSpPr>
-          <p:cNvPr id="7" name="Rettangolo 6">
-            <a:extLst>
-              <a:ext uri="{FF2B5EF4-FFF2-40B4-BE49-F238E27FC236}">
-                <a16:creationId xmlns:a16="http://schemas.microsoft.com/office/drawing/2014/main" id="{D9BFFFC5-47EC-7C5F-070F-400B667CCFAD}"/>
+              <a:t>https://github.com/nDr3K/GiornaleOnlinePW</a:t>
+            </a:r>
+            <a:endParaRPr lang="it-IT" sz="2000" b="1" cap="none" spc="0" dirty="0">
+              <a:ln/>
+              <a:solidFill>
+                <a:schemeClr val="tx1">
+                  <a:lumMod val="65000"/>
+                  <a:lumOff val="35000"/>
+                </a:schemeClr>
+              </a:solidFill>
+              <a:effectLst/>
+            </a:endParaRPr>
+          </a:p>
+        </p:txBody>
+      </p:sp>
+      <p:pic>
+        <p:nvPicPr>
+          <p:cNvPr id="9" name="Immagine 8">
+            <a:extLst>
+              <a:ext uri="{FF2B5EF4-FFF2-40B4-BE49-F238E27FC236}">
+                <a16:creationId xmlns:a16="http://schemas.microsoft.com/office/drawing/2014/main" id="{6EC1B23C-DA3E-C83D-BA2F-90102124FE59}"/>
+              </a:ext>
+            </a:extLst>
+          </p:cNvPr>
+          <p:cNvPicPr>
+            <a:picLocks noChangeAspect="1"/>
+          </p:cNvPicPr>
+          <p:nvPr/>
+        </p:nvPicPr>
+        <p:blipFill>
+          <a:blip r:embed="rId4">
+            <a:extLst>
+              <a:ext uri="{28A0092B-C50C-407E-A947-70E740481C1C}">
+                <a14:useLocalDpi xmlns:a14="http://schemas.microsoft.com/office/drawing/2010/main" val="0"/>
+              </a:ext>
+            </a:extLst>
+          </a:blip>
+          <a:stretch>
+            <a:fillRect/>
+          </a:stretch>
+        </p:blipFill>
+        <p:spPr>
+          <a:xfrm>
+            <a:off x="2535810" y="2721795"/>
+            <a:ext cx="7711126" cy="3760076"/>
+          </a:xfrm>
+          <a:prstGeom prst="rect">
+            <a:avLst/>
+          </a:prstGeom>
+        </p:spPr>
+      </p:pic>
+      <p:sp>
+        <p:nvSpPr>
+          <p:cNvPr id="8" name="Rettangolo 7">
+            <a:extLst>
+              <a:ext uri="{FF2B5EF4-FFF2-40B4-BE49-F238E27FC236}">
+                <a16:creationId xmlns:a16="http://schemas.microsoft.com/office/drawing/2014/main" id="{2979C974-6E35-496B-321C-F61D552D20BC}"/>
               </a:ext>
             </a:extLst>
           </p:cNvPr>
@@ -4421,8 +5279,8 @@
         </p:nvSpPr>
         <p:spPr>
           <a:xfrm>
-            <a:off x="3765875" y="1716358"/>
-            <a:ext cx="5093895" cy="830997"/>
+            <a:off x="-565607" y="253632"/>
+            <a:ext cx="13338928" cy="646331"/>
           </a:xfrm>
           <a:prstGeom prst="rect">
             <a:avLst/>
@@ -4430,7 +5288,7 @@
           <a:noFill/>
         </p:spPr>
         <p:txBody>
-          <a:bodyPr wrap="none" lIns="91440" tIns="45720" rIns="91440" bIns="45720">
+          <a:bodyPr wrap="square" lIns="91440" tIns="45720" rIns="91440" bIns="45720">
             <a:spAutoFit/>
             <a:scene3d>
               <a:camera prst="orthographicFront"/>
@@ -4449,22 +5307,7 @@
           <a:p>
             <a:pPr algn="ctr"/>
             <a:r>
-              <a:rPr lang="it-IT" sz="2800" b="1" dirty="0">
-                <a:ln/>
-                <a:solidFill>
-                  <a:schemeClr val="tx1">
-                    <a:lumMod val="65000"/>
-                    <a:lumOff val="35000"/>
-                  </a:schemeClr>
-                </a:solidFill>
-              </a:rPr>
-              <a:t>CREAZIONE REPOSITORY GITHUB</a:t>
-            </a:r>
-          </a:p>
-          <a:p>
-            <a:pPr algn="ctr"/>
-            <a:r>
-              <a:rPr lang="it-IT" sz="2000" b="1" cap="none" spc="0" dirty="0">
+              <a:rPr lang="it-IT" sz="3600" b="1" cap="none" spc="0" dirty="0">
                 <a:ln/>
                 <a:solidFill>
                   <a:schemeClr val="tx1">
@@ -4473,59 +5316,12 @@
                   </a:schemeClr>
                 </a:solidFill>
                 <a:effectLst/>
-                <a:hlinkClick r:id="rId3"/>
               </a:rPr>
-              <a:t>https://github.com/nDr3K/GiornaleOnlinePW</a:t>
-            </a:r>
-            <a:endParaRPr lang="it-IT" sz="2000" b="1" cap="none" spc="0" dirty="0">
-              <a:ln/>
-              <a:solidFill>
-                <a:schemeClr val="tx1">
-                  <a:lumMod val="65000"/>
-                  <a:lumOff val="35000"/>
-                </a:schemeClr>
-              </a:solidFill>
-              <a:effectLst/>
-            </a:endParaRPr>
-          </a:p>
-        </p:txBody>
-      </p:sp>
-      <p:pic>
-        <p:nvPicPr>
-          <p:cNvPr id="9" name="Immagine 8">
-            <a:extLst>
-              <a:ext uri="{FF2B5EF4-FFF2-40B4-BE49-F238E27FC236}">
-                <a16:creationId xmlns:a16="http://schemas.microsoft.com/office/drawing/2014/main" id="{6EC1B23C-DA3E-C83D-BA2F-90102124FE59}"/>
-              </a:ext>
-            </a:extLst>
-          </p:cNvPr>
-          <p:cNvPicPr>
-            <a:picLocks noChangeAspect="1"/>
-          </p:cNvPicPr>
-          <p:nvPr/>
-        </p:nvPicPr>
-        <p:blipFill>
-          <a:blip r:embed="rId4">
-            <a:extLst>
-              <a:ext uri="{28A0092B-C50C-407E-A947-70E740481C1C}">
-                <a14:useLocalDpi xmlns:a14="http://schemas.microsoft.com/office/drawing/2010/main" val="0"/>
-              </a:ext>
-            </a:extLst>
-          </a:blip>
-          <a:stretch>
-            <a:fillRect/>
-          </a:stretch>
-        </p:blipFill>
-        <p:spPr>
-          <a:xfrm>
-            <a:off x="2535810" y="2721795"/>
-            <a:ext cx="7711126" cy="3760076"/>
-          </a:xfrm>
-          <a:prstGeom prst="rect">
-            <a:avLst/>
-          </a:prstGeom>
-        </p:spPr>
-      </p:pic>
+              <a:t>PRESENTAZIONE PROJECT WORK FINALE: GIORNALE ONLINE</a:t>
+            </a:r>
+          </a:p>
+        </p:txBody>
+      </p:sp>
     </p:spTree>
     <p:extLst>
       <p:ext uri="{BB962C8B-B14F-4D97-AF65-F5344CB8AC3E}">
@@ -4536,6 +5332,237 @@
   <p:clrMapOvr>
     <a:masterClrMapping/>
   </p:clrMapOvr>
+  <p:timing>
+    <p:tnLst>
+      <p:par>
+        <p:cTn id="1" dur="indefinite" restart="never" nodeType="tmRoot">
+          <p:childTnLst>
+            <p:seq concurrent="1" nextAc="seek">
+              <p:cTn id="2" dur="indefinite" nodeType="mainSeq">
+                <p:childTnLst>
+                  <p:par>
+                    <p:cTn id="3" fill="hold">
+                      <p:stCondLst>
+                        <p:cond delay="indefinite"/>
+                      </p:stCondLst>
+                      <p:childTnLst>
+                        <p:par>
+                          <p:cTn id="4" fill="hold">
+                            <p:stCondLst>
+                              <p:cond delay="0"/>
+                            </p:stCondLst>
+                            <p:childTnLst>
+                              <p:par>
+                                <p:cTn id="5" presetID="42" presetClass="entr" presetSubtype="0" fill="hold" grpId="0" nodeType="clickEffect">
+                                  <p:stCondLst>
+                                    <p:cond delay="0"/>
+                                  </p:stCondLst>
+                                  <p:childTnLst>
+                                    <p:set>
+                                      <p:cBhvr>
+                                        <p:cTn id="6" dur="1" fill="hold">
+                                          <p:stCondLst>
+                                            <p:cond delay="0"/>
+                                          </p:stCondLst>
+                                        </p:cTn>
+                                        <p:tgtEl>
+                                          <p:spTgt spid="7"/>
+                                        </p:tgtEl>
+                                        <p:attrNameLst>
+                                          <p:attrName>style.visibility</p:attrName>
+                                        </p:attrNameLst>
+                                      </p:cBhvr>
+                                      <p:to>
+                                        <p:strVal val="visible"/>
+                                      </p:to>
+                                    </p:set>
+                                    <p:animEffect transition="in" filter="fade">
+                                      <p:cBhvr>
+                                        <p:cTn id="7" dur="1000"/>
+                                        <p:tgtEl>
+                                          <p:spTgt spid="7"/>
+                                        </p:tgtEl>
+                                      </p:cBhvr>
+                                    </p:animEffect>
+                                    <p:anim calcmode="lin" valueType="num">
+                                      <p:cBhvr>
+                                        <p:cTn id="8" dur="1000" fill="hold"/>
+                                        <p:tgtEl>
+                                          <p:spTgt spid="7"/>
+                                        </p:tgtEl>
+                                        <p:attrNameLst>
+                                          <p:attrName>ppt_x</p:attrName>
+                                        </p:attrNameLst>
+                                      </p:cBhvr>
+                                      <p:tavLst>
+                                        <p:tav tm="0">
+                                          <p:val>
+                                            <p:strVal val="#ppt_x"/>
+                                          </p:val>
+                                        </p:tav>
+                                        <p:tav tm="100000">
+                                          <p:val>
+                                            <p:strVal val="#ppt_x"/>
+                                          </p:val>
+                                        </p:tav>
+                                      </p:tavLst>
+                                    </p:anim>
+                                    <p:anim calcmode="lin" valueType="num">
+                                      <p:cBhvr>
+                                        <p:cTn id="9" dur="1000" fill="hold"/>
+                                        <p:tgtEl>
+                                          <p:spTgt spid="7"/>
+                                        </p:tgtEl>
+                                        <p:attrNameLst>
+                                          <p:attrName>ppt_y</p:attrName>
+                                        </p:attrNameLst>
+                                      </p:cBhvr>
+                                      <p:tavLst>
+                                        <p:tav tm="0">
+                                          <p:val>
+                                            <p:strVal val="#ppt_y+.1"/>
+                                          </p:val>
+                                        </p:tav>
+                                        <p:tav tm="100000">
+                                          <p:val>
+                                            <p:strVal val="#ppt_y"/>
+                                          </p:val>
+                                        </p:tav>
+                                      </p:tavLst>
+                                    </p:anim>
+                                  </p:childTnLst>
+                                </p:cTn>
+                              </p:par>
+                            </p:childTnLst>
+                          </p:cTn>
+                        </p:par>
+                      </p:childTnLst>
+                    </p:cTn>
+                  </p:par>
+                  <p:par>
+                    <p:cTn id="10" fill="hold">
+                      <p:stCondLst>
+                        <p:cond delay="indefinite"/>
+                      </p:stCondLst>
+                      <p:childTnLst>
+                        <p:par>
+                          <p:cTn id="11" fill="hold">
+                            <p:stCondLst>
+                              <p:cond delay="0"/>
+                            </p:stCondLst>
+                            <p:childTnLst>
+                              <p:par>
+                                <p:cTn id="12" presetID="42" presetClass="entr" presetSubtype="0" fill="hold" nodeType="clickEffect">
+                                  <p:stCondLst>
+                                    <p:cond delay="0"/>
+                                  </p:stCondLst>
+                                  <p:childTnLst>
+                                    <p:set>
+                                      <p:cBhvr>
+                                        <p:cTn id="13" dur="1" fill="hold">
+                                          <p:stCondLst>
+                                            <p:cond delay="0"/>
+                                          </p:stCondLst>
+                                        </p:cTn>
+                                        <p:tgtEl>
+                                          <p:spTgt spid="9"/>
+                                        </p:tgtEl>
+                                        <p:attrNameLst>
+                                          <p:attrName>style.visibility</p:attrName>
+                                        </p:attrNameLst>
+                                      </p:cBhvr>
+                                      <p:to>
+                                        <p:strVal val="visible"/>
+                                      </p:to>
+                                    </p:set>
+                                    <p:animEffect transition="in" filter="fade">
+                                      <p:cBhvr>
+                                        <p:cTn id="14" dur="1000"/>
+                                        <p:tgtEl>
+                                          <p:spTgt spid="9"/>
+                                        </p:tgtEl>
+                                      </p:cBhvr>
+                                    </p:animEffect>
+                                    <p:anim calcmode="lin" valueType="num">
+                                      <p:cBhvr>
+                                        <p:cTn id="15" dur="1000" fill="hold"/>
+                                        <p:tgtEl>
+                                          <p:spTgt spid="9"/>
+                                        </p:tgtEl>
+                                        <p:attrNameLst>
+                                          <p:attrName>ppt_x</p:attrName>
+                                        </p:attrNameLst>
+                                      </p:cBhvr>
+                                      <p:tavLst>
+                                        <p:tav tm="0">
+                                          <p:val>
+                                            <p:strVal val="#ppt_x"/>
+                                          </p:val>
+                                        </p:tav>
+                                        <p:tav tm="100000">
+                                          <p:val>
+                                            <p:strVal val="#ppt_x"/>
+                                          </p:val>
+                                        </p:tav>
+                                      </p:tavLst>
+                                    </p:anim>
+                                    <p:anim calcmode="lin" valueType="num">
+                                      <p:cBhvr>
+                                        <p:cTn id="16" dur="1000" fill="hold"/>
+                                        <p:tgtEl>
+                                          <p:spTgt spid="9"/>
+                                        </p:tgtEl>
+                                        <p:attrNameLst>
+                                          <p:attrName>ppt_y</p:attrName>
+                                        </p:attrNameLst>
+                                      </p:cBhvr>
+                                      <p:tavLst>
+                                        <p:tav tm="0">
+                                          <p:val>
+                                            <p:strVal val="#ppt_y+.1"/>
+                                          </p:val>
+                                        </p:tav>
+                                        <p:tav tm="100000">
+                                          <p:val>
+                                            <p:strVal val="#ppt_y"/>
+                                          </p:val>
+                                        </p:tav>
+                                      </p:tavLst>
+                                    </p:anim>
+                                  </p:childTnLst>
+                                </p:cTn>
+                              </p:par>
+                            </p:childTnLst>
+                          </p:cTn>
+                        </p:par>
+                      </p:childTnLst>
+                    </p:cTn>
+                  </p:par>
+                </p:childTnLst>
+              </p:cTn>
+              <p:prevCondLst>
+                <p:cond evt="onPrev" delay="0">
+                  <p:tgtEl>
+                    <p:sldTgt/>
+                  </p:tgtEl>
+                </p:cond>
+              </p:prevCondLst>
+              <p:nextCondLst>
+                <p:cond evt="onNext" delay="0">
+                  <p:tgtEl>
+                    <p:sldTgt/>
+                  </p:tgtEl>
+                </p:cond>
+              </p:nextCondLst>
+            </p:seq>
+          </p:childTnLst>
+        </p:cTn>
+      </p:par>
+    </p:tnLst>
+    <p:bldLst>
+      <p:bldP spid="7" grpId="0"/>
+    </p:bldLst>
+  </p:timing>
 </p:sld>
 </file>
 
@@ -4594,10 +5621,10 @@
       </p:pic>
       <p:sp>
         <p:nvSpPr>
-          <p:cNvPr id="6" name="Rettangolo 5">
-            <a:extLst>
-              <a:ext uri="{FF2B5EF4-FFF2-40B4-BE49-F238E27FC236}">
-                <a16:creationId xmlns:a16="http://schemas.microsoft.com/office/drawing/2014/main" id="{C8A0E014-2FD7-4636-4DCC-413186BE8B0E}"/>
+          <p:cNvPr id="7" name="Rettangolo 6">
+            <a:extLst>
+              <a:ext uri="{FF2B5EF4-FFF2-40B4-BE49-F238E27FC236}">
+                <a16:creationId xmlns:a16="http://schemas.microsoft.com/office/drawing/2014/main" id="{A2D455B1-19BC-601D-10DC-C93CA4A60992}"/>
               </a:ext>
             </a:extLst>
           </p:cNvPr>
@@ -4606,8 +5633,8 @@
         </p:nvSpPr>
         <p:spPr>
           <a:xfrm>
-            <a:off x="508220" y="253632"/>
-            <a:ext cx="11175560" cy="707886"/>
+            <a:off x="3463583" y="2065150"/>
+            <a:ext cx="5773888" cy="523220"/>
           </a:xfrm>
           <a:prstGeom prst="rect">
             <a:avLst/>
@@ -4634,7 +5661,7 @@
           <a:p>
             <a:pPr algn="ctr"/>
             <a:r>
-              <a:rPr lang="it-IT" sz="4000" b="1" cap="none" spc="0" dirty="0">
+              <a:rPr lang="it-IT" sz="2800" b="1" dirty="0">
                 <a:ln/>
                 <a:solidFill>
                   <a:schemeClr val="tx1">
@@ -4642,19 +5669,64 @@
                     <a:lumOff val="35000"/>
                   </a:schemeClr>
                 </a:solidFill>
-                <a:effectLst/>
               </a:rPr>
-              <a:t>PRESENTAZIONE PROJECT WORK FINALE: GIORNALE</a:t>
-            </a:r>
-          </a:p>
-        </p:txBody>
-      </p:sp>
-      <p:sp>
-        <p:nvSpPr>
-          <p:cNvPr id="7" name="Rettangolo 6">
-            <a:extLst>
-              <a:ext uri="{FF2B5EF4-FFF2-40B4-BE49-F238E27FC236}">
-                <a16:creationId xmlns:a16="http://schemas.microsoft.com/office/drawing/2014/main" id="{A2D455B1-19BC-601D-10DC-C93CA4A60992}"/>
+              <a:t>CREAZIONE DEL DATABASE GIORNALE</a:t>
+            </a:r>
+            <a:endParaRPr lang="it-IT" sz="2800" b="1" cap="none" spc="0" dirty="0">
+              <a:ln/>
+              <a:solidFill>
+                <a:schemeClr val="tx1">
+                  <a:lumMod val="65000"/>
+                  <a:lumOff val="35000"/>
+                </a:schemeClr>
+              </a:solidFill>
+              <a:effectLst/>
+            </a:endParaRPr>
+          </a:p>
+        </p:txBody>
+      </p:sp>
+      <p:pic>
+        <p:nvPicPr>
+          <p:cNvPr id="9" name="Immagine 8">
+            <a:extLst>
+              <a:ext uri="{FF2B5EF4-FFF2-40B4-BE49-F238E27FC236}">
+                <a16:creationId xmlns:a16="http://schemas.microsoft.com/office/drawing/2014/main" id="{A2C03734-2422-60D0-0729-B10BB3206606}"/>
+              </a:ext>
+            </a:extLst>
+          </p:cNvPr>
+          <p:cNvPicPr>
+            <a:picLocks noChangeAspect="1"/>
+          </p:cNvPicPr>
+          <p:nvPr/>
+        </p:nvPicPr>
+        <p:blipFill>
+          <a:blip r:embed="rId3">
+            <a:extLst>
+              <a:ext uri="{28A0092B-C50C-407E-A947-70E740481C1C}">
+                <a14:useLocalDpi xmlns:a14="http://schemas.microsoft.com/office/drawing/2010/main" val="0"/>
+              </a:ext>
+            </a:extLst>
+          </a:blip>
+          <a:stretch>
+            <a:fillRect/>
+          </a:stretch>
+        </p:blipFill>
+        <p:spPr>
+          <a:xfrm>
+            <a:off x="1791094" y="3429000"/>
+            <a:ext cx="9703658" cy="2978870"/>
+          </a:xfrm>
+          <a:prstGeom prst="rect">
+            <a:avLst/>
+          </a:prstGeom>
+        </p:spPr>
+      </p:pic>
+      <p:sp>
+        <p:nvSpPr>
+          <p:cNvPr id="8" name="Rettangolo 7">
+            <a:extLst>
+              <a:ext uri="{FF2B5EF4-FFF2-40B4-BE49-F238E27FC236}">
+                <a16:creationId xmlns:a16="http://schemas.microsoft.com/office/drawing/2014/main" id="{6DEC2C96-BFD8-7A3B-1CA4-5BFE7E73A614}"/>
               </a:ext>
             </a:extLst>
           </p:cNvPr>
@@ -4663,8 +5735,8 @@
         </p:nvSpPr>
         <p:spPr>
           <a:xfrm>
-            <a:off x="3463583" y="2065150"/>
-            <a:ext cx="5773888" cy="523220"/>
+            <a:off x="-565607" y="253632"/>
+            <a:ext cx="13338928" cy="646331"/>
           </a:xfrm>
           <a:prstGeom prst="rect">
             <a:avLst/>
@@ -4672,7 +5744,7 @@
           <a:noFill/>
         </p:spPr>
         <p:txBody>
-          <a:bodyPr wrap="none" lIns="91440" tIns="45720" rIns="91440" bIns="45720">
+          <a:bodyPr wrap="square" lIns="91440" tIns="45720" rIns="91440" bIns="45720">
             <a:spAutoFit/>
             <a:scene3d>
               <a:camera prst="orthographicFront"/>
@@ -4691,7 +5763,7 @@
           <a:p>
             <a:pPr algn="ctr"/>
             <a:r>
-              <a:rPr lang="it-IT" sz="2800" b="1" dirty="0">
+              <a:rPr lang="it-IT" sz="3600" b="1" cap="none" spc="0" dirty="0">
                 <a:ln/>
                 <a:solidFill>
                   <a:schemeClr val="tx1">
@@ -4699,58 +5771,13 @@
                     <a:lumOff val="35000"/>
                   </a:schemeClr>
                 </a:solidFill>
+                <a:effectLst/>
               </a:rPr>
-              <a:t>CREAZIONE DEL DATABASE GIORNALE</a:t>
-            </a:r>
-            <a:endParaRPr lang="it-IT" sz="2800" b="1" cap="none" spc="0" dirty="0">
-              <a:ln/>
-              <a:solidFill>
-                <a:schemeClr val="tx1">
-                  <a:lumMod val="65000"/>
-                  <a:lumOff val="35000"/>
-                </a:schemeClr>
-              </a:solidFill>
-              <a:effectLst/>
-            </a:endParaRPr>
-          </a:p>
-        </p:txBody>
-      </p:sp>
-      <p:pic>
-        <p:nvPicPr>
-          <p:cNvPr id="9" name="Immagine 8">
-            <a:extLst>
-              <a:ext uri="{FF2B5EF4-FFF2-40B4-BE49-F238E27FC236}">
-                <a16:creationId xmlns:a16="http://schemas.microsoft.com/office/drawing/2014/main" id="{A2C03734-2422-60D0-0729-B10BB3206606}"/>
-              </a:ext>
-            </a:extLst>
-          </p:cNvPr>
-          <p:cNvPicPr>
-            <a:picLocks noChangeAspect="1"/>
-          </p:cNvPicPr>
-          <p:nvPr/>
-        </p:nvPicPr>
-        <p:blipFill>
-          <a:blip r:embed="rId3">
-            <a:extLst>
-              <a:ext uri="{28A0092B-C50C-407E-A947-70E740481C1C}">
-                <a14:useLocalDpi xmlns:a14="http://schemas.microsoft.com/office/drawing/2010/main" val="0"/>
-              </a:ext>
-            </a:extLst>
-          </a:blip>
-          <a:stretch>
-            <a:fillRect/>
-          </a:stretch>
-        </p:blipFill>
-        <p:spPr>
-          <a:xfrm>
-            <a:off x="1791094" y="3429000"/>
-            <a:ext cx="9703658" cy="2978870"/>
-          </a:xfrm>
-          <a:prstGeom prst="rect">
-            <a:avLst/>
-          </a:prstGeom>
-        </p:spPr>
-      </p:pic>
+              <a:t>PRESENTAZIONE PROJECT WORK FINALE: GIORNALE ONLINE</a:t>
+            </a:r>
+          </a:p>
+        </p:txBody>
+      </p:sp>
     </p:spTree>
     <p:extLst>
       <p:ext uri="{BB962C8B-B14F-4D97-AF65-F5344CB8AC3E}">
@@ -4761,6 +5788,237 @@
   <p:clrMapOvr>
     <a:masterClrMapping/>
   </p:clrMapOvr>
+  <p:timing>
+    <p:tnLst>
+      <p:par>
+        <p:cTn id="1" dur="indefinite" restart="never" nodeType="tmRoot">
+          <p:childTnLst>
+            <p:seq concurrent="1" nextAc="seek">
+              <p:cTn id="2" dur="indefinite" nodeType="mainSeq">
+                <p:childTnLst>
+                  <p:par>
+                    <p:cTn id="3" fill="hold">
+                      <p:stCondLst>
+                        <p:cond delay="indefinite"/>
+                      </p:stCondLst>
+                      <p:childTnLst>
+                        <p:par>
+                          <p:cTn id="4" fill="hold">
+                            <p:stCondLst>
+                              <p:cond delay="0"/>
+                            </p:stCondLst>
+                            <p:childTnLst>
+                              <p:par>
+                                <p:cTn id="5" presetID="42" presetClass="entr" presetSubtype="0" fill="hold" grpId="0" nodeType="clickEffect">
+                                  <p:stCondLst>
+                                    <p:cond delay="0"/>
+                                  </p:stCondLst>
+                                  <p:childTnLst>
+                                    <p:set>
+                                      <p:cBhvr>
+                                        <p:cTn id="6" dur="1" fill="hold">
+                                          <p:stCondLst>
+                                            <p:cond delay="0"/>
+                                          </p:stCondLst>
+                                        </p:cTn>
+                                        <p:tgtEl>
+                                          <p:spTgt spid="7"/>
+                                        </p:tgtEl>
+                                        <p:attrNameLst>
+                                          <p:attrName>style.visibility</p:attrName>
+                                        </p:attrNameLst>
+                                      </p:cBhvr>
+                                      <p:to>
+                                        <p:strVal val="visible"/>
+                                      </p:to>
+                                    </p:set>
+                                    <p:animEffect transition="in" filter="fade">
+                                      <p:cBhvr>
+                                        <p:cTn id="7" dur="1000"/>
+                                        <p:tgtEl>
+                                          <p:spTgt spid="7"/>
+                                        </p:tgtEl>
+                                      </p:cBhvr>
+                                    </p:animEffect>
+                                    <p:anim calcmode="lin" valueType="num">
+                                      <p:cBhvr>
+                                        <p:cTn id="8" dur="1000" fill="hold"/>
+                                        <p:tgtEl>
+                                          <p:spTgt spid="7"/>
+                                        </p:tgtEl>
+                                        <p:attrNameLst>
+                                          <p:attrName>ppt_x</p:attrName>
+                                        </p:attrNameLst>
+                                      </p:cBhvr>
+                                      <p:tavLst>
+                                        <p:tav tm="0">
+                                          <p:val>
+                                            <p:strVal val="#ppt_x"/>
+                                          </p:val>
+                                        </p:tav>
+                                        <p:tav tm="100000">
+                                          <p:val>
+                                            <p:strVal val="#ppt_x"/>
+                                          </p:val>
+                                        </p:tav>
+                                      </p:tavLst>
+                                    </p:anim>
+                                    <p:anim calcmode="lin" valueType="num">
+                                      <p:cBhvr>
+                                        <p:cTn id="9" dur="1000" fill="hold"/>
+                                        <p:tgtEl>
+                                          <p:spTgt spid="7"/>
+                                        </p:tgtEl>
+                                        <p:attrNameLst>
+                                          <p:attrName>ppt_y</p:attrName>
+                                        </p:attrNameLst>
+                                      </p:cBhvr>
+                                      <p:tavLst>
+                                        <p:tav tm="0">
+                                          <p:val>
+                                            <p:strVal val="#ppt_y+.1"/>
+                                          </p:val>
+                                        </p:tav>
+                                        <p:tav tm="100000">
+                                          <p:val>
+                                            <p:strVal val="#ppt_y"/>
+                                          </p:val>
+                                        </p:tav>
+                                      </p:tavLst>
+                                    </p:anim>
+                                  </p:childTnLst>
+                                </p:cTn>
+                              </p:par>
+                            </p:childTnLst>
+                          </p:cTn>
+                        </p:par>
+                      </p:childTnLst>
+                    </p:cTn>
+                  </p:par>
+                  <p:par>
+                    <p:cTn id="10" fill="hold">
+                      <p:stCondLst>
+                        <p:cond delay="indefinite"/>
+                      </p:stCondLst>
+                      <p:childTnLst>
+                        <p:par>
+                          <p:cTn id="11" fill="hold">
+                            <p:stCondLst>
+                              <p:cond delay="0"/>
+                            </p:stCondLst>
+                            <p:childTnLst>
+                              <p:par>
+                                <p:cTn id="12" presetID="42" presetClass="entr" presetSubtype="0" fill="hold" nodeType="clickEffect">
+                                  <p:stCondLst>
+                                    <p:cond delay="0"/>
+                                  </p:stCondLst>
+                                  <p:childTnLst>
+                                    <p:set>
+                                      <p:cBhvr>
+                                        <p:cTn id="13" dur="1" fill="hold">
+                                          <p:stCondLst>
+                                            <p:cond delay="0"/>
+                                          </p:stCondLst>
+                                        </p:cTn>
+                                        <p:tgtEl>
+                                          <p:spTgt spid="9"/>
+                                        </p:tgtEl>
+                                        <p:attrNameLst>
+                                          <p:attrName>style.visibility</p:attrName>
+                                        </p:attrNameLst>
+                                      </p:cBhvr>
+                                      <p:to>
+                                        <p:strVal val="visible"/>
+                                      </p:to>
+                                    </p:set>
+                                    <p:animEffect transition="in" filter="fade">
+                                      <p:cBhvr>
+                                        <p:cTn id="14" dur="1000"/>
+                                        <p:tgtEl>
+                                          <p:spTgt spid="9"/>
+                                        </p:tgtEl>
+                                      </p:cBhvr>
+                                    </p:animEffect>
+                                    <p:anim calcmode="lin" valueType="num">
+                                      <p:cBhvr>
+                                        <p:cTn id="15" dur="1000" fill="hold"/>
+                                        <p:tgtEl>
+                                          <p:spTgt spid="9"/>
+                                        </p:tgtEl>
+                                        <p:attrNameLst>
+                                          <p:attrName>ppt_x</p:attrName>
+                                        </p:attrNameLst>
+                                      </p:cBhvr>
+                                      <p:tavLst>
+                                        <p:tav tm="0">
+                                          <p:val>
+                                            <p:strVal val="#ppt_x"/>
+                                          </p:val>
+                                        </p:tav>
+                                        <p:tav tm="100000">
+                                          <p:val>
+                                            <p:strVal val="#ppt_x"/>
+                                          </p:val>
+                                        </p:tav>
+                                      </p:tavLst>
+                                    </p:anim>
+                                    <p:anim calcmode="lin" valueType="num">
+                                      <p:cBhvr>
+                                        <p:cTn id="16" dur="1000" fill="hold"/>
+                                        <p:tgtEl>
+                                          <p:spTgt spid="9"/>
+                                        </p:tgtEl>
+                                        <p:attrNameLst>
+                                          <p:attrName>ppt_y</p:attrName>
+                                        </p:attrNameLst>
+                                      </p:cBhvr>
+                                      <p:tavLst>
+                                        <p:tav tm="0">
+                                          <p:val>
+                                            <p:strVal val="#ppt_y+.1"/>
+                                          </p:val>
+                                        </p:tav>
+                                        <p:tav tm="100000">
+                                          <p:val>
+                                            <p:strVal val="#ppt_y"/>
+                                          </p:val>
+                                        </p:tav>
+                                      </p:tavLst>
+                                    </p:anim>
+                                  </p:childTnLst>
+                                </p:cTn>
+                              </p:par>
+                            </p:childTnLst>
+                          </p:cTn>
+                        </p:par>
+                      </p:childTnLst>
+                    </p:cTn>
+                  </p:par>
+                </p:childTnLst>
+              </p:cTn>
+              <p:prevCondLst>
+                <p:cond evt="onPrev" delay="0">
+                  <p:tgtEl>
+                    <p:sldTgt/>
+                  </p:tgtEl>
+                </p:cond>
+              </p:prevCondLst>
+              <p:nextCondLst>
+                <p:cond evt="onNext" delay="0">
+                  <p:tgtEl>
+                    <p:sldTgt/>
+                  </p:tgtEl>
+                </p:cond>
+              </p:nextCondLst>
+            </p:seq>
+          </p:childTnLst>
+        </p:cTn>
+      </p:par>
+    </p:tnLst>
+    <p:bldLst>
+      <p:bldP spid="7" grpId="0"/>
+    </p:bldLst>
+  </p:timing>
 </p:sld>
 </file>
 
@@ -4819,10 +6077,10 @@
       </p:pic>
       <p:sp>
         <p:nvSpPr>
-          <p:cNvPr id="6" name="Rettangolo 5">
-            <a:extLst>
-              <a:ext uri="{FF2B5EF4-FFF2-40B4-BE49-F238E27FC236}">
-                <a16:creationId xmlns:a16="http://schemas.microsoft.com/office/drawing/2014/main" id="{07244609-9547-85F0-ED0B-C589120A75AC}"/>
+          <p:cNvPr id="7" name="Rettangolo 6">
+            <a:extLst>
+              <a:ext uri="{FF2B5EF4-FFF2-40B4-BE49-F238E27FC236}">
+                <a16:creationId xmlns:a16="http://schemas.microsoft.com/office/drawing/2014/main" id="{DF1285BF-ADAE-853A-DFD0-E28672837DB2}"/>
               </a:ext>
             </a:extLst>
           </p:cNvPr>
@@ -4831,8 +6089,8 @@
         </p:nvSpPr>
         <p:spPr>
           <a:xfrm>
-            <a:off x="508220" y="253632"/>
-            <a:ext cx="11175560" cy="707886"/>
+            <a:off x="3565734" y="2027443"/>
+            <a:ext cx="5854168" cy="523220"/>
           </a:xfrm>
           <a:prstGeom prst="rect">
             <a:avLst/>
@@ -4859,7 +6117,7 @@
           <a:p>
             <a:pPr algn="ctr"/>
             <a:r>
-              <a:rPr lang="it-IT" sz="4000" b="1" cap="none" spc="0" dirty="0">
+              <a:rPr lang="it-IT" sz="2800" b="1" dirty="0">
                 <a:ln/>
                 <a:solidFill>
                   <a:schemeClr val="tx1">
@@ -4867,19 +6125,64 @@
                     <a:lumOff val="35000"/>
                   </a:schemeClr>
                 </a:solidFill>
-                <a:effectLst/>
               </a:rPr>
-              <a:t>PRESENTAZIONE PROJECT WORK FINALE: GIORNALE</a:t>
-            </a:r>
-          </a:p>
-        </p:txBody>
-      </p:sp>
-      <p:sp>
-        <p:nvSpPr>
-          <p:cNvPr id="7" name="Rettangolo 6">
-            <a:extLst>
-              <a:ext uri="{FF2B5EF4-FFF2-40B4-BE49-F238E27FC236}">
-                <a16:creationId xmlns:a16="http://schemas.microsoft.com/office/drawing/2014/main" id="{DF1285BF-ADAE-853A-DFD0-E28672837DB2}"/>
+              <a:t>CREAZIONE DEL PROGETTO IN SPRING</a:t>
+            </a:r>
+            <a:endParaRPr lang="it-IT" sz="2800" b="1" cap="none" spc="0" dirty="0">
+              <a:ln/>
+              <a:solidFill>
+                <a:schemeClr val="tx1">
+                  <a:lumMod val="65000"/>
+                  <a:lumOff val="35000"/>
+                </a:schemeClr>
+              </a:solidFill>
+              <a:effectLst/>
+            </a:endParaRPr>
+          </a:p>
+        </p:txBody>
+      </p:sp>
+      <p:pic>
+        <p:nvPicPr>
+          <p:cNvPr id="3" name="Immagine 2">
+            <a:extLst>
+              <a:ext uri="{FF2B5EF4-FFF2-40B4-BE49-F238E27FC236}">
+                <a16:creationId xmlns:a16="http://schemas.microsoft.com/office/drawing/2014/main" id="{6E5D28DB-A180-68AA-31B3-A8DA31E9016B}"/>
+              </a:ext>
+            </a:extLst>
+          </p:cNvPr>
+          <p:cNvPicPr>
+            <a:picLocks noChangeAspect="1"/>
+          </p:cNvPicPr>
+          <p:nvPr/>
+        </p:nvPicPr>
+        <p:blipFill>
+          <a:blip r:embed="rId3">
+            <a:extLst>
+              <a:ext uri="{28A0092B-C50C-407E-A947-70E740481C1C}">
+                <a14:useLocalDpi xmlns:a14="http://schemas.microsoft.com/office/drawing/2010/main" val="0"/>
+              </a:ext>
+            </a:extLst>
+          </a:blip>
+          <a:stretch>
+            <a:fillRect/>
+          </a:stretch>
+        </p:blipFill>
+        <p:spPr>
+          <a:xfrm>
+            <a:off x="3073985" y="2809544"/>
+            <a:ext cx="7136598" cy="3789575"/>
+          </a:xfrm>
+          <a:prstGeom prst="rect">
+            <a:avLst/>
+          </a:prstGeom>
+        </p:spPr>
+      </p:pic>
+      <p:sp>
+        <p:nvSpPr>
+          <p:cNvPr id="8" name="Rettangolo 7">
+            <a:extLst>
+              <a:ext uri="{FF2B5EF4-FFF2-40B4-BE49-F238E27FC236}">
+                <a16:creationId xmlns:a16="http://schemas.microsoft.com/office/drawing/2014/main" id="{6BE559C5-BD60-4AF6-C0B7-5BFEF642CDF3}"/>
               </a:ext>
             </a:extLst>
           </p:cNvPr>
@@ -4888,8 +6191,8 @@
         </p:nvSpPr>
         <p:spPr>
           <a:xfrm>
-            <a:off x="3565734" y="2027443"/>
-            <a:ext cx="5854168" cy="523220"/>
+            <a:off x="-565607" y="253632"/>
+            <a:ext cx="13338928" cy="646331"/>
           </a:xfrm>
           <a:prstGeom prst="rect">
             <a:avLst/>
@@ -4897,7 +6200,7 @@
           <a:noFill/>
         </p:spPr>
         <p:txBody>
-          <a:bodyPr wrap="none" lIns="91440" tIns="45720" rIns="91440" bIns="45720">
+          <a:bodyPr wrap="square" lIns="91440" tIns="45720" rIns="91440" bIns="45720">
             <a:spAutoFit/>
             <a:scene3d>
               <a:camera prst="orthographicFront"/>
@@ -4916,7 +6219,7 @@
           <a:p>
             <a:pPr algn="ctr"/>
             <a:r>
-              <a:rPr lang="it-IT" sz="2800" b="1" dirty="0">
+              <a:rPr lang="it-IT" sz="3600" b="1" cap="none" spc="0" dirty="0">
                 <a:ln/>
                 <a:solidFill>
                   <a:schemeClr val="tx1">
@@ -4924,58 +6227,13 @@
                     <a:lumOff val="35000"/>
                   </a:schemeClr>
                 </a:solidFill>
+                <a:effectLst/>
               </a:rPr>
-              <a:t>CREAZIONE DEL PROGETTO IN SPRING</a:t>
-            </a:r>
-            <a:endParaRPr lang="it-IT" sz="2800" b="1" cap="none" spc="0" dirty="0">
-              <a:ln/>
-              <a:solidFill>
-                <a:schemeClr val="tx1">
-                  <a:lumMod val="65000"/>
-                  <a:lumOff val="35000"/>
-                </a:schemeClr>
-              </a:solidFill>
-              <a:effectLst/>
-            </a:endParaRPr>
-          </a:p>
-        </p:txBody>
-      </p:sp>
-      <p:pic>
-        <p:nvPicPr>
-          <p:cNvPr id="3" name="Immagine 2">
-            <a:extLst>
-              <a:ext uri="{FF2B5EF4-FFF2-40B4-BE49-F238E27FC236}">
-                <a16:creationId xmlns:a16="http://schemas.microsoft.com/office/drawing/2014/main" id="{6E5D28DB-A180-68AA-31B3-A8DA31E9016B}"/>
-              </a:ext>
-            </a:extLst>
-          </p:cNvPr>
-          <p:cNvPicPr>
-            <a:picLocks noChangeAspect="1"/>
-          </p:cNvPicPr>
-          <p:nvPr/>
-        </p:nvPicPr>
-        <p:blipFill>
-          <a:blip r:embed="rId3">
-            <a:extLst>
-              <a:ext uri="{28A0092B-C50C-407E-A947-70E740481C1C}">
-                <a14:useLocalDpi xmlns:a14="http://schemas.microsoft.com/office/drawing/2010/main" val="0"/>
-              </a:ext>
-            </a:extLst>
-          </a:blip>
-          <a:stretch>
-            <a:fillRect/>
-          </a:stretch>
-        </p:blipFill>
-        <p:spPr>
-          <a:xfrm>
-            <a:off x="3073985" y="2809544"/>
-            <a:ext cx="7136598" cy="3789575"/>
-          </a:xfrm>
-          <a:prstGeom prst="rect">
-            <a:avLst/>
-          </a:prstGeom>
-        </p:spPr>
-      </p:pic>
+              <a:t>PRESENTAZIONE PROJECT WORK FINALE: GIORNALE ONLINE</a:t>
+            </a:r>
+          </a:p>
+        </p:txBody>
+      </p:sp>
     </p:spTree>
     <p:extLst>
       <p:ext uri="{BB962C8B-B14F-4D97-AF65-F5344CB8AC3E}">
@@ -4986,6 +6244,237 @@
   <p:clrMapOvr>
     <a:masterClrMapping/>
   </p:clrMapOvr>
+  <p:timing>
+    <p:tnLst>
+      <p:par>
+        <p:cTn id="1" dur="indefinite" restart="never" nodeType="tmRoot">
+          <p:childTnLst>
+            <p:seq concurrent="1" nextAc="seek">
+              <p:cTn id="2" dur="indefinite" nodeType="mainSeq">
+                <p:childTnLst>
+                  <p:par>
+                    <p:cTn id="3" fill="hold">
+                      <p:stCondLst>
+                        <p:cond delay="indefinite"/>
+                      </p:stCondLst>
+                      <p:childTnLst>
+                        <p:par>
+                          <p:cTn id="4" fill="hold">
+                            <p:stCondLst>
+                              <p:cond delay="0"/>
+                            </p:stCondLst>
+                            <p:childTnLst>
+                              <p:par>
+                                <p:cTn id="5" presetID="42" presetClass="entr" presetSubtype="0" fill="hold" grpId="0" nodeType="clickEffect">
+                                  <p:stCondLst>
+                                    <p:cond delay="0"/>
+                                  </p:stCondLst>
+                                  <p:childTnLst>
+                                    <p:set>
+                                      <p:cBhvr>
+                                        <p:cTn id="6" dur="1" fill="hold">
+                                          <p:stCondLst>
+                                            <p:cond delay="0"/>
+                                          </p:stCondLst>
+                                        </p:cTn>
+                                        <p:tgtEl>
+                                          <p:spTgt spid="7"/>
+                                        </p:tgtEl>
+                                        <p:attrNameLst>
+                                          <p:attrName>style.visibility</p:attrName>
+                                        </p:attrNameLst>
+                                      </p:cBhvr>
+                                      <p:to>
+                                        <p:strVal val="visible"/>
+                                      </p:to>
+                                    </p:set>
+                                    <p:animEffect transition="in" filter="fade">
+                                      <p:cBhvr>
+                                        <p:cTn id="7" dur="1000"/>
+                                        <p:tgtEl>
+                                          <p:spTgt spid="7"/>
+                                        </p:tgtEl>
+                                      </p:cBhvr>
+                                    </p:animEffect>
+                                    <p:anim calcmode="lin" valueType="num">
+                                      <p:cBhvr>
+                                        <p:cTn id="8" dur="1000" fill="hold"/>
+                                        <p:tgtEl>
+                                          <p:spTgt spid="7"/>
+                                        </p:tgtEl>
+                                        <p:attrNameLst>
+                                          <p:attrName>ppt_x</p:attrName>
+                                        </p:attrNameLst>
+                                      </p:cBhvr>
+                                      <p:tavLst>
+                                        <p:tav tm="0">
+                                          <p:val>
+                                            <p:strVal val="#ppt_x"/>
+                                          </p:val>
+                                        </p:tav>
+                                        <p:tav tm="100000">
+                                          <p:val>
+                                            <p:strVal val="#ppt_x"/>
+                                          </p:val>
+                                        </p:tav>
+                                      </p:tavLst>
+                                    </p:anim>
+                                    <p:anim calcmode="lin" valueType="num">
+                                      <p:cBhvr>
+                                        <p:cTn id="9" dur="1000" fill="hold"/>
+                                        <p:tgtEl>
+                                          <p:spTgt spid="7"/>
+                                        </p:tgtEl>
+                                        <p:attrNameLst>
+                                          <p:attrName>ppt_y</p:attrName>
+                                        </p:attrNameLst>
+                                      </p:cBhvr>
+                                      <p:tavLst>
+                                        <p:tav tm="0">
+                                          <p:val>
+                                            <p:strVal val="#ppt_y+.1"/>
+                                          </p:val>
+                                        </p:tav>
+                                        <p:tav tm="100000">
+                                          <p:val>
+                                            <p:strVal val="#ppt_y"/>
+                                          </p:val>
+                                        </p:tav>
+                                      </p:tavLst>
+                                    </p:anim>
+                                  </p:childTnLst>
+                                </p:cTn>
+                              </p:par>
+                            </p:childTnLst>
+                          </p:cTn>
+                        </p:par>
+                      </p:childTnLst>
+                    </p:cTn>
+                  </p:par>
+                  <p:par>
+                    <p:cTn id="10" fill="hold">
+                      <p:stCondLst>
+                        <p:cond delay="indefinite"/>
+                      </p:stCondLst>
+                      <p:childTnLst>
+                        <p:par>
+                          <p:cTn id="11" fill="hold">
+                            <p:stCondLst>
+                              <p:cond delay="0"/>
+                            </p:stCondLst>
+                            <p:childTnLst>
+                              <p:par>
+                                <p:cTn id="12" presetID="42" presetClass="entr" presetSubtype="0" fill="hold" nodeType="clickEffect">
+                                  <p:stCondLst>
+                                    <p:cond delay="0"/>
+                                  </p:stCondLst>
+                                  <p:childTnLst>
+                                    <p:set>
+                                      <p:cBhvr>
+                                        <p:cTn id="13" dur="1" fill="hold">
+                                          <p:stCondLst>
+                                            <p:cond delay="0"/>
+                                          </p:stCondLst>
+                                        </p:cTn>
+                                        <p:tgtEl>
+                                          <p:spTgt spid="3"/>
+                                        </p:tgtEl>
+                                        <p:attrNameLst>
+                                          <p:attrName>style.visibility</p:attrName>
+                                        </p:attrNameLst>
+                                      </p:cBhvr>
+                                      <p:to>
+                                        <p:strVal val="visible"/>
+                                      </p:to>
+                                    </p:set>
+                                    <p:animEffect transition="in" filter="fade">
+                                      <p:cBhvr>
+                                        <p:cTn id="14" dur="1000"/>
+                                        <p:tgtEl>
+                                          <p:spTgt spid="3"/>
+                                        </p:tgtEl>
+                                      </p:cBhvr>
+                                    </p:animEffect>
+                                    <p:anim calcmode="lin" valueType="num">
+                                      <p:cBhvr>
+                                        <p:cTn id="15" dur="1000" fill="hold"/>
+                                        <p:tgtEl>
+                                          <p:spTgt spid="3"/>
+                                        </p:tgtEl>
+                                        <p:attrNameLst>
+                                          <p:attrName>ppt_x</p:attrName>
+                                        </p:attrNameLst>
+                                      </p:cBhvr>
+                                      <p:tavLst>
+                                        <p:tav tm="0">
+                                          <p:val>
+                                            <p:strVal val="#ppt_x"/>
+                                          </p:val>
+                                        </p:tav>
+                                        <p:tav tm="100000">
+                                          <p:val>
+                                            <p:strVal val="#ppt_x"/>
+                                          </p:val>
+                                        </p:tav>
+                                      </p:tavLst>
+                                    </p:anim>
+                                    <p:anim calcmode="lin" valueType="num">
+                                      <p:cBhvr>
+                                        <p:cTn id="16" dur="1000" fill="hold"/>
+                                        <p:tgtEl>
+                                          <p:spTgt spid="3"/>
+                                        </p:tgtEl>
+                                        <p:attrNameLst>
+                                          <p:attrName>ppt_y</p:attrName>
+                                        </p:attrNameLst>
+                                      </p:cBhvr>
+                                      <p:tavLst>
+                                        <p:tav tm="0">
+                                          <p:val>
+                                            <p:strVal val="#ppt_y+.1"/>
+                                          </p:val>
+                                        </p:tav>
+                                        <p:tav tm="100000">
+                                          <p:val>
+                                            <p:strVal val="#ppt_y"/>
+                                          </p:val>
+                                        </p:tav>
+                                      </p:tavLst>
+                                    </p:anim>
+                                  </p:childTnLst>
+                                </p:cTn>
+                              </p:par>
+                            </p:childTnLst>
+                          </p:cTn>
+                        </p:par>
+                      </p:childTnLst>
+                    </p:cTn>
+                  </p:par>
+                </p:childTnLst>
+              </p:cTn>
+              <p:prevCondLst>
+                <p:cond evt="onPrev" delay="0">
+                  <p:tgtEl>
+                    <p:sldTgt/>
+                  </p:tgtEl>
+                </p:cond>
+              </p:prevCondLst>
+              <p:nextCondLst>
+                <p:cond evt="onNext" delay="0">
+                  <p:tgtEl>
+                    <p:sldTgt/>
+                  </p:tgtEl>
+                </p:cond>
+              </p:nextCondLst>
+            </p:seq>
+          </p:childTnLst>
+        </p:cTn>
+      </p:par>
+    </p:tnLst>
+    <p:bldLst>
+      <p:bldP spid="7" grpId="0"/>
+    </p:bldLst>
+  </p:timing>
 </p:sld>
 </file>
 
@@ -5042,63 +6531,6 @@
           </a:prstGeom>
         </p:spPr>
       </p:pic>
-      <p:sp>
-        <p:nvSpPr>
-          <p:cNvPr id="6" name="Rettangolo 5">
-            <a:extLst>
-              <a:ext uri="{FF2B5EF4-FFF2-40B4-BE49-F238E27FC236}">
-                <a16:creationId xmlns:a16="http://schemas.microsoft.com/office/drawing/2014/main" id="{AB8CD5BD-FD44-EDA2-FCC6-DA83CA4B0B4D}"/>
-              </a:ext>
-            </a:extLst>
-          </p:cNvPr>
-          <p:cNvSpPr/>
-          <p:nvPr/>
-        </p:nvSpPr>
-        <p:spPr>
-          <a:xfrm>
-            <a:off x="508220" y="253632"/>
-            <a:ext cx="11175560" cy="707886"/>
-          </a:xfrm>
-          <a:prstGeom prst="rect">
-            <a:avLst/>
-          </a:prstGeom>
-          <a:noFill/>
-        </p:spPr>
-        <p:txBody>
-          <a:bodyPr wrap="none" lIns="91440" tIns="45720" rIns="91440" bIns="45720">
-            <a:spAutoFit/>
-            <a:scene3d>
-              <a:camera prst="orthographicFront"/>
-              <a:lightRig rig="harsh" dir="t"/>
-            </a:scene3d>
-            <a:sp3d extrusionH="57150" prstMaterial="matte">
-              <a:bevelT w="63500" h="12700" prst="angle"/>
-              <a:contourClr>
-                <a:schemeClr val="bg1">
-                  <a:lumMod val="65000"/>
-                </a:schemeClr>
-              </a:contourClr>
-            </a:sp3d>
-          </a:bodyPr>
-          <a:lstStyle/>
-          <a:p>
-            <a:pPr algn="ctr"/>
-            <a:r>
-              <a:rPr lang="it-IT" sz="4000" b="1" cap="none" spc="0" dirty="0">
-                <a:ln/>
-                <a:solidFill>
-                  <a:schemeClr val="tx1">
-                    <a:lumMod val="65000"/>
-                    <a:lumOff val="35000"/>
-                  </a:schemeClr>
-                </a:solidFill>
-                <a:effectLst/>
-              </a:rPr>
-              <a:t>PRESENTAZIONE PROJECT WORK FINALE: GIORNALE</a:t>
-            </a:r>
-          </a:p>
-        </p:txBody>
-      </p:sp>
       <p:sp>
         <p:nvSpPr>
           <p:cNvPr id="7" name="Rettangolo 6">
@@ -5244,10 +6676,578 @@
           </a:p>
         </p:txBody>
       </p:sp>
+      <p:sp>
+        <p:nvSpPr>
+          <p:cNvPr id="10" name="Rettangolo 9">
+            <a:extLst>
+              <a:ext uri="{FF2B5EF4-FFF2-40B4-BE49-F238E27FC236}">
+                <a16:creationId xmlns:a16="http://schemas.microsoft.com/office/drawing/2014/main" id="{8E54B4D6-FC2F-56B8-6C9F-A7ECDD5C4B9C}"/>
+              </a:ext>
+            </a:extLst>
+          </p:cNvPr>
+          <p:cNvSpPr/>
+          <p:nvPr/>
+        </p:nvSpPr>
+        <p:spPr>
+          <a:xfrm>
+            <a:off x="-565607" y="253632"/>
+            <a:ext cx="13338928" cy="646331"/>
+          </a:xfrm>
+          <a:prstGeom prst="rect">
+            <a:avLst/>
+          </a:prstGeom>
+          <a:noFill/>
+        </p:spPr>
+        <p:txBody>
+          <a:bodyPr wrap="square" lIns="91440" tIns="45720" rIns="91440" bIns="45720">
+            <a:spAutoFit/>
+            <a:scene3d>
+              <a:camera prst="orthographicFront"/>
+              <a:lightRig rig="harsh" dir="t"/>
+            </a:scene3d>
+            <a:sp3d extrusionH="57150" prstMaterial="matte">
+              <a:bevelT w="63500" h="12700" prst="angle"/>
+              <a:contourClr>
+                <a:schemeClr val="bg1">
+                  <a:lumMod val="65000"/>
+                </a:schemeClr>
+              </a:contourClr>
+            </a:sp3d>
+          </a:bodyPr>
+          <a:lstStyle/>
+          <a:p>
+            <a:pPr algn="ctr"/>
+            <a:r>
+              <a:rPr lang="it-IT" sz="3600" b="1" cap="none" spc="0" dirty="0">
+                <a:ln/>
+                <a:solidFill>
+                  <a:schemeClr val="tx1">
+                    <a:lumMod val="65000"/>
+                    <a:lumOff val="35000"/>
+                  </a:schemeClr>
+                </a:solidFill>
+                <a:effectLst/>
+              </a:rPr>
+              <a:t>PRESENTAZIONE PROJECT WORK FINALE: GIORNALE ONLINE</a:t>
+            </a:r>
+          </a:p>
+        </p:txBody>
+      </p:sp>
     </p:spTree>
     <p:extLst>
       <p:ext uri="{BB962C8B-B14F-4D97-AF65-F5344CB8AC3E}">
         <p14:creationId xmlns:p14="http://schemas.microsoft.com/office/powerpoint/2010/main" val="949823036"/>
+      </p:ext>
+    </p:extLst>
+  </p:cSld>
+  <p:clrMapOvr>
+    <a:masterClrMapping/>
+  </p:clrMapOvr>
+  <p:timing>
+    <p:tnLst>
+      <p:par>
+        <p:cTn id="1" dur="indefinite" restart="never" nodeType="tmRoot">
+          <p:childTnLst>
+            <p:seq concurrent="1" nextAc="seek">
+              <p:cTn id="2" dur="indefinite" nodeType="mainSeq">
+                <p:childTnLst>
+                  <p:par>
+                    <p:cTn id="3" fill="hold">
+                      <p:stCondLst>
+                        <p:cond delay="indefinite"/>
+                      </p:stCondLst>
+                      <p:childTnLst>
+                        <p:par>
+                          <p:cTn id="4" fill="hold">
+                            <p:stCondLst>
+                              <p:cond delay="0"/>
+                            </p:stCondLst>
+                            <p:childTnLst>
+                              <p:par>
+                                <p:cTn id="5" presetID="42" presetClass="entr" presetSubtype="0" fill="hold" grpId="0" nodeType="clickEffect">
+                                  <p:stCondLst>
+                                    <p:cond delay="0"/>
+                                  </p:stCondLst>
+                                  <p:childTnLst>
+                                    <p:set>
+                                      <p:cBhvr>
+                                        <p:cTn id="6" dur="1" fill="hold">
+                                          <p:stCondLst>
+                                            <p:cond delay="0"/>
+                                          </p:stCondLst>
+                                        </p:cTn>
+                                        <p:tgtEl>
+                                          <p:spTgt spid="7"/>
+                                        </p:tgtEl>
+                                        <p:attrNameLst>
+                                          <p:attrName>style.visibility</p:attrName>
+                                        </p:attrNameLst>
+                                      </p:cBhvr>
+                                      <p:to>
+                                        <p:strVal val="visible"/>
+                                      </p:to>
+                                    </p:set>
+                                    <p:animEffect transition="in" filter="fade">
+                                      <p:cBhvr>
+                                        <p:cTn id="7" dur="1000"/>
+                                        <p:tgtEl>
+                                          <p:spTgt spid="7"/>
+                                        </p:tgtEl>
+                                      </p:cBhvr>
+                                    </p:animEffect>
+                                    <p:anim calcmode="lin" valueType="num">
+                                      <p:cBhvr>
+                                        <p:cTn id="8" dur="1000" fill="hold"/>
+                                        <p:tgtEl>
+                                          <p:spTgt spid="7"/>
+                                        </p:tgtEl>
+                                        <p:attrNameLst>
+                                          <p:attrName>ppt_x</p:attrName>
+                                        </p:attrNameLst>
+                                      </p:cBhvr>
+                                      <p:tavLst>
+                                        <p:tav tm="0">
+                                          <p:val>
+                                            <p:strVal val="#ppt_x"/>
+                                          </p:val>
+                                        </p:tav>
+                                        <p:tav tm="100000">
+                                          <p:val>
+                                            <p:strVal val="#ppt_x"/>
+                                          </p:val>
+                                        </p:tav>
+                                      </p:tavLst>
+                                    </p:anim>
+                                    <p:anim calcmode="lin" valueType="num">
+                                      <p:cBhvr>
+                                        <p:cTn id="9" dur="1000" fill="hold"/>
+                                        <p:tgtEl>
+                                          <p:spTgt spid="7"/>
+                                        </p:tgtEl>
+                                        <p:attrNameLst>
+                                          <p:attrName>ppt_y</p:attrName>
+                                        </p:attrNameLst>
+                                      </p:cBhvr>
+                                      <p:tavLst>
+                                        <p:tav tm="0">
+                                          <p:val>
+                                            <p:strVal val="#ppt_y+.1"/>
+                                          </p:val>
+                                        </p:tav>
+                                        <p:tav tm="100000">
+                                          <p:val>
+                                            <p:strVal val="#ppt_y"/>
+                                          </p:val>
+                                        </p:tav>
+                                      </p:tavLst>
+                                    </p:anim>
+                                  </p:childTnLst>
+                                </p:cTn>
+                              </p:par>
+                            </p:childTnLst>
+                          </p:cTn>
+                        </p:par>
+                      </p:childTnLst>
+                    </p:cTn>
+                  </p:par>
+                  <p:par>
+                    <p:cTn id="10" fill="hold">
+                      <p:stCondLst>
+                        <p:cond delay="indefinite"/>
+                      </p:stCondLst>
+                      <p:childTnLst>
+                        <p:par>
+                          <p:cTn id="11" fill="hold">
+                            <p:stCondLst>
+                              <p:cond delay="0"/>
+                            </p:stCondLst>
+                            <p:childTnLst>
+                              <p:par>
+                                <p:cTn id="12" presetID="42" presetClass="entr" presetSubtype="0" fill="hold" grpId="0" nodeType="clickEffect">
+                                  <p:stCondLst>
+                                    <p:cond delay="0"/>
+                                  </p:stCondLst>
+                                  <p:childTnLst>
+                                    <p:set>
+                                      <p:cBhvr>
+                                        <p:cTn id="13" dur="1" fill="hold">
+                                          <p:stCondLst>
+                                            <p:cond delay="0"/>
+                                          </p:stCondLst>
+                                        </p:cTn>
+                                        <p:tgtEl>
+                                          <p:spTgt spid="9"/>
+                                        </p:tgtEl>
+                                        <p:attrNameLst>
+                                          <p:attrName>style.visibility</p:attrName>
+                                        </p:attrNameLst>
+                                      </p:cBhvr>
+                                      <p:to>
+                                        <p:strVal val="visible"/>
+                                      </p:to>
+                                    </p:set>
+                                    <p:animEffect transition="in" filter="fade">
+                                      <p:cBhvr>
+                                        <p:cTn id="14" dur="1000"/>
+                                        <p:tgtEl>
+                                          <p:spTgt spid="9"/>
+                                        </p:tgtEl>
+                                      </p:cBhvr>
+                                    </p:animEffect>
+                                    <p:anim calcmode="lin" valueType="num">
+                                      <p:cBhvr>
+                                        <p:cTn id="15" dur="1000" fill="hold"/>
+                                        <p:tgtEl>
+                                          <p:spTgt spid="9"/>
+                                        </p:tgtEl>
+                                        <p:attrNameLst>
+                                          <p:attrName>ppt_x</p:attrName>
+                                        </p:attrNameLst>
+                                      </p:cBhvr>
+                                      <p:tavLst>
+                                        <p:tav tm="0">
+                                          <p:val>
+                                            <p:strVal val="#ppt_x"/>
+                                          </p:val>
+                                        </p:tav>
+                                        <p:tav tm="100000">
+                                          <p:val>
+                                            <p:strVal val="#ppt_x"/>
+                                          </p:val>
+                                        </p:tav>
+                                      </p:tavLst>
+                                    </p:anim>
+                                    <p:anim calcmode="lin" valueType="num">
+                                      <p:cBhvr>
+                                        <p:cTn id="16" dur="1000" fill="hold"/>
+                                        <p:tgtEl>
+                                          <p:spTgt spid="9"/>
+                                        </p:tgtEl>
+                                        <p:attrNameLst>
+                                          <p:attrName>ppt_y</p:attrName>
+                                        </p:attrNameLst>
+                                      </p:cBhvr>
+                                      <p:tavLst>
+                                        <p:tav tm="0">
+                                          <p:val>
+                                            <p:strVal val="#ppt_y+.1"/>
+                                          </p:val>
+                                        </p:tav>
+                                        <p:tav tm="100000">
+                                          <p:val>
+                                            <p:strVal val="#ppt_y"/>
+                                          </p:val>
+                                        </p:tav>
+                                      </p:tavLst>
+                                    </p:anim>
+                                  </p:childTnLst>
+                                </p:cTn>
+                              </p:par>
+                            </p:childTnLst>
+                          </p:cTn>
+                        </p:par>
+                      </p:childTnLst>
+                    </p:cTn>
+                  </p:par>
+                  <p:par>
+                    <p:cTn id="17" fill="hold">
+                      <p:stCondLst>
+                        <p:cond delay="indefinite"/>
+                      </p:stCondLst>
+                      <p:childTnLst>
+                        <p:par>
+                          <p:cTn id="18" fill="hold">
+                            <p:stCondLst>
+                              <p:cond delay="0"/>
+                            </p:stCondLst>
+                            <p:childTnLst>
+                              <p:par>
+                                <p:cTn id="19" presetID="42" presetClass="entr" presetSubtype="0" fill="hold" nodeType="clickEffect">
+                                  <p:stCondLst>
+                                    <p:cond delay="0"/>
+                                  </p:stCondLst>
+                                  <p:childTnLst>
+                                    <p:set>
+                                      <p:cBhvr>
+                                        <p:cTn id="20" dur="1" fill="hold">
+                                          <p:stCondLst>
+                                            <p:cond delay="0"/>
+                                          </p:stCondLst>
+                                        </p:cTn>
+                                        <p:tgtEl>
+                                          <p:spTgt spid="8"/>
+                                        </p:tgtEl>
+                                        <p:attrNameLst>
+                                          <p:attrName>style.visibility</p:attrName>
+                                        </p:attrNameLst>
+                                      </p:cBhvr>
+                                      <p:to>
+                                        <p:strVal val="visible"/>
+                                      </p:to>
+                                    </p:set>
+                                    <p:animEffect transition="in" filter="fade">
+                                      <p:cBhvr>
+                                        <p:cTn id="21" dur="1000"/>
+                                        <p:tgtEl>
+                                          <p:spTgt spid="8"/>
+                                        </p:tgtEl>
+                                      </p:cBhvr>
+                                    </p:animEffect>
+                                    <p:anim calcmode="lin" valueType="num">
+                                      <p:cBhvr>
+                                        <p:cTn id="22" dur="1000" fill="hold"/>
+                                        <p:tgtEl>
+                                          <p:spTgt spid="8"/>
+                                        </p:tgtEl>
+                                        <p:attrNameLst>
+                                          <p:attrName>ppt_x</p:attrName>
+                                        </p:attrNameLst>
+                                      </p:cBhvr>
+                                      <p:tavLst>
+                                        <p:tav tm="0">
+                                          <p:val>
+                                            <p:strVal val="#ppt_x"/>
+                                          </p:val>
+                                        </p:tav>
+                                        <p:tav tm="100000">
+                                          <p:val>
+                                            <p:strVal val="#ppt_x"/>
+                                          </p:val>
+                                        </p:tav>
+                                      </p:tavLst>
+                                    </p:anim>
+                                    <p:anim calcmode="lin" valueType="num">
+                                      <p:cBhvr>
+                                        <p:cTn id="23" dur="1000" fill="hold"/>
+                                        <p:tgtEl>
+                                          <p:spTgt spid="8"/>
+                                        </p:tgtEl>
+                                        <p:attrNameLst>
+                                          <p:attrName>ppt_y</p:attrName>
+                                        </p:attrNameLst>
+                                      </p:cBhvr>
+                                      <p:tavLst>
+                                        <p:tav tm="0">
+                                          <p:val>
+                                            <p:strVal val="#ppt_y+.1"/>
+                                          </p:val>
+                                        </p:tav>
+                                        <p:tav tm="100000">
+                                          <p:val>
+                                            <p:strVal val="#ppt_y"/>
+                                          </p:val>
+                                        </p:tav>
+                                      </p:tavLst>
+                                    </p:anim>
+                                  </p:childTnLst>
+                                </p:cTn>
+                              </p:par>
+                            </p:childTnLst>
+                          </p:cTn>
+                        </p:par>
+                      </p:childTnLst>
+                    </p:cTn>
+                  </p:par>
+                </p:childTnLst>
+              </p:cTn>
+              <p:prevCondLst>
+                <p:cond evt="onPrev" delay="0">
+                  <p:tgtEl>
+                    <p:sldTgt/>
+                  </p:tgtEl>
+                </p:cond>
+              </p:prevCondLst>
+              <p:nextCondLst>
+                <p:cond evt="onNext" delay="0">
+                  <p:tgtEl>
+                    <p:sldTgt/>
+                  </p:tgtEl>
+                </p:cond>
+              </p:nextCondLst>
+            </p:seq>
+          </p:childTnLst>
+        </p:cTn>
+      </p:par>
+    </p:tnLst>
+    <p:bldLst>
+      <p:bldP spid="7" grpId="0"/>
+      <p:bldP spid="9" grpId="0" animBg="1"/>
+    </p:bldLst>
+  </p:timing>
+</p:sld>
+</file>
+
+<file path=ppt/slides/slide8.xml><?xml version="1.0" encoding="utf-8"?>
+<p:sld xmlns:a="http://schemas.openxmlformats.org/drawingml/2006/main" xmlns:r="http://schemas.openxmlformats.org/officeDocument/2006/relationships" xmlns:p="http://schemas.openxmlformats.org/presentationml/2006/main">
+  <p:cSld>
+    <p:spTree>
+      <p:nvGrpSpPr>
+        <p:cNvPr id="1" name=""/>
+        <p:cNvGrpSpPr/>
+        <p:nvPr/>
+      </p:nvGrpSpPr>
+      <p:grpSpPr>
+        <a:xfrm>
+          <a:off x="0" y="0"/>
+          <a:ext cx="0" cy="0"/>
+          <a:chOff x="0" y="0"/>
+          <a:chExt cx="0" cy="0"/>
+        </a:xfrm>
+      </p:grpSpPr>
+      <p:pic>
+        <p:nvPicPr>
+          <p:cNvPr id="4" name="Immagine 3">
+            <a:extLst>
+              <a:ext uri="{FF2B5EF4-FFF2-40B4-BE49-F238E27FC236}">
+                <a16:creationId xmlns:a16="http://schemas.microsoft.com/office/drawing/2014/main" id="{6DAC6974-F957-2E94-73B8-C3CAF09F680C}"/>
+              </a:ext>
+            </a:extLst>
+          </p:cNvPr>
+          <p:cNvPicPr>
+            <a:picLocks noChangeAspect="1"/>
+          </p:cNvPicPr>
+          <p:nvPr/>
+        </p:nvPicPr>
+        <p:blipFill>
+          <a:blip r:embed="rId2">
+            <a:extLst>
+              <a:ext uri="{28A0092B-C50C-407E-A947-70E740481C1C}">
+                <a14:useLocalDpi xmlns:a14="http://schemas.microsoft.com/office/drawing/2010/main" val="0"/>
+              </a:ext>
+            </a:extLst>
+          </a:blip>
+          <a:stretch>
+            <a:fillRect/>
+          </a:stretch>
+        </p:blipFill>
+        <p:spPr>
+          <a:xfrm>
+            <a:off x="0" y="0"/>
+            <a:ext cx="12192000" cy="6858000"/>
+          </a:xfrm>
+          <a:prstGeom prst="rect">
+            <a:avLst/>
+          </a:prstGeom>
+        </p:spPr>
+      </p:pic>
+      <p:sp>
+        <p:nvSpPr>
+          <p:cNvPr id="5" name="Rettangolo 4">
+            <a:extLst>
+              <a:ext uri="{FF2B5EF4-FFF2-40B4-BE49-F238E27FC236}">
+                <a16:creationId xmlns:a16="http://schemas.microsoft.com/office/drawing/2014/main" id="{D3CC5B1A-C1A0-AD65-3AD2-37AF725451B3}"/>
+              </a:ext>
+            </a:extLst>
+          </p:cNvPr>
+          <p:cNvSpPr/>
+          <p:nvPr/>
+        </p:nvSpPr>
+        <p:spPr>
+          <a:xfrm>
+            <a:off x="-565607" y="253632"/>
+            <a:ext cx="13338928" cy="646331"/>
+          </a:xfrm>
+          <a:prstGeom prst="rect">
+            <a:avLst/>
+          </a:prstGeom>
+          <a:noFill/>
+        </p:spPr>
+        <p:txBody>
+          <a:bodyPr wrap="square" lIns="91440" tIns="45720" rIns="91440" bIns="45720">
+            <a:spAutoFit/>
+            <a:scene3d>
+              <a:camera prst="orthographicFront"/>
+              <a:lightRig rig="harsh" dir="t"/>
+            </a:scene3d>
+            <a:sp3d extrusionH="57150" prstMaterial="matte">
+              <a:bevelT w="63500" h="12700" prst="angle"/>
+              <a:contourClr>
+                <a:schemeClr val="bg1">
+                  <a:lumMod val="65000"/>
+                </a:schemeClr>
+              </a:contourClr>
+            </a:sp3d>
+          </a:bodyPr>
+          <a:lstStyle/>
+          <a:p>
+            <a:pPr algn="ctr"/>
+            <a:r>
+              <a:rPr lang="it-IT" sz="3600" b="1" cap="none" spc="0" dirty="0">
+                <a:ln/>
+                <a:solidFill>
+                  <a:schemeClr val="tx1">
+                    <a:lumMod val="65000"/>
+                    <a:lumOff val="35000"/>
+                  </a:schemeClr>
+                </a:solidFill>
+                <a:effectLst/>
+              </a:rPr>
+              <a:t>PRESENTAZIONE PROJECT WORK FINALE: GIORNALE ONLINE</a:t>
+            </a:r>
+          </a:p>
+        </p:txBody>
+      </p:sp>
+      <p:sp>
+        <p:nvSpPr>
+          <p:cNvPr id="7" name="Rettangolo 6">
+            <a:extLst>
+              <a:ext uri="{FF2B5EF4-FFF2-40B4-BE49-F238E27FC236}">
+                <a16:creationId xmlns:a16="http://schemas.microsoft.com/office/drawing/2014/main" id="{A804F389-ADEC-A560-6ED2-0E5EDEDE5BE9}"/>
+              </a:ext>
+            </a:extLst>
+          </p:cNvPr>
+          <p:cNvSpPr/>
+          <p:nvPr/>
+        </p:nvSpPr>
+        <p:spPr>
+          <a:xfrm>
+            <a:off x="-366072" y="3232650"/>
+            <a:ext cx="13469331" cy="707886"/>
+          </a:xfrm>
+          <a:prstGeom prst="rect">
+            <a:avLst/>
+          </a:prstGeom>
+          <a:noFill/>
+        </p:spPr>
+        <p:txBody>
+          <a:bodyPr wrap="square" lIns="91440" tIns="45720" rIns="91440" bIns="45720">
+            <a:spAutoFit/>
+            <a:scene3d>
+              <a:camera prst="orthographicFront"/>
+              <a:lightRig rig="harsh" dir="t"/>
+            </a:scene3d>
+            <a:sp3d extrusionH="57150" prstMaterial="matte">
+              <a:bevelT w="63500" h="12700" prst="angle"/>
+              <a:contourClr>
+                <a:schemeClr val="bg1">
+                  <a:lumMod val="65000"/>
+                </a:schemeClr>
+              </a:contourClr>
+            </a:sp3d>
+          </a:bodyPr>
+          <a:lstStyle/>
+          <a:p>
+            <a:pPr algn="ctr"/>
+            <a:r>
+              <a:rPr lang="it-IT" sz="4000" b="1" cap="none" spc="0" dirty="0">
+                <a:ln/>
+                <a:solidFill>
+                  <a:schemeClr val="tx1">
+                    <a:lumMod val="65000"/>
+                    <a:lumOff val="35000"/>
+                  </a:schemeClr>
+                </a:solidFill>
+                <a:effectLst/>
+              </a:rPr>
+              <a:t>SI RINGRAZIA TUTTI PER L’ATTENZIONE.</a:t>
+            </a:r>
+          </a:p>
+        </p:txBody>
+      </p:sp>
+    </p:spTree>
+    <p:extLst>
+      <p:ext uri="{BB962C8B-B14F-4D97-AF65-F5344CB8AC3E}">
+        <p14:creationId xmlns:p14="http://schemas.microsoft.com/office/powerpoint/2010/main" val="1046735074"/>
       </p:ext>
     </p:extLst>
   </p:cSld>

</xml_diff>

<commit_message>
Modificata presentazione e Modello ER
</commit_message>
<xml_diff>
--- a/Presentazione Project Giornale.pptx
+++ b/Presentazione Project Giornale.pptx
@@ -9,10 +9,16 @@
     <p:sldId id="258" r:id="rId3"/>
     <p:sldId id="256" r:id="rId4"/>
     <p:sldId id="260" r:id="rId5"/>
-    <p:sldId id="259" r:id="rId6"/>
-    <p:sldId id="261" r:id="rId7"/>
-    <p:sldId id="262" r:id="rId8"/>
-    <p:sldId id="263" r:id="rId9"/>
+    <p:sldId id="265" r:id="rId6"/>
+    <p:sldId id="259" r:id="rId7"/>
+    <p:sldId id="261" r:id="rId8"/>
+    <p:sldId id="266" r:id="rId9"/>
+    <p:sldId id="267" r:id="rId10"/>
+    <p:sldId id="268" r:id="rId11"/>
+    <p:sldId id="270" r:id="rId12"/>
+    <p:sldId id="269" r:id="rId13"/>
+    <p:sldId id="262" r:id="rId14"/>
+    <p:sldId id="263" r:id="rId15"/>
   </p:sldIdLst>
   <p:sldSz cx="12192000" cy="6858000"/>
   <p:notesSz cx="6858000" cy="9144000"/>
@@ -3730,6 +3736,2663 @@
 </p:sld>
 </file>
 
+<file path=ppt/slides/slide10.xml><?xml version="1.0" encoding="utf-8"?>
+<p:sld xmlns:a="http://schemas.openxmlformats.org/drawingml/2006/main" xmlns:r="http://schemas.openxmlformats.org/officeDocument/2006/relationships" xmlns:p="http://schemas.openxmlformats.org/presentationml/2006/main">
+  <p:cSld>
+    <p:spTree>
+      <p:nvGrpSpPr>
+        <p:cNvPr id="1" name=""/>
+        <p:cNvGrpSpPr/>
+        <p:nvPr/>
+      </p:nvGrpSpPr>
+      <p:grpSpPr>
+        <a:xfrm>
+          <a:off x="0" y="0"/>
+          <a:ext cx="0" cy="0"/>
+          <a:chOff x="0" y="0"/>
+          <a:chExt cx="0" cy="0"/>
+        </a:xfrm>
+      </p:grpSpPr>
+      <p:pic>
+        <p:nvPicPr>
+          <p:cNvPr id="5" name="Immagine 4">
+            <a:extLst>
+              <a:ext uri="{FF2B5EF4-FFF2-40B4-BE49-F238E27FC236}">
+                <a16:creationId xmlns:a16="http://schemas.microsoft.com/office/drawing/2014/main" id="{FA3C6BD7-8FBF-6EDA-7981-2218C1F6E17D}"/>
+              </a:ext>
+            </a:extLst>
+          </p:cNvPr>
+          <p:cNvPicPr>
+            <a:picLocks noChangeAspect="1"/>
+          </p:cNvPicPr>
+          <p:nvPr/>
+        </p:nvPicPr>
+        <p:blipFill>
+          <a:blip r:embed="rId2">
+            <a:extLst>
+              <a:ext uri="{28A0092B-C50C-407E-A947-70E740481C1C}">
+                <a14:useLocalDpi xmlns:a14="http://schemas.microsoft.com/office/drawing/2010/main" val="0"/>
+              </a:ext>
+            </a:extLst>
+          </a:blip>
+          <a:stretch>
+            <a:fillRect/>
+          </a:stretch>
+        </p:blipFill>
+        <p:spPr>
+          <a:xfrm>
+            <a:off x="0" y="0"/>
+            <a:ext cx="12192000" cy="6858000"/>
+          </a:xfrm>
+          <a:prstGeom prst="rect">
+            <a:avLst/>
+          </a:prstGeom>
+        </p:spPr>
+      </p:pic>
+      <p:sp>
+        <p:nvSpPr>
+          <p:cNvPr id="7" name="Rettangolo 6">
+            <a:extLst>
+              <a:ext uri="{FF2B5EF4-FFF2-40B4-BE49-F238E27FC236}">
+                <a16:creationId xmlns:a16="http://schemas.microsoft.com/office/drawing/2014/main" id="{DF1285BF-ADAE-853A-DFD0-E28672837DB2}"/>
+              </a:ext>
+            </a:extLst>
+          </p:cNvPr>
+          <p:cNvSpPr/>
+          <p:nvPr/>
+        </p:nvSpPr>
+        <p:spPr>
+          <a:xfrm>
+            <a:off x="2817131" y="2032889"/>
+            <a:ext cx="6970623" cy="523220"/>
+          </a:xfrm>
+          <a:prstGeom prst="rect">
+            <a:avLst/>
+          </a:prstGeom>
+          <a:noFill/>
+        </p:spPr>
+        <p:txBody>
+          <a:bodyPr wrap="square" lIns="91440" tIns="45720" rIns="91440" bIns="45720">
+            <a:spAutoFit/>
+            <a:scene3d>
+              <a:camera prst="orthographicFront"/>
+              <a:lightRig rig="harsh" dir="t"/>
+            </a:scene3d>
+            <a:sp3d extrusionH="57150" prstMaterial="matte">
+              <a:bevelT w="63500" h="12700" prst="angle"/>
+              <a:contourClr>
+                <a:schemeClr val="bg1">
+                  <a:lumMod val="65000"/>
+                </a:schemeClr>
+              </a:contourClr>
+            </a:sp3d>
+          </a:bodyPr>
+          <a:lstStyle/>
+          <a:p>
+            <a:pPr algn="ctr"/>
+            <a:r>
+              <a:rPr lang="it-IT" sz="2800" b="1" dirty="0">
+                <a:ln/>
+                <a:solidFill>
+                  <a:schemeClr val="tx1">
+                    <a:lumMod val="65000"/>
+                    <a:lumOff val="35000"/>
+                  </a:schemeClr>
+                </a:solidFill>
+              </a:rPr>
+              <a:t>CREAZIONE GRAFICA JavaScript - SPRING</a:t>
+            </a:r>
+            <a:endParaRPr lang="it-IT" sz="2800" b="1" cap="none" spc="0" dirty="0">
+              <a:ln/>
+              <a:solidFill>
+                <a:schemeClr val="tx1">
+                  <a:lumMod val="65000"/>
+                  <a:lumOff val="35000"/>
+                </a:schemeClr>
+              </a:solidFill>
+              <a:effectLst/>
+            </a:endParaRPr>
+          </a:p>
+        </p:txBody>
+      </p:sp>
+      <p:sp>
+        <p:nvSpPr>
+          <p:cNvPr id="8" name="Rettangolo 7">
+            <a:extLst>
+              <a:ext uri="{FF2B5EF4-FFF2-40B4-BE49-F238E27FC236}">
+                <a16:creationId xmlns:a16="http://schemas.microsoft.com/office/drawing/2014/main" id="{6BE559C5-BD60-4AF6-C0B7-5BFEF642CDF3}"/>
+              </a:ext>
+            </a:extLst>
+          </p:cNvPr>
+          <p:cNvSpPr/>
+          <p:nvPr/>
+        </p:nvSpPr>
+        <p:spPr>
+          <a:xfrm>
+            <a:off x="-565607" y="253632"/>
+            <a:ext cx="13338928" cy="646331"/>
+          </a:xfrm>
+          <a:prstGeom prst="rect">
+            <a:avLst/>
+          </a:prstGeom>
+          <a:noFill/>
+        </p:spPr>
+        <p:txBody>
+          <a:bodyPr wrap="square" lIns="91440" tIns="45720" rIns="91440" bIns="45720">
+            <a:spAutoFit/>
+            <a:scene3d>
+              <a:camera prst="orthographicFront"/>
+              <a:lightRig rig="harsh" dir="t"/>
+            </a:scene3d>
+            <a:sp3d extrusionH="57150" prstMaterial="matte">
+              <a:bevelT w="63500" h="12700" prst="angle"/>
+              <a:contourClr>
+                <a:schemeClr val="bg1">
+                  <a:lumMod val="65000"/>
+                </a:schemeClr>
+              </a:contourClr>
+            </a:sp3d>
+          </a:bodyPr>
+          <a:lstStyle/>
+          <a:p>
+            <a:pPr algn="ctr"/>
+            <a:r>
+              <a:rPr lang="it-IT" sz="3600" b="1" cap="none" spc="0" dirty="0">
+                <a:ln/>
+                <a:solidFill>
+                  <a:schemeClr val="tx1">
+                    <a:lumMod val="65000"/>
+                    <a:lumOff val="35000"/>
+                  </a:schemeClr>
+                </a:solidFill>
+                <a:effectLst/>
+              </a:rPr>
+              <a:t>PRESENTAZIONE PROJECT WORK FINALE: GIORNALE ONLINE</a:t>
+            </a:r>
+          </a:p>
+        </p:txBody>
+      </p:sp>
+      <p:pic>
+        <p:nvPicPr>
+          <p:cNvPr id="4" name="Immagine 3">
+            <a:extLst>
+              <a:ext uri="{FF2B5EF4-FFF2-40B4-BE49-F238E27FC236}">
+                <a16:creationId xmlns:a16="http://schemas.microsoft.com/office/drawing/2014/main" id="{9B810041-57D9-CB5A-D5AA-0218DADD3EC8}"/>
+              </a:ext>
+            </a:extLst>
+          </p:cNvPr>
+          <p:cNvPicPr>
+            <a:picLocks noChangeAspect="1"/>
+          </p:cNvPicPr>
+          <p:nvPr/>
+        </p:nvPicPr>
+        <p:blipFill>
+          <a:blip r:embed="rId3">
+            <a:extLst>
+              <a:ext uri="{28A0092B-C50C-407E-A947-70E740481C1C}">
+                <a14:useLocalDpi xmlns:a14="http://schemas.microsoft.com/office/drawing/2010/main" val="0"/>
+              </a:ext>
+            </a:extLst>
+          </a:blip>
+          <a:stretch>
+            <a:fillRect/>
+          </a:stretch>
+        </p:blipFill>
+        <p:spPr>
+          <a:xfrm>
+            <a:off x="3036989" y="3237018"/>
+            <a:ext cx="6530906" cy="2476715"/>
+          </a:xfrm>
+          <a:prstGeom prst="rect">
+            <a:avLst/>
+          </a:prstGeom>
+        </p:spPr>
+      </p:pic>
+    </p:spTree>
+    <p:extLst>
+      <p:ext uri="{BB962C8B-B14F-4D97-AF65-F5344CB8AC3E}">
+        <p14:creationId xmlns:p14="http://schemas.microsoft.com/office/powerpoint/2010/main" val="37316903"/>
+      </p:ext>
+    </p:extLst>
+  </p:cSld>
+  <p:clrMapOvr>
+    <a:masterClrMapping/>
+  </p:clrMapOvr>
+  <p:timing>
+    <p:tnLst>
+      <p:par>
+        <p:cTn id="1" dur="indefinite" restart="never" nodeType="tmRoot">
+          <p:childTnLst>
+            <p:seq concurrent="1" nextAc="seek">
+              <p:cTn id="2" dur="indefinite" nodeType="mainSeq">
+                <p:childTnLst>
+                  <p:par>
+                    <p:cTn id="3" fill="hold">
+                      <p:stCondLst>
+                        <p:cond delay="indefinite"/>
+                      </p:stCondLst>
+                      <p:childTnLst>
+                        <p:par>
+                          <p:cTn id="4" fill="hold">
+                            <p:stCondLst>
+                              <p:cond delay="0"/>
+                            </p:stCondLst>
+                            <p:childTnLst>
+                              <p:par>
+                                <p:cTn id="5" presetID="42" presetClass="entr" presetSubtype="0" fill="hold" grpId="0" nodeType="clickEffect">
+                                  <p:stCondLst>
+                                    <p:cond delay="0"/>
+                                  </p:stCondLst>
+                                  <p:childTnLst>
+                                    <p:set>
+                                      <p:cBhvr>
+                                        <p:cTn id="6" dur="1" fill="hold">
+                                          <p:stCondLst>
+                                            <p:cond delay="0"/>
+                                          </p:stCondLst>
+                                        </p:cTn>
+                                        <p:tgtEl>
+                                          <p:spTgt spid="7"/>
+                                        </p:tgtEl>
+                                        <p:attrNameLst>
+                                          <p:attrName>style.visibility</p:attrName>
+                                        </p:attrNameLst>
+                                      </p:cBhvr>
+                                      <p:to>
+                                        <p:strVal val="visible"/>
+                                      </p:to>
+                                    </p:set>
+                                    <p:animEffect transition="in" filter="fade">
+                                      <p:cBhvr>
+                                        <p:cTn id="7" dur="1000"/>
+                                        <p:tgtEl>
+                                          <p:spTgt spid="7"/>
+                                        </p:tgtEl>
+                                      </p:cBhvr>
+                                    </p:animEffect>
+                                    <p:anim calcmode="lin" valueType="num">
+                                      <p:cBhvr>
+                                        <p:cTn id="8" dur="1000" fill="hold"/>
+                                        <p:tgtEl>
+                                          <p:spTgt spid="7"/>
+                                        </p:tgtEl>
+                                        <p:attrNameLst>
+                                          <p:attrName>ppt_x</p:attrName>
+                                        </p:attrNameLst>
+                                      </p:cBhvr>
+                                      <p:tavLst>
+                                        <p:tav tm="0">
+                                          <p:val>
+                                            <p:strVal val="#ppt_x"/>
+                                          </p:val>
+                                        </p:tav>
+                                        <p:tav tm="100000">
+                                          <p:val>
+                                            <p:strVal val="#ppt_x"/>
+                                          </p:val>
+                                        </p:tav>
+                                      </p:tavLst>
+                                    </p:anim>
+                                    <p:anim calcmode="lin" valueType="num">
+                                      <p:cBhvr>
+                                        <p:cTn id="9" dur="1000" fill="hold"/>
+                                        <p:tgtEl>
+                                          <p:spTgt spid="7"/>
+                                        </p:tgtEl>
+                                        <p:attrNameLst>
+                                          <p:attrName>ppt_y</p:attrName>
+                                        </p:attrNameLst>
+                                      </p:cBhvr>
+                                      <p:tavLst>
+                                        <p:tav tm="0">
+                                          <p:val>
+                                            <p:strVal val="#ppt_y+.1"/>
+                                          </p:val>
+                                        </p:tav>
+                                        <p:tav tm="100000">
+                                          <p:val>
+                                            <p:strVal val="#ppt_y"/>
+                                          </p:val>
+                                        </p:tav>
+                                      </p:tavLst>
+                                    </p:anim>
+                                  </p:childTnLst>
+                                </p:cTn>
+                              </p:par>
+                            </p:childTnLst>
+                          </p:cTn>
+                        </p:par>
+                      </p:childTnLst>
+                    </p:cTn>
+                  </p:par>
+                  <p:par>
+                    <p:cTn id="10" fill="hold">
+                      <p:stCondLst>
+                        <p:cond delay="indefinite"/>
+                      </p:stCondLst>
+                      <p:childTnLst>
+                        <p:par>
+                          <p:cTn id="11" fill="hold">
+                            <p:stCondLst>
+                              <p:cond delay="0"/>
+                            </p:stCondLst>
+                            <p:childTnLst>
+                              <p:par>
+                                <p:cTn id="12" presetID="42" presetClass="entr" presetSubtype="0" fill="hold" nodeType="clickEffect">
+                                  <p:stCondLst>
+                                    <p:cond delay="0"/>
+                                  </p:stCondLst>
+                                  <p:childTnLst>
+                                    <p:set>
+                                      <p:cBhvr>
+                                        <p:cTn id="13" dur="1" fill="hold">
+                                          <p:stCondLst>
+                                            <p:cond delay="0"/>
+                                          </p:stCondLst>
+                                        </p:cTn>
+                                        <p:tgtEl>
+                                          <p:spTgt spid="4"/>
+                                        </p:tgtEl>
+                                        <p:attrNameLst>
+                                          <p:attrName>style.visibility</p:attrName>
+                                        </p:attrNameLst>
+                                      </p:cBhvr>
+                                      <p:to>
+                                        <p:strVal val="visible"/>
+                                      </p:to>
+                                    </p:set>
+                                    <p:animEffect transition="in" filter="fade">
+                                      <p:cBhvr>
+                                        <p:cTn id="14" dur="1000"/>
+                                        <p:tgtEl>
+                                          <p:spTgt spid="4"/>
+                                        </p:tgtEl>
+                                      </p:cBhvr>
+                                    </p:animEffect>
+                                    <p:anim calcmode="lin" valueType="num">
+                                      <p:cBhvr>
+                                        <p:cTn id="15" dur="1000" fill="hold"/>
+                                        <p:tgtEl>
+                                          <p:spTgt spid="4"/>
+                                        </p:tgtEl>
+                                        <p:attrNameLst>
+                                          <p:attrName>ppt_x</p:attrName>
+                                        </p:attrNameLst>
+                                      </p:cBhvr>
+                                      <p:tavLst>
+                                        <p:tav tm="0">
+                                          <p:val>
+                                            <p:strVal val="#ppt_x"/>
+                                          </p:val>
+                                        </p:tav>
+                                        <p:tav tm="100000">
+                                          <p:val>
+                                            <p:strVal val="#ppt_x"/>
+                                          </p:val>
+                                        </p:tav>
+                                      </p:tavLst>
+                                    </p:anim>
+                                    <p:anim calcmode="lin" valueType="num">
+                                      <p:cBhvr>
+                                        <p:cTn id="16" dur="1000" fill="hold"/>
+                                        <p:tgtEl>
+                                          <p:spTgt spid="4"/>
+                                        </p:tgtEl>
+                                        <p:attrNameLst>
+                                          <p:attrName>ppt_y</p:attrName>
+                                        </p:attrNameLst>
+                                      </p:cBhvr>
+                                      <p:tavLst>
+                                        <p:tav tm="0">
+                                          <p:val>
+                                            <p:strVal val="#ppt_y+.1"/>
+                                          </p:val>
+                                        </p:tav>
+                                        <p:tav tm="100000">
+                                          <p:val>
+                                            <p:strVal val="#ppt_y"/>
+                                          </p:val>
+                                        </p:tav>
+                                      </p:tavLst>
+                                    </p:anim>
+                                  </p:childTnLst>
+                                </p:cTn>
+                              </p:par>
+                            </p:childTnLst>
+                          </p:cTn>
+                        </p:par>
+                      </p:childTnLst>
+                    </p:cTn>
+                  </p:par>
+                </p:childTnLst>
+              </p:cTn>
+              <p:prevCondLst>
+                <p:cond evt="onPrev" delay="0">
+                  <p:tgtEl>
+                    <p:sldTgt/>
+                  </p:tgtEl>
+                </p:cond>
+              </p:prevCondLst>
+              <p:nextCondLst>
+                <p:cond evt="onNext" delay="0">
+                  <p:tgtEl>
+                    <p:sldTgt/>
+                  </p:tgtEl>
+                </p:cond>
+              </p:nextCondLst>
+            </p:seq>
+          </p:childTnLst>
+        </p:cTn>
+      </p:par>
+    </p:tnLst>
+    <p:bldLst>
+      <p:bldP spid="7" grpId="0"/>
+    </p:bldLst>
+  </p:timing>
+</p:sld>
+</file>
+
+<file path=ppt/slides/slide11.xml><?xml version="1.0" encoding="utf-8"?>
+<p:sld xmlns:a="http://schemas.openxmlformats.org/drawingml/2006/main" xmlns:r="http://schemas.openxmlformats.org/officeDocument/2006/relationships" xmlns:p="http://schemas.openxmlformats.org/presentationml/2006/main">
+  <p:cSld>
+    <p:spTree>
+      <p:nvGrpSpPr>
+        <p:cNvPr id="1" name=""/>
+        <p:cNvGrpSpPr/>
+        <p:nvPr/>
+      </p:nvGrpSpPr>
+      <p:grpSpPr>
+        <a:xfrm>
+          <a:off x="0" y="0"/>
+          <a:ext cx="0" cy="0"/>
+          <a:chOff x="0" y="0"/>
+          <a:chExt cx="0" cy="0"/>
+        </a:xfrm>
+      </p:grpSpPr>
+      <p:pic>
+        <p:nvPicPr>
+          <p:cNvPr id="5" name="Immagine 4">
+            <a:extLst>
+              <a:ext uri="{FF2B5EF4-FFF2-40B4-BE49-F238E27FC236}">
+                <a16:creationId xmlns:a16="http://schemas.microsoft.com/office/drawing/2014/main" id="{FA3C6BD7-8FBF-6EDA-7981-2218C1F6E17D}"/>
+              </a:ext>
+            </a:extLst>
+          </p:cNvPr>
+          <p:cNvPicPr>
+            <a:picLocks noChangeAspect="1"/>
+          </p:cNvPicPr>
+          <p:nvPr/>
+        </p:nvPicPr>
+        <p:blipFill>
+          <a:blip r:embed="rId2">
+            <a:extLst>
+              <a:ext uri="{28A0092B-C50C-407E-A947-70E740481C1C}">
+                <a14:useLocalDpi xmlns:a14="http://schemas.microsoft.com/office/drawing/2010/main" val="0"/>
+              </a:ext>
+            </a:extLst>
+          </a:blip>
+          <a:stretch>
+            <a:fillRect/>
+          </a:stretch>
+        </p:blipFill>
+        <p:spPr>
+          <a:xfrm>
+            <a:off x="0" y="0"/>
+            <a:ext cx="12192000" cy="6858000"/>
+          </a:xfrm>
+          <a:prstGeom prst="rect">
+            <a:avLst/>
+          </a:prstGeom>
+        </p:spPr>
+      </p:pic>
+      <p:sp>
+        <p:nvSpPr>
+          <p:cNvPr id="7" name="Rettangolo 6">
+            <a:extLst>
+              <a:ext uri="{FF2B5EF4-FFF2-40B4-BE49-F238E27FC236}">
+                <a16:creationId xmlns:a16="http://schemas.microsoft.com/office/drawing/2014/main" id="{DF1285BF-ADAE-853A-DFD0-E28672837DB2}"/>
+              </a:ext>
+            </a:extLst>
+          </p:cNvPr>
+          <p:cNvSpPr/>
+          <p:nvPr/>
+        </p:nvSpPr>
+        <p:spPr>
+          <a:xfrm>
+            <a:off x="2203765" y="2133349"/>
+            <a:ext cx="6970623" cy="523220"/>
+          </a:xfrm>
+          <a:prstGeom prst="rect">
+            <a:avLst/>
+          </a:prstGeom>
+          <a:noFill/>
+        </p:spPr>
+        <p:txBody>
+          <a:bodyPr wrap="square" lIns="91440" tIns="45720" rIns="91440" bIns="45720">
+            <a:spAutoFit/>
+            <a:scene3d>
+              <a:camera prst="orthographicFront"/>
+              <a:lightRig rig="harsh" dir="t"/>
+            </a:scene3d>
+            <a:sp3d extrusionH="57150" prstMaterial="matte">
+              <a:bevelT w="63500" h="12700" prst="angle"/>
+              <a:contourClr>
+                <a:schemeClr val="bg1">
+                  <a:lumMod val="65000"/>
+                </a:schemeClr>
+              </a:contourClr>
+            </a:sp3d>
+          </a:bodyPr>
+          <a:lstStyle/>
+          <a:p>
+            <a:pPr algn="ctr"/>
+            <a:r>
+              <a:rPr lang="it-IT" sz="2800" b="1" dirty="0">
+                <a:ln/>
+                <a:solidFill>
+                  <a:schemeClr val="tx1">
+                    <a:lumMod val="65000"/>
+                    <a:lumOff val="35000"/>
+                  </a:schemeClr>
+                </a:solidFill>
+              </a:rPr>
+              <a:t>OBIETTIVI RAGGIUNTI</a:t>
+            </a:r>
+            <a:endParaRPr lang="it-IT" sz="2800" b="1" cap="none" spc="0" dirty="0">
+              <a:ln/>
+              <a:solidFill>
+                <a:schemeClr val="tx1">
+                  <a:lumMod val="65000"/>
+                  <a:lumOff val="35000"/>
+                </a:schemeClr>
+              </a:solidFill>
+              <a:effectLst/>
+            </a:endParaRPr>
+          </a:p>
+        </p:txBody>
+      </p:sp>
+      <p:sp>
+        <p:nvSpPr>
+          <p:cNvPr id="8" name="Rettangolo 7">
+            <a:extLst>
+              <a:ext uri="{FF2B5EF4-FFF2-40B4-BE49-F238E27FC236}">
+                <a16:creationId xmlns:a16="http://schemas.microsoft.com/office/drawing/2014/main" id="{6BE559C5-BD60-4AF6-C0B7-5BFEF642CDF3}"/>
+              </a:ext>
+            </a:extLst>
+          </p:cNvPr>
+          <p:cNvSpPr/>
+          <p:nvPr/>
+        </p:nvSpPr>
+        <p:spPr>
+          <a:xfrm>
+            <a:off x="-565607" y="253632"/>
+            <a:ext cx="13338928" cy="646331"/>
+          </a:xfrm>
+          <a:prstGeom prst="rect">
+            <a:avLst/>
+          </a:prstGeom>
+          <a:noFill/>
+        </p:spPr>
+        <p:txBody>
+          <a:bodyPr wrap="square" lIns="91440" tIns="45720" rIns="91440" bIns="45720">
+            <a:spAutoFit/>
+            <a:scene3d>
+              <a:camera prst="orthographicFront"/>
+              <a:lightRig rig="harsh" dir="t"/>
+            </a:scene3d>
+            <a:sp3d extrusionH="57150" prstMaterial="matte">
+              <a:bevelT w="63500" h="12700" prst="angle"/>
+              <a:contourClr>
+                <a:schemeClr val="bg1">
+                  <a:lumMod val="65000"/>
+                </a:schemeClr>
+              </a:contourClr>
+            </a:sp3d>
+          </a:bodyPr>
+          <a:lstStyle/>
+          <a:p>
+            <a:pPr algn="ctr"/>
+            <a:r>
+              <a:rPr lang="it-IT" sz="3600" b="1" cap="none" spc="0" dirty="0">
+                <a:ln/>
+                <a:solidFill>
+                  <a:schemeClr val="tx1">
+                    <a:lumMod val="65000"/>
+                    <a:lumOff val="35000"/>
+                  </a:schemeClr>
+                </a:solidFill>
+                <a:effectLst/>
+              </a:rPr>
+              <a:t>PRESENTAZIONE PROJECT WORK FINALE: GIORNALE ONLINE</a:t>
+            </a:r>
+          </a:p>
+        </p:txBody>
+      </p:sp>
+      <p:sp>
+        <p:nvSpPr>
+          <p:cNvPr id="9" name="Rettangolo 8">
+            <a:extLst>
+              <a:ext uri="{FF2B5EF4-FFF2-40B4-BE49-F238E27FC236}">
+                <a16:creationId xmlns:a16="http://schemas.microsoft.com/office/drawing/2014/main" id="{A95B99EC-69BB-9278-8F5E-2FB7C3679AC6}"/>
+              </a:ext>
+            </a:extLst>
+          </p:cNvPr>
+          <p:cNvSpPr/>
+          <p:nvPr/>
+        </p:nvSpPr>
+        <p:spPr>
+          <a:xfrm>
+            <a:off x="3987624" y="2972043"/>
+            <a:ext cx="6970623" cy="1200329"/>
+          </a:xfrm>
+          <a:prstGeom prst="rect">
+            <a:avLst/>
+          </a:prstGeom>
+          <a:noFill/>
+        </p:spPr>
+        <p:txBody>
+          <a:bodyPr wrap="square" lIns="91440" tIns="45720" rIns="91440" bIns="45720">
+            <a:spAutoFit/>
+            <a:scene3d>
+              <a:camera prst="orthographicFront"/>
+              <a:lightRig rig="harsh" dir="t"/>
+            </a:scene3d>
+            <a:sp3d extrusionH="57150" prstMaterial="matte">
+              <a:bevelT w="63500" h="12700" prst="angle"/>
+              <a:contourClr>
+                <a:schemeClr val="bg1">
+                  <a:lumMod val="65000"/>
+                </a:schemeClr>
+              </a:contourClr>
+            </a:sp3d>
+          </a:bodyPr>
+          <a:lstStyle/>
+          <a:p>
+            <a:pPr marL="342900" indent="-342900">
+              <a:buFont typeface="Arial" panose="020B0604020202020204" pitchFamily="34" charset="0"/>
+              <a:buChar char="•"/>
+            </a:pPr>
+            <a:r>
+              <a:rPr lang="it-IT" sz="2400" b="1" dirty="0">
+                <a:ln/>
+                <a:solidFill>
+                  <a:schemeClr val="tx1">
+                    <a:lumMod val="65000"/>
+                    <a:lumOff val="35000"/>
+                  </a:schemeClr>
+                </a:solidFill>
+              </a:rPr>
+              <a:t>PAGINA HOME</a:t>
+            </a:r>
+          </a:p>
+          <a:p>
+            <a:pPr marL="342900" indent="-342900">
+              <a:buFont typeface="Arial" panose="020B0604020202020204" pitchFamily="34" charset="0"/>
+              <a:buChar char="•"/>
+            </a:pPr>
+            <a:r>
+              <a:rPr lang="it-IT" sz="2400" b="1" dirty="0">
+                <a:ln/>
+                <a:solidFill>
+                  <a:schemeClr val="tx1">
+                    <a:lumMod val="65000"/>
+                    <a:lumOff val="35000"/>
+                  </a:schemeClr>
+                </a:solidFill>
+              </a:rPr>
+              <a:t>PAGINA ARTICOLI</a:t>
+            </a:r>
+          </a:p>
+          <a:p>
+            <a:pPr marL="342900" indent="-342900">
+              <a:buFont typeface="Arial" panose="020B0604020202020204" pitchFamily="34" charset="0"/>
+              <a:buChar char="•"/>
+            </a:pPr>
+            <a:r>
+              <a:rPr lang="it-IT" sz="2400" b="1" cap="none" spc="0" dirty="0">
+                <a:ln/>
+                <a:solidFill>
+                  <a:schemeClr val="tx1">
+                    <a:lumMod val="65000"/>
+                    <a:lumOff val="35000"/>
+                  </a:schemeClr>
+                </a:solidFill>
+                <a:effectLst/>
+              </a:rPr>
+              <a:t>PAGINA CATEGORIE</a:t>
+            </a:r>
+          </a:p>
+        </p:txBody>
+      </p:sp>
+      <p:sp>
+        <p:nvSpPr>
+          <p:cNvPr id="10" name="Rettangolo 9">
+            <a:extLst>
+              <a:ext uri="{FF2B5EF4-FFF2-40B4-BE49-F238E27FC236}">
+                <a16:creationId xmlns:a16="http://schemas.microsoft.com/office/drawing/2014/main" id="{E7F60E7F-02E2-4B5A-EF2F-5352C5C4DE6A}"/>
+              </a:ext>
+            </a:extLst>
+          </p:cNvPr>
+          <p:cNvSpPr/>
+          <p:nvPr/>
+        </p:nvSpPr>
+        <p:spPr>
+          <a:xfrm>
+            <a:off x="3987623" y="4305460"/>
+            <a:ext cx="6970623" cy="1938992"/>
+          </a:xfrm>
+          <a:prstGeom prst="rect">
+            <a:avLst/>
+          </a:prstGeom>
+          <a:noFill/>
+        </p:spPr>
+        <p:txBody>
+          <a:bodyPr wrap="square" lIns="91440" tIns="45720" rIns="91440" bIns="45720">
+            <a:spAutoFit/>
+            <a:scene3d>
+              <a:camera prst="orthographicFront"/>
+              <a:lightRig rig="harsh" dir="t"/>
+            </a:scene3d>
+            <a:sp3d extrusionH="57150" prstMaterial="matte">
+              <a:bevelT w="63500" h="12700" prst="angle"/>
+              <a:contourClr>
+                <a:schemeClr val="bg1">
+                  <a:lumMod val="65000"/>
+                </a:schemeClr>
+              </a:contourClr>
+            </a:sp3d>
+          </a:bodyPr>
+          <a:lstStyle/>
+          <a:p>
+            <a:pPr marL="342900" indent="-342900">
+              <a:buFont typeface="Arial" panose="020B0604020202020204" pitchFamily="34" charset="0"/>
+              <a:buChar char="•"/>
+            </a:pPr>
+            <a:r>
+              <a:rPr lang="it-IT" sz="2400" b="1" dirty="0">
+                <a:ln/>
+                <a:solidFill>
+                  <a:schemeClr val="tx1">
+                    <a:lumMod val="65000"/>
+                    <a:lumOff val="35000"/>
+                  </a:schemeClr>
+                </a:solidFill>
+              </a:rPr>
+              <a:t>GESTIONE UTENTE</a:t>
+            </a:r>
+          </a:p>
+          <a:p>
+            <a:pPr marL="342900" indent="-342900">
+              <a:buFont typeface="Arial" panose="020B0604020202020204" pitchFamily="34" charset="0"/>
+              <a:buChar char="•"/>
+            </a:pPr>
+            <a:r>
+              <a:rPr lang="it-IT" sz="2400" b="1" dirty="0">
+                <a:ln/>
+                <a:solidFill>
+                  <a:schemeClr val="tx1">
+                    <a:lumMod val="65000"/>
+                    <a:lumOff val="35000"/>
+                  </a:schemeClr>
+                </a:solidFill>
+              </a:rPr>
+              <a:t>GESTIONE USERS</a:t>
+            </a:r>
+          </a:p>
+          <a:p>
+            <a:pPr marL="342900" indent="-342900">
+              <a:buFont typeface="Arial" panose="020B0604020202020204" pitchFamily="34" charset="0"/>
+              <a:buChar char="•"/>
+            </a:pPr>
+            <a:r>
+              <a:rPr lang="it-IT" sz="2400" b="1" dirty="0">
+                <a:ln/>
+                <a:solidFill>
+                  <a:schemeClr val="tx1">
+                    <a:lumMod val="65000"/>
+                    <a:lumOff val="35000"/>
+                  </a:schemeClr>
+                </a:solidFill>
+              </a:rPr>
+              <a:t>GESTIONE ADMIN</a:t>
+            </a:r>
+          </a:p>
+          <a:p>
+            <a:pPr marL="342900" indent="-342900">
+              <a:buFont typeface="Arial" panose="020B0604020202020204" pitchFamily="34" charset="0"/>
+              <a:buChar char="•"/>
+            </a:pPr>
+            <a:r>
+              <a:rPr lang="it-IT" sz="2400" b="1" cap="none" spc="0" dirty="0">
+                <a:ln/>
+                <a:solidFill>
+                  <a:schemeClr val="tx1">
+                    <a:lumMod val="65000"/>
+                    <a:lumOff val="35000"/>
+                  </a:schemeClr>
+                </a:solidFill>
+                <a:effectLst/>
+              </a:rPr>
+              <a:t>GESTIONE REGISTRATI</a:t>
+            </a:r>
+          </a:p>
+          <a:p>
+            <a:pPr marL="342900" indent="-342900">
+              <a:buFont typeface="Arial" panose="020B0604020202020204" pitchFamily="34" charset="0"/>
+              <a:buChar char="•"/>
+            </a:pPr>
+            <a:r>
+              <a:rPr lang="it-IT" sz="2400" b="1" dirty="0">
+                <a:ln/>
+                <a:solidFill>
+                  <a:schemeClr val="tx1">
+                    <a:lumMod val="65000"/>
+                    <a:lumOff val="35000"/>
+                  </a:schemeClr>
+                </a:solidFill>
+              </a:rPr>
+              <a:t>GESTIONE LOGIN</a:t>
+            </a:r>
+            <a:endParaRPr lang="it-IT" sz="2400" b="1" cap="none" spc="0" dirty="0">
+              <a:ln/>
+              <a:solidFill>
+                <a:schemeClr val="tx1">
+                  <a:lumMod val="65000"/>
+                  <a:lumOff val="35000"/>
+                </a:schemeClr>
+              </a:solidFill>
+              <a:effectLst/>
+            </a:endParaRPr>
+          </a:p>
+        </p:txBody>
+      </p:sp>
+    </p:spTree>
+    <p:extLst>
+      <p:ext uri="{BB962C8B-B14F-4D97-AF65-F5344CB8AC3E}">
+        <p14:creationId xmlns:p14="http://schemas.microsoft.com/office/powerpoint/2010/main" val="1007742426"/>
+      </p:ext>
+    </p:extLst>
+  </p:cSld>
+  <p:clrMapOvr>
+    <a:masterClrMapping/>
+  </p:clrMapOvr>
+  <p:timing>
+    <p:tnLst>
+      <p:par>
+        <p:cTn id="1" dur="indefinite" restart="never" nodeType="tmRoot">
+          <p:childTnLst>
+            <p:seq concurrent="1" nextAc="seek">
+              <p:cTn id="2" dur="indefinite" nodeType="mainSeq">
+                <p:childTnLst>
+                  <p:par>
+                    <p:cTn id="3" fill="hold">
+                      <p:stCondLst>
+                        <p:cond delay="indefinite"/>
+                      </p:stCondLst>
+                      <p:childTnLst>
+                        <p:par>
+                          <p:cTn id="4" fill="hold">
+                            <p:stCondLst>
+                              <p:cond delay="0"/>
+                            </p:stCondLst>
+                            <p:childTnLst>
+                              <p:par>
+                                <p:cTn id="5" presetID="42" presetClass="entr" presetSubtype="0" fill="hold" grpId="0" nodeType="clickEffect">
+                                  <p:stCondLst>
+                                    <p:cond delay="0"/>
+                                  </p:stCondLst>
+                                  <p:childTnLst>
+                                    <p:set>
+                                      <p:cBhvr>
+                                        <p:cTn id="6" dur="1" fill="hold">
+                                          <p:stCondLst>
+                                            <p:cond delay="0"/>
+                                          </p:stCondLst>
+                                        </p:cTn>
+                                        <p:tgtEl>
+                                          <p:spTgt spid="7"/>
+                                        </p:tgtEl>
+                                        <p:attrNameLst>
+                                          <p:attrName>style.visibility</p:attrName>
+                                        </p:attrNameLst>
+                                      </p:cBhvr>
+                                      <p:to>
+                                        <p:strVal val="visible"/>
+                                      </p:to>
+                                    </p:set>
+                                    <p:animEffect transition="in" filter="fade">
+                                      <p:cBhvr>
+                                        <p:cTn id="7" dur="1000"/>
+                                        <p:tgtEl>
+                                          <p:spTgt spid="7"/>
+                                        </p:tgtEl>
+                                      </p:cBhvr>
+                                    </p:animEffect>
+                                    <p:anim calcmode="lin" valueType="num">
+                                      <p:cBhvr>
+                                        <p:cTn id="8" dur="1000" fill="hold"/>
+                                        <p:tgtEl>
+                                          <p:spTgt spid="7"/>
+                                        </p:tgtEl>
+                                        <p:attrNameLst>
+                                          <p:attrName>ppt_x</p:attrName>
+                                        </p:attrNameLst>
+                                      </p:cBhvr>
+                                      <p:tavLst>
+                                        <p:tav tm="0">
+                                          <p:val>
+                                            <p:strVal val="#ppt_x"/>
+                                          </p:val>
+                                        </p:tav>
+                                        <p:tav tm="100000">
+                                          <p:val>
+                                            <p:strVal val="#ppt_x"/>
+                                          </p:val>
+                                        </p:tav>
+                                      </p:tavLst>
+                                    </p:anim>
+                                    <p:anim calcmode="lin" valueType="num">
+                                      <p:cBhvr>
+                                        <p:cTn id="9" dur="1000" fill="hold"/>
+                                        <p:tgtEl>
+                                          <p:spTgt spid="7"/>
+                                        </p:tgtEl>
+                                        <p:attrNameLst>
+                                          <p:attrName>ppt_y</p:attrName>
+                                        </p:attrNameLst>
+                                      </p:cBhvr>
+                                      <p:tavLst>
+                                        <p:tav tm="0">
+                                          <p:val>
+                                            <p:strVal val="#ppt_y+.1"/>
+                                          </p:val>
+                                        </p:tav>
+                                        <p:tav tm="100000">
+                                          <p:val>
+                                            <p:strVal val="#ppt_y"/>
+                                          </p:val>
+                                        </p:tav>
+                                      </p:tavLst>
+                                    </p:anim>
+                                  </p:childTnLst>
+                                </p:cTn>
+                              </p:par>
+                            </p:childTnLst>
+                          </p:cTn>
+                        </p:par>
+                      </p:childTnLst>
+                    </p:cTn>
+                  </p:par>
+                  <p:par>
+                    <p:cTn id="10" fill="hold">
+                      <p:stCondLst>
+                        <p:cond delay="indefinite"/>
+                      </p:stCondLst>
+                      <p:childTnLst>
+                        <p:par>
+                          <p:cTn id="11" fill="hold">
+                            <p:stCondLst>
+                              <p:cond delay="0"/>
+                            </p:stCondLst>
+                            <p:childTnLst>
+                              <p:par>
+                                <p:cTn id="12" presetID="42" presetClass="entr" presetSubtype="0" fill="hold" grpId="0" nodeType="clickEffect">
+                                  <p:stCondLst>
+                                    <p:cond delay="0"/>
+                                  </p:stCondLst>
+                                  <p:childTnLst>
+                                    <p:set>
+                                      <p:cBhvr>
+                                        <p:cTn id="13" dur="1" fill="hold">
+                                          <p:stCondLst>
+                                            <p:cond delay="0"/>
+                                          </p:stCondLst>
+                                        </p:cTn>
+                                        <p:tgtEl>
+                                          <p:spTgt spid="9"/>
+                                        </p:tgtEl>
+                                        <p:attrNameLst>
+                                          <p:attrName>style.visibility</p:attrName>
+                                        </p:attrNameLst>
+                                      </p:cBhvr>
+                                      <p:to>
+                                        <p:strVal val="visible"/>
+                                      </p:to>
+                                    </p:set>
+                                    <p:animEffect transition="in" filter="fade">
+                                      <p:cBhvr>
+                                        <p:cTn id="14" dur="1000"/>
+                                        <p:tgtEl>
+                                          <p:spTgt spid="9"/>
+                                        </p:tgtEl>
+                                      </p:cBhvr>
+                                    </p:animEffect>
+                                    <p:anim calcmode="lin" valueType="num">
+                                      <p:cBhvr>
+                                        <p:cTn id="15" dur="1000" fill="hold"/>
+                                        <p:tgtEl>
+                                          <p:spTgt spid="9"/>
+                                        </p:tgtEl>
+                                        <p:attrNameLst>
+                                          <p:attrName>ppt_x</p:attrName>
+                                        </p:attrNameLst>
+                                      </p:cBhvr>
+                                      <p:tavLst>
+                                        <p:tav tm="0">
+                                          <p:val>
+                                            <p:strVal val="#ppt_x"/>
+                                          </p:val>
+                                        </p:tav>
+                                        <p:tav tm="100000">
+                                          <p:val>
+                                            <p:strVal val="#ppt_x"/>
+                                          </p:val>
+                                        </p:tav>
+                                      </p:tavLst>
+                                    </p:anim>
+                                    <p:anim calcmode="lin" valueType="num">
+                                      <p:cBhvr>
+                                        <p:cTn id="16" dur="1000" fill="hold"/>
+                                        <p:tgtEl>
+                                          <p:spTgt spid="9"/>
+                                        </p:tgtEl>
+                                        <p:attrNameLst>
+                                          <p:attrName>ppt_y</p:attrName>
+                                        </p:attrNameLst>
+                                      </p:cBhvr>
+                                      <p:tavLst>
+                                        <p:tav tm="0">
+                                          <p:val>
+                                            <p:strVal val="#ppt_y+.1"/>
+                                          </p:val>
+                                        </p:tav>
+                                        <p:tav tm="100000">
+                                          <p:val>
+                                            <p:strVal val="#ppt_y"/>
+                                          </p:val>
+                                        </p:tav>
+                                      </p:tavLst>
+                                    </p:anim>
+                                  </p:childTnLst>
+                                </p:cTn>
+                              </p:par>
+                            </p:childTnLst>
+                          </p:cTn>
+                        </p:par>
+                      </p:childTnLst>
+                    </p:cTn>
+                  </p:par>
+                  <p:par>
+                    <p:cTn id="17" fill="hold">
+                      <p:stCondLst>
+                        <p:cond delay="indefinite"/>
+                      </p:stCondLst>
+                      <p:childTnLst>
+                        <p:par>
+                          <p:cTn id="18" fill="hold">
+                            <p:stCondLst>
+                              <p:cond delay="0"/>
+                            </p:stCondLst>
+                            <p:childTnLst>
+                              <p:par>
+                                <p:cTn id="19" presetID="42" presetClass="entr" presetSubtype="0" fill="hold" grpId="0" nodeType="clickEffect">
+                                  <p:stCondLst>
+                                    <p:cond delay="0"/>
+                                  </p:stCondLst>
+                                  <p:childTnLst>
+                                    <p:set>
+                                      <p:cBhvr>
+                                        <p:cTn id="20" dur="1" fill="hold">
+                                          <p:stCondLst>
+                                            <p:cond delay="0"/>
+                                          </p:stCondLst>
+                                        </p:cTn>
+                                        <p:tgtEl>
+                                          <p:spTgt spid="10"/>
+                                        </p:tgtEl>
+                                        <p:attrNameLst>
+                                          <p:attrName>style.visibility</p:attrName>
+                                        </p:attrNameLst>
+                                      </p:cBhvr>
+                                      <p:to>
+                                        <p:strVal val="visible"/>
+                                      </p:to>
+                                    </p:set>
+                                    <p:animEffect transition="in" filter="fade">
+                                      <p:cBhvr>
+                                        <p:cTn id="21" dur="1000"/>
+                                        <p:tgtEl>
+                                          <p:spTgt spid="10"/>
+                                        </p:tgtEl>
+                                      </p:cBhvr>
+                                    </p:animEffect>
+                                    <p:anim calcmode="lin" valueType="num">
+                                      <p:cBhvr>
+                                        <p:cTn id="22" dur="1000" fill="hold"/>
+                                        <p:tgtEl>
+                                          <p:spTgt spid="10"/>
+                                        </p:tgtEl>
+                                        <p:attrNameLst>
+                                          <p:attrName>ppt_x</p:attrName>
+                                        </p:attrNameLst>
+                                      </p:cBhvr>
+                                      <p:tavLst>
+                                        <p:tav tm="0">
+                                          <p:val>
+                                            <p:strVal val="#ppt_x"/>
+                                          </p:val>
+                                        </p:tav>
+                                        <p:tav tm="100000">
+                                          <p:val>
+                                            <p:strVal val="#ppt_x"/>
+                                          </p:val>
+                                        </p:tav>
+                                      </p:tavLst>
+                                    </p:anim>
+                                    <p:anim calcmode="lin" valueType="num">
+                                      <p:cBhvr>
+                                        <p:cTn id="23" dur="1000" fill="hold"/>
+                                        <p:tgtEl>
+                                          <p:spTgt spid="10"/>
+                                        </p:tgtEl>
+                                        <p:attrNameLst>
+                                          <p:attrName>ppt_y</p:attrName>
+                                        </p:attrNameLst>
+                                      </p:cBhvr>
+                                      <p:tavLst>
+                                        <p:tav tm="0">
+                                          <p:val>
+                                            <p:strVal val="#ppt_y+.1"/>
+                                          </p:val>
+                                        </p:tav>
+                                        <p:tav tm="100000">
+                                          <p:val>
+                                            <p:strVal val="#ppt_y"/>
+                                          </p:val>
+                                        </p:tav>
+                                      </p:tavLst>
+                                    </p:anim>
+                                  </p:childTnLst>
+                                </p:cTn>
+                              </p:par>
+                            </p:childTnLst>
+                          </p:cTn>
+                        </p:par>
+                      </p:childTnLst>
+                    </p:cTn>
+                  </p:par>
+                </p:childTnLst>
+              </p:cTn>
+              <p:prevCondLst>
+                <p:cond evt="onPrev" delay="0">
+                  <p:tgtEl>
+                    <p:sldTgt/>
+                  </p:tgtEl>
+                </p:cond>
+              </p:prevCondLst>
+              <p:nextCondLst>
+                <p:cond evt="onNext" delay="0">
+                  <p:tgtEl>
+                    <p:sldTgt/>
+                  </p:tgtEl>
+                </p:cond>
+              </p:nextCondLst>
+            </p:seq>
+          </p:childTnLst>
+        </p:cTn>
+      </p:par>
+    </p:tnLst>
+    <p:bldLst>
+      <p:bldP spid="7" grpId="0"/>
+      <p:bldP spid="9" grpId="0"/>
+      <p:bldP spid="10" grpId="0"/>
+    </p:bldLst>
+  </p:timing>
+</p:sld>
+</file>
+
+<file path=ppt/slides/slide12.xml><?xml version="1.0" encoding="utf-8"?>
+<p:sld xmlns:a="http://schemas.openxmlformats.org/drawingml/2006/main" xmlns:r="http://schemas.openxmlformats.org/officeDocument/2006/relationships" xmlns:p="http://schemas.openxmlformats.org/presentationml/2006/main">
+  <p:cSld>
+    <p:spTree>
+      <p:nvGrpSpPr>
+        <p:cNvPr id="1" name=""/>
+        <p:cNvGrpSpPr/>
+        <p:nvPr/>
+      </p:nvGrpSpPr>
+      <p:grpSpPr>
+        <a:xfrm>
+          <a:off x="0" y="0"/>
+          <a:ext cx="0" cy="0"/>
+          <a:chOff x="0" y="0"/>
+          <a:chExt cx="0" cy="0"/>
+        </a:xfrm>
+      </p:grpSpPr>
+      <p:pic>
+        <p:nvPicPr>
+          <p:cNvPr id="5" name="Immagine 4">
+            <a:extLst>
+              <a:ext uri="{FF2B5EF4-FFF2-40B4-BE49-F238E27FC236}">
+                <a16:creationId xmlns:a16="http://schemas.microsoft.com/office/drawing/2014/main" id="{FA3C6BD7-8FBF-6EDA-7981-2218C1F6E17D}"/>
+              </a:ext>
+            </a:extLst>
+          </p:cNvPr>
+          <p:cNvPicPr>
+            <a:picLocks noChangeAspect="1"/>
+          </p:cNvPicPr>
+          <p:nvPr/>
+        </p:nvPicPr>
+        <p:blipFill>
+          <a:blip r:embed="rId2">
+            <a:extLst>
+              <a:ext uri="{28A0092B-C50C-407E-A947-70E740481C1C}">
+                <a14:useLocalDpi xmlns:a14="http://schemas.microsoft.com/office/drawing/2010/main" val="0"/>
+              </a:ext>
+            </a:extLst>
+          </a:blip>
+          <a:stretch>
+            <a:fillRect/>
+          </a:stretch>
+        </p:blipFill>
+        <p:spPr>
+          <a:xfrm>
+            <a:off x="0" y="0"/>
+            <a:ext cx="12192000" cy="6858000"/>
+          </a:xfrm>
+          <a:prstGeom prst="rect">
+            <a:avLst/>
+          </a:prstGeom>
+        </p:spPr>
+      </p:pic>
+      <p:sp>
+        <p:nvSpPr>
+          <p:cNvPr id="7" name="Rettangolo 6">
+            <a:extLst>
+              <a:ext uri="{FF2B5EF4-FFF2-40B4-BE49-F238E27FC236}">
+                <a16:creationId xmlns:a16="http://schemas.microsoft.com/office/drawing/2014/main" id="{DF1285BF-ADAE-853A-DFD0-E28672837DB2}"/>
+              </a:ext>
+            </a:extLst>
+          </p:cNvPr>
+          <p:cNvSpPr/>
+          <p:nvPr/>
+        </p:nvSpPr>
+        <p:spPr>
+          <a:xfrm>
+            <a:off x="2213597" y="2349659"/>
+            <a:ext cx="6970623" cy="523220"/>
+          </a:xfrm>
+          <a:prstGeom prst="rect">
+            <a:avLst/>
+          </a:prstGeom>
+          <a:noFill/>
+        </p:spPr>
+        <p:txBody>
+          <a:bodyPr wrap="square" lIns="91440" tIns="45720" rIns="91440" bIns="45720">
+            <a:spAutoFit/>
+            <a:scene3d>
+              <a:camera prst="orthographicFront"/>
+              <a:lightRig rig="harsh" dir="t"/>
+            </a:scene3d>
+            <a:sp3d extrusionH="57150" prstMaterial="matte">
+              <a:bevelT w="63500" h="12700" prst="angle"/>
+              <a:contourClr>
+                <a:schemeClr val="bg1">
+                  <a:lumMod val="65000"/>
+                </a:schemeClr>
+              </a:contourClr>
+            </a:sp3d>
+          </a:bodyPr>
+          <a:lstStyle/>
+          <a:p>
+            <a:pPr algn="ctr"/>
+            <a:r>
+              <a:rPr lang="it-IT" sz="2800" b="1" dirty="0">
+                <a:ln/>
+                <a:solidFill>
+                  <a:schemeClr val="tx1">
+                    <a:lumMod val="65000"/>
+                    <a:lumOff val="35000"/>
+                  </a:schemeClr>
+                </a:solidFill>
+              </a:rPr>
+              <a:t>FUNZIONI AGGIUNTIVE</a:t>
+            </a:r>
+            <a:endParaRPr lang="it-IT" sz="2800" b="1" cap="none" spc="0" dirty="0">
+              <a:ln/>
+              <a:solidFill>
+                <a:schemeClr val="tx1">
+                  <a:lumMod val="65000"/>
+                  <a:lumOff val="35000"/>
+                </a:schemeClr>
+              </a:solidFill>
+              <a:effectLst/>
+            </a:endParaRPr>
+          </a:p>
+        </p:txBody>
+      </p:sp>
+      <p:sp>
+        <p:nvSpPr>
+          <p:cNvPr id="8" name="Rettangolo 7">
+            <a:extLst>
+              <a:ext uri="{FF2B5EF4-FFF2-40B4-BE49-F238E27FC236}">
+                <a16:creationId xmlns:a16="http://schemas.microsoft.com/office/drawing/2014/main" id="{6BE559C5-BD60-4AF6-C0B7-5BFEF642CDF3}"/>
+              </a:ext>
+            </a:extLst>
+          </p:cNvPr>
+          <p:cNvSpPr/>
+          <p:nvPr/>
+        </p:nvSpPr>
+        <p:spPr>
+          <a:xfrm>
+            <a:off x="-565607" y="253632"/>
+            <a:ext cx="13338928" cy="646331"/>
+          </a:xfrm>
+          <a:prstGeom prst="rect">
+            <a:avLst/>
+          </a:prstGeom>
+          <a:noFill/>
+        </p:spPr>
+        <p:txBody>
+          <a:bodyPr wrap="square" lIns="91440" tIns="45720" rIns="91440" bIns="45720">
+            <a:spAutoFit/>
+            <a:scene3d>
+              <a:camera prst="orthographicFront"/>
+              <a:lightRig rig="harsh" dir="t"/>
+            </a:scene3d>
+            <a:sp3d extrusionH="57150" prstMaterial="matte">
+              <a:bevelT w="63500" h="12700" prst="angle"/>
+              <a:contourClr>
+                <a:schemeClr val="bg1">
+                  <a:lumMod val="65000"/>
+                </a:schemeClr>
+              </a:contourClr>
+            </a:sp3d>
+          </a:bodyPr>
+          <a:lstStyle/>
+          <a:p>
+            <a:pPr algn="ctr"/>
+            <a:r>
+              <a:rPr lang="it-IT" sz="3600" b="1" cap="none" spc="0" dirty="0">
+                <a:ln/>
+                <a:solidFill>
+                  <a:schemeClr val="tx1">
+                    <a:lumMod val="65000"/>
+                    <a:lumOff val="35000"/>
+                  </a:schemeClr>
+                </a:solidFill>
+                <a:effectLst/>
+              </a:rPr>
+              <a:t>PRESENTAZIONE PROJECT WORK FINALE: GIORNALE ONLINE</a:t>
+            </a:r>
+          </a:p>
+        </p:txBody>
+      </p:sp>
+      <p:sp>
+        <p:nvSpPr>
+          <p:cNvPr id="9" name="Rettangolo 8">
+            <a:extLst>
+              <a:ext uri="{FF2B5EF4-FFF2-40B4-BE49-F238E27FC236}">
+                <a16:creationId xmlns:a16="http://schemas.microsoft.com/office/drawing/2014/main" id="{A95B99EC-69BB-9278-8F5E-2FB7C3679AC6}"/>
+              </a:ext>
+            </a:extLst>
+          </p:cNvPr>
+          <p:cNvSpPr/>
+          <p:nvPr/>
+        </p:nvSpPr>
+        <p:spPr>
+          <a:xfrm>
+            <a:off x="3899133" y="3556955"/>
+            <a:ext cx="6970623" cy="1200329"/>
+          </a:xfrm>
+          <a:prstGeom prst="rect">
+            <a:avLst/>
+          </a:prstGeom>
+          <a:noFill/>
+        </p:spPr>
+        <p:txBody>
+          <a:bodyPr wrap="square" lIns="91440" tIns="45720" rIns="91440" bIns="45720">
+            <a:spAutoFit/>
+            <a:scene3d>
+              <a:camera prst="orthographicFront"/>
+              <a:lightRig rig="harsh" dir="t"/>
+            </a:scene3d>
+            <a:sp3d extrusionH="57150" prstMaterial="matte">
+              <a:bevelT w="63500" h="12700" prst="angle"/>
+              <a:contourClr>
+                <a:schemeClr val="bg1">
+                  <a:lumMod val="65000"/>
+                </a:schemeClr>
+              </a:contourClr>
+            </a:sp3d>
+          </a:bodyPr>
+          <a:lstStyle/>
+          <a:p>
+            <a:pPr marL="342900" indent="-342900">
+              <a:buFont typeface="Arial" panose="020B0604020202020204" pitchFamily="34" charset="0"/>
+              <a:buChar char="•"/>
+            </a:pPr>
+            <a:r>
+              <a:rPr lang="it-IT" sz="2400" b="1" dirty="0">
+                <a:ln/>
+                <a:solidFill>
+                  <a:schemeClr val="tx1">
+                    <a:lumMod val="65000"/>
+                    <a:lumOff val="35000"/>
+                  </a:schemeClr>
+                </a:solidFill>
+              </a:rPr>
+              <a:t>CAMBIO TEMA</a:t>
+            </a:r>
+          </a:p>
+          <a:p>
+            <a:pPr marL="342900" indent="-342900">
+              <a:buFont typeface="Arial" panose="020B0604020202020204" pitchFamily="34" charset="0"/>
+              <a:buChar char="•"/>
+            </a:pPr>
+            <a:r>
+              <a:rPr lang="it-IT" sz="2400" b="1" dirty="0">
+                <a:ln/>
+                <a:solidFill>
+                  <a:schemeClr val="tx1">
+                    <a:lumMod val="65000"/>
+                    <a:lumOff val="35000"/>
+                  </a:schemeClr>
+                </a:solidFill>
+              </a:rPr>
+              <a:t>MOTORE DI RICERCA </a:t>
+            </a:r>
+          </a:p>
+          <a:p>
+            <a:pPr marL="342900" indent="-342900">
+              <a:buFont typeface="Arial" panose="020B0604020202020204" pitchFamily="34" charset="0"/>
+              <a:buChar char="•"/>
+            </a:pPr>
+            <a:r>
+              <a:rPr lang="it-IT" sz="2400" b="1" cap="none" spc="0" dirty="0">
+                <a:ln/>
+                <a:solidFill>
+                  <a:schemeClr val="tx1">
+                    <a:lumMod val="65000"/>
+                    <a:lumOff val="35000"/>
+                  </a:schemeClr>
+                </a:solidFill>
+                <a:effectLst/>
+              </a:rPr>
+              <a:t>POSSIBILITA’ DI NASCONDERE GLI ARTICOLI</a:t>
+            </a:r>
+          </a:p>
+        </p:txBody>
+      </p:sp>
+    </p:spTree>
+    <p:extLst>
+      <p:ext uri="{BB962C8B-B14F-4D97-AF65-F5344CB8AC3E}">
+        <p14:creationId xmlns:p14="http://schemas.microsoft.com/office/powerpoint/2010/main" val="1636098357"/>
+      </p:ext>
+    </p:extLst>
+  </p:cSld>
+  <p:clrMapOvr>
+    <a:masterClrMapping/>
+  </p:clrMapOvr>
+  <p:timing>
+    <p:tnLst>
+      <p:par>
+        <p:cTn id="1" dur="indefinite" restart="never" nodeType="tmRoot">
+          <p:childTnLst>
+            <p:seq concurrent="1" nextAc="seek">
+              <p:cTn id="2" dur="indefinite" nodeType="mainSeq">
+                <p:childTnLst>
+                  <p:par>
+                    <p:cTn id="3" fill="hold">
+                      <p:stCondLst>
+                        <p:cond delay="indefinite"/>
+                      </p:stCondLst>
+                      <p:childTnLst>
+                        <p:par>
+                          <p:cTn id="4" fill="hold">
+                            <p:stCondLst>
+                              <p:cond delay="0"/>
+                            </p:stCondLst>
+                            <p:childTnLst>
+                              <p:par>
+                                <p:cTn id="5" presetID="42" presetClass="entr" presetSubtype="0" fill="hold" grpId="0" nodeType="clickEffect">
+                                  <p:stCondLst>
+                                    <p:cond delay="0"/>
+                                  </p:stCondLst>
+                                  <p:childTnLst>
+                                    <p:set>
+                                      <p:cBhvr>
+                                        <p:cTn id="6" dur="1" fill="hold">
+                                          <p:stCondLst>
+                                            <p:cond delay="0"/>
+                                          </p:stCondLst>
+                                        </p:cTn>
+                                        <p:tgtEl>
+                                          <p:spTgt spid="7"/>
+                                        </p:tgtEl>
+                                        <p:attrNameLst>
+                                          <p:attrName>style.visibility</p:attrName>
+                                        </p:attrNameLst>
+                                      </p:cBhvr>
+                                      <p:to>
+                                        <p:strVal val="visible"/>
+                                      </p:to>
+                                    </p:set>
+                                    <p:animEffect transition="in" filter="fade">
+                                      <p:cBhvr>
+                                        <p:cTn id="7" dur="1000"/>
+                                        <p:tgtEl>
+                                          <p:spTgt spid="7"/>
+                                        </p:tgtEl>
+                                      </p:cBhvr>
+                                    </p:animEffect>
+                                    <p:anim calcmode="lin" valueType="num">
+                                      <p:cBhvr>
+                                        <p:cTn id="8" dur="1000" fill="hold"/>
+                                        <p:tgtEl>
+                                          <p:spTgt spid="7"/>
+                                        </p:tgtEl>
+                                        <p:attrNameLst>
+                                          <p:attrName>ppt_x</p:attrName>
+                                        </p:attrNameLst>
+                                      </p:cBhvr>
+                                      <p:tavLst>
+                                        <p:tav tm="0">
+                                          <p:val>
+                                            <p:strVal val="#ppt_x"/>
+                                          </p:val>
+                                        </p:tav>
+                                        <p:tav tm="100000">
+                                          <p:val>
+                                            <p:strVal val="#ppt_x"/>
+                                          </p:val>
+                                        </p:tav>
+                                      </p:tavLst>
+                                    </p:anim>
+                                    <p:anim calcmode="lin" valueType="num">
+                                      <p:cBhvr>
+                                        <p:cTn id="9" dur="1000" fill="hold"/>
+                                        <p:tgtEl>
+                                          <p:spTgt spid="7"/>
+                                        </p:tgtEl>
+                                        <p:attrNameLst>
+                                          <p:attrName>ppt_y</p:attrName>
+                                        </p:attrNameLst>
+                                      </p:cBhvr>
+                                      <p:tavLst>
+                                        <p:tav tm="0">
+                                          <p:val>
+                                            <p:strVal val="#ppt_y+.1"/>
+                                          </p:val>
+                                        </p:tav>
+                                        <p:tav tm="100000">
+                                          <p:val>
+                                            <p:strVal val="#ppt_y"/>
+                                          </p:val>
+                                        </p:tav>
+                                      </p:tavLst>
+                                    </p:anim>
+                                  </p:childTnLst>
+                                </p:cTn>
+                              </p:par>
+                            </p:childTnLst>
+                          </p:cTn>
+                        </p:par>
+                      </p:childTnLst>
+                    </p:cTn>
+                  </p:par>
+                  <p:par>
+                    <p:cTn id="10" fill="hold">
+                      <p:stCondLst>
+                        <p:cond delay="indefinite"/>
+                      </p:stCondLst>
+                      <p:childTnLst>
+                        <p:par>
+                          <p:cTn id="11" fill="hold">
+                            <p:stCondLst>
+                              <p:cond delay="0"/>
+                            </p:stCondLst>
+                            <p:childTnLst>
+                              <p:par>
+                                <p:cTn id="12" presetID="42" presetClass="entr" presetSubtype="0" fill="hold" grpId="0" nodeType="clickEffect">
+                                  <p:stCondLst>
+                                    <p:cond delay="0"/>
+                                  </p:stCondLst>
+                                  <p:childTnLst>
+                                    <p:set>
+                                      <p:cBhvr>
+                                        <p:cTn id="13" dur="1" fill="hold">
+                                          <p:stCondLst>
+                                            <p:cond delay="0"/>
+                                          </p:stCondLst>
+                                        </p:cTn>
+                                        <p:tgtEl>
+                                          <p:spTgt spid="9"/>
+                                        </p:tgtEl>
+                                        <p:attrNameLst>
+                                          <p:attrName>style.visibility</p:attrName>
+                                        </p:attrNameLst>
+                                      </p:cBhvr>
+                                      <p:to>
+                                        <p:strVal val="visible"/>
+                                      </p:to>
+                                    </p:set>
+                                    <p:animEffect transition="in" filter="fade">
+                                      <p:cBhvr>
+                                        <p:cTn id="14" dur="1000"/>
+                                        <p:tgtEl>
+                                          <p:spTgt spid="9"/>
+                                        </p:tgtEl>
+                                      </p:cBhvr>
+                                    </p:animEffect>
+                                    <p:anim calcmode="lin" valueType="num">
+                                      <p:cBhvr>
+                                        <p:cTn id="15" dur="1000" fill="hold"/>
+                                        <p:tgtEl>
+                                          <p:spTgt spid="9"/>
+                                        </p:tgtEl>
+                                        <p:attrNameLst>
+                                          <p:attrName>ppt_x</p:attrName>
+                                        </p:attrNameLst>
+                                      </p:cBhvr>
+                                      <p:tavLst>
+                                        <p:tav tm="0">
+                                          <p:val>
+                                            <p:strVal val="#ppt_x"/>
+                                          </p:val>
+                                        </p:tav>
+                                        <p:tav tm="100000">
+                                          <p:val>
+                                            <p:strVal val="#ppt_x"/>
+                                          </p:val>
+                                        </p:tav>
+                                      </p:tavLst>
+                                    </p:anim>
+                                    <p:anim calcmode="lin" valueType="num">
+                                      <p:cBhvr>
+                                        <p:cTn id="16" dur="1000" fill="hold"/>
+                                        <p:tgtEl>
+                                          <p:spTgt spid="9"/>
+                                        </p:tgtEl>
+                                        <p:attrNameLst>
+                                          <p:attrName>ppt_y</p:attrName>
+                                        </p:attrNameLst>
+                                      </p:cBhvr>
+                                      <p:tavLst>
+                                        <p:tav tm="0">
+                                          <p:val>
+                                            <p:strVal val="#ppt_y+.1"/>
+                                          </p:val>
+                                        </p:tav>
+                                        <p:tav tm="100000">
+                                          <p:val>
+                                            <p:strVal val="#ppt_y"/>
+                                          </p:val>
+                                        </p:tav>
+                                      </p:tavLst>
+                                    </p:anim>
+                                  </p:childTnLst>
+                                </p:cTn>
+                              </p:par>
+                            </p:childTnLst>
+                          </p:cTn>
+                        </p:par>
+                      </p:childTnLst>
+                    </p:cTn>
+                  </p:par>
+                </p:childTnLst>
+              </p:cTn>
+              <p:prevCondLst>
+                <p:cond evt="onPrev" delay="0">
+                  <p:tgtEl>
+                    <p:sldTgt/>
+                  </p:tgtEl>
+                </p:cond>
+              </p:prevCondLst>
+              <p:nextCondLst>
+                <p:cond evt="onNext" delay="0">
+                  <p:tgtEl>
+                    <p:sldTgt/>
+                  </p:tgtEl>
+                </p:cond>
+              </p:nextCondLst>
+            </p:seq>
+          </p:childTnLst>
+        </p:cTn>
+      </p:par>
+    </p:tnLst>
+    <p:bldLst>
+      <p:bldP spid="7" grpId="0"/>
+      <p:bldP spid="9" grpId="0"/>
+    </p:bldLst>
+  </p:timing>
+</p:sld>
+</file>
+
+<file path=ppt/slides/slide13.xml><?xml version="1.0" encoding="utf-8"?>
+<p:sld xmlns:a="http://schemas.openxmlformats.org/drawingml/2006/main" xmlns:r="http://schemas.openxmlformats.org/officeDocument/2006/relationships" xmlns:p="http://schemas.openxmlformats.org/presentationml/2006/main">
+  <p:cSld>
+    <p:spTree>
+      <p:nvGrpSpPr>
+        <p:cNvPr id="1" name=""/>
+        <p:cNvGrpSpPr/>
+        <p:nvPr/>
+      </p:nvGrpSpPr>
+      <p:grpSpPr>
+        <a:xfrm>
+          <a:off x="0" y="0"/>
+          <a:ext cx="0" cy="0"/>
+          <a:chOff x="0" y="0"/>
+          <a:chExt cx="0" cy="0"/>
+        </a:xfrm>
+      </p:grpSpPr>
+      <p:pic>
+        <p:nvPicPr>
+          <p:cNvPr id="4" name="Immagine 3">
+            <a:extLst>
+              <a:ext uri="{FF2B5EF4-FFF2-40B4-BE49-F238E27FC236}">
+                <a16:creationId xmlns:a16="http://schemas.microsoft.com/office/drawing/2014/main" id="{2238C690-8762-1671-3A7C-0CB68BD37276}"/>
+              </a:ext>
+            </a:extLst>
+          </p:cNvPr>
+          <p:cNvPicPr>
+            <a:picLocks noChangeAspect="1"/>
+          </p:cNvPicPr>
+          <p:nvPr/>
+        </p:nvPicPr>
+        <p:blipFill>
+          <a:blip r:embed="rId2">
+            <a:extLst>
+              <a:ext uri="{28A0092B-C50C-407E-A947-70E740481C1C}">
+                <a14:useLocalDpi xmlns:a14="http://schemas.microsoft.com/office/drawing/2010/main" val="0"/>
+              </a:ext>
+            </a:extLst>
+          </a:blip>
+          <a:stretch>
+            <a:fillRect/>
+          </a:stretch>
+        </p:blipFill>
+        <p:spPr>
+          <a:xfrm>
+            <a:off x="0" y="0"/>
+            <a:ext cx="12192000" cy="6858000"/>
+          </a:xfrm>
+          <a:prstGeom prst="rect">
+            <a:avLst/>
+          </a:prstGeom>
+        </p:spPr>
+      </p:pic>
+      <p:sp>
+        <p:nvSpPr>
+          <p:cNvPr id="7" name="Rettangolo 6">
+            <a:extLst>
+              <a:ext uri="{FF2B5EF4-FFF2-40B4-BE49-F238E27FC236}">
+                <a16:creationId xmlns:a16="http://schemas.microsoft.com/office/drawing/2014/main" id="{6977FF6E-185F-1431-B523-46A920A0B7FE}"/>
+              </a:ext>
+            </a:extLst>
+          </p:cNvPr>
+          <p:cNvSpPr/>
+          <p:nvPr/>
+        </p:nvSpPr>
+        <p:spPr>
+          <a:xfrm>
+            <a:off x="2929749" y="2570931"/>
+            <a:ext cx="6784999" cy="523220"/>
+          </a:xfrm>
+          <a:prstGeom prst="rect">
+            <a:avLst/>
+          </a:prstGeom>
+          <a:noFill/>
+        </p:spPr>
+        <p:txBody>
+          <a:bodyPr wrap="none" lIns="91440" tIns="45720" rIns="91440" bIns="45720">
+            <a:spAutoFit/>
+            <a:scene3d>
+              <a:camera prst="orthographicFront"/>
+              <a:lightRig rig="harsh" dir="t"/>
+            </a:scene3d>
+            <a:sp3d extrusionH="57150" prstMaterial="matte">
+              <a:bevelT w="63500" h="12700" prst="angle"/>
+              <a:contourClr>
+                <a:schemeClr val="bg1">
+                  <a:lumMod val="65000"/>
+                </a:schemeClr>
+              </a:contourClr>
+            </a:sp3d>
+          </a:bodyPr>
+          <a:lstStyle/>
+          <a:p>
+            <a:pPr algn="ctr"/>
+            <a:r>
+              <a:rPr lang="it-IT" sz="2800" b="1" dirty="0">
+                <a:ln/>
+                <a:solidFill>
+                  <a:schemeClr val="tx1">
+                    <a:lumMod val="65000"/>
+                    <a:lumOff val="35000"/>
+                  </a:schemeClr>
+                </a:solidFill>
+              </a:rPr>
+              <a:t>VISUALIZZIAMO IL RISULTATO SUL BROWSER</a:t>
+            </a:r>
+          </a:p>
+        </p:txBody>
+      </p:sp>
+      <p:sp>
+        <p:nvSpPr>
+          <p:cNvPr id="9" name="Freccia in giù 8">
+            <a:extLst>
+              <a:ext uri="{FF2B5EF4-FFF2-40B4-BE49-F238E27FC236}">
+                <a16:creationId xmlns:a16="http://schemas.microsoft.com/office/drawing/2014/main" id="{6682CBB0-DEF9-EE75-5392-F576568B8181}"/>
+              </a:ext>
+            </a:extLst>
+          </p:cNvPr>
+          <p:cNvSpPr/>
+          <p:nvPr/>
+        </p:nvSpPr>
+        <p:spPr>
+          <a:xfrm>
+            <a:off x="6096000" y="3429000"/>
+            <a:ext cx="399068" cy="523220"/>
+          </a:xfrm>
+          <a:prstGeom prst="downArrow">
+            <a:avLst/>
+          </a:prstGeom>
+          <a:solidFill>
+            <a:schemeClr val="tx1">
+              <a:lumMod val="75000"/>
+              <a:lumOff val="25000"/>
+            </a:schemeClr>
+          </a:solidFill>
+          <a:ln>
+            <a:solidFill>
+              <a:schemeClr val="tx1">
+                <a:lumMod val="75000"/>
+                <a:lumOff val="25000"/>
+              </a:schemeClr>
+            </a:solidFill>
+          </a:ln>
+        </p:spPr>
+        <p:style>
+          <a:lnRef idx="2">
+            <a:schemeClr val="accent1">
+              <a:shade val="50000"/>
+            </a:schemeClr>
+          </a:lnRef>
+          <a:fillRef idx="1">
+            <a:schemeClr val="accent1"/>
+          </a:fillRef>
+          <a:effectRef idx="0">
+            <a:schemeClr val="accent1"/>
+          </a:effectRef>
+          <a:fontRef idx="minor">
+            <a:schemeClr val="lt1"/>
+          </a:fontRef>
+        </p:style>
+        <p:txBody>
+          <a:bodyPr rtlCol="0" anchor="ctr"/>
+          <a:lstStyle/>
+          <a:p>
+            <a:pPr algn="ctr"/>
+            <a:endParaRPr lang="it-IT"/>
+          </a:p>
+        </p:txBody>
+      </p:sp>
+      <p:sp>
+        <p:nvSpPr>
+          <p:cNvPr id="10" name="Rettangolo 9">
+            <a:extLst>
+              <a:ext uri="{FF2B5EF4-FFF2-40B4-BE49-F238E27FC236}">
+                <a16:creationId xmlns:a16="http://schemas.microsoft.com/office/drawing/2014/main" id="{8E54B4D6-FC2F-56B8-6C9F-A7ECDD5C4B9C}"/>
+              </a:ext>
+            </a:extLst>
+          </p:cNvPr>
+          <p:cNvSpPr/>
+          <p:nvPr/>
+        </p:nvSpPr>
+        <p:spPr>
+          <a:xfrm>
+            <a:off x="-565607" y="253632"/>
+            <a:ext cx="13338928" cy="646331"/>
+          </a:xfrm>
+          <a:prstGeom prst="rect">
+            <a:avLst/>
+          </a:prstGeom>
+          <a:noFill/>
+        </p:spPr>
+        <p:txBody>
+          <a:bodyPr wrap="square" lIns="91440" tIns="45720" rIns="91440" bIns="45720">
+            <a:spAutoFit/>
+            <a:scene3d>
+              <a:camera prst="orthographicFront"/>
+              <a:lightRig rig="harsh" dir="t"/>
+            </a:scene3d>
+            <a:sp3d extrusionH="57150" prstMaterial="matte">
+              <a:bevelT w="63500" h="12700" prst="angle"/>
+              <a:contourClr>
+                <a:schemeClr val="bg1">
+                  <a:lumMod val="65000"/>
+                </a:schemeClr>
+              </a:contourClr>
+            </a:sp3d>
+          </a:bodyPr>
+          <a:lstStyle/>
+          <a:p>
+            <a:pPr algn="ctr"/>
+            <a:r>
+              <a:rPr lang="it-IT" sz="3600" b="1" cap="none" spc="0" dirty="0">
+                <a:ln/>
+                <a:solidFill>
+                  <a:schemeClr val="tx1">
+                    <a:lumMod val="65000"/>
+                    <a:lumOff val="35000"/>
+                  </a:schemeClr>
+                </a:solidFill>
+                <a:effectLst/>
+              </a:rPr>
+              <a:t>PRESENTAZIONE PROJECT WORK FINALE: GIORNALE ONLINE</a:t>
+            </a:r>
+          </a:p>
+        </p:txBody>
+      </p:sp>
+      <p:sp>
+        <p:nvSpPr>
+          <p:cNvPr id="11" name="Rettangolo 10">
+            <a:extLst>
+              <a:ext uri="{FF2B5EF4-FFF2-40B4-BE49-F238E27FC236}">
+                <a16:creationId xmlns:a16="http://schemas.microsoft.com/office/drawing/2014/main" id="{060F9915-C630-CE0A-087D-D96880CC93B4}"/>
+              </a:ext>
+            </a:extLst>
+          </p:cNvPr>
+          <p:cNvSpPr/>
+          <p:nvPr/>
+        </p:nvSpPr>
+        <p:spPr>
+          <a:xfrm>
+            <a:off x="5713486" y="3130011"/>
+            <a:ext cx="1164101" cy="261610"/>
+          </a:xfrm>
+          <a:prstGeom prst="rect">
+            <a:avLst/>
+          </a:prstGeom>
+          <a:noFill/>
+        </p:spPr>
+        <p:txBody>
+          <a:bodyPr wrap="none" lIns="91440" tIns="45720" rIns="91440" bIns="45720">
+            <a:spAutoFit/>
+            <a:scene3d>
+              <a:camera prst="orthographicFront"/>
+              <a:lightRig rig="harsh" dir="t"/>
+            </a:scene3d>
+            <a:sp3d extrusionH="57150" prstMaterial="matte">
+              <a:bevelT w="63500" h="12700" prst="angle"/>
+              <a:contourClr>
+                <a:schemeClr val="bg1">
+                  <a:lumMod val="65000"/>
+                </a:schemeClr>
+              </a:contourClr>
+            </a:sp3d>
+          </a:bodyPr>
+          <a:lstStyle/>
+          <a:p>
+            <a:pPr algn="ctr"/>
+            <a:r>
+              <a:rPr lang="it-IT" sz="1100" b="1" dirty="0">
+                <a:ln/>
+                <a:solidFill>
+                  <a:schemeClr val="tx1">
+                    <a:lumMod val="65000"/>
+                    <a:lumOff val="35000"/>
+                  </a:schemeClr>
+                </a:solidFill>
+              </a:rPr>
+              <a:t>Clicca sul banner</a:t>
+            </a:r>
+          </a:p>
+        </p:txBody>
+      </p:sp>
+      <p:pic>
+        <p:nvPicPr>
+          <p:cNvPr id="12" name="Immagine 11">
+            <a:hlinkClick r:id="rId3"/>
+            <a:extLst>
+              <a:ext uri="{FF2B5EF4-FFF2-40B4-BE49-F238E27FC236}">
+                <a16:creationId xmlns:a16="http://schemas.microsoft.com/office/drawing/2014/main" id="{39ABBFCE-75C1-E06F-B806-1AAEF085B465}"/>
+              </a:ext>
+            </a:extLst>
+          </p:cNvPr>
+          <p:cNvPicPr>
+            <a:picLocks noChangeAspect="1"/>
+          </p:cNvPicPr>
+          <p:nvPr/>
+        </p:nvPicPr>
+        <p:blipFill>
+          <a:blip r:embed="rId4">
+            <a:extLst>
+              <a:ext uri="{28A0092B-C50C-407E-A947-70E740481C1C}">
+                <a14:useLocalDpi xmlns:a14="http://schemas.microsoft.com/office/drawing/2010/main" val="0"/>
+              </a:ext>
+            </a:extLst>
+          </a:blip>
+          <a:stretch>
+            <a:fillRect/>
+          </a:stretch>
+        </p:blipFill>
+        <p:spPr>
+          <a:xfrm>
+            <a:off x="2929749" y="4118885"/>
+            <a:ext cx="6857524" cy="1714381"/>
+          </a:xfrm>
+          <a:prstGeom prst="rect">
+            <a:avLst/>
+          </a:prstGeom>
+        </p:spPr>
+      </p:pic>
+    </p:spTree>
+    <p:extLst>
+      <p:ext uri="{BB962C8B-B14F-4D97-AF65-F5344CB8AC3E}">
+        <p14:creationId xmlns:p14="http://schemas.microsoft.com/office/powerpoint/2010/main" val="949823036"/>
+      </p:ext>
+    </p:extLst>
+  </p:cSld>
+  <p:clrMapOvr>
+    <a:masterClrMapping/>
+  </p:clrMapOvr>
+  <p:timing>
+    <p:tnLst>
+      <p:par>
+        <p:cTn id="1" dur="indefinite" restart="never" nodeType="tmRoot">
+          <p:childTnLst>
+            <p:seq concurrent="1" nextAc="seek">
+              <p:cTn id="2" dur="indefinite" nodeType="mainSeq">
+                <p:childTnLst>
+                  <p:par>
+                    <p:cTn id="3" fill="hold">
+                      <p:stCondLst>
+                        <p:cond delay="indefinite"/>
+                      </p:stCondLst>
+                      <p:childTnLst>
+                        <p:par>
+                          <p:cTn id="4" fill="hold">
+                            <p:stCondLst>
+                              <p:cond delay="0"/>
+                            </p:stCondLst>
+                            <p:childTnLst>
+                              <p:par>
+                                <p:cTn id="5" presetID="42" presetClass="entr" presetSubtype="0" fill="hold" grpId="0" nodeType="clickEffect">
+                                  <p:stCondLst>
+                                    <p:cond delay="0"/>
+                                  </p:stCondLst>
+                                  <p:childTnLst>
+                                    <p:set>
+                                      <p:cBhvr>
+                                        <p:cTn id="6" dur="1" fill="hold">
+                                          <p:stCondLst>
+                                            <p:cond delay="0"/>
+                                          </p:stCondLst>
+                                        </p:cTn>
+                                        <p:tgtEl>
+                                          <p:spTgt spid="7"/>
+                                        </p:tgtEl>
+                                        <p:attrNameLst>
+                                          <p:attrName>style.visibility</p:attrName>
+                                        </p:attrNameLst>
+                                      </p:cBhvr>
+                                      <p:to>
+                                        <p:strVal val="visible"/>
+                                      </p:to>
+                                    </p:set>
+                                    <p:animEffect transition="in" filter="fade">
+                                      <p:cBhvr>
+                                        <p:cTn id="7" dur="1000"/>
+                                        <p:tgtEl>
+                                          <p:spTgt spid="7"/>
+                                        </p:tgtEl>
+                                      </p:cBhvr>
+                                    </p:animEffect>
+                                    <p:anim calcmode="lin" valueType="num">
+                                      <p:cBhvr>
+                                        <p:cTn id="8" dur="1000" fill="hold"/>
+                                        <p:tgtEl>
+                                          <p:spTgt spid="7"/>
+                                        </p:tgtEl>
+                                        <p:attrNameLst>
+                                          <p:attrName>ppt_x</p:attrName>
+                                        </p:attrNameLst>
+                                      </p:cBhvr>
+                                      <p:tavLst>
+                                        <p:tav tm="0">
+                                          <p:val>
+                                            <p:strVal val="#ppt_x"/>
+                                          </p:val>
+                                        </p:tav>
+                                        <p:tav tm="100000">
+                                          <p:val>
+                                            <p:strVal val="#ppt_x"/>
+                                          </p:val>
+                                        </p:tav>
+                                      </p:tavLst>
+                                    </p:anim>
+                                    <p:anim calcmode="lin" valueType="num">
+                                      <p:cBhvr>
+                                        <p:cTn id="9" dur="1000" fill="hold"/>
+                                        <p:tgtEl>
+                                          <p:spTgt spid="7"/>
+                                        </p:tgtEl>
+                                        <p:attrNameLst>
+                                          <p:attrName>ppt_y</p:attrName>
+                                        </p:attrNameLst>
+                                      </p:cBhvr>
+                                      <p:tavLst>
+                                        <p:tav tm="0">
+                                          <p:val>
+                                            <p:strVal val="#ppt_y+.1"/>
+                                          </p:val>
+                                        </p:tav>
+                                        <p:tav tm="100000">
+                                          <p:val>
+                                            <p:strVal val="#ppt_y"/>
+                                          </p:val>
+                                        </p:tav>
+                                      </p:tavLst>
+                                    </p:anim>
+                                  </p:childTnLst>
+                                </p:cTn>
+                              </p:par>
+                            </p:childTnLst>
+                          </p:cTn>
+                        </p:par>
+                      </p:childTnLst>
+                    </p:cTn>
+                  </p:par>
+                  <p:par>
+                    <p:cTn id="10" fill="hold">
+                      <p:stCondLst>
+                        <p:cond delay="indefinite"/>
+                      </p:stCondLst>
+                      <p:childTnLst>
+                        <p:par>
+                          <p:cTn id="11" fill="hold">
+                            <p:stCondLst>
+                              <p:cond delay="0"/>
+                            </p:stCondLst>
+                            <p:childTnLst>
+                              <p:par>
+                                <p:cTn id="12" presetID="42" presetClass="entr" presetSubtype="0" fill="hold" grpId="0" nodeType="clickEffect">
+                                  <p:stCondLst>
+                                    <p:cond delay="0"/>
+                                  </p:stCondLst>
+                                  <p:childTnLst>
+                                    <p:set>
+                                      <p:cBhvr>
+                                        <p:cTn id="13" dur="1" fill="hold">
+                                          <p:stCondLst>
+                                            <p:cond delay="0"/>
+                                          </p:stCondLst>
+                                        </p:cTn>
+                                        <p:tgtEl>
+                                          <p:spTgt spid="9"/>
+                                        </p:tgtEl>
+                                        <p:attrNameLst>
+                                          <p:attrName>style.visibility</p:attrName>
+                                        </p:attrNameLst>
+                                      </p:cBhvr>
+                                      <p:to>
+                                        <p:strVal val="visible"/>
+                                      </p:to>
+                                    </p:set>
+                                    <p:animEffect transition="in" filter="fade">
+                                      <p:cBhvr>
+                                        <p:cTn id="14" dur="1000"/>
+                                        <p:tgtEl>
+                                          <p:spTgt spid="9"/>
+                                        </p:tgtEl>
+                                      </p:cBhvr>
+                                    </p:animEffect>
+                                    <p:anim calcmode="lin" valueType="num">
+                                      <p:cBhvr>
+                                        <p:cTn id="15" dur="1000" fill="hold"/>
+                                        <p:tgtEl>
+                                          <p:spTgt spid="9"/>
+                                        </p:tgtEl>
+                                        <p:attrNameLst>
+                                          <p:attrName>ppt_x</p:attrName>
+                                        </p:attrNameLst>
+                                      </p:cBhvr>
+                                      <p:tavLst>
+                                        <p:tav tm="0">
+                                          <p:val>
+                                            <p:strVal val="#ppt_x"/>
+                                          </p:val>
+                                        </p:tav>
+                                        <p:tav tm="100000">
+                                          <p:val>
+                                            <p:strVal val="#ppt_x"/>
+                                          </p:val>
+                                        </p:tav>
+                                      </p:tavLst>
+                                    </p:anim>
+                                    <p:anim calcmode="lin" valueType="num">
+                                      <p:cBhvr>
+                                        <p:cTn id="16" dur="1000" fill="hold"/>
+                                        <p:tgtEl>
+                                          <p:spTgt spid="9"/>
+                                        </p:tgtEl>
+                                        <p:attrNameLst>
+                                          <p:attrName>ppt_y</p:attrName>
+                                        </p:attrNameLst>
+                                      </p:cBhvr>
+                                      <p:tavLst>
+                                        <p:tav tm="0">
+                                          <p:val>
+                                            <p:strVal val="#ppt_y+.1"/>
+                                          </p:val>
+                                        </p:tav>
+                                        <p:tav tm="100000">
+                                          <p:val>
+                                            <p:strVal val="#ppt_y"/>
+                                          </p:val>
+                                        </p:tav>
+                                      </p:tavLst>
+                                    </p:anim>
+                                  </p:childTnLst>
+                                </p:cTn>
+                              </p:par>
+                              <p:par>
+                                <p:cTn id="17" presetID="42" presetClass="entr" presetSubtype="0" fill="hold" grpId="0" nodeType="withEffect">
+                                  <p:stCondLst>
+                                    <p:cond delay="0"/>
+                                  </p:stCondLst>
+                                  <p:childTnLst>
+                                    <p:set>
+                                      <p:cBhvr>
+                                        <p:cTn id="18" dur="1" fill="hold">
+                                          <p:stCondLst>
+                                            <p:cond delay="0"/>
+                                          </p:stCondLst>
+                                        </p:cTn>
+                                        <p:tgtEl>
+                                          <p:spTgt spid="11"/>
+                                        </p:tgtEl>
+                                        <p:attrNameLst>
+                                          <p:attrName>style.visibility</p:attrName>
+                                        </p:attrNameLst>
+                                      </p:cBhvr>
+                                      <p:to>
+                                        <p:strVal val="visible"/>
+                                      </p:to>
+                                    </p:set>
+                                    <p:animEffect transition="in" filter="fade">
+                                      <p:cBhvr>
+                                        <p:cTn id="19" dur="1000"/>
+                                        <p:tgtEl>
+                                          <p:spTgt spid="11"/>
+                                        </p:tgtEl>
+                                      </p:cBhvr>
+                                    </p:animEffect>
+                                    <p:anim calcmode="lin" valueType="num">
+                                      <p:cBhvr>
+                                        <p:cTn id="20" dur="1000" fill="hold"/>
+                                        <p:tgtEl>
+                                          <p:spTgt spid="11"/>
+                                        </p:tgtEl>
+                                        <p:attrNameLst>
+                                          <p:attrName>ppt_x</p:attrName>
+                                        </p:attrNameLst>
+                                      </p:cBhvr>
+                                      <p:tavLst>
+                                        <p:tav tm="0">
+                                          <p:val>
+                                            <p:strVal val="#ppt_x"/>
+                                          </p:val>
+                                        </p:tav>
+                                        <p:tav tm="100000">
+                                          <p:val>
+                                            <p:strVal val="#ppt_x"/>
+                                          </p:val>
+                                        </p:tav>
+                                      </p:tavLst>
+                                    </p:anim>
+                                    <p:anim calcmode="lin" valueType="num">
+                                      <p:cBhvr>
+                                        <p:cTn id="21" dur="1000" fill="hold"/>
+                                        <p:tgtEl>
+                                          <p:spTgt spid="11"/>
+                                        </p:tgtEl>
+                                        <p:attrNameLst>
+                                          <p:attrName>ppt_y</p:attrName>
+                                        </p:attrNameLst>
+                                      </p:cBhvr>
+                                      <p:tavLst>
+                                        <p:tav tm="0">
+                                          <p:val>
+                                            <p:strVal val="#ppt_y+.1"/>
+                                          </p:val>
+                                        </p:tav>
+                                        <p:tav tm="100000">
+                                          <p:val>
+                                            <p:strVal val="#ppt_y"/>
+                                          </p:val>
+                                        </p:tav>
+                                      </p:tavLst>
+                                    </p:anim>
+                                  </p:childTnLst>
+                                </p:cTn>
+                              </p:par>
+                            </p:childTnLst>
+                          </p:cTn>
+                        </p:par>
+                      </p:childTnLst>
+                    </p:cTn>
+                  </p:par>
+                  <p:par>
+                    <p:cTn id="22" fill="hold">
+                      <p:stCondLst>
+                        <p:cond delay="indefinite"/>
+                      </p:stCondLst>
+                      <p:childTnLst>
+                        <p:par>
+                          <p:cTn id="23" fill="hold">
+                            <p:stCondLst>
+                              <p:cond delay="0"/>
+                            </p:stCondLst>
+                            <p:childTnLst>
+                              <p:par>
+                                <p:cTn id="24" presetID="42" presetClass="entr" presetSubtype="0" fill="hold" nodeType="clickEffect">
+                                  <p:stCondLst>
+                                    <p:cond delay="0"/>
+                                  </p:stCondLst>
+                                  <p:childTnLst>
+                                    <p:set>
+                                      <p:cBhvr>
+                                        <p:cTn id="25" dur="1" fill="hold">
+                                          <p:stCondLst>
+                                            <p:cond delay="0"/>
+                                          </p:stCondLst>
+                                        </p:cTn>
+                                        <p:tgtEl>
+                                          <p:spTgt spid="12"/>
+                                        </p:tgtEl>
+                                        <p:attrNameLst>
+                                          <p:attrName>style.visibility</p:attrName>
+                                        </p:attrNameLst>
+                                      </p:cBhvr>
+                                      <p:to>
+                                        <p:strVal val="visible"/>
+                                      </p:to>
+                                    </p:set>
+                                    <p:animEffect transition="in" filter="fade">
+                                      <p:cBhvr>
+                                        <p:cTn id="26" dur="1000"/>
+                                        <p:tgtEl>
+                                          <p:spTgt spid="12"/>
+                                        </p:tgtEl>
+                                      </p:cBhvr>
+                                    </p:animEffect>
+                                    <p:anim calcmode="lin" valueType="num">
+                                      <p:cBhvr>
+                                        <p:cTn id="27" dur="1000" fill="hold"/>
+                                        <p:tgtEl>
+                                          <p:spTgt spid="12"/>
+                                        </p:tgtEl>
+                                        <p:attrNameLst>
+                                          <p:attrName>ppt_x</p:attrName>
+                                        </p:attrNameLst>
+                                      </p:cBhvr>
+                                      <p:tavLst>
+                                        <p:tav tm="0">
+                                          <p:val>
+                                            <p:strVal val="#ppt_x"/>
+                                          </p:val>
+                                        </p:tav>
+                                        <p:tav tm="100000">
+                                          <p:val>
+                                            <p:strVal val="#ppt_x"/>
+                                          </p:val>
+                                        </p:tav>
+                                      </p:tavLst>
+                                    </p:anim>
+                                    <p:anim calcmode="lin" valueType="num">
+                                      <p:cBhvr>
+                                        <p:cTn id="28" dur="1000" fill="hold"/>
+                                        <p:tgtEl>
+                                          <p:spTgt spid="12"/>
+                                        </p:tgtEl>
+                                        <p:attrNameLst>
+                                          <p:attrName>ppt_y</p:attrName>
+                                        </p:attrNameLst>
+                                      </p:cBhvr>
+                                      <p:tavLst>
+                                        <p:tav tm="0">
+                                          <p:val>
+                                            <p:strVal val="#ppt_y+.1"/>
+                                          </p:val>
+                                        </p:tav>
+                                        <p:tav tm="100000">
+                                          <p:val>
+                                            <p:strVal val="#ppt_y"/>
+                                          </p:val>
+                                        </p:tav>
+                                      </p:tavLst>
+                                    </p:anim>
+                                  </p:childTnLst>
+                                </p:cTn>
+                              </p:par>
+                            </p:childTnLst>
+                          </p:cTn>
+                        </p:par>
+                      </p:childTnLst>
+                    </p:cTn>
+                  </p:par>
+                </p:childTnLst>
+              </p:cTn>
+              <p:prevCondLst>
+                <p:cond evt="onPrev" delay="0">
+                  <p:tgtEl>
+                    <p:sldTgt/>
+                  </p:tgtEl>
+                </p:cond>
+              </p:prevCondLst>
+              <p:nextCondLst>
+                <p:cond evt="onNext" delay="0">
+                  <p:tgtEl>
+                    <p:sldTgt/>
+                  </p:tgtEl>
+                </p:cond>
+              </p:nextCondLst>
+            </p:seq>
+          </p:childTnLst>
+        </p:cTn>
+      </p:par>
+    </p:tnLst>
+    <p:bldLst>
+      <p:bldP spid="7" grpId="0"/>
+      <p:bldP spid="9" grpId="0" animBg="1"/>
+      <p:bldP spid="11" grpId="0"/>
+    </p:bldLst>
+  </p:timing>
+</p:sld>
+</file>
+
+<file path=ppt/slides/slide14.xml><?xml version="1.0" encoding="utf-8"?>
+<p:sld xmlns:a="http://schemas.openxmlformats.org/drawingml/2006/main" xmlns:r="http://schemas.openxmlformats.org/officeDocument/2006/relationships" xmlns:p="http://schemas.openxmlformats.org/presentationml/2006/main">
+  <p:cSld>
+    <p:spTree>
+      <p:nvGrpSpPr>
+        <p:cNvPr id="1" name=""/>
+        <p:cNvGrpSpPr/>
+        <p:nvPr/>
+      </p:nvGrpSpPr>
+      <p:grpSpPr>
+        <a:xfrm>
+          <a:off x="0" y="0"/>
+          <a:ext cx="0" cy="0"/>
+          <a:chOff x="0" y="0"/>
+          <a:chExt cx="0" cy="0"/>
+        </a:xfrm>
+      </p:grpSpPr>
+      <p:pic>
+        <p:nvPicPr>
+          <p:cNvPr id="4" name="Immagine 3">
+            <a:extLst>
+              <a:ext uri="{FF2B5EF4-FFF2-40B4-BE49-F238E27FC236}">
+                <a16:creationId xmlns:a16="http://schemas.microsoft.com/office/drawing/2014/main" id="{6DAC6974-F957-2E94-73B8-C3CAF09F680C}"/>
+              </a:ext>
+            </a:extLst>
+          </p:cNvPr>
+          <p:cNvPicPr>
+            <a:picLocks noChangeAspect="1"/>
+          </p:cNvPicPr>
+          <p:nvPr/>
+        </p:nvPicPr>
+        <p:blipFill>
+          <a:blip r:embed="rId2">
+            <a:extLst>
+              <a:ext uri="{28A0092B-C50C-407E-A947-70E740481C1C}">
+                <a14:useLocalDpi xmlns:a14="http://schemas.microsoft.com/office/drawing/2010/main" val="0"/>
+              </a:ext>
+            </a:extLst>
+          </a:blip>
+          <a:stretch>
+            <a:fillRect/>
+          </a:stretch>
+        </p:blipFill>
+        <p:spPr>
+          <a:xfrm>
+            <a:off x="0" y="0"/>
+            <a:ext cx="12192000" cy="6858000"/>
+          </a:xfrm>
+          <a:prstGeom prst="rect">
+            <a:avLst/>
+          </a:prstGeom>
+        </p:spPr>
+      </p:pic>
+      <p:sp>
+        <p:nvSpPr>
+          <p:cNvPr id="5" name="Rettangolo 4">
+            <a:extLst>
+              <a:ext uri="{FF2B5EF4-FFF2-40B4-BE49-F238E27FC236}">
+                <a16:creationId xmlns:a16="http://schemas.microsoft.com/office/drawing/2014/main" id="{D3CC5B1A-C1A0-AD65-3AD2-37AF725451B3}"/>
+              </a:ext>
+            </a:extLst>
+          </p:cNvPr>
+          <p:cNvSpPr/>
+          <p:nvPr/>
+        </p:nvSpPr>
+        <p:spPr>
+          <a:xfrm>
+            <a:off x="-565607" y="253632"/>
+            <a:ext cx="13338928" cy="646331"/>
+          </a:xfrm>
+          <a:prstGeom prst="rect">
+            <a:avLst/>
+          </a:prstGeom>
+          <a:noFill/>
+        </p:spPr>
+        <p:txBody>
+          <a:bodyPr wrap="square" lIns="91440" tIns="45720" rIns="91440" bIns="45720">
+            <a:spAutoFit/>
+            <a:scene3d>
+              <a:camera prst="orthographicFront"/>
+              <a:lightRig rig="harsh" dir="t"/>
+            </a:scene3d>
+            <a:sp3d extrusionH="57150" prstMaterial="matte">
+              <a:bevelT w="63500" h="12700" prst="angle"/>
+              <a:contourClr>
+                <a:schemeClr val="bg1">
+                  <a:lumMod val="65000"/>
+                </a:schemeClr>
+              </a:contourClr>
+            </a:sp3d>
+          </a:bodyPr>
+          <a:lstStyle/>
+          <a:p>
+            <a:pPr algn="ctr"/>
+            <a:r>
+              <a:rPr lang="it-IT" sz="3600" b="1" cap="none" spc="0" dirty="0">
+                <a:ln/>
+                <a:solidFill>
+                  <a:schemeClr val="tx1">
+                    <a:lumMod val="65000"/>
+                    <a:lumOff val="35000"/>
+                  </a:schemeClr>
+                </a:solidFill>
+                <a:effectLst/>
+              </a:rPr>
+              <a:t>PRESENTAZIONE PROJECT WORK FINALE: GIORNALE ONLINE</a:t>
+            </a:r>
+          </a:p>
+        </p:txBody>
+      </p:sp>
+      <p:sp>
+        <p:nvSpPr>
+          <p:cNvPr id="7" name="Rettangolo 6">
+            <a:extLst>
+              <a:ext uri="{FF2B5EF4-FFF2-40B4-BE49-F238E27FC236}">
+                <a16:creationId xmlns:a16="http://schemas.microsoft.com/office/drawing/2014/main" id="{A804F389-ADEC-A560-6ED2-0E5EDEDE5BE9}"/>
+              </a:ext>
+            </a:extLst>
+          </p:cNvPr>
+          <p:cNvSpPr/>
+          <p:nvPr/>
+        </p:nvSpPr>
+        <p:spPr>
+          <a:xfrm>
+            <a:off x="-366072" y="3232650"/>
+            <a:ext cx="13469331" cy="707886"/>
+          </a:xfrm>
+          <a:prstGeom prst="rect">
+            <a:avLst/>
+          </a:prstGeom>
+          <a:noFill/>
+        </p:spPr>
+        <p:txBody>
+          <a:bodyPr wrap="square" lIns="91440" tIns="45720" rIns="91440" bIns="45720">
+            <a:spAutoFit/>
+            <a:scene3d>
+              <a:camera prst="orthographicFront"/>
+              <a:lightRig rig="harsh" dir="t"/>
+            </a:scene3d>
+            <a:sp3d extrusionH="57150" prstMaterial="matte">
+              <a:bevelT w="63500" h="12700" prst="angle"/>
+              <a:contourClr>
+                <a:schemeClr val="bg1">
+                  <a:lumMod val="65000"/>
+                </a:schemeClr>
+              </a:contourClr>
+            </a:sp3d>
+          </a:bodyPr>
+          <a:lstStyle/>
+          <a:p>
+            <a:pPr algn="ctr"/>
+            <a:r>
+              <a:rPr lang="it-IT" sz="4000" b="1" cap="none" spc="0" dirty="0">
+                <a:ln/>
+                <a:solidFill>
+                  <a:schemeClr val="tx1">
+                    <a:lumMod val="65000"/>
+                    <a:lumOff val="35000"/>
+                  </a:schemeClr>
+                </a:solidFill>
+                <a:effectLst/>
+              </a:rPr>
+              <a:t>GRAZIE A TUTTI PER L’ATTENZIONE.</a:t>
+            </a:r>
+          </a:p>
+        </p:txBody>
+      </p:sp>
+    </p:spTree>
+    <p:extLst>
+      <p:ext uri="{BB962C8B-B14F-4D97-AF65-F5344CB8AC3E}">
+        <p14:creationId xmlns:p14="http://schemas.microsoft.com/office/powerpoint/2010/main" val="1046735074"/>
+      </p:ext>
+    </p:extLst>
+  </p:cSld>
+  <p:clrMapOvr>
+    <a:masterClrMapping/>
+  </p:clrMapOvr>
+</p:sld>
+</file>
+
 <file path=ppt/slides/slide2.xml><?xml version="1.0" encoding="utf-8"?>
 <p:sld xmlns:a="http://schemas.openxmlformats.org/drawingml/2006/main" xmlns:r="http://schemas.openxmlformats.org/officeDocument/2006/relationships" xmlns:p="http://schemas.openxmlformats.org/presentationml/2006/main">
   <p:cSld>
@@ -5585,6 +8248,596 @@
       </p:grpSpPr>
       <p:pic>
         <p:nvPicPr>
+          <p:cNvPr id="4" name="Immagine 3">
+            <a:extLst>
+              <a:ext uri="{FF2B5EF4-FFF2-40B4-BE49-F238E27FC236}">
+                <a16:creationId xmlns:a16="http://schemas.microsoft.com/office/drawing/2014/main" id="{E933A52B-24FB-140B-F7EF-537778E9AC75}"/>
+              </a:ext>
+            </a:extLst>
+          </p:cNvPr>
+          <p:cNvPicPr>
+            <a:picLocks noChangeAspect="1"/>
+          </p:cNvPicPr>
+          <p:nvPr/>
+        </p:nvPicPr>
+        <p:blipFill>
+          <a:blip r:embed="rId2">
+            <a:extLst>
+              <a:ext uri="{28A0092B-C50C-407E-A947-70E740481C1C}">
+                <a14:useLocalDpi xmlns:a14="http://schemas.microsoft.com/office/drawing/2010/main" val="0"/>
+              </a:ext>
+            </a:extLst>
+          </a:blip>
+          <a:stretch>
+            <a:fillRect/>
+          </a:stretch>
+        </p:blipFill>
+        <p:spPr>
+          <a:xfrm>
+            <a:off x="0" y="0"/>
+            <a:ext cx="12192000" cy="6858000"/>
+          </a:xfrm>
+          <a:prstGeom prst="rect">
+            <a:avLst/>
+          </a:prstGeom>
+        </p:spPr>
+      </p:pic>
+      <p:sp>
+        <p:nvSpPr>
+          <p:cNvPr id="5" name="Rettangolo 4">
+            <a:extLst>
+              <a:ext uri="{FF2B5EF4-FFF2-40B4-BE49-F238E27FC236}">
+                <a16:creationId xmlns:a16="http://schemas.microsoft.com/office/drawing/2014/main" id="{0679484E-8958-8668-A91C-74D95F3DA95D}"/>
+              </a:ext>
+            </a:extLst>
+          </p:cNvPr>
+          <p:cNvSpPr/>
+          <p:nvPr/>
+        </p:nvSpPr>
+        <p:spPr>
+          <a:xfrm>
+            <a:off x="-565607" y="253632"/>
+            <a:ext cx="13338928" cy="646331"/>
+          </a:xfrm>
+          <a:prstGeom prst="rect">
+            <a:avLst/>
+          </a:prstGeom>
+          <a:noFill/>
+        </p:spPr>
+        <p:txBody>
+          <a:bodyPr wrap="square" lIns="91440" tIns="45720" rIns="91440" bIns="45720">
+            <a:spAutoFit/>
+            <a:scene3d>
+              <a:camera prst="orthographicFront"/>
+              <a:lightRig rig="harsh" dir="t"/>
+            </a:scene3d>
+            <a:sp3d extrusionH="57150" prstMaterial="matte">
+              <a:bevelT w="63500" h="12700" prst="angle"/>
+              <a:contourClr>
+                <a:schemeClr val="bg1">
+                  <a:lumMod val="65000"/>
+                </a:schemeClr>
+              </a:contourClr>
+            </a:sp3d>
+          </a:bodyPr>
+          <a:lstStyle/>
+          <a:p>
+            <a:pPr algn="ctr"/>
+            <a:r>
+              <a:rPr lang="it-IT" sz="3600" b="1" cap="none" spc="0" dirty="0">
+                <a:ln/>
+                <a:solidFill>
+                  <a:schemeClr val="tx1">
+                    <a:lumMod val="65000"/>
+                    <a:lumOff val="35000"/>
+                  </a:schemeClr>
+                </a:solidFill>
+                <a:effectLst/>
+              </a:rPr>
+              <a:t>PRESENTAZIONE PROJECT WORK FINALE: GIORNALE ONLINE</a:t>
+            </a:r>
+          </a:p>
+        </p:txBody>
+      </p:sp>
+      <p:sp>
+        <p:nvSpPr>
+          <p:cNvPr id="6" name="Rettangolo 5">
+            <a:extLst>
+              <a:ext uri="{FF2B5EF4-FFF2-40B4-BE49-F238E27FC236}">
+                <a16:creationId xmlns:a16="http://schemas.microsoft.com/office/drawing/2014/main" id="{4410BB98-DD80-E619-3F7E-36C71024A9FC}"/>
+              </a:ext>
+            </a:extLst>
+          </p:cNvPr>
+          <p:cNvSpPr/>
+          <p:nvPr/>
+        </p:nvSpPr>
+        <p:spPr>
+          <a:xfrm>
+            <a:off x="4157597" y="2027443"/>
+            <a:ext cx="4670446" cy="523220"/>
+          </a:xfrm>
+          <a:prstGeom prst="rect">
+            <a:avLst/>
+          </a:prstGeom>
+          <a:noFill/>
+        </p:spPr>
+        <p:txBody>
+          <a:bodyPr wrap="none" lIns="91440" tIns="45720" rIns="91440" bIns="45720">
+            <a:spAutoFit/>
+            <a:scene3d>
+              <a:camera prst="orthographicFront"/>
+              <a:lightRig rig="harsh" dir="t"/>
+            </a:scene3d>
+            <a:sp3d extrusionH="57150" prstMaterial="matte">
+              <a:bevelT w="63500" h="12700" prst="angle"/>
+              <a:contourClr>
+                <a:schemeClr val="bg1">
+                  <a:lumMod val="65000"/>
+                </a:schemeClr>
+              </a:contourClr>
+            </a:sp3d>
+          </a:bodyPr>
+          <a:lstStyle/>
+          <a:p>
+            <a:pPr algn="ctr"/>
+            <a:r>
+              <a:rPr lang="it-IT" sz="2800" b="1" dirty="0">
+                <a:ln/>
+                <a:solidFill>
+                  <a:schemeClr val="tx1">
+                    <a:lumMod val="65000"/>
+                    <a:lumOff val="35000"/>
+                  </a:schemeClr>
+                </a:solidFill>
+              </a:rPr>
+              <a:t>CREAZIONE DEL MODELLO E-R</a:t>
+            </a:r>
+            <a:endParaRPr lang="it-IT" sz="2800" b="1" cap="none" spc="0" dirty="0">
+              <a:ln/>
+              <a:solidFill>
+                <a:schemeClr val="tx1">
+                  <a:lumMod val="65000"/>
+                  <a:lumOff val="35000"/>
+                </a:schemeClr>
+              </a:solidFill>
+              <a:effectLst/>
+            </a:endParaRPr>
+          </a:p>
+        </p:txBody>
+      </p:sp>
+      <p:sp>
+        <p:nvSpPr>
+          <p:cNvPr id="11" name="Rettangolo 10">
+            <a:extLst>
+              <a:ext uri="{FF2B5EF4-FFF2-40B4-BE49-F238E27FC236}">
+                <a16:creationId xmlns:a16="http://schemas.microsoft.com/office/drawing/2014/main" id="{4066BE53-E8D3-6EDB-DBFB-9E30B4779E72}"/>
+              </a:ext>
+            </a:extLst>
+          </p:cNvPr>
+          <p:cNvSpPr/>
+          <p:nvPr/>
+        </p:nvSpPr>
+        <p:spPr>
+          <a:xfrm>
+            <a:off x="3261674" y="2648932"/>
+            <a:ext cx="6711885" cy="3955436"/>
+          </a:xfrm>
+          <a:prstGeom prst="rect">
+            <a:avLst/>
+          </a:prstGeom>
+          <a:ln>
+            <a:solidFill>
+              <a:schemeClr val="tx1">
+                <a:lumMod val="75000"/>
+                <a:lumOff val="25000"/>
+              </a:schemeClr>
+            </a:solidFill>
+          </a:ln>
+        </p:spPr>
+        <p:style>
+          <a:lnRef idx="2">
+            <a:schemeClr val="accent6"/>
+          </a:lnRef>
+          <a:fillRef idx="1">
+            <a:schemeClr val="lt1"/>
+          </a:fillRef>
+          <a:effectRef idx="0">
+            <a:schemeClr val="accent6"/>
+          </a:effectRef>
+          <a:fontRef idx="minor">
+            <a:schemeClr val="dk1"/>
+          </a:fontRef>
+        </p:style>
+        <p:txBody>
+          <a:bodyPr rtlCol="0" anchor="ctr"/>
+          <a:lstStyle/>
+          <a:p>
+            <a:pPr algn="ctr"/>
+            <a:endParaRPr lang="it-IT"/>
+          </a:p>
+        </p:txBody>
+      </p:sp>
+      <p:pic>
+        <p:nvPicPr>
+          <p:cNvPr id="13" name="Immagine 12">
+            <a:extLst>
+              <a:ext uri="{FF2B5EF4-FFF2-40B4-BE49-F238E27FC236}">
+                <a16:creationId xmlns:a16="http://schemas.microsoft.com/office/drawing/2014/main" id="{79FB8E75-2E08-A55C-C52D-FF7BF4E6653E}"/>
+              </a:ext>
+            </a:extLst>
+          </p:cNvPr>
+          <p:cNvPicPr>
+            <a:picLocks noChangeAspect="1"/>
+          </p:cNvPicPr>
+          <p:nvPr/>
+        </p:nvPicPr>
+        <p:blipFill>
+          <a:blip r:embed="rId3">
+            <a:extLst>
+              <a:ext uri="{28A0092B-C50C-407E-A947-70E740481C1C}">
+                <a14:useLocalDpi xmlns:a14="http://schemas.microsoft.com/office/drawing/2010/main" val="0"/>
+              </a:ext>
+            </a:extLst>
+          </a:blip>
+          <a:stretch>
+            <a:fillRect/>
+          </a:stretch>
+        </p:blipFill>
+        <p:spPr>
+          <a:xfrm>
+            <a:off x="3355941" y="2725705"/>
+            <a:ext cx="6523349" cy="3801889"/>
+          </a:xfrm>
+          <a:prstGeom prst="rect">
+            <a:avLst/>
+          </a:prstGeom>
+        </p:spPr>
+      </p:pic>
+    </p:spTree>
+    <p:extLst>
+      <p:ext uri="{BB962C8B-B14F-4D97-AF65-F5344CB8AC3E}">
+        <p14:creationId xmlns:p14="http://schemas.microsoft.com/office/powerpoint/2010/main" val="3584651041"/>
+      </p:ext>
+    </p:extLst>
+  </p:cSld>
+  <p:clrMapOvr>
+    <a:masterClrMapping/>
+  </p:clrMapOvr>
+  <p:timing>
+    <p:tnLst>
+      <p:par>
+        <p:cTn id="1" dur="indefinite" restart="never" nodeType="tmRoot">
+          <p:childTnLst>
+            <p:seq concurrent="1" nextAc="seek">
+              <p:cTn id="2" dur="indefinite" nodeType="mainSeq">
+                <p:childTnLst>
+                  <p:par>
+                    <p:cTn id="3" fill="hold">
+                      <p:stCondLst>
+                        <p:cond delay="indefinite"/>
+                      </p:stCondLst>
+                      <p:childTnLst>
+                        <p:par>
+                          <p:cTn id="4" fill="hold">
+                            <p:stCondLst>
+                              <p:cond delay="0"/>
+                            </p:stCondLst>
+                            <p:childTnLst>
+                              <p:par>
+                                <p:cTn id="5" presetID="42" presetClass="entr" presetSubtype="0" fill="hold" grpId="0" nodeType="clickEffect">
+                                  <p:stCondLst>
+                                    <p:cond delay="0"/>
+                                  </p:stCondLst>
+                                  <p:childTnLst>
+                                    <p:set>
+                                      <p:cBhvr>
+                                        <p:cTn id="6" dur="1" fill="hold">
+                                          <p:stCondLst>
+                                            <p:cond delay="0"/>
+                                          </p:stCondLst>
+                                        </p:cTn>
+                                        <p:tgtEl>
+                                          <p:spTgt spid="6"/>
+                                        </p:tgtEl>
+                                        <p:attrNameLst>
+                                          <p:attrName>style.visibility</p:attrName>
+                                        </p:attrNameLst>
+                                      </p:cBhvr>
+                                      <p:to>
+                                        <p:strVal val="visible"/>
+                                      </p:to>
+                                    </p:set>
+                                    <p:animEffect transition="in" filter="fade">
+                                      <p:cBhvr>
+                                        <p:cTn id="7" dur="1000"/>
+                                        <p:tgtEl>
+                                          <p:spTgt spid="6"/>
+                                        </p:tgtEl>
+                                      </p:cBhvr>
+                                    </p:animEffect>
+                                    <p:anim calcmode="lin" valueType="num">
+                                      <p:cBhvr>
+                                        <p:cTn id="8" dur="1000" fill="hold"/>
+                                        <p:tgtEl>
+                                          <p:spTgt spid="6"/>
+                                        </p:tgtEl>
+                                        <p:attrNameLst>
+                                          <p:attrName>ppt_x</p:attrName>
+                                        </p:attrNameLst>
+                                      </p:cBhvr>
+                                      <p:tavLst>
+                                        <p:tav tm="0">
+                                          <p:val>
+                                            <p:strVal val="#ppt_x"/>
+                                          </p:val>
+                                        </p:tav>
+                                        <p:tav tm="100000">
+                                          <p:val>
+                                            <p:strVal val="#ppt_x"/>
+                                          </p:val>
+                                        </p:tav>
+                                      </p:tavLst>
+                                    </p:anim>
+                                    <p:anim calcmode="lin" valueType="num">
+                                      <p:cBhvr>
+                                        <p:cTn id="9" dur="1000" fill="hold"/>
+                                        <p:tgtEl>
+                                          <p:spTgt spid="6"/>
+                                        </p:tgtEl>
+                                        <p:attrNameLst>
+                                          <p:attrName>ppt_y</p:attrName>
+                                        </p:attrNameLst>
+                                      </p:cBhvr>
+                                      <p:tavLst>
+                                        <p:tav tm="0">
+                                          <p:val>
+                                            <p:strVal val="#ppt_y+.1"/>
+                                          </p:val>
+                                        </p:tav>
+                                        <p:tav tm="100000">
+                                          <p:val>
+                                            <p:strVal val="#ppt_y"/>
+                                          </p:val>
+                                        </p:tav>
+                                      </p:tavLst>
+                                    </p:anim>
+                                  </p:childTnLst>
+                                </p:cTn>
+                              </p:par>
+                            </p:childTnLst>
+                          </p:cTn>
+                        </p:par>
+                      </p:childTnLst>
+                    </p:cTn>
+                  </p:par>
+                  <p:par>
+                    <p:cTn id="10" fill="hold">
+                      <p:stCondLst>
+                        <p:cond delay="indefinite"/>
+                      </p:stCondLst>
+                      <p:childTnLst>
+                        <p:par>
+                          <p:cTn id="11" fill="hold">
+                            <p:stCondLst>
+                              <p:cond delay="0"/>
+                            </p:stCondLst>
+                            <p:childTnLst>
+                              <p:par>
+                                <p:cTn id="12" presetID="42" presetClass="entr" presetSubtype="0" fill="hold" nodeType="clickEffect">
+                                  <p:stCondLst>
+                                    <p:cond delay="0"/>
+                                  </p:stCondLst>
+                                  <p:childTnLst>
+                                    <p:set>
+                                      <p:cBhvr>
+                                        <p:cTn id="13" dur="1" fill="hold">
+                                          <p:stCondLst>
+                                            <p:cond delay="0"/>
+                                          </p:stCondLst>
+                                        </p:cTn>
+                                        <p:tgtEl>
+                                          <p:spTgt spid="13"/>
+                                        </p:tgtEl>
+                                        <p:attrNameLst>
+                                          <p:attrName>style.visibility</p:attrName>
+                                        </p:attrNameLst>
+                                      </p:cBhvr>
+                                      <p:to>
+                                        <p:strVal val="visible"/>
+                                      </p:to>
+                                    </p:set>
+                                    <p:animEffect transition="in" filter="fade">
+                                      <p:cBhvr>
+                                        <p:cTn id="14" dur="1000"/>
+                                        <p:tgtEl>
+                                          <p:spTgt spid="13"/>
+                                        </p:tgtEl>
+                                      </p:cBhvr>
+                                    </p:animEffect>
+                                    <p:anim calcmode="lin" valueType="num">
+                                      <p:cBhvr>
+                                        <p:cTn id="15" dur="1000" fill="hold"/>
+                                        <p:tgtEl>
+                                          <p:spTgt spid="13"/>
+                                        </p:tgtEl>
+                                        <p:attrNameLst>
+                                          <p:attrName>ppt_x</p:attrName>
+                                        </p:attrNameLst>
+                                      </p:cBhvr>
+                                      <p:tavLst>
+                                        <p:tav tm="0">
+                                          <p:val>
+                                            <p:strVal val="#ppt_x"/>
+                                          </p:val>
+                                        </p:tav>
+                                        <p:tav tm="100000">
+                                          <p:val>
+                                            <p:strVal val="#ppt_x"/>
+                                          </p:val>
+                                        </p:tav>
+                                      </p:tavLst>
+                                    </p:anim>
+                                    <p:anim calcmode="lin" valueType="num">
+                                      <p:cBhvr>
+                                        <p:cTn id="16" dur="1000" fill="hold"/>
+                                        <p:tgtEl>
+                                          <p:spTgt spid="13"/>
+                                        </p:tgtEl>
+                                        <p:attrNameLst>
+                                          <p:attrName>ppt_y</p:attrName>
+                                        </p:attrNameLst>
+                                      </p:cBhvr>
+                                      <p:tavLst>
+                                        <p:tav tm="0">
+                                          <p:val>
+                                            <p:strVal val="#ppt_y+.1"/>
+                                          </p:val>
+                                        </p:tav>
+                                        <p:tav tm="100000">
+                                          <p:val>
+                                            <p:strVal val="#ppt_y"/>
+                                          </p:val>
+                                        </p:tav>
+                                      </p:tavLst>
+                                    </p:anim>
+                                  </p:childTnLst>
+                                </p:cTn>
+                              </p:par>
+                              <p:par>
+                                <p:cTn id="17" presetID="42" presetClass="entr" presetSubtype="0" fill="hold" grpId="0" nodeType="withEffect">
+                                  <p:stCondLst>
+                                    <p:cond delay="0"/>
+                                  </p:stCondLst>
+                                  <p:childTnLst>
+                                    <p:set>
+                                      <p:cBhvr>
+                                        <p:cTn id="18" dur="1" fill="hold">
+                                          <p:stCondLst>
+                                            <p:cond delay="0"/>
+                                          </p:stCondLst>
+                                        </p:cTn>
+                                        <p:tgtEl>
+                                          <p:spTgt spid="11"/>
+                                        </p:tgtEl>
+                                        <p:attrNameLst>
+                                          <p:attrName>style.visibility</p:attrName>
+                                        </p:attrNameLst>
+                                      </p:cBhvr>
+                                      <p:to>
+                                        <p:strVal val="visible"/>
+                                      </p:to>
+                                    </p:set>
+                                    <p:animEffect transition="in" filter="fade">
+                                      <p:cBhvr>
+                                        <p:cTn id="19" dur="1000"/>
+                                        <p:tgtEl>
+                                          <p:spTgt spid="11"/>
+                                        </p:tgtEl>
+                                      </p:cBhvr>
+                                    </p:animEffect>
+                                    <p:anim calcmode="lin" valueType="num">
+                                      <p:cBhvr>
+                                        <p:cTn id="20" dur="1000" fill="hold"/>
+                                        <p:tgtEl>
+                                          <p:spTgt spid="11"/>
+                                        </p:tgtEl>
+                                        <p:attrNameLst>
+                                          <p:attrName>ppt_x</p:attrName>
+                                        </p:attrNameLst>
+                                      </p:cBhvr>
+                                      <p:tavLst>
+                                        <p:tav tm="0">
+                                          <p:val>
+                                            <p:strVal val="#ppt_x"/>
+                                          </p:val>
+                                        </p:tav>
+                                        <p:tav tm="100000">
+                                          <p:val>
+                                            <p:strVal val="#ppt_x"/>
+                                          </p:val>
+                                        </p:tav>
+                                      </p:tavLst>
+                                    </p:anim>
+                                    <p:anim calcmode="lin" valueType="num">
+                                      <p:cBhvr>
+                                        <p:cTn id="21" dur="1000" fill="hold"/>
+                                        <p:tgtEl>
+                                          <p:spTgt spid="11"/>
+                                        </p:tgtEl>
+                                        <p:attrNameLst>
+                                          <p:attrName>ppt_y</p:attrName>
+                                        </p:attrNameLst>
+                                      </p:cBhvr>
+                                      <p:tavLst>
+                                        <p:tav tm="0">
+                                          <p:val>
+                                            <p:strVal val="#ppt_y+.1"/>
+                                          </p:val>
+                                        </p:tav>
+                                        <p:tav tm="100000">
+                                          <p:val>
+                                            <p:strVal val="#ppt_y"/>
+                                          </p:val>
+                                        </p:tav>
+                                      </p:tavLst>
+                                    </p:anim>
+                                  </p:childTnLst>
+                                </p:cTn>
+                              </p:par>
+                            </p:childTnLst>
+                          </p:cTn>
+                        </p:par>
+                      </p:childTnLst>
+                    </p:cTn>
+                  </p:par>
+                </p:childTnLst>
+              </p:cTn>
+              <p:prevCondLst>
+                <p:cond evt="onPrev" delay="0">
+                  <p:tgtEl>
+                    <p:sldTgt/>
+                  </p:tgtEl>
+                </p:cond>
+              </p:prevCondLst>
+              <p:nextCondLst>
+                <p:cond evt="onNext" delay="0">
+                  <p:tgtEl>
+                    <p:sldTgt/>
+                  </p:tgtEl>
+                </p:cond>
+              </p:nextCondLst>
+            </p:seq>
+          </p:childTnLst>
+        </p:cTn>
+      </p:par>
+    </p:tnLst>
+    <p:bldLst>
+      <p:bldP spid="6" grpId="0"/>
+      <p:bldP spid="11" grpId="0" animBg="1"/>
+    </p:bldLst>
+  </p:timing>
+</p:sld>
+</file>
+
+<file path=ppt/slides/slide6.xml><?xml version="1.0" encoding="utf-8"?>
+<p:sld xmlns:a="http://schemas.openxmlformats.org/drawingml/2006/main" xmlns:r="http://schemas.openxmlformats.org/officeDocument/2006/relationships" xmlns:p="http://schemas.openxmlformats.org/presentationml/2006/main">
+  <p:cSld>
+    <p:spTree>
+      <p:nvGrpSpPr>
+        <p:cNvPr id="1" name=""/>
+        <p:cNvGrpSpPr/>
+        <p:nvPr/>
+      </p:nvGrpSpPr>
+      <p:grpSpPr>
+        <a:xfrm>
+          <a:off x="0" y="0"/>
+          <a:ext cx="0" cy="0"/>
+          <a:chOff x="0" y="0"/>
+          <a:chExt cx="0" cy="0"/>
+        </a:xfrm>
+      </p:grpSpPr>
+      <p:pic>
+        <p:nvPicPr>
           <p:cNvPr id="5" name="Immagine 4">
             <a:extLst>
               <a:ext uri="{FF2B5EF4-FFF2-40B4-BE49-F238E27FC236}">
@@ -5967,462 +9220,6 @@
                                         <p:cTn id="16" dur="1000" fill="hold"/>
                                         <p:tgtEl>
                                           <p:spTgt spid="9"/>
-                                        </p:tgtEl>
-                                        <p:attrNameLst>
-                                          <p:attrName>ppt_y</p:attrName>
-                                        </p:attrNameLst>
-                                      </p:cBhvr>
-                                      <p:tavLst>
-                                        <p:tav tm="0">
-                                          <p:val>
-                                            <p:strVal val="#ppt_y+.1"/>
-                                          </p:val>
-                                        </p:tav>
-                                        <p:tav tm="100000">
-                                          <p:val>
-                                            <p:strVal val="#ppt_y"/>
-                                          </p:val>
-                                        </p:tav>
-                                      </p:tavLst>
-                                    </p:anim>
-                                  </p:childTnLst>
-                                </p:cTn>
-                              </p:par>
-                            </p:childTnLst>
-                          </p:cTn>
-                        </p:par>
-                      </p:childTnLst>
-                    </p:cTn>
-                  </p:par>
-                </p:childTnLst>
-              </p:cTn>
-              <p:prevCondLst>
-                <p:cond evt="onPrev" delay="0">
-                  <p:tgtEl>
-                    <p:sldTgt/>
-                  </p:tgtEl>
-                </p:cond>
-              </p:prevCondLst>
-              <p:nextCondLst>
-                <p:cond evt="onNext" delay="0">
-                  <p:tgtEl>
-                    <p:sldTgt/>
-                  </p:tgtEl>
-                </p:cond>
-              </p:nextCondLst>
-            </p:seq>
-          </p:childTnLst>
-        </p:cTn>
-      </p:par>
-    </p:tnLst>
-    <p:bldLst>
-      <p:bldP spid="7" grpId="0"/>
-    </p:bldLst>
-  </p:timing>
-</p:sld>
-</file>
-
-<file path=ppt/slides/slide6.xml><?xml version="1.0" encoding="utf-8"?>
-<p:sld xmlns:a="http://schemas.openxmlformats.org/drawingml/2006/main" xmlns:r="http://schemas.openxmlformats.org/officeDocument/2006/relationships" xmlns:p="http://schemas.openxmlformats.org/presentationml/2006/main">
-  <p:cSld>
-    <p:spTree>
-      <p:nvGrpSpPr>
-        <p:cNvPr id="1" name=""/>
-        <p:cNvGrpSpPr/>
-        <p:nvPr/>
-      </p:nvGrpSpPr>
-      <p:grpSpPr>
-        <a:xfrm>
-          <a:off x="0" y="0"/>
-          <a:ext cx="0" cy="0"/>
-          <a:chOff x="0" y="0"/>
-          <a:chExt cx="0" cy="0"/>
-        </a:xfrm>
-      </p:grpSpPr>
-      <p:pic>
-        <p:nvPicPr>
-          <p:cNvPr id="5" name="Immagine 4">
-            <a:extLst>
-              <a:ext uri="{FF2B5EF4-FFF2-40B4-BE49-F238E27FC236}">
-                <a16:creationId xmlns:a16="http://schemas.microsoft.com/office/drawing/2014/main" id="{FA3C6BD7-8FBF-6EDA-7981-2218C1F6E17D}"/>
-              </a:ext>
-            </a:extLst>
-          </p:cNvPr>
-          <p:cNvPicPr>
-            <a:picLocks noChangeAspect="1"/>
-          </p:cNvPicPr>
-          <p:nvPr/>
-        </p:nvPicPr>
-        <p:blipFill>
-          <a:blip r:embed="rId2">
-            <a:extLst>
-              <a:ext uri="{28A0092B-C50C-407E-A947-70E740481C1C}">
-                <a14:useLocalDpi xmlns:a14="http://schemas.microsoft.com/office/drawing/2010/main" val="0"/>
-              </a:ext>
-            </a:extLst>
-          </a:blip>
-          <a:stretch>
-            <a:fillRect/>
-          </a:stretch>
-        </p:blipFill>
-        <p:spPr>
-          <a:xfrm>
-            <a:off x="0" y="0"/>
-            <a:ext cx="12192000" cy="6858000"/>
-          </a:xfrm>
-          <a:prstGeom prst="rect">
-            <a:avLst/>
-          </a:prstGeom>
-        </p:spPr>
-      </p:pic>
-      <p:sp>
-        <p:nvSpPr>
-          <p:cNvPr id="7" name="Rettangolo 6">
-            <a:extLst>
-              <a:ext uri="{FF2B5EF4-FFF2-40B4-BE49-F238E27FC236}">
-                <a16:creationId xmlns:a16="http://schemas.microsoft.com/office/drawing/2014/main" id="{DF1285BF-ADAE-853A-DFD0-E28672837DB2}"/>
-              </a:ext>
-            </a:extLst>
-          </p:cNvPr>
-          <p:cNvSpPr/>
-          <p:nvPr/>
-        </p:nvSpPr>
-        <p:spPr>
-          <a:xfrm>
-            <a:off x="3565734" y="2027443"/>
-            <a:ext cx="5854168" cy="523220"/>
-          </a:xfrm>
-          <a:prstGeom prst="rect">
-            <a:avLst/>
-          </a:prstGeom>
-          <a:noFill/>
-        </p:spPr>
-        <p:txBody>
-          <a:bodyPr wrap="none" lIns="91440" tIns="45720" rIns="91440" bIns="45720">
-            <a:spAutoFit/>
-            <a:scene3d>
-              <a:camera prst="orthographicFront"/>
-              <a:lightRig rig="harsh" dir="t"/>
-            </a:scene3d>
-            <a:sp3d extrusionH="57150" prstMaterial="matte">
-              <a:bevelT w="63500" h="12700" prst="angle"/>
-              <a:contourClr>
-                <a:schemeClr val="bg1">
-                  <a:lumMod val="65000"/>
-                </a:schemeClr>
-              </a:contourClr>
-            </a:sp3d>
-          </a:bodyPr>
-          <a:lstStyle/>
-          <a:p>
-            <a:pPr algn="ctr"/>
-            <a:r>
-              <a:rPr lang="it-IT" sz="2800" b="1" dirty="0">
-                <a:ln/>
-                <a:solidFill>
-                  <a:schemeClr val="tx1">
-                    <a:lumMod val="65000"/>
-                    <a:lumOff val="35000"/>
-                  </a:schemeClr>
-                </a:solidFill>
-              </a:rPr>
-              <a:t>CREAZIONE DEL PROGETTO IN SPRING</a:t>
-            </a:r>
-            <a:endParaRPr lang="it-IT" sz="2800" b="1" cap="none" spc="0" dirty="0">
-              <a:ln/>
-              <a:solidFill>
-                <a:schemeClr val="tx1">
-                  <a:lumMod val="65000"/>
-                  <a:lumOff val="35000"/>
-                </a:schemeClr>
-              </a:solidFill>
-              <a:effectLst/>
-            </a:endParaRPr>
-          </a:p>
-        </p:txBody>
-      </p:sp>
-      <p:pic>
-        <p:nvPicPr>
-          <p:cNvPr id="3" name="Immagine 2">
-            <a:extLst>
-              <a:ext uri="{FF2B5EF4-FFF2-40B4-BE49-F238E27FC236}">
-                <a16:creationId xmlns:a16="http://schemas.microsoft.com/office/drawing/2014/main" id="{6E5D28DB-A180-68AA-31B3-A8DA31E9016B}"/>
-              </a:ext>
-            </a:extLst>
-          </p:cNvPr>
-          <p:cNvPicPr>
-            <a:picLocks noChangeAspect="1"/>
-          </p:cNvPicPr>
-          <p:nvPr/>
-        </p:nvPicPr>
-        <p:blipFill>
-          <a:blip r:embed="rId3">
-            <a:extLst>
-              <a:ext uri="{28A0092B-C50C-407E-A947-70E740481C1C}">
-                <a14:useLocalDpi xmlns:a14="http://schemas.microsoft.com/office/drawing/2010/main" val="0"/>
-              </a:ext>
-            </a:extLst>
-          </a:blip>
-          <a:stretch>
-            <a:fillRect/>
-          </a:stretch>
-        </p:blipFill>
-        <p:spPr>
-          <a:xfrm>
-            <a:off x="3073985" y="2809544"/>
-            <a:ext cx="7136598" cy="3789575"/>
-          </a:xfrm>
-          <a:prstGeom prst="rect">
-            <a:avLst/>
-          </a:prstGeom>
-        </p:spPr>
-      </p:pic>
-      <p:sp>
-        <p:nvSpPr>
-          <p:cNvPr id="8" name="Rettangolo 7">
-            <a:extLst>
-              <a:ext uri="{FF2B5EF4-FFF2-40B4-BE49-F238E27FC236}">
-                <a16:creationId xmlns:a16="http://schemas.microsoft.com/office/drawing/2014/main" id="{6BE559C5-BD60-4AF6-C0B7-5BFEF642CDF3}"/>
-              </a:ext>
-            </a:extLst>
-          </p:cNvPr>
-          <p:cNvSpPr/>
-          <p:nvPr/>
-        </p:nvSpPr>
-        <p:spPr>
-          <a:xfrm>
-            <a:off x="-565607" y="253632"/>
-            <a:ext cx="13338928" cy="646331"/>
-          </a:xfrm>
-          <a:prstGeom prst="rect">
-            <a:avLst/>
-          </a:prstGeom>
-          <a:noFill/>
-        </p:spPr>
-        <p:txBody>
-          <a:bodyPr wrap="square" lIns="91440" tIns="45720" rIns="91440" bIns="45720">
-            <a:spAutoFit/>
-            <a:scene3d>
-              <a:camera prst="orthographicFront"/>
-              <a:lightRig rig="harsh" dir="t"/>
-            </a:scene3d>
-            <a:sp3d extrusionH="57150" prstMaterial="matte">
-              <a:bevelT w="63500" h="12700" prst="angle"/>
-              <a:contourClr>
-                <a:schemeClr val="bg1">
-                  <a:lumMod val="65000"/>
-                </a:schemeClr>
-              </a:contourClr>
-            </a:sp3d>
-          </a:bodyPr>
-          <a:lstStyle/>
-          <a:p>
-            <a:pPr algn="ctr"/>
-            <a:r>
-              <a:rPr lang="it-IT" sz="3600" b="1" cap="none" spc="0" dirty="0">
-                <a:ln/>
-                <a:solidFill>
-                  <a:schemeClr val="tx1">
-                    <a:lumMod val="65000"/>
-                    <a:lumOff val="35000"/>
-                  </a:schemeClr>
-                </a:solidFill>
-                <a:effectLst/>
-              </a:rPr>
-              <a:t>PRESENTAZIONE PROJECT WORK FINALE: GIORNALE ONLINE</a:t>
-            </a:r>
-          </a:p>
-        </p:txBody>
-      </p:sp>
-    </p:spTree>
-    <p:extLst>
-      <p:ext uri="{BB962C8B-B14F-4D97-AF65-F5344CB8AC3E}">
-        <p14:creationId xmlns:p14="http://schemas.microsoft.com/office/powerpoint/2010/main" val="699962716"/>
-      </p:ext>
-    </p:extLst>
-  </p:cSld>
-  <p:clrMapOvr>
-    <a:masterClrMapping/>
-  </p:clrMapOvr>
-  <p:timing>
-    <p:tnLst>
-      <p:par>
-        <p:cTn id="1" dur="indefinite" restart="never" nodeType="tmRoot">
-          <p:childTnLst>
-            <p:seq concurrent="1" nextAc="seek">
-              <p:cTn id="2" dur="indefinite" nodeType="mainSeq">
-                <p:childTnLst>
-                  <p:par>
-                    <p:cTn id="3" fill="hold">
-                      <p:stCondLst>
-                        <p:cond delay="indefinite"/>
-                      </p:stCondLst>
-                      <p:childTnLst>
-                        <p:par>
-                          <p:cTn id="4" fill="hold">
-                            <p:stCondLst>
-                              <p:cond delay="0"/>
-                            </p:stCondLst>
-                            <p:childTnLst>
-                              <p:par>
-                                <p:cTn id="5" presetID="42" presetClass="entr" presetSubtype="0" fill="hold" grpId="0" nodeType="clickEffect">
-                                  <p:stCondLst>
-                                    <p:cond delay="0"/>
-                                  </p:stCondLst>
-                                  <p:childTnLst>
-                                    <p:set>
-                                      <p:cBhvr>
-                                        <p:cTn id="6" dur="1" fill="hold">
-                                          <p:stCondLst>
-                                            <p:cond delay="0"/>
-                                          </p:stCondLst>
-                                        </p:cTn>
-                                        <p:tgtEl>
-                                          <p:spTgt spid="7"/>
-                                        </p:tgtEl>
-                                        <p:attrNameLst>
-                                          <p:attrName>style.visibility</p:attrName>
-                                        </p:attrNameLst>
-                                      </p:cBhvr>
-                                      <p:to>
-                                        <p:strVal val="visible"/>
-                                      </p:to>
-                                    </p:set>
-                                    <p:animEffect transition="in" filter="fade">
-                                      <p:cBhvr>
-                                        <p:cTn id="7" dur="1000"/>
-                                        <p:tgtEl>
-                                          <p:spTgt spid="7"/>
-                                        </p:tgtEl>
-                                      </p:cBhvr>
-                                    </p:animEffect>
-                                    <p:anim calcmode="lin" valueType="num">
-                                      <p:cBhvr>
-                                        <p:cTn id="8" dur="1000" fill="hold"/>
-                                        <p:tgtEl>
-                                          <p:spTgt spid="7"/>
-                                        </p:tgtEl>
-                                        <p:attrNameLst>
-                                          <p:attrName>ppt_x</p:attrName>
-                                        </p:attrNameLst>
-                                      </p:cBhvr>
-                                      <p:tavLst>
-                                        <p:tav tm="0">
-                                          <p:val>
-                                            <p:strVal val="#ppt_x"/>
-                                          </p:val>
-                                        </p:tav>
-                                        <p:tav tm="100000">
-                                          <p:val>
-                                            <p:strVal val="#ppt_x"/>
-                                          </p:val>
-                                        </p:tav>
-                                      </p:tavLst>
-                                    </p:anim>
-                                    <p:anim calcmode="lin" valueType="num">
-                                      <p:cBhvr>
-                                        <p:cTn id="9" dur="1000" fill="hold"/>
-                                        <p:tgtEl>
-                                          <p:spTgt spid="7"/>
-                                        </p:tgtEl>
-                                        <p:attrNameLst>
-                                          <p:attrName>ppt_y</p:attrName>
-                                        </p:attrNameLst>
-                                      </p:cBhvr>
-                                      <p:tavLst>
-                                        <p:tav tm="0">
-                                          <p:val>
-                                            <p:strVal val="#ppt_y+.1"/>
-                                          </p:val>
-                                        </p:tav>
-                                        <p:tav tm="100000">
-                                          <p:val>
-                                            <p:strVal val="#ppt_y"/>
-                                          </p:val>
-                                        </p:tav>
-                                      </p:tavLst>
-                                    </p:anim>
-                                  </p:childTnLst>
-                                </p:cTn>
-                              </p:par>
-                            </p:childTnLst>
-                          </p:cTn>
-                        </p:par>
-                      </p:childTnLst>
-                    </p:cTn>
-                  </p:par>
-                  <p:par>
-                    <p:cTn id="10" fill="hold">
-                      <p:stCondLst>
-                        <p:cond delay="indefinite"/>
-                      </p:stCondLst>
-                      <p:childTnLst>
-                        <p:par>
-                          <p:cTn id="11" fill="hold">
-                            <p:stCondLst>
-                              <p:cond delay="0"/>
-                            </p:stCondLst>
-                            <p:childTnLst>
-                              <p:par>
-                                <p:cTn id="12" presetID="42" presetClass="entr" presetSubtype="0" fill="hold" nodeType="clickEffect">
-                                  <p:stCondLst>
-                                    <p:cond delay="0"/>
-                                  </p:stCondLst>
-                                  <p:childTnLst>
-                                    <p:set>
-                                      <p:cBhvr>
-                                        <p:cTn id="13" dur="1" fill="hold">
-                                          <p:stCondLst>
-                                            <p:cond delay="0"/>
-                                          </p:stCondLst>
-                                        </p:cTn>
-                                        <p:tgtEl>
-                                          <p:spTgt spid="3"/>
-                                        </p:tgtEl>
-                                        <p:attrNameLst>
-                                          <p:attrName>style.visibility</p:attrName>
-                                        </p:attrNameLst>
-                                      </p:cBhvr>
-                                      <p:to>
-                                        <p:strVal val="visible"/>
-                                      </p:to>
-                                    </p:set>
-                                    <p:animEffect transition="in" filter="fade">
-                                      <p:cBhvr>
-                                        <p:cTn id="14" dur="1000"/>
-                                        <p:tgtEl>
-                                          <p:spTgt spid="3"/>
-                                        </p:tgtEl>
-                                      </p:cBhvr>
-                                    </p:animEffect>
-                                    <p:anim calcmode="lin" valueType="num">
-                                      <p:cBhvr>
-                                        <p:cTn id="15" dur="1000" fill="hold"/>
-                                        <p:tgtEl>
-                                          <p:spTgt spid="3"/>
-                                        </p:tgtEl>
-                                        <p:attrNameLst>
-                                          <p:attrName>ppt_x</p:attrName>
-                                        </p:attrNameLst>
-                                      </p:cBhvr>
-                                      <p:tavLst>
-                                        <p:tav tm="0">
-                                          <p:val>
-                                            <p:strVal val="#ppt_x"/>
-                                          </p:val>
-                                        </p:tav>
-                                        <p:tav tm="100000">
-                                          <p:val>
-                                            <p:strVal val="#ppt_x"/>
-                                          </p:val>
-                                        </p:tav>
-                                      </p:tavLst>
-                                    </p:anim>
-                                    <p:anim calcmode="lin" valueType="num">
-                                      <p:cBhvr>
-                                        <p:cTn id="16" dur="1000" fill="hold"/>
-                                        <p:tgtEl>
-                                          <p:spTgt spid="3"/>
                                         </p:tgtEl>
                                         <p:attrNameLst>
                                           <p:attrName>ppt_y</p:attrName>
@@ -6497,10 +9294,10 @@
       </p:grpSpPr>
       <p:pic>
         <p:nvPicPr>
-          <p:cNvPr id="4" name="Immagine 3">
-            <a:extLst>
-              <a:ext uri="{FF2B5EF4-FFF2-40B4-BE49-F238E27FC236}">
-                <a16:creationId xmlns:a16="http://schemas.microsoft.com/office/drawing/2014/main" id="{2238C690-8762-1671-3A7C-0CB68BD37276}"/>
+          <p:cNvPr id="5" name="Immagine 4">
+            <a:extLst>
+              <a:ext uri="{FF2B5EF4-FFF2-40B4-BE49-F238E27FC236}">
+                <a16:creationId xmlns:a16="http://schemas.microsoft.com/office/drawing/2014/main" id="{FA3C6BD7-8FBF-6EDA-7981-2218C1F6E17D}"/>
               </a:ext>
             </a:extLst>
           </p:cNvPr>
@@ -6536,7 +9333,7 @@
           <p:cNvPr id="7" name="Rettangolo 6">
             <a:extLst>
               <a:ext uri="{FF2B5EF4-FFF2-40B4-BE49-F238E27FC236}">
-                <a16:creationId xmlns:a16="http://schemas.microsoft.com/office/drawing/2014/main" id="{6977FF6E-185F-1431-B523-46A920A0B7FE}"/>
+                <a16:creationId xmlns:a16="http://schemas.microsoft.com/office/drawing/2014/main" id="{DF1285BF-ADAE-853A-DFD0-E28672837DB2}"/>
               </a:ext>
             </a:extLst>
           </p:cNvPr>
@@ -6545,8 +9342,8 @@
         </p:nvSpPr>
         <p:spPr>
           <a:xfrm>
-            <a:off x="2929749" y="2570931"/>
-            <a:ext cx="6784999" cy="523220"/>
+            <a:off x="3565734" y="2027443"/>
+            <a:ext cx="5854168" cy="523220"/>
           </a:xfrm>
           <a:prstGeom prst="rect">
             <a:avLst/>
@@ -6582,18 +9379,27 @@
                   </a:schemeClr>
                 </a:solidFill>
               </a:rPr>
-              <a:t>VISUALIZZIAMO IL RISULTATO SUL BROWSER</a:t>
-            </a:r>
+              <a:t>CREAZIONE DEL PROGETTO IN SPRING</a:t>
+            </a:r>
+            <a:endParaRPr lang="it-IT" sz="2800" b="1" cap="none" spc="0" dirty="0">
+              <a:ln/>
+              <a:solidFill>
+                <a:schemeClr val="tx1">
+                  <a:lumMod val="65000"/>
+                  <a:lumOff val="35000"/>
+                </a:schemeClr>
+              </a:solidFill>
+              <a:effectLst/>
+            </a:endParaRPr>
           </a:p>
         </p:txBody>
       </p:sp>
       <p:pic>
         <p:nvPicPr>
-          <p:cNvPr id="8" name="Immagine 7">
-            <a:hlinkClick r:id="rId3"/>
-            <a:extLst>
-              <a:ext uri="{FF2B5EF4-FFF2-40B4-BE49-F238E27FC236}">
-                <a16:creationId xmlns:a16="http://schemas.microsoft.com/office/drawing/2014/main" id="{0A2C8090-E09A-69E6-A13F-120BC0DD0350}"/>
+          <p:cNvPr id="3" name="Immagine 2">
+            <a:extLst>
+              <a:ext uri="{FF2B5EF4-FFF2-40B4-BE49-F238E27FC236}">
+                <a16:creationId xmlns:a16="http://schemas.microsoft.com/office/drawing/2014/main" id="{6E5D28DB-A180-68AA-31B3-A8DA31E9016B}"/>
               </a:ext>
             </a:extLst>
           </p:cNvPr>
@@ -6603,7 +9409,7 @@
           <p:nvPr/>
         </p:nvPicPr>
         <p:blipFill>
-          <a:blip r:embed="rId4">
+          <a:blip r:embed="rId3">
             <a:extLst>
               <a:ext uri="{28A0092B-C50C-407E-A947-70E740481C1C}">
                 <a14:useLocalDpi xmlns:a14="http://schemas.microsoft.com/office/drawing/2010/main" val="0"/>
@@ -6616,8 +9422,8 @@
         </p:blipFill>
         <p:spPr>
           <a:xfrm>
-            <a:off x="2950910" y="3740725"/>
-            <a:ext cx="6857524" cy="1714381"/>
+            <a:off x="3073985" y="2809544"/>
+            <a:ext cx="7136598" cy="3789575"/>
           </a:xfrm>
           <a:prstGeom prst="rect">
             <a:avLst/>
@@ -6626,62 +9432,10 @@
       </p:pic>
       <p:sp>
         <p:nvSpPr>
-          <p:cNvPr id="9" name="Freccia in giù 8">
-            <a:extLst>
-              <a:ext uri="{FF2B5EF4-FFF2-40B4-BE49-F238E27FC236}">
-                <a16:creationId xmlns:a16="http://schemas.microsoft.com/office/drawing/2014/main" id="{6682CBB0-DEF9-EE75-5392-F576568B8181}"/>
-              </a:ext>
-            </a:extLst>
-          </p:cNvPr>
-          <p:cNvSpPr/>
-          <p:nvPr/>
-        </p:nvSpPr>
-        <p:spPr>
-          <a:xfrm>
-            <a:off x="6096000" y="3094151"/>
-            <a:ext cx="399068" cy="523220"/>
-          </a:xfrm>
-          <a:prstGeom prst="downArrow">
-            <a:avLst/>
-          </a:prstGeom>
-          <a:solidFill>
-            <a:schemeClr val="tx1">
-              <a:lumMod val="75000"/>
-              <a:lumOff val="25000"/>
-            </a:schemeClr>
-          </a:solidFill>
-        </p:spPr>
-        <p:style>
-          <a:lnRef idx="2">
-            <a:schemeClr val="accent1">
-              <a:shade val="50000"/>
-            </a:schemeClr>
-          </a:lnRef>
-          <a:fillRef idx="1">
-            <a:schemeClr val="accent1"/>
-          </a:fillRef>
-          <a:effectRef idx="0">
-            <a:schemeClr val="accent1"/>
-          </a:effectRef>
-          <a:fontRef idx="minor">
-            <a:schemeClr val="lt1"/>
-          </a:fontRef>
-        </p:style>
-        <p:txBody>
-          <a:bodyPr rtlCol="0" anchor="ctr"/>
-          <a:lstStyle/>
-          <a:p>
-            <a:pPr algn="ctr"/>
-            <a:endParaRPr lang="it-IT"/>
-          </a:p>
-        </p:txBody>
-      </p:sp>
-      <p:sp>
-        <p:nvSpPr>
-          <p:cNvPr id="10" name="Rettangolo 9">
-            <a:extLst>
-              <a:ext uri="{FF2B5EF4-FFF2-40B4-BE49-F238E27FC236}">
-                <a16:creationId xmlns:a16="http://schemas.microsoft.com/office/drawing/2014/main" id="{8E54B4D6-FC2F-56B8-6C9F-A7ECDD5C4B9C}"/>
+          <p:cNvPr id="8" name="Rettangolo 7">
+            <a:extLst>
+              <a:ext uri="{FF2B5EF4-FFF2-40B4-BE49-F238E27FC236}">
+                <a16:creationId xmlns:a16="http://schemas.microsoft.com/office/drawing/2014/main" id="{6BE559C5-BD60-4AF6-C0B7-5BFEF642CDF3}"/>
               </a:ext>
             </a:extLst>
           </p:cNvPr>
@@ -6736,7 +9490,7 @@
     </p:spTree>
     <p:extLst>
       <p:ext uri="{BB962C8B-B14F-4D97-AF65-F5344CB8AC3E}">
-        <p14:creationId xmlns:p14="http://schemas.microsoft.com/office/powerpoint/2010/main" val="949823036"/>
+        <p14:creationId xmlns:p14="http://schemas.microsoft.com/office/powerpoint/2010/main" val="699962716"/>
       </p:ext>
     </p:extLst>
   </p:cSld>
@@ -6863,7 +9617,7 @@
                             </p:stCondLst>
                             <p:childTnLst>
                               <p:par>
-                                <p:cTn id="12" presetID="42" presetClass="entr" presetSubtype="0" fill="hold" grpId="0" nodeType="clickEffect">
+                                <p:cTn id="12" presetID="42" presetClass="entr" presetSubtype="0" fill="hold" nodeType="clickEffect">
                                   <p:stCondLst>
                                     <p:cond delay="0"/>
                                   </p:stCondLst>
@@ -6876,7 +9630,7 @@
                                           </p:stCondLst>
                                         </p:cTn>
                                         <p:tgtEl>
-                                          <p:spTgt spid="9"/>
+                                          <p:spTgt spid="3"/>
                                         </p:tgtEl>
                                         <p:attrNameLst>
                                           <p:attrName>style.visibility</p:attrName>
@@ -6890,7 +9644,7 @@
                                       <p:cBhvr>
                                         <p:cTn id="14" dur="1000"/>
                                         <p:tgtEl>
-                                          <p:spTgt spid="9"/>
+                                          <p:spTgt spid="3"/>
                                         </p:tgtEl>
                                       </p:cBhvr>
                                     </p:animEffect>
@@ -6898,7 +9652,7 @@
                                       <p:cBhvr>
                                         <p:cTn id="15" dur="1000" fill="hold"/>
                                         <p:tgtEl>
-                                          <p:spTgt spid="9"/>
+                                          <p:spTgt spid="3"/>
                                         </p:tgtEl>
                                         <p:attrNameLst>
                                           <p:attrName>ppt_x</p:attrName>
@@ -6921,106 +9675,7 @@
                                       <p:cBhvr>
                                         <p:cTn id="16" dur="1000" fill="hold"/>
                                         <p:tgtEl>
-                                          <p:spTgt spid="9"/>
-                                        </p:tgtEl>
-                                        <p:attrNameLst>
-                                          <p:attrName>ppt_y</p:attrName>
-                                        </p:attrNameLst>
-                                      </p:cBhvr>
-                                      <p:tavLst>
-                                        <p:tav tm="0">
-                                          <p:val>
-                                            <p:strVal val="#ppt_y+.1"/>
-                                          </p:val>
-                                        </p:tav>
-                                        <p:tav tm="100000">
-                                          <p:val>
-                                            <p:strVal val="#ppt_y"/>
-                                          </p:val>
-                                        </p:tav>
-                                      </p:tavLst>
-                                    </p:anim>
-                                  </p:childTnLst>
-                                </p:cTn>
-                              </p:par>
-                            </p:childTnLst>
-                          </p:cTn>
-                        </p:par>
-                      </p:childTnLst>
-                    </p:cTn>
-                  </p:par>
-                  <p:par>
-                    <p:cTn id="17" fill="hold">
-                      <p:stCondLst>
-                        <p:cond delay="indefinite"/>
-                      </p:stCondLst>
-                      <p:childTnLst>
-                        <p:par>
-                          <p:cTn id="18" fill="hold">
-                            <p:stCondLst>
-                              <p:cond delay="0"/>
-                            </p:stCondLst>
-                            <p:childTnLst>
-                              <p:par>
-                                <p:cTn id="19" presetID="42" presetClass="entr" presetSubtype="0" fill="hold" nodeType="clickEffect">
-                                  <p:stCondLst>
-                                    <p:cond delay="0"/>
-                                  </p:stCondLst>
-                                  <p:childTnLst>
-                                    <p:set>
-                                      <p:cBhvr>
-                                        <p:cTn id="20" dur="1" fill="hold">
-                                          <p:stCondLst>
-                                            <p:cond delay="0"/>
-                                          </p:stCondLst>
-                                        </p:cTn>
-                                        <p:tgtEl>
-                                          <p:spTgt spid="8"/>
-                                        </p:tgtEl>
-                                        <p:attrNameLst>
-                                          <p:attrName>style.visibility</p:attrName>
-                                        </p:attrNameLst>
-                                      </p:cBhvr>
-                                      <p:to>
-                                        <p:strVal val="visible"/>
-                                      </p:to>
-                                    </p:set>
-                                    <p:animEffect transition="in" filter="fade">
-                                      <p:cBhvr>
-                                        <p:cTn id="21" dur="1000"/>
-                                        <p:tgtEl>
-                                          <p:spTgt spid="8"/>
-                                        </p:tgtEl>
-                                      </p:cBhvr>
-                                    </p:animEffect>
-                                    <p:anim calcmode="lin" valueType="num">
-                                      <p:cBhvr>
-                                        <p:cTn id="22" dur="1000" fill="hold"/>
-                                        <p:tgtEl>
-                                          <p:spTgt spid="8"/>
-                                        </p:tgtEl>
-                                        <p:attrNameLst>
-                                          <p:attrName>ppt_x</p:attrName>
-                                        </p:attrNameLst>
-                                      </p:cBhvr>
-                                      <p:tavLst>
-                                        <p:tav tm="0">
-                                          <p:val>
-                                            <p:strVal val="#ppt_x"/>
-                                          </p:val>
-                                        </p:tav>
-                                        <p:tav tm="100000">
-                                          <p:val>
-                                            <p:strVal val="#ppt_x"/>
-                                          </p:val>
-                                        </p:tav>
-                                      </p:tavLst>
-                                    </p:anim>
-                                    <p:anim calcmode="lin" valueType="num">
-                                      <p:cBhvr>
-                                        <p:cTn id="23" dur="1000" fill="hold"/>
-                                        <p:tgtEl>
-                                          <p:spTgt spid="8"/>
+                                          <p:spTgt spid="3"/>
                                         </p:tgtEl>
                                         <p:attrNameLst>
                                           <p:attrName>ppt_y</p:attrName>
@@ -7071,7 +9726,6 @@
     </p:tnLst>
     <p:bldLst>
       <p:bldP spid="7" grpId="0"/>
-      <p:bldP spid="9" grpId="0" animBg="1"/>
     </p:bldLst>
   </p:timing>
 </p:sld>
@@ -7096,10 +9750,10 @@
       </p:grpSpPr>
       <p:pic>
         <p:nvPicPr>
-          <p:cNvPr id="4" name="Immagine 3">
-            <a:extLst>
-              <a:ext uri="{FF2B5EF4-FFF2-40B4-BE49-F238E27FC236}">
-                <a16:creationId xmlns:a16="http://schemas.microsoft.com/office/drawing/2014/main" id="{6DAC6974-F957-2E94-73B8-C3CAF09F680C}"/>
+          <p:cNvPr id="5" name="Immagine 4">
+            <a:extLst>
+              <a:ext uri="{FF2B5EF4-FFF2-40B4-BE49-F238E27FC236}">
+                <a16:creationId xmlns:a16="http://schemas.microsoft.com/office/drawing/2014/main" id="{FA3C6BD7-8FBF-6EDA-7981-2218C1F6E17D}"/>
               </a:ext>
             </a:extLst>
           </p:cNvPr>
@@ -7132,10 +9786,76 @@
       </p:pic>
       <p:sp>
         <p:nvSpPr>
-          <p:cNvPr id="5" name="Rettangolo 4">
-            <a:extLst>
-              <a:ext uri="{FF2B5EF4-FFF2-40B4-BE49-F238E27FC236}">
-                <a16:creationId xmlns:a16="http://schemas.microsoft.com/office/drawing/2014/main" id="{D3CC5B1A-C1A0-AD65-3AD2-37AF725451B3}"/>
+          <p:cNvPr id="7" name="Rettangolo 6">
+            <a:extLst>
+              <a:ext uri="{FF2B5EF4-FFF2-40B4-BE49-F238E27FC236}">
+                <a16:creationId xmlns:a16="http://schemas.microsoft.com/office/drawing/2014/main" id="{DF1285BF-ADAE-853A-DFD0-E28672837DB2}"/>
+              </a:ext>
+            </a:extLst>
+          </p:cNvPr>
+          <p:cNvSpPr/>
+          <p:nvPr/>
+        </p:nvSpPr>
+        <p:spPr>
+          <a:xfrm>
+            <a:off x="2817131" y="2032889"/>
+            <a:ext cx="6970623" cy="523220"/>
+          </a:xfrm>
+          <a:prstGeom prst="rect">
+            <a:avLst/>
+          </a:prstGeom>
+          <a:noFill/>
+        </p:spPr>
+        <p:txBody>
+          <a:bodyPr wrap="square" lIns="91440" tIns="45720" rIns="91440" bIns="45720">
+            <a:spAutoFit/>
+            <a:scene3d>
+              <a:camera prst="orthographicFront"/>
+              <a:lightRig rig="harsh" dir="t"/>
+            </a:scene3d>
+            <a:sp3d extrusionH="57150" prstMaterial="matte">
+              <a:bevelT w="63500" h="12700" prst="angle"/>
+              <a:contourClr>
+                <a:schemeClr val="bg1">
+                  <a:lumMod val="65000"/>
+                </a:schemeClr>
+              </a:contourClr>
+            </a:sp3d>
+          </a:bodyPr>
+          <a:lstStyle/>
+          <a:p>
+            <a:pPr algn="ctr"/>
+            <a:r>
+              <a:rPr lang="it-IT" sz="2800" b="1" dirty="0">
+                <a:ln/>
+                <a:solidFill>
+                  <a:schemeClr val="tx1">
+                    <a:lumMod val="65000"/>
+                    <a:lumOff val="35000"/>
+                  </a:schemeClr>
+                </a:solidFill>
+              </a:rPr>
+              <a:t>CREAZIONE GRAFICA HTML - SPRING</a:t>
+            </a:r>
+            <a:endParaRPr lang="it-IT" sz="2800" b="1" cap="none" spc="0" dirty="0">
+              <a:ln/>
+              <a:solidFill>
+                <a:schemeClr val="tx1">
+                  <a:lumMod val="65000"/>
+                  <a:lumOff val="35000"/>
+                </a:schemeClr>
+              </a:solidFill>
+              <a:effectLst/>
+            </a:endParaRPr>
+          </a:p>
+        </p:txBody>
+      </p:sp>
+      <p:sp>
+        <p:nvSpPr>
+          <p:cNvPr id="8" name="Rettangolo 7">
+            <a:extLst>
+              <a:ext uri="{FF2B5EF4-FFF2-40B4-BE49-F238E27FC236}">
+                <a16:creationId xmlns:a16="http://schemas.microsoft.com/office/drawing/2014/main" id="{6BE559C5-BD60-4AF6-C0B7-5BFEF642CDF3}"/>
               </a:ext>
             </a:extLst>
           </p:cNvPr>
@@ -7187,12 +9907,345 @@
           </a:p>
         </p:txBody>
       </p:sp>
+      <p:pic>
+        <p:nvPicPr>
+          <p:cNvPr id="4" name="Immagine 3">
+            <a:extLst>
+              <a:ext uri="{FF2B5EF4-FFF2-40B4-BE49-F238E27FC236}">
+                <a16:creationId xmlns:a16="http://schemas.microsoft.com/office/drawing/2014/main" id="{B4E62A2A-5024-DD90-B147-E70413D16FEB}"/>
+              </a:ext>
+            </a:extLst>
+          </p:cNvPr>
+          <p:cNvPicPr>
+            <a:picLocks noChangeAspect="1"/>
+          </p:cNvPicPr>
+          <p:nvPr/>
+        </p:nvPicPr>
+        <p:blipFill>
+          <a:blip r:embed="rId3">
+            <a:extLst>
+              <a:ext uri="{28A0092B-C50C-407E-A947-70E740481C1C}">
+                <a14:useLocalDpi xmlns:a14="http://schemas.microsoft.com/office/drawing/2010/main" val="0"/>
+              </a:ext>
+            </a:extLst>
+          </a:blip>
+          <a:stretch>
+            <a:fillRect/>
+          </a:stretch>
+        </p:blipFill>
+        <p:spPr>
+          <a:xfrm>
+            <a:off x="2737253" y="2646900"/>
+            <a:ext cx="7337771" cy="4120309"/>
+          </a:xfrm>
+          <a:prstGeom prst="rect">
+            <a:avLst/>
+          </a:prstGeom>
+        </p:spPr>
+      </p:pic>
+    </p:spTree>
+    <p:extLst>
+      <p:ext uri="{BB962C8B-B14F-4D97-AF65-F5344CB8AC3E}">
+        <p14:creationId xmlns:p14="http://schemas.microsoft.com/office/powerpoint/2010/main" val="3944497476"/>
+      </p:ext>
+    </p:extLst>
+  </p:cSld>
+  <p:clrMapOvr>
+    <a:masterClrMapping/>
+  </p:clrMapOvr>
+  <p:timing>
+    <p:tnLst>
+      <p:par>
+        <p:cTn id="1" dur="indefinite" restart="never" nodeType="tmRoot">
+          <p:childTnLst>
+            <p:seq concurrent="1" nextAc="seek">
+              <p:cTn id="2" dur="indefinite" nodeType="mainSeq">
+                <p:childTnLst>
+                  <p:par>
+                    <p:cTn id="3" fill="hold">
+                      <p:stCondLst>
+                        <p:cond delay="indefinite"/>
+                      </p:stCondLst>
+                      <p:childTnLst>
+                        <p:par>
+                          <p:cTn id="4" fill="hold">
+                            <p:stCondLst>
+                              <p:cond delay="0"/>
+                            </p:stCondLst>
+                            <p:childTnLst>
+                              <p:par>
+                                <p:cTn id="5" presetID="42" presetClass="entr" presetSubtype="0" fill="hold" grpId="0" nodeType="clickEffect">
+                                  <p:stCondLst>
+                                    <p:cond delay="0"/>
+                                  </p:stCondLst>
+                                  <p:childTnLst>
+                                    <p:set>
+                                      <p:cBhvr>
+                                        <p:cTn id="6" dur="1" fill="hold">
+                                          <p:stCondLst>
+                                            <p:cond delay="0"/>
+                                          </p:stCondLst>
+                                        </p:cTn>
+                                        <p:tgtEl>
+                                          <p:spTgt spid="7"/>
+                                        </p:tgtEl>
+                                        <p:attrNameLst>
+                                          <p:attrName>style.visibility</p:attrName>
+                                        </p:attrNameLst>
+                                      </p:cBhvr>
+                                      <p:to>
+                                        <p:strVal val="visible"/>
+                                      </p:to>
+                                    </p:set>
+                                    <p:animEffect transition="in" filter="fade">
+                                      <p:cBhvr>
+                                        <p:cTn id="7" dur="1000"/>
+                                        <p:tgtEl>
+                                          <p:spTgt spid="7"/>
+                                        </p:tgtEl>
+                                      </p:cBhvr>
+                                    </p:animEffect>
+                                    <p:anim calcmode="lin" valueType="num">
+                                      <p:cBhvr>
+                                        <p:cTn id="8" dur="1000" fill="hold"/>
+                                        <p:tgtEl>
+                                          <p:spTgt spid="7"/>
+                                        </p:tgtEl>
+                                        <p:attrNameLst>
+                                          <p:attrName>ppt_x</p:attrName>
+                                        </p:attrNameLst>
+                                      </p:cBhvr>
+                                      <p:tavLst>
+                                        <p:tav tm="0">
+                                          <p:val>
+                                            <p:strVal val="#ppt_x"/>
+                                          </p:val>
+                                        </p:tav>
+                                        <p:tav tm="100000">
+                                          <p:val>
+                                            <p:strVal val="#ppt_x"/>
+                                          </p:val>
+                                        </p:tav>
+                                      </p:tavLst>
+                                    </p:anim>
+                                    <p:anim calcmode="lin" valueType="num">
+                                      <p:cBhvr>
+                                        <p:cTn id="9" dur="1000" fill="hold"/>
+                                        <p:tgtEl>
+                                          <p:spTgt spid="7"/>
+                                        </p:tgtEl>
+                                        <p:attrNameLst>
+                                          <p:attrName>ppt_y</p:attrName>
+                                        </p:attrNameLst>
+                                      </p:cBhvr>
+                                      <p:tavLst>
+                                        <p:tav tm="0">
+                                          <p:val>
+                                            <p:strVal val="#ppt_y+.1"/>
+                                          </p:val>
+                                        </p:tav>
+                                        <p:tav tm="100000">
+                                          <p:val>
+                                            <p:strVal val="#ppt_y"/>
+                                          </p:val>
+                                        </p:tav>
+                                      </p:tavLst>
+                                    </p:anim>
+                                  </p:childTnLst>
+                                </p:cTn>
+                              </p:par>
+                            </p:childTnLst>
+                          </p:cTn>
+                        </p:par>
+                      </p:childTnLst>
+                    </p:cTn>
+                  </p:par>
+                  <p:par>
+                    <p:cTn id="10" fill="hold">
+                      <p:stCondLst>
+                        <p:cond delay="indefinite"/>
+                      </p:stCondLst>
+                      <p:childTnLst>
+                        <p:par>
+                          <p:cTn id="11" fill="hold">
+                            <p:stCondLst>
+                              <p:cond delay="0"/>
+                            </p:stCondLst>
+                            <p:childTnLst>
+                              <p:par>
+                                <p:cTn id="12" presetID="42" presetClass="entr" presetSubtype="0" fill="hold" nodeType="clickEffect">
+                                  <p:stCondLst>
+                                    <p:cond delay="0"/>
+                                  </p:stCondLst>
+                                  <p:childTnLst>
+                                    <p:set>
+                                      <p:cBhvr>
+                                        <p:cTn id="13" dur="1" fill="hold">
+                                          <p:stCondLst>
+                                            <p:cond delay="0"/>
+                                          </p:stCondLst>
+                                        </p:cTn>
+                                        <p:tgtEl>
+                                          <p:spTgt spid="4"/>
+                                        </p:tgtEl>
+                                        <p:attrNameLst>
+                                          <p:attrName>style.visibility</p:attrName>
+                                        </p:attrNameLst>
+                                      </p:cBhvr>
+                                      <p:to>
+                                        <p:strVal val="visible"/>
+                                      </p:to>
+                                    </p:set>
+                                    <p:animEffect transition="in" filter="fade">
+                                      <p:cBhvr>
+                                        <p:cTn id="14" dur="1000"/>
+                                        <p:tgtEl>
+                                          <p:spTgt spid="4"/>
+                                        </p:tgtEl>
+                                      </p:cBhvr>
+                                    </p:animEffect>
+                                    <p:anim calcmode="lin" valueType="num">
+                                      <p:cBhvr>
+                                        <p:cTn id="15" dur="1000" fill="hold"/>
+                                        <p:tgtEl>
+                                          <p:spTgt spid="4"/>
+                                        </p:tgtEl>
+                                        <p:attrNameLst>
+                                          <p:attrName>ppt_x</p:attrName>
+                                        </p:attrNameLst>
+                                      </p:cBhvr>
+                                      <p:tavLst>
+                                        <p:tav tm="0">
+                                          <p:val>
+                                            <p:strVal val="#ppt_x"/>
+                                          </p:val>
+                                        </p:tav>
+                                        <p:tav tm="100000">
+                                          <p:val>
+                                            <p:strVal val="#ppt_x"/>
+                                          </p:val>
+                                        </p:tav>
+                                      </p:tavLst>
+                                    </p:anim>
+                                    <p:anim calcmode="lin" valueType="num">
+                                      <p:cBhvr>
+                                        <p:cTn id="16" dur="1000" fill="hold"/>
+                                        <p:tgtEl>
+                                          <p:spTgt spid="4"/>
+                                        </p:tgtEl>
+                                        <p:attrNameLst>
+                                          <p:attrName>ppt_y</p:attrName>
+                                        </p:attrNameLst>
+                                      </p:cBhvr>
+                                      <p:tavLst>
+                                        <p:tav tm="0">
+                                          <p:val>
+                                            <p:strVal val="#ppt_y+.1"/>
+                                          </p:val>
+                                        </p:tav>
+                                        <p:tav tm="100000">
+                                          <p:val>
+                                            <p:strVal val="#ppt_y"/>
+                                          </p:val>
+                                        </p:tav>
+                                      </p:tavLst>
+                                    </p:anim>
+                                  </p:childTnLst>
+                                </p:cTn>
+                              </p:par>
+                            </p:childTnLst>
+                          </p:cTn>
+                        </p:par>
+                      </p:childTnLst>
+                    </p:cTn>
+                  </p:par>
+                </p:childTnLst>
+              </p:cTn>
+              <p:prevCondLst>
+                <p:cond evt="onPrev" delay="0">
+                  <p:tgtEl>
+                    <p:sldTgt/>
+                  </p:tgtEl>
+                </p:cond>
+              </p:prevCondLst>
+              <p:nextCondLst>
+                <p:cond evt="onNext" delay="0">
+                  <p:tgtEl>
+                    <p:sldTgt/>
+                  </p:tgtEl>
+                </p:cond>
+              </p:nextCondLst>
+            </p:seq>
+          </p:childTnLst>
+        </p:cTn>
+      </p:par>
+    </p:tnLst>
+    <p:bldLst>
+      <p:bldP spid="7" grpId="0"/>
+    </p:bldLst>
+  </p:timing>
+</p:sld>
+</file>
+
+<file path=ppt/slides/slide9.xml><?xml version="1.0" encoding="utf-8"?>
+<p:sld xmlns:a="http://schemas.openxmlformats.org/drawingml/2006/main" xmlns:r="http://schemas.openxmlformats.org/officeDocument/2006/relationships" xmlns:p="http://schemas.openxmlformats.org/presentationml/2006/main">
+  <p:cSld>
+    <p:spTree>
+      <p:nvGrpSpPr>
+        <p:cNvPr id="1" name=""/>
+        <p:cNvGrpSpPr/>
+        <p:nvPr/>
+      </p:nvGrpSpPr>
+      <p:grpSpPr>
+        <a:xfrm>
+          <a:off x="0" y="0"/>
+          <a:ext cx="0" cy="0"/>
+          <a:chOff x="0" y="0"/>
+          <a:chExt cx="0" cy="0"/>
+        </a:xfrm>
+      </p:grpSpPr>
+      <p:pic>
+        <p:nvPicPr>
+          <p:cNvPr id="5" name="Immagine 4">
+            <a:extLst>
+              <a:ext uri="{FF2B5EF4-FFF2-40B4-BE49-F238E27FC236}">
+                <a16:creationId xmlns:a16="http://schemas.microsoft.com/office/drawing/2014/main" id="{FA3C6BD7-8FBF-6EDA-7981-2218C1F6E17D}"/>
+              </a:ext>
+            </a:extLst>
+          </p:cNvPr>
+          <p:cNvPicPr>
+            <a:picLocks noChangeAspect="1"/>
+          </p:cNvPicPr>
+          <p:nvPr/>
+        </p:nvPicPr>
+        <p:blipFill>
+          <a:blip r:embed="rId2">
+            <a:extLst>
+              <a:ext uri="{28A0092B-C50C-407E-A947-70E740481C1C}">
+                <a14:useLocalDpi xmlns:a14="http://schemas.microsoft.com/office/drawing/2010/main" val="0"/>
+              </a:ext>
+            </a:extLst>
+          </a:blip>
+          <a:stretch>
+            <a:fillRect/>
+          </a:stretch>
+        </p:blipFill>
+        <p:spPr>
+          <a:xfrm>
+            <a:off x="0" y="0"/>
+            <a:ext cx="12192000" cy="6858000"/>
+          </a:xfrm>
+          <a:prstGeom prst="rect">
+            <a:avLst/>
+          </a:prstGeom>
+        </p:spPr>
+      </p:pic>
       <p:sp>
         <p:nvSpPr>
           <p:cNvPr id="7" name="Rettangolo 6">
             <a:extLst>
               <a:ext uri="{FF2B5EF4-FFF2-40B4-BE49-F238E27FC236}">
-                <a16:creationId xmlns:a16="http://schemas.microsoft.com/office/drawing/2014/main" id="{A804F389-ADEC-A560-6ED2-0E5EDEDE5BE9}"/>
+                <a16:creationId xmlns:a16="http://schemas.microsoft.com/office/drawing/2014/main" id="{DF1285BF-ADAE-853A-DFD0-E28672837DB2}"/>
               </a:ext>
             </a:extLst>
           </p:cNvPr>
@@ -7201,8 +10254,8 @@
         </p:nvSpPr>
         <p:spPr>
           <a:xfrm>
-            <a:off x="-366072" y="3232650"/>
-            <a:ext cx="13469331" cy="707886"/>
+            <a:off x="2817131" y="2032889"/>
+            <a:ext cx="6970623" cy="523220"/>
           </a:xfrm>
           <a:prstGeom prst="rect">
             <a:avLst/>
@@ -7229,7 +10282,73 @@
           <a:p>
             <a:pPr algn="ctr"/>
             <a:r>
-              <a:rPr lang="it-IT" sz="4000" b="1" cap="none" spc="0" dirty="0">
+              <a:rPr lang="it-IT" sz="2800" b="1" dirty="0">
+                <a:ln/>
+                <a:solidFill>
+                  <a:schemeClr val="tx1">
+                    <a:lumMod val="65000"/>
+                    <a:lumOff val="35000"/>
+                  </a:schemeClr>
+                </a:solidFill>
+              </a:rPr>
+              <a:t>CREAZIONE GRAFICA CSS - SPRING</a:t>
+            </a:r>
+            <a:endParaRPr lang="it-IT" sz="2800" b="1" cap="none" spc="0" dirty="0">
+              <a:ln/>
+              <a:solidFill>
+                <a:schemeClr val="tx1">
+                  <a:lumMod val="65000"/>
+                  <a:lumOff val="35000"/>
+                </a:schemeClr>
+              </a:solidFill>
+              <a:effectLst/>
+            </a:endParaRPr>
+          </a:p>
+        </p:txBody>
+      </p:sp>
+      <p:sp>
+        <p:nvSpPr>
+          <p:cNvPr id="8" name="Rettangolo 7">
+            <a:extLst>
+              <a:ext uri="{FF2B5EF4-FFF2-40B4-BE49-F238E27FC236}">
+                <a16:creationId xmlns:a16="http://schemas.microsoft.com/office/drawing/2014/main" id="{6BE559C5-BD60-4AF6-C0B7-5BFEF642CDF3}"/>
+              </a:ext>
+            </a:extLst>
+          </p:cNvPr>
+          <p:cNvSpPr/>
+          <p:nvPr/>
+        </p:nvSpPr>
+        <p:spPr>
+          <a:xfrm>
+            <a:off x="-565607" y="253632"/>
+            <a:ext cx="13338928" cy="646331"/>
+          </a:xfrm>
+          <a:prstGeom prst="rect">
+            <a:avLst/>
+          </a:prstGeom>
+          <a:noFill/>
+        </p:spPr>
+        <p:txBody>
+          <a:bodyPr wrap="square" lIns="91440" tIns="45720" rIns="91440" bIns="45720">
+            <a:spAutoFit/>
+            <a:scene3d>
+              <a:camera prst="orthographicFront"/>
+              <a:lightRig rig="harsh" dir="t"/>
+            </a:scene3d>
+            <a:sp3d extrusionH="57150" prstMaterial="matte">
+              <a:bevelT w="63500" h="12700" prst="angle"/>
+              <a:contourClr>
+                <a:schemeClr val="bg1">
+                  <a:lumMod val="65000"/>
+                </a:schemeClr>
+              </a:contourClr>
+            </a:sp3d>
+          </a:bodyPr>
+          <a:lstStyle/>
+          <a:p>
+            <a:pPr algn="ctr"/>
+            <a:r>
+              <a:rPr lang="it-IT" sz="3600" b="1" cap="none" spc="0" dirty="0">
                 <a:ln/>
                 <a:solidFill>
                   <a:schemeClr val="tx1">
@@ -7239,21 +10358,288 @@
                 </a:solidFill>
                 <a:effectLst/>
               </a:rPr>
-              <a:t>SI RINGRAZIA TUTTI PER L’ATTENZIONE.</a:t>
+              <a:t>PRESENTAZIONE PROJECT WORK FINALE: GIORNALE ONLINE</a:t>
             </a:r>
           </a:p>
         </p:txBody>
       </p:sp>
+      <p:pic>
+        <p:nvPicPr>
+          <p:cNvPr id="3" name="Immagine 2">
+            <a:extLst>
+              <a:ext uri="{FF2B5EF4-FFF2-40B4-BE49-F238E27FC236}">
+                <a16:creationId xmlns:a16="http://schemas.microsoft.com/office/drawing/2014/main" id="{D6F94A61-14EF-BAAB-0762-2A7496B7F0D9}"/>
+              </a:ext>
+            </a:extLst>
+          </p:cNvPr>
+          <p:cNvPicPr>
+            <a:picLocks noChangeAspect="1"/>
+          </p:cNvPicPr>
+          <p:nvPr/>
+        </p:nvPicPr>
+        <p:blipFill>
+          <a:blip r:embed="rId3">
+            <a:extLst>
+              <a:ext uri="{28A0092B-C50C-407E-A947-70E740481C1C}">
+                <a14:useLocalDpi xmlns:a14="http://schemas.microsoft.com/office/drawing/2010/main" val="0"/>
+              </a:ext>
+            </a:extLst>
+          </a:blip>
+          <a:stretch>
+            <a:fillRect/>
+          </a:stretch>
+        </p:blipFill>
+        <p:spPr>
+          <a:xfrm>
+            <a:off x="4638611" y="2633103"/>
+            <a:ext cx="3327661" cy="3792218"/>
+          </a:xfrm>
+          <a:prstGeom prst="rect">
+            <a:avLst/>
+          </a:prstGeom>
+        </p:spPr>
+      </p:pic>
     </p:spTree>
     <p:extLst>
       <p:ext uri="{BB962C8B-B14F-4D97-AF65-F5344CB8AC3E}">
-        <p14:creationId xmlns:p14="http://schemas.microsoft.com/office/powerpoint/2010/main" val="1046735074"/>
+        <p14:creationId xmlns:p14="http://schemas.microsoft.com/office/powerpoint/2010/main" val="636635174"/>
       </p:ext>
     </p:extLst>
   </p:cSld>
   <p:clrMapOvr>
     <a:masterClrMapping/>
   </p:clrMapOvr>
+  <p:timing>
+    <p:tnLst>
+      <p:par>
+        <p:cTn id="1" dur="indefinite" restart="never" nodeType="tmRoot">
+          <p:childTnLst>
+            <p:seq concurrent="1" nextAc="seek">
+              <p:cTn id="2" dur="indefinite" nodeType="mainSeq">
+                <p:childTnLst>
+                  <p:par>
+                    <p:cTn id="3" fill="hold">
+                      <p:stCondLst>
+                        <p:cond delay="indefinite"/>
+                      </p:stCondLst>
+                      <p:childTnLst>
+                        <p:par>
+                          <p:cTn id="4" fill="hold">
+                            <p:stCondLst>
+                              <p:cond delay="0"/>
+                            </p:stCondLst>
+                            <p:childTnLst>
+                              <p:par>
+                                <p:cTn id="5" presetID="42" presetClass="entr" presetSubtype="0" fill="hold" grpId="0" nodeType="clickEffect">
+                                  <p:stCondLst>
+                                    <p:cond delay="0"/>
+                                  </p:stCondLst>
+                                  <p:childTnLst>
+                                    <p:set>
+                                      <p:cBhvr>
+                                        <p:cTn id="6" dur="1" fill="hold">
+                                          <p:stCondLst>
+                                            <p:cond delay="0"/>
+                                          </p:stCondLst>
+                                        </p:cTn>
+                                        <p:tgtEl>
+                                          <p:spTgt spid="7"/>
+                                        </p:tgtEl>
+                                        <p:attrNameLst>
+                                          <p:attrName>style.visibility</p:attrName>
+                                        </p:attrNameLst>
+                                      </p:cBhvr>
+                                      <p:to>
+                                        <p:strVal val="visible"/>
+                                      </p:to>
+                                    </p:set>
+                                    <p:animEffect transition="in" filter="fade">
+                                      <p:cBhvr>
+                                        <p:cTn id="7" dur="1000"/>
+                                        <p:tgtEl>
+                                          <p:spTgt spid="7"/>
+                                        </p:tgtEl>
+                                      </p:cBhvr>
+                                    </p:animEffect>
+                                    <p:anim calcmode="lin" valueType="num">
+                                      <p:cBhvr>
+                                        <p:cTn id="8" dur="1000" fill="hold"/>
+                                        <p:tgtEl>
+                                          <p:spTgt spid="7"/>
+                                        </p:tgtEl>
+                                        <p:attrNameLst>
+                                          <p:attrName>ppt_x</p:attrName>
+                                        </p:attrNameLst>
+                                      </p:cBhvr>
+                                      <p:tavLst>
+                                        <p:tav tm="0">
+                                          <p:val>
+                                            <p:strVal val="#ppt_x"/>
+                                          </p:val>
+                                        </p:tav>
+                                        <p:tav tm="100000">
+                                          <p:val>
+                                            <p:strVal val="#ppt_x"/>
+                                          </p:val>
+                                        </p:tav>
+                                      </p:tavLst>
+                                    </p:anim>
+                                    <p:anim calcmode="lin" valueType="num">
+                                      <p:cBhvr>
+                                        <p:cTn id="9" dur="1000" fill="hold"/>
+                                        <p:tgtEl>
+                                          <p:spTgt spid="7"/>
+                                        </p:tgtEl>
+                                        <p:attrNameLst>
+                                          <p:attrName>ppt_y</p:attrName>
+                                        </p:attrNameLst>
+                                      </p:cBhvr>
+                                      <p:tavLst>
+                                        <p:tav tm="0">
+                                          <p:val>
+                                            <p:strVal val="#ppt_y+.1"/>
+                                          </p:val>
+                                        </p:tav>
+                                        <p:tav tm="100000">
+                                          <p:val>
+                                            <p:strVal val="#ppt_y"/>
+                                          </p:val>
+                                        </p:tav>
+                                      </p:tavLst>
+                                    </p:anim>
+                                  </p:childTnLst>
+                                </p:cTn>
+                              </p:par>
+                            </p:childTnLst>
+                          </p:cTn>
+                        </p:par>
+                      </p:childTnLst>
+                    </p:cTn>
+                  </p:par>
+                  <p:par>
+                    <p:cTn id="10" fill="hold">
+                      <p:stCondLst>
+                        <p:cond delay="indefinite"/>
+                      </p:stCondLst>
+                      <p:childTnLst>
+                        <p:par>
+                          <p:cTn id="11" fill="hold">
+                            <p:stCondLst>
+                              <p:cond delay="0"/>
+                            </p:stCondLst>
+                            <p:childTnLst>
+                              <p:par>
+                                <p:cTn id="12" presetID="42" presetClass="entr" presetSubtype="0" fill="hold" nodeType="clickEffect">
+                                  <p:stCondLst>
+                                    <p:cond delay="0"/>
+                                  </p:stCondLst>
+                                  <p:childTnLst>
+                                    <p:set>
+                                      <p:cBhvr>
+                                        <p:cTn id="13" dur="1" fill="hold">
+                                          <p:stCondLst>
+                                            <p:cond delay="0"/>
+                                          </p:stCondLst>
+                                        </p:cTn>
+                                        <p:tgtEl>
+                                          <p:spTgt spid="3"/>
+                                        </p:tgtEl>
+                                        <p:attrNameLst>
+                                          <p:attrName>style.visibility</p:attrName>
+                                        </p:attrNameLst>
+                                      </p:cBhvr>
+                                      <p:to>
+                                        <p:strVal val="visible"/>
+                                      </p:to>
+                                    </p:set>
+                                    <p:animEffect transition="in" filter="fade">
+                                      <p:cBhvr>
+                                        <p:cTn id="14" dur="1000"/>
+                                        <p:tgtEl>
+                                          <p:spTgt spid="3"/>
+                                        </p:tgtEl>
+                                      </p:cBhvr>
+                                    </p:animEffect>
+                                    <p:anim calcmode="lin" valueType="num">
+                                      <p:cBhvr>
+                                        <p:cTn id="15" dur="1000" fill="hold"/>
+                                        <p:tgtEl>
+                                          <p:spTgt spid="3"/>
+                                        </p:tgtEl>
+                                        <p:attrNameLst>
+                                          <p:attrName>ppt_x</p:attrName>
+                                        </p:attrNameLst>
+                                      </p:cBhvr>
+                                      <p:tavLst>
+                                        <p:tav tm="0">
+                                          <p:val>
+                                            <p:strVal val="#ppt_x"/>
+                                          </p:val>
+                                        </p:tav>
+                                        <p:tav tm="100000">
+                                          <p:val>
+                                            <p:strVal val="#ppt_x"/>
+                                          </p:val>
+                                        </p:tav>
+                                      </p:tavLst>
+                                    </p:anim>
+                                    <p:anim calcmode="lin" valueType="num">
+                                      <p:cBhvr>
+                                        <p:cTn id="16" dur="1000" fill="hold"/>
+                                        <p:tgtEl>
+                                          <p:spTgt spid="3"/>
+                                        </p:tgtEl>
+                                        <p:attrNameLst>
+                                          <p:attrName>ppt_y</p:attrName>
+                                        </p:attrNameLst>
+                                      </p:cBhvr>
+                                      <p:tavLst>
+                                        <p:tav tm="0">
+                                          <p:val>
+                                            <p:strVal val="#ppt_y+.1"/>
+                                          </p:val>
+                                        </p:tav>
+                                        <p:tav tm="100000">
+                                          <p:val>
+                                            <p:strVal val="#ppt_y"/>
+                                          </p:val>
+                                        </p:tav>
+                                      </p:tavLst>
+                                    </p:anim>
+                                  </p:childTnLst>
+                                </p:cTn>
+                              </p:par>
+                            </p:childTnLst>
+                          </p:cTn>
+                        </p:par>
+                      </p:childTnLst>
+                    </p:cTn>
+                  </p:par>
+                </p:childTnLst>
+              </p:cTn>
+              <p:prevCondLst>
+                <p:cond evt="onPrev" delay="0">
+                  <p:tgtEl>
+                    <p:sldTgt/>
+                  </p:tgtEl>
+                </p:cond>
+              </p:prevCondLst>
+              <p:nextCondLst>
+                <p:cond evt="onNext" delay="0">
+                  <p:tgtEl>
+                    <p:sldTgt/>
+                  </p:tgtEl>
+                </p:cond>
+              </p:nextCondLst>
+            </p:seq>
+          </p:childTnLst>
+        </p:cTn>
+      </p:par>
+    </p:tnLst>
+    <p:bldLst>
+      <p:bldP spid="7" grpId="0"/>
+    </p:bldLst>
+  </p:timing>
 </p:sld>
 </file>
 

</xml_diff>

<commit_message>
Modificta presentazione Power Point
</commit_message>
<xml_diff>
--- a/Presentazione Project Giornale.pptx
+++ b/Presentazione Project Giornale.pptx
@@ -11,14 +11,15 @@
     <p:sldId id="260" r:id="rId5"/>
     <p:sldId id="265" r:id="rId6"/>
     <p:sldId id="259" r:id="rId7"/>
-    <p:sldId id="261" r:id="rId8"/>
-    <p:sldId id="266" r:id="rId9"/>
-    <p:sldId id="267" r:id="rId10"/>
-    <p:sldId id="268" r:id="rId11"/>
-    <p:sldId id="270" r:id="rId12"/>
-    <p:sldId id="269" r:id="rId13"/>
-    <p:sldId id="262" r:id="rId14"/>
-    <p:sldId id="263" r:id="rId15"/>
+    <p:sldId id="271" r:id="rId8"/>
+    <p:sldId id="261" r:id="rId9"/>
+    <p:sldId id="266" r:id="rId10"/>
+    <p:sldId id="267" r:id="rId11"/>
+    <p:sldId id="268" r:id="rId12"/>
+    <p:sldId id="270" r:id="rId13"/>
+    <p:sldId id="269" r:id="rId14"/>
+    <p:sldId id="262" r:id="rId15"/>
+    <p:sldId id="263" r:id="rId16"/>
   </p:sldIdLst>
   <p:sldSz cx="12192000" cy="6858000"/>
   <p:notesSz cx="6858000" cy="9144000"/>
@@ -3840,7 +3841,7 @@
                   </a:schemeClr>
                 </a:solidFill>
               </a:rPr>
-              <a:t>CREAZIONE GRAFICA JavaScript - SPRING</a:t>
+              <a:t>CREAZIONE GRAFICA CSS - SPRING</a:t>
             </a:r>
             <a:endParaRPr lang="it-IT" sz="2800" b="1" cap="none" spc="0" dirty="0">
               <a:ln/>
@@ -3914,10 +3915,10 @@
       </p:sp>
       <p:pic>
         <p:nvPicPr>
-          <p:cNvPr id="4" name="Immagine 3">
-            <a:extLst>
-              <a:ext uri="{FF2B5EF4-FFF2-40B4-BE49-F238E27FC236}">
-                <a16:creationId xmlns:a16="http://schemas.microsoft.com/office/drawing/2014/main" id="{9B810041-57D9-CB5A-D5AA-0218DADD3EC8}"/>
+          <p:cNvPr id="3" name="Immagine 2">
+            <a:extLst>
+              <a:ext uri="{FF2B5EF4-FFF2-40B4-BE49-F238E27FC236}">
+                <a16:creationId xmlns:a16="http://schemas.microsoft.com/office/drawing/2014/main" id="{D6F94A61-14EF-BAAB-0762-2A7496B7F0D9}"/>
               </a:ext>
             </a:extLst>
           </p:cNvPr>
@@ -3940,8 +3941,44 @@
         </p:blipFill>
         <p:spPr>
           <a:xfrm>
-            <a:off x="3036989" y="3237018"/>
-            <a:ext cx="6530906" cy="2476715"/>
+            <a:off x="4638611" y="2633103"/>
+            <a:ext cx="3327661" cy="3792218"/>
+          </a:xfrm>
+          <a:prstGeom prst="rect">
+            <a:avLst/>
+          </a:prstGeom>
+        </p:spPr>
+      </p:pic>
+      <p:pic>
+        <p:nvPicPr>
+          <p:cNvPr id="4" name="Immagine 3">
+            <a:extLst>
+              <a:ext uri="{FF2B5EF4-FFF2-40B4-BE49-F238E27FC236}">
+                <a16:creationId xmlns:a16="http://schemas.microsoft.com/office/drawing/2014/main" id="{4CC82317-D38E-D467-B209-AAE5DA9CF4CF}"/>
+              </a:ext>
+            </a:extLst>
+          </p:cNvPr>
+          <p:cNvPicPr>
+            <a:picLocks noChangeAspect="1"/>
+          </p:cNvPicPr>
+          <p:nvPr/>
+        </p:nvPicPr>
+        <p:blipFill>
+          <a:blip r:embed="rId4">
+            <a:extLst>
+              <a:ext uri="{28A0092B-C50C-407E-A947-70E740481C1C}">
+                <a14:useLocalDpi xmlns:a14="http://schemas.microsoft.com/office/drawing/2010/main" val="0"/>
+              </a:ext>
+            </a:extLst>
+          </a:blip>
+          <a:stretch>
+            <a:fillRect/>
+          </a:stretch>
+        </p:blipFill>
+        <p:spPr>
+          <a:xfrm>
+            <a:off x="3000550" y="2633103"/>
+            <a:ext cx="6970624" cy="3872057"/>
           </a:xfrm>
           <a:prstGeom prst="rect">
             <a:avLst/>
@@ -3951,7 +3988,7 @@
     </p:spTree>
     <p:extLst>
       <p:ext uri="{BB962C8B-B14F-4D97-AF65-F5344CB8AC3E}">
-        <p14:creationId xmlns:p14="http://schemas.microsoft.com/office/powerpoint/2010/main" val="37316903"/>
+        <p14:creationId xmlns:p14="http://schemas.microsoft.com/office/powerpoint/2010/main" val="636635174"/>
       </p:ext>
     </p:extLst>
   </p:cSld>
@@ -4091,7 +4128,7 @@
                                           </p:stCondLst>
                                         </p:cTn>
                                         <p:tgtEl>
-                                          <p:spTgt spid="4"/>
+                                          <p:spTgt spid="3"/>
                                         </p:tgtEl>
                                         <p:attrNameLst>
                                           <p:attrName>style.visibility</p:attrName>
@@ -4105,7 +4142,7 @@
                                       <p:cBhvr>
                                         <p:cTn id="14" dur="1000"/>
                                         <p:tgtEl>
-                                          <p:spTgt spid="4"/>
+                                          <p:spTgt spid="3"/>
                                         </p:tgtEl>
                                       </p:cBhvr>
                                     </p:animEffect>
@@ -4113,7 +4150,7 @@
                                       <p:cBhvr>
                                         <p:cTn id="15" dur="1000" fill="hold"/>
                                         <p:tgtEl>
-                                          <p:spTgt spid="4"/>
+                                          <p:spTgt spid="3"/>
                                         </p:tgtEl>
                                         <p:attrNameLst>
                                           <p:attrName>ppt_x</p:attrName>
@@ -4135,6 +4172,150 @@
                                     <p:anim calcmode="lin" valueType="num">
                                       <p:cBhvr>
                                         <p:cTn id="16" dur="1000" fill="hold"/>
+                                        <p:tgtEl>
+                                          <p:spTgt spid="3"/>
+                                        </p:tgtEl>
+                                        <p:attrNameLst>
+                                          <p:attrName>ppt_y</p:attrName>
+                                        </p:attrNameLst>
+                                      </p:cBhvr>
+                                      <p:tavLst>
+                                        <p:tav tm="0">
+                                          <p:val>
+                                            <p:strVal val="#ppt_y+.1"/>
+                                          </p:val>
+                                        </p:tav>
+                                        <p:tav tm="100000">
+                                          <p:val>
+                                            <p:strVal val="#ppt_y"/>
+                                          </p:val>
+                                        </p:tav>
+                                      </p:tavLst>
+                                    </p:anim>
+                                  </p:childTnLst>
+                                </p:cTn>
+                              </p:par>
+                            </p:childTnLst>
+                          </p:cTn>
+                        </p:par>
+                      </p:childTnLst>
+                    </p:cTn>
+                  </p:par>
+                  <p:par>
+                    <p:cTn id="17" fill="hold">
+                      <p:stCondLst>
+                        <p:cond delay="indefinite"/>
+                      </p:stCondLst>
+                      <p:childTnLst>
+                        <p:par>
+                          <p:cTn id="18" fill="hold">
+                            <p:stCondLst>
+                              <p:cond delay="0"/>
+                            </p:stCondLst>
+                            <p:childTnLst>
+                              <p:par>
+                                <p:cTn id="19" presetID="1" presetClass="exit" presetSubtype="0" fill="hold" nodeType="clickEffect">
+                                  <p:stCondLst>
+                                    <p:cond delay="0"/>
+                                  </p:stCondLst>
+                                  <p:childTnLst>
+                                    <p:set>
+                                      <p:cBhvr>
+                                        <p:cTn id="20" dur="1" fill="hold">
+                                          <p:stCondLst>
+                                            <p:cond delay="0"/>
+                                          </p:stCondLst>
+                                        </p:cTn>
+                                        <p:tgtEl>
+                                          <p:spTgt spid="3"/>
+                                        </p:tgtEl>
+                                        <p:attrNameLst>
+                                          <p:attrName>style.visibility</p:attrName>
+                                        </p:attrNameLst>
+                                      </p:cBhvr>
+                                      <p:to>
+                                        <p:strVal val="hidden"/>
+                                      </p:to>
+                                    </p:set>
+                                  </p:childTnLst>
+                                </p:cTn>
+                              </p:par>
+                            </p:childTnLst>
+                          </p:cTn>
+                        </p:par>
+                      </p:childTnLst>
+                    </p:cTn>
+                  </p:par>
+                  <p:par>
+                    <p:cTn id="21" fill="hold">
+                      <p:stCondLst>
+                        <p:cond delay="indefinite"/>
+                      </p:stCondLst>
+                      <p:childTnLst>
+                        <p:par>
+                          <p:cTn id="22" fill="hold">
+                            <p:stCondLst>
+                              <p:cond delay="0"/>
+                            </p:stCondLst>
+                            <p:childTnLst>
+                              <p:par>
+                                <p:cTn id="23" presetID="42" presetClass="entr" presetSubtype="0" fill="hold" nodeType="clickEffect">
+                                  <p:stCondLst>
+                                    <p:cond delay="0"/>
+                                  </p:stCondLst>
+                                  <p:childTnLst>
+                                    <p:set>
+                                      <p:cBhvr>
+                                        <p:cTn id="24" dur="1" fill="hold">
+                                          <p:stCondLst>
+                                            <p:cond delay="0"/>
+                                          </p:stCondLst>
+                                        </p:cTn>
+                                        <p:tgtEl>
+                                          <p:spTgt spid="4"/>
+                                        </p:tgtEl>
+                                        <p:attrNameLst>
+                                          <p:attrName>style.visibility</p:attrName>
+                                        </p:attrNameLst>
+                                      </p:cBhvr>
+                                      <p:to>
+                                        <p:strVal val="visible"/>
+                                      </p:to>
+                                    </p:set>
+                                    <p:animEffect transition="in" filter="fade">
+                                      <p:cBhvr>
+                                        <p:cTn id="25" dur="1000"/>
+                                        <p:tgtEl>
+                                          <p:spTgt spid="4"/>
+                                        </p:tgtEl>
+                                      </p:cBhvr>
+                                    </p:animEffect>
+                                    <p:anim calcmode="lin" valueType="num">
+                                      <p:cBhvr>
+                                        <p:cTn id="26" dur="1000" fill="hold"/>
+                                        <p:tgtEl>
+                                          <p:spTgt spid="4"/>
+                                        </p:tgtEl>
+                                        <p:attrNameLst>
+                                          <p:attrName>ppt_x</p:attrName>
+                                        </p:attrNameLst>
+                                      </p:cBhvr>
+                                      <p:tavLst>
+                                        <p:tav tm="0">
+                                          <p:val>
+                                            <p:strVal val="#ppt_x"/>
+                                          </p:val>
+                                        </p:tav>
+                                        <p:tav tm="100000">
+                                          <p:val>
+                                            <p:strVal val="#ppt_x"/>
+                                          </p:val>
+                                        </p:tav>
+                                      </p:tavLst>
+                                    </p:anim>
+                                    <p:anim calcmode="lin" valueType="num">
+                                      <p:cBhvr>
+                                        <p:cTn id="27" dur="1000" fill="hold"/>
                                         <p:tgtEl>
                                           <p:spTgt spid="4"/>
                                         </p:tgtEl>
@@ -4259,7 +4440,7 @@
         </p:nvSpPr>
         <p:spPr>
           <a:xfrm>
-            <a:off x="2203765" y="2133349"/>
+            <a:off x="2817131" y="2032889"/>
             <a:ext cx="6970623" cy="523220"/>
           </a:xfrm>
           <a:prstGeom prst="rect">
@@ -4296,7 +4477,7 @@
                   </a:schemeClr>
                 </a:solidFill>
               </a:rPr>
-              <a:t>OBIETTIVI RAGGIUNTI</a:t>
+              <a:t>CREAZIONE GRAFICA JavaScript - SPRING</a:t>
             </a:r>
             <a:endParaRPr lang="it-IT" sz="2800" b="1" cap="none" spc="0" dirty="0">
               <a:ln/>
@@ -4368,6 +4549,759 @@
           </a:p>
         </p:txBody>
       </p:sp>
+      <p:pic>
+        <p:nvPicPr>
+          <p:cNvPr id="4" name="Immagine 3">
+            <a:extLst>
+              <a:ext uri="{FF2B5EF4-FFF2-40B4-BE49-F238E27FC236}">
+                <a16:creationId xmlns:a16="http://schemas.microsoft.com/office/drawing/2014/main" id="{9B810041-57D9-CB5A-D5AA-0218DADD3EC8}"/>
+              </a:ext>
+            </a:extLst>
+          </p:cNvPr>
+          <p:cNvPicPr>
+            <a:picLocks noChangeAspect="1"/>
+          </p:cNvPicPr>
+          <p:nvPr/>
+        </p:nvPicPr>
+        <p:blipFill>
+          <a:blip r:embed="rId3">
+            <a:extLst>
+              <a:ext uri="{28A0092B-C50C-407E-A947-70E740481C1C}">
+                <a14:useLocalDpi xmlns:a14="http://schemas.microsoft.com/office/drawing/2010/main" val="0"/>
+              </a:ext>
+            </a:extLst>
+          </a:blip>
+          <a:stretch>
+            <a:fillRect/>
+          </a:stretch>
+        </p:blipFill>
+        <p:spPr>
+          <a:xfrm>
+            <a:off x="3036989" y="3237018"/>
+            <a:ext cx="6530906" cy="2476715"/>
+          </a:xfrm>
+          <a:prstGeom prst="rect">
+            <a:avLst/>
+          </a:prstGeom>
+        </p:spPr>
+      </p:pic>
+      <p:pic>
+        <p:nvPicPr>
+          <p:cNvPr id="3" name="Immagine 2">
+            <a:extLst>
+              <a:ext uri="{FF2B5EF4-FFF2-40B4-BE49-F238E27FC236}">
+                <a16:creationId xmlns:a16="http://schemas.microsoft.com/office/drawing/2014/main" id="{E68B4AC5-A1DA-E03E-1A8D-850B01DE03DA}"/>
+              </a:ext>
+            </a:extLst>
+          </p:cNvPr>
+          <p:cNvPicPr>
+            <a:picLocks noChangeAspect="1"/>
+          </p:cNvPicPr>
+          <p:nvPr/>
+        </p:nvPicPr>
+        <p:blipFill>
+          <a:blip r:embed="rId4">
+            <a:extLst>
+              <a:ext uri="{28A0092B-C50C-407E-A947-70E740481C1C}">
+                <a14:useLocalDpi xmlns:a14="http://schemas.microsoft.com/office/drawing/2010/main" val="0"/>
+              </a:ext>
+            </a:extLst>
+          </a:blip>
+          <a:stretch>
+            <a:fillRect/>
+          </a:stretch>
+        </p:blipFill>
+        <p:spPr>
+          <a:xfrm>
+            <a:off x="1971578" y="3132054"/>
+            <a:ext cx="4664226" cy="2686641"/>
+          </a:xfrm>
+          <a:prstGeom prst="rect">
+            <a:avLst/>
+          </a:prstGeom>
+        </p:spPr>
+      </p:pic>
+      <p:pic>
+        <p:nvPicPr>
+          <p:cNvPr id="9" name="Immagine 8">
+            <a:extLst>
+              <a:ext uri="{FF2B5EF4-FFF2-40B4-BE49-F238E27FC236}">
+                <a16:creationId xmlns:a16="http://schemas.microsoft.com/office/drawing/2014/main" id="{AC962ED3-06E4-D02D-561D-6A5D8064616C}"/>
+              </a:ext>
+            </a:extLst>
+          </p:cNvPr>
+          <p:cNvPicPr>
+            <a:picLocks noChangeAspect="1"/>
+          </p:cNvPicPr>
+          <p:nvPr/>
+        </p:nvPicPr>
+        <p:blipFill>
+          <a:blip r:embed="rId5">
+            <a:extLst>
+              <a:ext uri="{28A0092B-C50C-407E-A947-70E740481C1C}">
+                <a14:useLocalDpi xmlns:a14="http://schemas.microsoft.com/office/drawing/2010/main" val="0"/>
+              </a:ext>
+            </a:extLst>
+          </a:blip>
+          <a:stretch>
+            <a:fillRect/>
+          </a:stretch>
+        </p:blipFill>
+        <p:spPr>
+          <a:xfrm>
+            <a:off x="6767251" y="3132055"/>
+            <a:ext cx="5010498" cy="2686640"/>
+          </a:xfrm>
+          <a:prstGeom prst="rect">
+            <a:avLst/>
+          </a:prstGeom>
+        </p:spPr>
+      </p:pic>
+    </p:spTree>
+    <p:extLst>
+      <p:ext uri="{BB962C8B-B14F-4D97-AF65-F5344CB8AC3E}">
+        <p14:creationId xmlns:p14="http://schemas.microsoft.com/office/powerpoint/2010/main" val="37316903"/>
+      </p:ext>
+    </p:extLst>
+  </p:cSld>
+  <p:clrMapOvr>
+    <a:masterClrMapping/>
+  </p:clrMapOvr>
+  <p:timing>
+    <p:tnLst>
+      <p:par>
+        <p:cTn id="1" dur="indefinite" restart="never" nodeType="tmRoot">
+          <p:childTnLst>
+            <p:seq concurrent="1" nextAc="seek">
+              <p:cTn id="2" dur="indefinite" nodeType="mainSeq">
+                <p:childTnLst>
+                  <p:par>
+                    <p:cTn id="3" fill="hold">
+                      <p:stCondLst>
+                        <p:cond delay="indefinite"/>
+                      </p:stCondLst>
+                      <p:childTnLst>
+                        <p:par>
+                          <p:cTn id="4" fill="hold">
+                            <p:stCondLst>
+                              <p:cond delay="0"/>
+                            </p:stCondLst>
+                            <p:childTnLst>
+                              <p:par>
+                                <p:cTn id="5" presetID="42" presetClass="entr" presetSubtype="0" fill="hold" grpId="0" nodeType="clickEffect">
+                                  <p:stCondLst>
+                                    <p:cond delay="0"/>
+                                  </p:stCondLst>
+                                  <p:childTnLst>
+                                    <p:set>
+                                      <p:cBhvr>
+                                        <p:cTn id="6" dur="1" fill="hold">
+                                          <p:stCondLst>
+                                            <p:cond delay="0"/>
+                                          </p:stCondLst>
+                                        </p:cTn>
+                                        <p:tgtEl>
+                                          <p:spTgt spid="7"/>
+                                        </p:tgtEl>
+                                        <p:attrNameLst>
+                                          <p:attrName>style.visibility</p:attrName>
+                                        </p:attrNameLst>
+                                      </p:cBhvr>
+                                      <p:to>
+                                        <p:strVal val="visible"/>
+                                      </p:to>
+                                    </p:set>
+                                    <p:animEffect transition="in" filter="fade">
+                                      <p:cBhvr>
+                                        <p:cTn id="7" dur="1000"/>
+                                        <p:tgtEl>
+                                          <p:spTgt spid="7"/>
+                                        </p:tgtEl>
+                                      </p:cBhvr>
+                                    </p:animEffect>
+                                    <p:anim calcmode="lin" valueType="num">
+                                      <p:cBhvr>
+                                        <p:cTn id="8" dur="1000" fill="hold"/>
+                                        <p:tgtEl>
+                                          <p:spTgt spid="7"/>
+                                        </p:tgtEl>
+                                        <p:attrNameLst>
+                                          <p:attrName>ppt_x</p:attrName>
+                                        </p:attrNameLst>
+                                      </p:cBhvr>
+                                      <p:tavLst>
+                                        <p:tav tm="0">
+                                          <p:val>
+                                            <p:strVal val="#ppt_x"/>
+                                          </p:val>
+                                        </p:tav>
+                                        <p:tav tm="100000">
+                                          <p:val>
+                                            <p:strVal val="#ppt_x"/>
+                                          </p:val>
+                                        </p:tav>
+                                      </p:tavLst>
+                                    </p:anim>
+                                    <p:anim calcmode="lin" valueType="num">
+                                      <p:cBhvr>
+                                        <p:cTn id="9" dur="1000" fill="hold"/>
+                                        <p:tgtEl>
+                                          <p:spTgt spid="7"/>
+                                        </p:tgtEl>
+                                        <p:attrNameLst>
+                                          <p:attrName>ppt_y</p:attrName>
+                                        </p:attrNameLst>
+                                      </p:cBhvr>
+                                      <p:tavLst>
+                                        <p:tav tm="0">
+                                          <p:val>
+                                            <p:strVal val="#ppt_y+.1"/>
+                                          </p:val>
+                                        </p:tav>
+                                        <p:tav tm="100000">
+                                          <p:val>
+                                            <p:strVal val="#ppt_y"/>
+                                          </p:val>
+                                        </p:tav>
+                                      </p:tavLst>
+                                    </p:anim>
+                                  </p:childTnLst>
+                                </p:cTn>
+                              </p:par>
+                            </p:childTnLst>
+                          </p:cTn>
+                        </p:par>
+                      </p:childTnLst>
+                    </p:cTn>
+                  </p:par>
+                  <p:par>
+                    <p:cTn id="10" fill="hold">
+                      <p:stCondLst>
+                        <p:cond delay="indefinite"/>
+                      </p:stCondLst>
+                      <p:childTnLst>
+                        <p:par>
+                          <p:cTn id="11" fill="hold">
+                            <p:stCondLst>
+                              <p:cond delay="0"/>
+                            </p:stCondLst>
+                            <p:childTnLst>
+                              <p:par>
+                                <p:cTn id="12" presetID="42" presetClass="entr" presetSubtype="0" fill="hold" nodeType="clickEffect">
+                                  <p:stCondLst>
+                                    <p:cond delay="0"/>
+                                  </p:stCondLst>
+                                  <p:childTnLst>
+                                    <p:set>
+                                      <p:cBhvr>
+                                        <p:cTn id="13" dur="1" fill="hold">
+                                          <p:stCondLst>
+                                            <p:cond delay="0"/>
+                                          </p:stCondLst>
+                                        </p:cTn>
+                                        <p:tgtEl>
+                                          <p:spTgt spid="4"/>
+                                        </p:tgtEl>
+                                        <p:attrNameLst>
+                                          <p:attrName>style.visibility</p:attrName>
+                                        </p:attrNameLst>
+                                      </p:cBhvr>
+                                      <p:to>
+                                        <p:strVal val="visible"/>
+                                      </p:to>
+                                    </p:set>
+                                    <p:animEffect transition="in" filter="fade">
+                                      <p:cBhvr>
+                                        <p:cTn id="14" dur="1000"/>
+                                        <p:tgtEl>
+                                          <p:spTgt spid="4"/>
+                                        </p:tgtEl>
+                                      </p:cBhvr>
+                                    </p:animEffect>
+                                    <p:anim calcmode="lin" valueType="num">
+                                      <p:cBhvr>
+                                        <p:cTn id="15" dur="1000" fill="hold"/>
+                                        <p:tgtEl>
+                                          <p:spTgt spid="4"/>
+                                        </p:tgtEl>
+                                        <p:attrNameLst>
+                                          <p:attrName>ppt_x</p:attrName>
+                                        </p:attrNameLst>
+                                      </p:cBhvr>
+                                      <p:tavLst>
+                                        <p:tav tm="0">
+                                          <p:val>
+                                            <p:strVal val="#ppt_x"/>
+                                          </p:val>
+                                        </p:tav>
+                                        <p:tav tm="100000">
+                                          <p:val>
+                                            <p:strVal val="#ppt_x"/>
+                                          </p:val>
+                                        </p:tav>
+                                      </p:tavLst>
+                                    </p:anim>
+                                    <p:anim calcmode="lin" valueType="num">
+                                      <p:cBhvr>
+                                        <p:cTn id="16" dur="1000" fill="hold"/>
+                                        <p:tgtEl>
+                                          <p:spTgt spid="4"/>
+                                        </p:tgtEl>
+                                        <p:attrNameLst>
+                                          <p:attrName>ppt_y</p:attrName>
+                                        </p:attrNameLst>
+                                      </p:cBhvr>
+                                      <p:tavLst>
+                                        <p:tav tm="0">
+                                          <p:val>
+                                            <p:strVal val="#ppt_y+.1"/>
+                                          </p:val>
+                                        </p:tav>
+                                        <p:tav tm="100000">
+                                          <p:val>
+                                            <p:strVal val="#ppt_y"/>
+                                          </p:val>
+                                        </p:tav>
+                                      </p:tavLst>
+                                    </p:anim>
+                                  </p:childTnLst>
+                                </p:cTn>
+                              </p:par>
+                            </p:childTnLst>
+                          </p:cTn>
+                        </p:par>
+                      </p:childTnLst>
+                    </p:cTn>
+                  </p:par>
+                  <p:par>
+                    <p:cTn id="17" fill="hold">
+                      <p:stCondLst>
+                        <p:cond delay="indefinite"/>
+                      </p:stCondLst>
+                      <p:childTnLst>
+                        <p:par>
+                          <p:cTn id="18" fill="hold">
+                            <p:stCondLst>
+                              <p:cond delay="0"/>
+                            </p:stCondLst>
+                            <p:childTnLst>
+                              <p:par>
+                                <p:cTn id="19" presetID="1" presetClass="exit" presetSubtype="0" fill="hold" nodeType="clickEffect">
+                                  <p:stCondLst>
+                                    <p:cond delay="0"/>
+                                  </p:stCondLst>
+                                  <p:childTnLst>
+                                    <p:set>
+                                      <p:cBhvr>
+                                        <p:cTn id="20" dur="1" fill="hold">
+                                          <p:stCondLst>
+                                            <p:cond delay="0"/>
+                                          </p:stCondLst>
+                                        </p:cTn>
+                                        <p:tgtEl>
+                                          <p:spTgt spid="4"/>
+                                        </p:tgtEl>
+                                        <p:attrNameLst>
+                                          <p:attrName>style.visibility</p:attrName>
+                                        </p:attrNameLst>
+                                      </p:cBhvr>
+                                      <p:to>
+                                        <p:strVal val="hidden"/>
+                                      </p:to>
+                                    </p:set>
+                                  </p:childTnLst>
+                                </p:cTn>
+                              </p:par>
+                            </p:childTnLst>
+                          </p:cTn>
+                        </p:par>
+                      </p:childTnLst>
+                    </p:cTn>
+                  </p:par>
+                  <p:par>
+                    <p:cTn id="21" fill="hold">
+                      <p:stCondLst>
+                        <p:cond delay="indefinite"/>
+                      </p:stCondLst>
+                      <p:childTnLst>
+                        <p:par>
+                          <p:cTn id="22" fill="hold">
+                            <p:stCondLst>
+                              <p:cond delay="0"/>
+                            </p:stCondLst>
+                            <p:childTnLst>
+                              <p:par>
+                                <p:cTn id="23" presetID="42" presetClass="entr" presetSubtype="0" fill="hold" nodeType="clickEffect">
+                                  <p:stCondLst>
+                                    <p:cond delay="0"/>
+                                  </p:stCondLst>
+                                  <p:childTnLst>
+                                    <p:set>
+                                      <p:cBhvr>
+                                        <p:cTn id="24" dur="1" fill="hold">
+                                          <p:stCondLst>
+                                            <p:cond delay="0"/>
+                                          </p:stCondLst>
+                                        </p:cTn>
+                                        <p:tgtEl>
+                                          <p:spTgt spid="3"/>
+                                        </p:tgtEl>
+                                        <p:attrNameLst>
+                                          <p:attrName>style.visibility</p:attrName>
+                                        </p:attrNameLst>
+                                      </p:cBhvr>
+                                      <p:to>
+                                        <p:strVal val="visible"/>
+                                      </p:to>
+                                    </p:set>
+                                    <p:animEffect transition="in" filter="fade">
+                                      <p:cBhvr>
+                                        <p:cTn id="25" dur="1000"/>
+                                        <p:tgtEl>
+                                          <p:spTgt spid="3"/>
+                                        </p:tgtEl>
+                                      </p:cBhvr>
+                                    </p:animEffect>
+                                    <p:anim calcmode="lin" valueType="num">
+                                      <p:cBhvr>
+                                        <p:cTn id="26" dur="1000" fill="hold"/>
+                                        <p:tgtEl>
+                                          <p:spTgt spid="3"/>
+                                        </p:tgtEl>
+                                        <p:attrNameLst>
+                                          <p:attrName>ppt_x</p:attrName>
+                                        </p:attrNameLst>
+                                      </p:cBhvr>
+                                      <p:tavLst>
+                                        <p:tav tm="0">
+                                          <p:val>
+                                            <p:strVal val="#ppt_x"/>
+                                          </p:val>
+                                        </p:tav>
+                                        <p:tav tm="100000">
+                                          <p:val>
+                                            <p:strVal val="#ppt_x"/>
+                                          </p:val>
+                                        </p:tav>
+                                      </p:tavLst>
+                                    </p:anim>
+                                    <p:anim calcmode="lin" valueType="num">
+                                      <p:cBhvr>
+                                        <p:cTn id="27" dur="1000" fill="hold"/>
+                                        <p:tgtEl>
+                                          <p:spTgt spid="3"/>
+                                        </p:tgtEl>
+                                        <p:attrNameLst>
+                                          <p:attrName>ppt_y</p:attrName>
+                                        </p:attrNameLst>
+                                      </p:cBhvr>
+                                      <p:tavLst>
+                                        <p:tav tm="0">
+                                          <p:val>
+                                            <p:strVal val="#ppt_y+.1"/>
+                                          </p:val>
+                                        </p:tav>
+                                        <p:tav tm="100000">
+                                          <p:val>
+                                            <p:strVal val="#ppt_y"/>
+                                          </p:val>
+                                        </p:tav>
+                                      </p:tavLst>
+                                    </p:anim>
+                                  </p:childTnLst>
+                                </p:cTn>
+                              </p:par>
+                              <p:par>
+                                <p:cTn id="28" presetID="42" presetClass="entr" presetSubtype="0" fill="hold" nodeType="withEffect">
+                                  <p:stCondLst>
+                                    <p:cond delay="0"/>
+                                  </p:stCondLst>
+                                  <p:childTnLst>
+                                    <p:set>
+                                      <p:cBhvr>
+                                        <p:cTn id="29" dur="1" fill="hold">
+                                          <p:stCondLst>
+                                            <p:cond delay="0"/>
+                                          </p:stCondLst>
+                                        </p:cTn>
+                                        <p:tgtEl>
+                                          <p:spTgt spid="9"/>
+                                        </p:tgtEl>
+                                        <p:attrNameLst>
+                                          <p:attrName>style.visibility</p:attrName>
+                                        </p:attrNameLst>
+                                      </p:cBhvr>
+                                      <p:to>
+                                        <p:strVal val="visible"/>
+                                      </p:to>
+                                    </p:set>
+                                    <p:animEffect transition="in" filter="fade">
+                                      <p:cBhvr>
+                                        <p:cTn id="30" dur="1000"/>
+                                        <p:tgtEl>
+                                          <p:spTgt spid="9"/>
+                                        </p:tgtEl>
+                                      </p:cBhvr>
+                                    </p:animEffect>
+                                    <p:anim calcmode="lin" valueType="num">
+                                      <p:cBhvr>
+                                        <p:cTn id="31" dur="1000" fill="hold"/>
+                                        <p:tgtEl>
+                                          <p:spTgt spid="9"/>
+                                        </p:tgtEl>
+                                        <p:attrNameLst>
+                                          <p:attrName>ppt_x</p:attrName>
+                                        </p:attrNameLst>
+                                      </p:cBhvr>
+                                      <p:tavLst>
+                                        <p:tav tm="0">
+                                          <p:val>
+                                            <p:strVal val="#ppt_x"/>
+                                          </p:val>
+                                        </p:tav>
+                                        <p:tav tm="100000">
+                                          <p:val>
+                                            <p:strVal val="#ppt_x"/>
+                                          </p:val>
+                                        </p:tav>
+                                      </p:tavLst>
+                                    </p:anim>
+                                    <p:anim calcmode="lin" valueType="num">
+                                      <p:cBhvr>
+                                        <p:cTn id="32" dur="1000" fill="hold"/>
+                                        <p:tgtEl>
+                                          <p:spTgt spid="9"/>
+                                        </p:tgtEl>
+                                        <p:attrNameLst>
+                                          <p:attrName>ppt_y</p:attrName>
+                                        </p:attrNameLst>
+                                      </p:cBhvr>
+                                      <p:tavLst>
+                                        <p:tav tm="0">
+                                          <p:val>
+                                            <p:strVal val="#ppt_y+.1"/>
+                                          </p:val>
+                                        </p:tav>
+                                        <p:tav tm="100000">
+                                          <p:val>
+                                            <p:strVal val="#ppt_y"/>
+                                          </p:val>
+                                        </p:tav>
+                                      </p:tavLst>
+                                    </p:anim>
+                                  </p:childTnLst>
+                                </p:cTn>
+                              </p:par>
+                            </p:childTnLst>
+                          </p:cTn>
+                        </p:par>
+                      </p:childTnLst>
+                    </p:cTn>
+                  </p:par>
+                </p:childTnLst>
+              </p:cTn>
+              <p:prevCondLst>
+                <p:cond evt="onPrev" delay="0">
+                  <p:tgtEl>
+                    <p:sldTgt/>
+                  </p:tgtEl>
+                </p:cond>
+              </p:prevCondLst>
+              <p:nextCondLst>
+                <p:cond evt="onNext" delay="0">
+                  <p:tgtEl>
+                    <p:sldTgt/>
+                  </p:tgtEl>
+                </p:cond>
+              </p:nextCondLst>
+            </p:seq>
+          </p:childTnLst>
+        </p:cTn>
+      </p:par>
+    </p:tnLst>
+    <p:bldLst>
+      <p:bldP spid="7" grpId="0"/>
+    </p:bldLst>
+  </p:timing>
+</p:sld>
+</file>
+
+<file path=ppt/slides/slide12.xml><?xml version="1.0" encoding="utf-8"?>
+<p:sld xmlns:a="http://schemas.openxmlformats.org/drawingml/2006/main" xmlns:r="http://schemas.openxmlformats.org/officeDocument/2006/relationships" xmlns:p="http://schemas.openxmlformats.org/presentationml/2006/main">
+  <p:cSld>
+    <p:spTree>
+      <p:nvGrpSpPr>
+        <p:cNvPr id="1" name=""/>
+        <p:cNvGrpSpPr/>
+        <p:nvPr/>
+      </p:nvGrpSpPr>
+      <p:grpSpPr>
+        <a:xfrm>
+          <a:off x="0" y="0"/>
+          <a:ext cx="0" cy="0"/>
+          <a:chOff x="0" y="0"/>
+          <a:chExt cx="0" cy="0"/>
+        </a:xfrm>
+      </p:grpSpPr>
+      <p:pic>
+        <p:nvPicPr>
+          <p:cNvPr id="5" name="Immagine 4">
+            <a:extLst>
+              <a:ext uri="{FF2B5EF4-FFF2-40B4-BE49-F238E27FC236}">
+                <a16:creationId xmlns:a16="http://schemas.microsoft.com/office/drawing/2014/main" id="{FA3C6BD7-8FBF-6EDA-7981-2218C1F6E17D}"/>
+              </a:ext>
+            </a:extLst>
+          </p:cNvPr>
+          <p:cNvPicPr>
+            <a:picLocks noChangeAspect="1"/>
+          </p:cNvPicPr>
+          <p:nvPr/>
+        </p:nvPicPr>
+        <p:blipFill>
+          <a:blip r:embed="rId2">
+            <a:extLst>
+              <a:ext uri="{28A0092B-C50C-407E-A947-70E740481C1C}">
+                <a14:useLocalDpi xmlns:a14="http://schemas.microsoft.com/office/drawing/2010/main" val="0"/>
+              </a:ext>
+            </a:extLst>
+          </a:blip>
+          <a:stretch>
+            <a:fillRect/>
+          </a:stretch>
+        </p:blipFill>
+        <p:spPr>
+          <a:xfrm>
+            <a:off x="0" y="0"/>
+            <a:ext cx="12192000" cy="6858000"/>
+          </a:xfrm>
+          <a:prstGeom prst="rect">
+            <a:avLst/>
+          </a:prstGeom>
+        </p:spPr>
+      </p:pic>
+      <p:sp>
+        <p:nvSpPr>
+          <p:cNvPr id="7" name="Rettangolo 6">
+            <a:extLst>
+              <a:ext uri="{FF2B5EF4-FFF2-40B4-BE49-F238E27FC236}">
+                <a16:creationId xmlns:a16="http://schemas.microsoft.com/office/drawing/2014/main" id="{DF1285BF-ADAE-853A-DFD0-E28672837DB2}"/>
+              </a:ext>
+            </a:extLst>
+          </p:cNvPr>
+          <p:cNvSpPr/>
+          <p:nvPr/>
+        </p:nvSpPr>
+        <p:spPr>
+          <a:xfrm>
+            <a:off x="2203765" y="2133349"/>
+            <a:ext cx="6970623" cy="523220"/>
+          </a:xfrm>
+          <a:prstGeom prst="rect">
+            <a:avLst/>
+          </a:prstGeom>
+          <a:noFill/>
+        </p:spPr>
+        <p:txBody>
+          <a:bodyPr wrap="square" lIns="91440" tIns="45720" rIns="91440" bIns="45720">
+            <a:spAutoFit/>
+            <a:scene3d>
+              <a:camera prst="orthographicFront"/>
+              <a:lightRig rig="harsh" dir="t"/>
+            </a:scene3d>
+            <a:sp3d extrusionH="57150" prstMaterial="matte">
+              <a:bevelT w="63500" h="12700" prst="angle"/>
+              <a:contourClr>
+                <a:schemeClr val="bg1">
+                  <a:lumMod val="65000"/>
+                </a:schemeClr>
+              </a:contourClr>
+            </a:sp3d>
+          </a:bodyPr>
+          <a:lstStyle/>
+          <a:p>
+            <a:pPr algn="ctr"/>
+            <a:r>
+              <a:rPr lang="it-IT" sz="2800" b="1" dirty="0">
+                <a:ln/>
+                <a:solidFill>
+                  <a:schemeClr val="tx1">
+                    <a:lumMod val="65000"/>
+                    <a:lumOff val="35000"/>
+                  </a:schemeClr>
+                </a:solidFill>
+              </a:rPr>
+              <a:t>OBIETTIVI RAGGIUNTI</a:t>
+            </a:r>
+            <a:endParaRPr lang="it-IT" sz="2800" b="1" cap="none" spc="0" dirty="0">
+              <a:ln/>
+              <a:solidFill>
+                <a:schemeClr val="tx1">
+                  <a:lumMod val="65000"/>
+                  <a:lumOff val="35000"/>
+                </a:schemeClr>
+              </a:solidFill>
+              <a:effectLst/>
+            </a:endParaRPr>
+          </a:p>
+        </p:txBody>
+      </p:sp>
+      <p:sp>
+        <p:nvSpPr>
+          <p:cNvPr id="8" name="Rettangolo 7">
+            <a:extLst>
+              <a:ext uri="{FF2B5EF4-FFF2-40B4-BE49-F238E27FC236}">
+                <a16:creationId xmlns:a16="http://schemas.microsoft.com/office/drawing/2014/main" id="{6BE559C5-BD60-4AF6-C0B7-5BFEF642CDF3}"/>
+              </a:ext>
+            </a:extLst>
+          </p:cNvPr>
+          <p:cNvSpPr/>
+          <p:nvPr/>
+        </p:nvSpPr>
+        <p:spPr>
+          <a:xfrm>
+            <a:off x="-565607" y="253632"/>
+            <a:ext cx="13338928" cy="646331"/>
+          </a:xfrm>
+          <a:prstGeom prst="rect">
+            <a:avLst/>
+          </a:prstGeom>
+          <a:noFill/>
+        </p:spPr>
+        <p:txBody>
+          <a:bodyPr wrap="square" lIns="91440" tIns="45720" rIns="91440" bIns="45720">
+            <a:spAutoFit/>
+            <a:scene3d>
+              <a:camera prst="orthographicFront"/>
+              <a:lightRig rig="harsh" dir="t"/>
+            </a:scene3d>
+            <a:sp3d extrusionH="57150" prstMaterial="matte">
+              <a:bevelT w="63500" h="12700" prst="angle"/>
+              <a:contourClr>
+                <a:schemeClr val="bg1">
+                  <a:lumMod val="65000"/>
+                </a:schemeClr>
+              </a:contourClr>
+            </a:sp3d>
+          </a:bodyPr>
+          <a:lstStyle/>
+          <a:p>
+            <a:pPr algn="ctr"/>
+            <a:r>
+              <a:rPr lang="it-IT" sz="3600" b="1" cap="none" spc="0" dirty="0">
+                <a:ln/>
+                <a:solidFill>
+                  <a:schemeClr val="tx1">
+                    <a:lumMod val="65000"/>
+                    <a:lumOff val="35000"/>
+                  </a:schemeClr>
+                </a:solidFill>
+                <a:effectLst/>
+              </a:rPr>
+              <a:t>PRESENTAZIONE PROJECT WORK FINALE: GIORNALE ONLINE</a:t>
+            </a:r>
+          </a:p>
+        </p:txBody>
+      </p:sp>
       <p:sp>
         <p:nvSpPr>
           <p:cNvPr id="9" name="Rettangolo 8">
@@ -4573,7 +5507,7 @@
                 </a:solidFill>
                 <a:effectLst/>
               </a:rPr>
-              <a:t>GESTIONE REGISTRATI</a:t>
+              <a:t>GESTIONE FORM REGISTRAZIONE</a:t>
             </a:r>
           </a:p>
           <a:p>
@@ -4591,7 +5525,7 @@
                   </a:schemeClr>
                 </a:solidFill>
               </a:rPr>
-              <a:t>GESTIONE LOGIN</a:t>
+              <a:t>GESTIONE FORM ACCESSO UTENTE/ADMIN</a:t>
             </a:r>
             <a:endParaRPr lang="it-IT" sz="2400" b="1" cap="none" spc="0" dirty="0">
               <a:ln/>
@@ -4951,7 +5885,7 @@
 </p:sld>
 </file>
 
-<file path=ppt/slides/slide12.xml><?xml version="1.0" encoding="utf-8"?>
+<file path=ppt/slides/slide13.xml><?xml version="1.0" encoding="utf-8"?>
 <p:sld xmlns:a="http://schemas.openxmlformats.org/drawingml/2006/main" xmlns:r="http://schemas.openxmlformats.org/officeDocument/2006/relationships" xmlns:p="http://schemas.openxmlformats.org/presentationml/2006/main">
   <p:cSld>
     <p:spTree>
@@ -5141,7 +6075,7 @@
         </p:nvSpPr>
         <p:spPr>
           <a:xfrm>
-            <a:off x="3899133" y="3556955"/>
+            <a:off x="3908560" y="3384957"/>
             <a:ext cx="6970623" cy="1200329"/>
           </a:xfrm>
           <a:prstGeom prst="rect">
@@ -5199,7 +6133,7 @@
                   </a:schemeClr>
                 </a:solidFill>
               </a:rPr>
-              <a:t>MOTORE DI RICERCA </a:t>
+              <a:t>MOTORE INTERNO DI RICERCA </a:t>
             </a:r>
           </a:p>
           <a:p>
@@ -5468,7 +6402,7 @@
 </p:sld>
 </file>
 
-<file path=ppt/slides/slide13.xml><?xml version="1.0" encoding="utf-8"?>
+<file path=ppt/slides/slide14.xml><?xml version="1.0" encoding="utf-8"?>
 <p:sld xmlns:a="http://schemas.openxmlformats.org/drawingml/2006/main" xmlns:r="http://schemas.openxmlformats.org/officeDocument/2006/relationships" xmlns:p="http://schemas.openxmlformats.org/presentationml/2006/main">
   <p:cSld>
     <p:spTree>
@@ -6213,7 +7147,7 @@
 </p:sld>
 </file>
 
-<file path=ppt/slides/slide14.xml><?xml version="1.0" encoding="utf-8"?>
+<file path=ppt/slides/slide15.xml><?xml version="1.0" encoding="utf-8"?>
 <p:sld xmlns:a="http://schemas.openxmlformats.org/drawingml/2006/main" xmlns:r="http://schemas.openxmlformats.org/officeDocument/2006/relationships" xmlns:p="http://schemas.openxmlformats.org/presentationml/2006/main">
   <p:cSld>
     <p:spTree>
@@ -9297,6 +10231,1785 @@
           <p:cNvPr id="5" name="Immagine 4">
             <a:extLst>
               <a:ext uri="{FF2B5EF4-FFF2-40B4-BE49-F238E27FC236}">
+                <a16:creationId xmlns:a16="http://schemas.microsoft.com/office/drawing/2014/main" id="{425A051B-1A37-32BA-41CD-CE78F2D937D1}"/>
+              </a:ext>
+            </a:extLst>
+          </p:cNvPr>
+          <p:cNvPicPr>
+            <a:picLocks noChangeAspect="1"/>
+          </p:cNvPicPr>
+          <p:nvPr/>
+        </p:nvPicPr>
+        <p:blipFill>
+          <a:blip r:embed="rId2">
+            <a:extLst>
+              <a:ext uri="{28A0092B-C50C-407E-A947-70E740481C1C}">
+                <a14:useLocalDpi xmlns:a14="http://schemas.microsoft.com/office/drawing/2010/main" val="0"/>
+              </a:ext>
+            </a:extLst>
+          </a:blip>
+          <a:stretch>
+            <a:fillRect/>
+          </a:stretch>
+        </p:blipFill>
+        <p:spPr>
+          <a:xfrm>
+            <a:off x="7856" y="0"/>
+            <a:ext cx="12192000" cy="6858000"/>
+          </a:xfrm>
+          <a:prstGeom prst="rect">
+            <a:avLst/>
+          </a:prstGeom>
+        </p:spPr>
+      </p:pic>
+      <p:sp>
+        <p:nvSpPr>
+          <p:cNvPr id="6" name="Rettangolo 5">
+            <a:extLst>
+              <a:ext uri="{FF2B5EF4-FFF2-40B4-BE49-F238E27FC236}">
+                <a16:creationId xmlns:a16="http://schemas.microsoft.com/office/drawing/2014/main" id="{6999F5BD-9940-8BE2-8D15-2FBDD9D11E23}"/>
+              </a:ext>
+            </a:extLst>
+          </p:cNvPr>
+          <p:cNvSpPr/>
+          <p:nvPr/>
+        </p:nvSpPr>
+        <p:spPr>
+          <a:xfrm>
+            <a:off x="-565607" y="253632"/>
+            <a:ext cx="13338928" cy="646331"/>
+          </a:xfrm>
+          <a:prstGeom prst="rect">
+            <a:avLst/>
+          </a:prstGeom>
+          <a:noFill/>
+        </p:spPr>
+        <p:txBody>
+          <a:bodyPr wrap="square" lIns="91440" tIns="45720" rIns="91440" bIns="45720">
+            <a:spAutoFit/>
+            <a:scene3d>
+              <a:camera prst="orthographicFront"/>
+              <a:lightRig rig="harsh" dir="t"/>
+            </a:scene3d>
+            <a:sp3d extrusionH="57150" prstMaterial="matte">
+              <a:bevelT w="63500" h="12700" prst="angle"/>
+              <a:contourClr>
+                <a:schemeClr val="bg1">
+                  <a:lumMod val="65000"/>
+                </a:schemeClr>
+              </a:contourClr>
+            </a:sp3d>
+          </a:bodyPr>
+          <a:lstStyle/>
+          <a:p>
+            <a:pPr algn="ctr"/>
+            <a:r>
+              <a:rPr lang="it-IT" sz="3600" b="1" cap="none" spc="0" dirty="0">
+                <a:ln/>
+                <a:solidFill>
+                  <a:schemeClr val="tx1">
+                    <a:lumMod val="65000"/>
+                    <a:lumOff val="35000"/>
+                  </a:schemeClr>
+                </a:solidFill>
+                <a:effectLst/>
+              </a:rPr>
+              <a:t>PRESENTAZIONE PROJECT WORK FINALE: GIORNALE ONLINE</a:t>
+            </a:r>
+          </a:p>
+        </p:txBody>
+      </p:sp>
+      <p:sp>
+        <p:nvSpPr>
+          <p:cNvPr id="7" name="Rettangolo 6">
+            <a:extLst>
+              <a:ext uri="{FF2B5EF4-FFF2-40B4-BE49-F238E27FC236}">
+                <a16:creationId xmlns:a16="http://schemas.microsoft.com/office/drawing/2014/main" id="{E059FD62-73FD-6FB3-6312-DAD787AF740D}"/>
+              </a:ext>
+            </a:extLst>
+          </p:cNvPr>
+          <p:cNvSpPr/>
+          <p:nvPr/>
+        </p:nvSpPr>
+        <p:spPr>
+          <a:xfrm>
+            <a:off x="2897250" y="1270978"/>
+            <a:ext cx="6970623" cy="523220"/>
+          </a:xfrm>
+          <a:prstGeom prst="rect">
+            <a:avLst/>
+          </a:prstGeom>
+          <a:noFill/>
+        </p:spPr>
+        <p:txBody>
+          <a:bodyPr wrap="square" lIns="91440" tIns="45720" rIns="91440" bIns="45720">
+            <a:spAutoFit/>
+            <a:scene3d>
+              <a:camera prst="orthographicFront"/>
+              <a:lightRig rig="harsh" dir="t"/>
+            </a:scene3d>
+            <a:sp3d extrusionH="57150" prstMaterial="matte">
+              <a:bevelT w="63500" h="12700" prst="angle"/>
+              <a:contourClr>
+                <a:schemeClr val="bg1">
+                  <a:lumMod val="65000"/>
+                </a:schemeClr>
+              </a:contourClr>
+            </a:sp3d>
+          </a:bodyPr>
+          <a:lstStyle/>
+          <a:p>
+            <a:pPr algn="ctr"/>
+            <a:r>
+              <a:rPr lang="it-IT" sz="2800" b="1" dirty="0">
+                <a:ln/>
+                <a:solidFill>
+                  <a:schemeClr val="tx1">
+                    <a:lumMod val="65000"/>
+                    <a:lumOff val="35000"/>
+                  </a:schemeClr>
+                </a:solidFill>
+              </a:rPr>
+              <a:t>LINGUAGGI UTILIZZATI E STRUTTURA</a:t>
+            </a:r>
+            <a:endParaRPr lang="it-IT" sz="2800" b="1" cap="none" spc="0" dirty="0">
+              <a:ln/>
+              <a:solidFill>
+                <a:schemeClr val="tx1">
+                  <a:lumMod val="65000"/>
+                  <a:lumOff val="35000"/>
+                </a:schemeClr>
+              </a:solidFill>
+              <a:effectLst/>
+            </a:endParaRPr>
+          </a:p>
+        </p:txBody>
+      </p:sp>
+      <p:sp>
+        <p:nvSpPr>
+          <p:cNvPr id="22" name="Ovale 21">
+            <a:extLst>
+              <a:ext uri="{FF2B5EF4-FFF2-40B4-BE49-F238E27FC236}">
+                <a16:creationId xmlns:a16="http://schemas.microsoft.com/office/drawing/2014/main" id="{816E3986-EF35-1E82-6E1F-FD7B5CCD7102}"/>
+              </a:ext>
+            </a:extLst>
+          </p:cNvPr>
+          <p:cNvSpPr/>
+          <p:nvPr/>
+        </p:nvSpPr>
+        <p:spPr>
+          <a:xfrm>
+            <a:off x="5690205" y="4013694"/>
+            <a:ext cx="1428388" cy="1065229"/>
+          </a:xfrm>
+          <a:prstGeom prst="ellipse">
+            <a:avLst/>
+          </a:prstGeom>
+          <a:ln>
+            <a:solidFill>
+              <a:schemeClr val="tx1">
+                <a:lumMod val="75000"/>
+                <a:lumOff val="25000"/>
+              </a:schemeClr>
+            </a:solidFill>
+          </a:ln>
+        </p:spPr>
+        <p:style>
+          <a:lnRef idx="2">
+            <a:schemeClr val="accent6"/>
+          </a:lnRef>
+          <a:fillRef idx="1">
+            <a:schemeClr val="lt1"/>
+          </a:fillRef>
+          <a:effectRef idx="0">
+            <a:schemeClr val="accent6"/>
+          </a:effectRef>
+          <a:fontRef idx="minor">
+            <a:schemeClr val="dk1"/>
+          </a:fontRef>
+        </p:style>
+        <p:txBody>
+          <a:bodyPr rtlCol="0" anchor="ctr"/>
+          <a:lstStyle/>
+          <a:p>
+            <a:pPr algn="ctr"/>
+            <a:endParaRPr lang="it-IT"/>
+          </a:p>
+        </p:txBody>
+      </p:sp>
+      <p:sp>
+        <p:nvSpPr>
+          <p:cNvPr id="31" name="Ovale 30">
+            <a:extLst>
+              <a:ext uri="{FF2B5EF4-FFF2-40B4-BE49-F238E27FC236}">
+                <a16:creationId xmlns:a16="http://schemas.microsoft.com/office/drawing/2014/main" id="{3EEBD550-F28D-0BA9-EF7F-B2B2C852397E}"/>
+              </a:ext>
+            </a:extLst>
+          </p:cNvPr>
+          <p:cNvSpPr/>
+          <p:nvPr/>
+        </p:nvSpPr>
+        <p:spPr>
+          <a:xfrm>
+            <a:off x="7666274" y="2309319"/>
+            <a:ext cx="1428453" cy="1065229"/>
+          </a:xfrm>
+          <a:prstGeom prst="ellipse">
+            <a:avLst/>
+          </a:prstGeom>
+          <a:ln>
+            <a:solidFill>
+              <a:schemeClr val="tx1">
+                <a:lumMod val="75000"/>
+                <a:lumOff val="25000"/>
+              </a:schemeClr>
+            </a:solidFill>
+          </a:ln>
+        </p:spPr>
+        <p:style>
+          <a:lnRef idx="2">
+            <a:schemeClr val="accent6"/>
+          </a:lnRef>
+          <a:fillRef idx="1">
+            <a:schemeClr val="lt1"/>
+          </a:fillRef>
+          <a:effectRef idx="0">
+            <a:schemeClr val="accent6"/>
+          </a:effectRef>
+          <a:fontRef idx="minor">
+            <a:schemeClr val="dk1"/>
+          </a:fontRef>
+        </p:style>
+        <p:txBody>
+          <a:bodyPr rtlCol="0" anchor="ctr"/>
+          <a:lstStyle/>
+          <a:p>
+            <a:pPr algn="ctr"/>
+            <a:endParaRPr lang="it-IT"/>
+          </a:p>
+        </p:txBody>
+      </p:sp>
+      <p:pic>
+        <p:nvPicPr>
+          <p:cNvPr id="30" name="Immagine 29">
+            <a:extLst>
+              <a:ext uri="{FF2B5EF4-FFF2-40B4-BE49-F238E27FC236}">
+                <a16:creationId xmlns:a16="http://schemas.microsoft.com/office/drawing/2014/main" id="{D7C6DD75-DA21-41F8-82A0-99CE17F7A6FC}"/>
+              </a:ext>
+            </a:extLst>
+          </p:cNvPr>
+          <p:cNvPicPr>
+            <a:picLocks noChangeAspect="1"/>
+          </p:cNvPicPr>
+          <p:nvPr/>
+        </p:nvPicPr>
+        <p:blipFill>
+          <a:blip r:embed="rId3">
+            <a:extLst>
+              <a:ext uri="{28A0092B-C50C-407E-A947-70E740481C1C}">
+                <a14:useLocalDpi xmlns:a14="http://schemas.microsoft.com/office/drawing/2010/main" val="0"/>
+              </a:ext>
+            </a:extLst>
+          </a:blip>
+          <a:stretch>
+            <a:fillRect/>
+          </a:stretch>
+        </p:blipFill>
+        <p:spPr>
+          <a:xfrm>
+            <a:off x="8086042" y="2547475"/>
+            <a:ext cx="588916" cy="588916"/>
+          </a:xfrm>
+          <a:prstGeom prst="rect">
+            <a:avLst/>
+          </a:prstGeom>
+        </p:spPr>
+      </p:pic>
+      <p:sp>
+        <p:nvSpPr>
+          <p:cNvPr id="61" name="Ovale 60">
+            <a:extLst>
+              <a:ext uri="{FF2B5EF4-FFF2-40B4-BE49-F238E27FC236}">
+                <a16:creationId xmlns:a16="http://schemas.microsoft.com/office/drawing/2014/main" id="{394824FE-2C1A-B9E8-F984-3EAAA4AFAAC2}"/>
+              </a:ext>
+            </a:extLst>
+          </p:cNvPr>
+          <p:cNvSpPr/>
+          <p:nvPr/>
+        </p:nvSpPr>
+        <p:spPr>
+          <a:xfrm>
+            <a:off x="5684343" y="2281138"/>
+            <a:ext cx="1428453" cy="1065229"/>
+          </a:xfrm>
+          <a:prstGeom prst="ellipse">
+            <a:avLst/>
+          </a:prstGeom>
+          <a:ln>
+            <a:solidFill>
+              <a:schemeClr val="tx1">
+                <a:lumMod val="75000"/>
+                <a:lumOff val="25000"/>
+              </a:schemeClr>
+            </a:solidFill>
+          </a:ln>
+        </p:spPr>
+        <p:style>
+          <a:lnRef idx="2">
+            <a:schemeClr val="accent6"/>
+          </a:lnRef>
+          <a:fillRef idx="1">
+            <a:schemeClr val="lt1"/>
+          </a:fillRef>
+          <a:effectRef idx="0">
+            <a:schemeClr val="accent6"/>
+          </a:effectRef>
+          <a:fontRef idx="minor">
+            <a:schemeClr val="dk1"/>
+          </a:fontRef>
+        </p:style>
+        <p:txBody>
+          <a:bodyPr rtlCol="0" anchor="ctr"/>
+          <a:lstStyle/>
+          <a:p>
+            <a:pPr algn="ctr"/>
+            <a:endParaRPr lang="it-IT"/>
+          </a:p>
+        </p:txBody>
+      </p:sp>
+      <p:pic>
+        <p:nvPicPr>
+          <p:cNvPr id="54" name="Immagine 53">
+            <a:extLst>
+              <a:ext uri="{FF2B5EF4-FFF2-40B4-BE49-F238E27FC236}">
+                <a16:creationId xmlns:a16="http://schemas.microsoft.com/office/drawing/2014/main" id="{38C026D0-DA7D-9A7E-17C2-125E09578A01}"/>
+              </a:ext>
+            </a:extLst>
+          </p:cNvPr>
+          <p:cNvPicPr>
+            <a:picLocks noChangeAspect="1"/>
+          </p:cNvPicPr>
+          <p:nvPr/>
+        </p:nvPicPr>
+        <p:blipFill>
+          <a:blip r:embed="rId4">
+            <a:extLst>
+              <a:ext uri="{28A0092B-C50C-407E-A947-70E740481C1C}">
+                <a14:useLocalDpi xmlns:a14="http://schemas.microsoft.com/office/drawing/2010/main" val="0"/>
+              </a:ext>
+            </a:extLst>
+          </a:blip>
+          <a:stretch>
+            <a:fillRect/>
+          </a:stretch>
+        </p:blipFill>
+        <p:spPr>
+          <a:xfrm>
+            <a:off x="5878178" y="2511121"/>
+            <a:ext cx="1008769" cy="605261"/>
+          </a:xfrm>
+          <a:prstGeom prst="rect">
+            <a:avLst/>
+          </a:prstGeom>
+        </p:spPr>
+      </p:pic>
+      <p:sp>
+        <p:nvSpPr>
+          <p:cNvPr id="62" name="Ovale 61">
+            <a:extLst>
+              <a:ext uri="{FF2B5EF4-FFF2-40B4-BE49-F238E27FC236}">
+                <a16:creationId xmlns:a16="http://schemas.microsoft.com/office/drawing/2014/main" id="{9C269668-8E5B-B6C1-85A9-FADC2A47EE9E}"/>
+              </a:ext>
+            </a:extLst>
+          </p:cNvPr>
+          <p:cNvSpPr/>
+          <p:nvPr/>
+        </p:nvSpPr>
+        <p:spPr>
+          <a:xfrm>
+            <a:off x="3541665" y="2309319"/>
+            <a:ext cx="1428453" cy="1065229"/>
+          </a:xfrm>
+          <a:prstGeom prst="ellipse">
+            <a:avLst/>
+          </a:prstGeom>
+          <a:ln>
+            <a:solidFill>
+              <a:schemeClr val="tx1">
+                <a:lumMod val="75000"/>
+                <a:lumOff val="25000"/>
+              </a:schemeClr>
+            </a:solidFill>
+          </a:ln>
+        </p:spPr>
+        <p:style>
+          <a:lnRef idx="2">
+            <a:schemeClr val="accent6"/>
+          </a:lnRef>
+          <a:fillRef idx="1">
+            <a:schemeClr val="lt1"/>
+          </a:fillRef>
+          <a:effectRef idx="0">
+            <a:schemeClr val="accent6"/>
+          </a:effectRef>
+          <a:fontRef idx="minor">
+            <a:schemeClr val="dk1"/>
+          </a:fontRef>
+        </p:style>
+        <p:txBody>
+          <a:bodyPr rtlCol="0" anchor="ctr"/>
+          <a:lstStyle/>
+          <a:p>
+            <a:pPr algn="ctr"/>
+            <a:endParaRPr lang="it-IT" dirty="0"/>
+          </a:p>
+        </p:txBody>
+      </p:sp>
+      <p:pic>
+        <p:nvPicPr>
+          <p:cNvPr id="13" name="Immagine 12">
+            <a:extLst>
+              <a:ext uri="{FF2B5EF4-FFF2-40B4-BE49-F238E27FC236}">
+                <a16:creationId xmlns:a16="http://schemas.microsoft.com/office/drawing/2014/main" id="{7D476A88-65B9-0356-7934-D10A17830E9B}"/>
+              </a:ext>
+            </a:extLst>
+          </p:cNvPr>
+          <p:cNvPicPr>
+            <a:picLocks noChangeAspect="1"/>
+          </p:cNvPicPr>
+          <p:nvPr/>
+        </p:nvPicPr>
+        <p:blipFill>
+          <a:blip r:embed="rId5">
+            <a:extLst>
+              <a:ext uri="{28A0092B-C50C-407E-A947-70E740481C1C}">
+                <a14:useLocalDpi xmlns:a14="http://schemas.microsoft.com/office/drawing/2010/main" val="0"/>
+              </a:ext>
+            </a:extLst>
+          </a:blip>
+          <a:stretch>
+            <a:fillRect/>
+          </a:stretch>
+        </p:blipFill>
+        <p:spPr>
+          <a:xfrm>
+            <a:off x="3724182" y="2511415"/>
+            <a:ext cx="1068699" cy="631713"/>
+          </a:xfrm>
+          <a:prstGeom prst="rect">
+            <a:avLst/>
+          </a:prstGeom>
+        </p:spPr>
+      </p:pic>
+      <p:cxnSp>
+        <p:nvCxnSpPr>
+          <p:cNvPr id="64" name="Connettore curvo 63">
+            <a:extLst>
+              <a:ext uri="{FF2B5EF4-FFF2-40B4-BE49-F238E27FC236}">
+                <a16:creationId xmlns:a16="http://schemas.microsoft.com/office/drawing/2014/main" id="{DD5C803D-98C5-02F9-983B-F15A96A6C7E1}"/>
+              </a:ext>
+            </a:extLst>
+          </p:cNvPr>
+          <p:cNvCxnSpPr>
+            <a:cxnSpLocks/>
+            <a:endCxn id="22" idx="2"/>
+          </p:cNvCxnSpPr>
+          <p:nvPr/>
+        </p:nvCxnSpPr>
+        <p:spPr>
+          <a:xfrm>
+            <a:off x="4271752" y="3374548"/>
+            <a:ext cx="1418453" cy="1171761"/>
+          </a:xfrm>
+          <a:prstGeom prst="curvedConnector3">
+            <a:avLst>
+              <a:gd name="adj1" fmla="val 821"/>
+            </a:avLst>
+          </a:prstGeom>
+          <a:ln>
+            <a:solidFill>
+              <a:schemeClr val="tx1">
+                <a:lumMod val="75000"/>
+                <a:lumOff val="25000"/>
+              </a:schemeClr>
+            </a:solidFill>
+            <a:tailEnd type="triangle"/>
+          </a:ln>
+        </p:spPr>
+        <p:style>
+          <a:lnRef idx="1">
+            <a:schemeClr val="accent1"/>
+          </a:lnRef>
+          <a:fillRef idx="0">
+            <a:schemeClr val="accent1"/>
+          </a:fillRef>
+          <a:effectRef idx="0">
+            <a:schemeClr val="accent1"/>
+          </a:effectRef>
+          <a:fontRef idx="minor">
+            <a:schemeClr val="tx1"/>
+          </a:fontRef>
+        </p:style>
+      </p:cxnSp>
+      <p:cxnSp>
+        <p:nvCxnSpPr>
+          <p:cNvPr id="66" name="Connettore curvo 65">
+            <a:extLst>
+              <a:ext uri="{FF2B5EF4-FFF2-40B4-BE49-F238E27FC236}">
+                <a16:creationId xmlns:a16="http://schemas.microsoft.com/office/drawing/2014/main" id="{001014B6-84B3-3D22-CE00-A40D06D4A06D}"/>
+              </a:ext>
+            </a:extLst>
+          </p:cNvPr>
+          <p:cNvCxnSpPr>
+            <a:cxnSpLocks/>
+          </p:cNvCxnSpPr>
+          <p:nvPr/>
+        </p:nvCxnSpPr>
+        <p:spPr>
+          <a:xfrm rot="10800000" flipV="1">
+            <a:off x="7092798" y="3374548"/>
+            <a:ext cx="1367466" cy="1165875"/>
+          </a:xfrm>
+          <a:prstGeom prst="curvedConnector3">
+            <a:avLst>
+              <a:gd name="adj1" fmla="val -1013"/>
+            </a:avLst>
+          </a:prstGeom>
+          <a:ln>
+            <a:solidFill>
+              <a:schemeClr val="tx1">
+                <a:lumMod val="75000"/>
+                <a:lumOff val="25000"/>
+              </a:schemeClr>
+            </a:solidFill>
+            <a:tailEnd type="triangle"/>
+          </a:ln>
+        </p:spPr>
+        <p:style>
+          <a:lnRef idx="1">
+            <a:schemeClr val="accent1"/>
+          </a:lnRef>
+          <a:fillRef idx="0">
+            <a:schemeClr val="accent1"/>
+          </a:fillRef>
+          <a:effectRef idx="0">
+            <a:schemeClr val="accent1"/>
+          </a:effectRef>
+          <a:fontRef idx="minor">
+            <a:schemeClr val="tx1"/>
+          </a:fontRef>
+        </p:style>
+      </p:cxnSp>
+      <p:cxnSp>
+        <p:nvCxnSpPr>
+          <p:cNvPr id="75" name="Connettore 2 74">
+            <a:extLst>
+              <a:ext uri="{FF2B5EF4-FFF2-40B4-BE49-F238E27FC236}">
+                <a16:creationId xmlns:a16="http://schemas.microsoft.com/office/drawing/2014/main" id="{5AC2A8C5-E168-E200-0223-FF3338099C3B}"/>
+              </a:ext>
+            </a:extLst>
+          </p:cNvPr>
+          <p:cNvCxnSpPr>
+            <a:cxnSpLocks/>
+          </p:cNvCxnSpPr>
+          <p:nvPr/>
+        </p:nvCxnSpPr>
+        <p:spPr>
+          <a:xfrm>
+            <a:off x="6398570" y="3346367"/>
+            <a:ext cx="0" cy="667327"/>
+          </a:xfrm>
+          <a:prstGeom prst="straightConnector1">
+            <a:avLst/>
+          </a:prstGeom>
+          <a:ln>
+            <a:solidFill>
+              <a:schemeClr val="tx1">
+                <a:lumMod val="75000"/>
+                <a:lumOff val="25000"/>
+              </a:schemeClr>
+            </a:solidFill>
+            <a:tailEnd type="triangle"/>
+          </a:ln>
+        </p:spPr>
+        <p:style>
+          <a:lnRef idx="1">
+            <a:schemeClr val="accent1"/>
+          </a:lnRef>
+          <a:fillRef idx="0">
+            <a:schemeClr val="accent1"/>
+          </a:fillRef>
+          <a:effectRef idx="0">
+            <a:schemeClr val="accent1"/>
+          </a:effectRef>
+          <a:fontRef idx="minor">
+            <a:schemeClr val="tx1"/>
+          </a:fontRef>
+        </p:style>
+      </p:cxnSp>
+      <p:sp>
+        <p:nvSpPr>
+          <p:cNvPr id="83" name="Ovale 82">
+            <a:extLst>
+              <a:ext uri="{FF2B5EF4-FFF2-40B4-BE49-F238E27FC236}">
+                <a16:creationId xmlns:a16="http://schemas.microsoft.com/office/drawing/2014/main" id="{CFE04B0D-2C15-5B93-B8C2-3C110C603A48}"/>
+              </a:ext>
+            </a:extLst>
+          </p:cNvPr>
+          <p:cNvSpPr/>
+          <p:nvPr/>
+        </p:nvSpPr>
+        <p:spPr>
+          <a:xfrm>
+            <a:off x="5698525" y="5695115"/>
+            <a:ext cx="1428388" cy="1065229"/>
+          </a:xfrm>
+          <a:prstGeom prst="ellipse">
+            <a:avLst/>
+          </a:prstGeom>
+          <a:ln>
+            <a:solidFill>
+              <a:schemeClr val="tx1">
+                <a:lumMod val="75000"/>
+                <a:lumOff val="25000"/>
+              </a:schemeClr>
+            </a:solidFill>
+          </a:ln>
+        </p:spPr>
+        <p:style>
+          <a:lnRef idx="2">
+            <a:schemeClr val="accent6"/>
+          </a:lnRef>
+          <a:fillRef idx="1">
+            <a:schemeClr val="lt1"/>
+          </a:fillRef>
+          <a:effectRef idx="0">
+            <a:schemeClr val="accent6"/>
+          </a:effectRef>
+          <a:fontRef idx="minor">
+            <a:schemeClr val="dk1"/>
+          </a:fontRef>
+        </p:style>
+        <p:txBody>
+          <a:bodyPr rtlCol="0" anchor="ctr"/>
+          <a:lstStyle/>
+          <a:p>
+            <a:pPr algn="ctr"/>
+            <a:endParaRPr lang="it-IT"/>
+          </a:p>
+        </p:txBody>
+      </p:sp>
+      <p:cxnSp>
+        <p:nvCxnSpPr>
+          <p:cNvPr id="84" name="Connettore 2 83">
+            <a:extLst>
+              <a:ext uri="{FF2B5EF4-FFF2-40B4-BE49-F238E27FC236}">
+                <a16:creationId xmlns:a16="http://schemas.microsoft.com/office/drawing/2014/main" id="{CE9D0A95-1664-2C18-2827-DEEF8A957980}"/>
+              </a:ext>
+            </a:extLst>
+          </p:cNvPr>
+          <p:cNvCxnSpPr>
+            <a:cxnSpLocks/>
+          </p:cNvCxnSpPr>
+          <p:nvPr/>
+        </p:nvCxnSpPr>
+        <p:spPr>
+          <a:xfrm>
+            <a:off x="6398570" y="5078923"/>
+            <a:ext cx="0" cy="616192"/>
+          </a:xfrm>
+          <a:prstGeom prst="straightConnector1">
+            <a:avLst/>
+          </a:prstGeom>
+          <a:ln>
+            <a:solidFill>
+              <a:schemeClr val="tx1">
+                <a:lumMod val="75000"/>
+                <a:lumOff val="25000"/>
+              </a:schemeClr>
+            </a:solidFill>
+            <a:tailEnd type="triangle"/>
+          </a:ln>
+        </p:spPr>
+        <p:style>
+          <a:lnRef idx="1">
+            <a:schemeClr val="accent1"/>
+          </a:lnRef>
+          <a:fillRef idx="0">
+            <a:schemeClr val="accent1"/>
+          </a:fillRef>
+          <a:effectRef idx="0">
+            <a:schemeClr val="accent1"/>
+          </a:effectRef>
+          <a:fontRef idx="minor">
+            <a:schemeClr val="tx1"/>
+          </a:fontRef>
+        </p:style>
+      </p:cxnSp>
+      <p:pic>
+        <p:nvPicPr>
+          <p:cNvPr id="87" name="Immagine 86">
+            <a:extLst>
+              <a:ext uri="{FF2B5EF4-FFF2-40B4-BE49-F238E27FC236}">
+                <a16:creationId xmlns:a16="http://schemas.microsoft.com/office/drawing/2014/main" id="{F242960E-8CB5-44EA-BFEF-B08B5778C587}"/>
+              </a:ext>
+            </a:extLst>
+          </p:cNvPr>
+          <p:cNvPicPr>
+            <a:picLocks noChangeAspect="1"/>
+          </p:cNvPicPr>
+          <p:nvPr/>
+        </p:nvPicPr>
+        <p:blipFill>
+          <a:blip r:embed="rId6">
+            <a:extLst>
+              <a:ext uri="{28A0092B-C50C-407E-A947-70E740481C1C}">
+                <a14:useLocalDpi xmlns:a14="http://schemas.microsoft.com/office/drawing/2010/main" val="0"/>
+              </a:ext>
+            </a:extLst>
+          </a:blip>
+          <a:stretch>
+            <a:fillRect/>
+          </a:stretch>
+        </p:blipFill>
+        <p:spPr>
+          <a:xfrm>
+            <a:off x="5983812" y="5848746"/>
+            <a:ext cx="857814" cy="857814"/>
+          </a:xfrm>
+          <a:prstGeom prst="rect">
+            <a:avLst/>
+          </a:prstGeom>
+        </p:spPr>
+      </p:pic>
+      <p:pic>
+        <p:nvPicPr>
+          <p:cNvPr id="94" name="Immagine 93">
+            <a:extLst>
+              <a:ext uri="{FF2B5EF4-FFF2-40B4-BE49-F238E27FC236}">
+                <a16:creationId xmlns:a16="http://schemas.microsoft.com/office/drawing/2014/main" id="{86D39A12-3E2B-DE2B-3357-1195F1B88C02}"/>
+              </a:ext>
+            </a:extLst>
+          </p:cNvPr>
+          <p:cNvPicPr>
+            <a:picLocks noChangeAspect="1"/>
+          </p:cNvPicPr>
+          <p:nvPr/>
+        </p:nvPicPr>
+        <p:blipFill>
+          <a:blip r:embed="rId7">
+            <a:extLst>
+              <a:ext uri="{28A0092B-C50C-407E-A947-70E740481C1C}">
+                <a14:useLocalDpi xmlns:a14="http://schemas.microsoft.com/office/drawing/2010/main" val="0"/>
+              </a:ext>
+            </a:extLst>
+          </a:blip>
+          <a:stretch>
+            <a:fillRect/>
+          </a:stretch>
+        </p:blipFill>
+        <p:spPr>
+          <a:xfrm>
+            <a:off x="5992497" y="4167325"/>
+            <a:ext cx="806217" cy="699243"/>
+          </a:xfrm>
+          <a:prstGeom prst="rect">
+            <a:avLst/>
+          </a:prstGeom>
+        </p:spPr>
+      </p:pic>
+    </p:spTree>
+    <p:extLst>
+      <p:ext uri="{BB962C8B-B14F-4D97-AF65-F5344CB8AC3E}">
+        <p14:creationId xmlns:p14="http://schemas.microsoft.com/office/powerpoint/2010/main" val="4047131637"/>
+      </p:ext>
+    </p:extLst>
+  </p:cSld>
+  <p:clrMapOvr>
+    <a:masterClrMapping/>
+  </p:clrMapOvr>
+  <p:timing>
+    <p:tnLst>
+      <p:par>
+        <p:cTn id="1" dur="indefinite" restart="never" nodeType="tmRoot">
+          <p:childTnLst>
+            <p:seq concurrent="1" nextAc="seek">
+              <p:cTn id="2" dur="indefinite" nodeType="mainSeq">
+                <p:childTnLst>
+                  <p:par>
+                    <p:cTn id="3" fill="hold">
+                      <p:stCondLst>
+                        <p:cond delay="indefinite"/>
+                      </p:stCondLst>
+                      <p:childTnLst>
+                        <p:par>
+                          <p:cTn id="4" fill="hold">
+                            <p:stCondLst>
+                              <p:cond delay="0"/>
+                            </p:stCondLst>
+                            <p:childTnLst>
+                              <p:par>
+                                <p:cTn id="5" presetID="42" presetClass="entr" presetSubtype="0" fill="hold" grpId="0" nodeType="clickEffect">
+                                  <p:stCondLst>
+                                    <p:cond delay="0"/>
+                                  </p:stCondLst>
+                                  <p:childTnLst>
+                                    <p:set>
+                                      <p:cBhvr>
+                                        <p:cTn id="6" dur="1" fill="hold">
+                                          <p:stCondLst>
+                                            <p:cond delay="0"/>
+                                          </p:stCondLst>
+                                        </p:cTn>
+                                        <p:tgtEl>
+                                          <p:spTgt spid="7"/>
+                                        </p:tgtEl>
+                                        <p:attrNameLst>
+                                          <p:attrName>style.visibility</p:attrName>
+                                        </p:attrNameLst>
+                                      </p:cBhvr>
+                                      <p:to>
+                                        <p:strVal val="visible"/>
+                                      </p:to>
+                                    </p:set>
+                                    <p:animEffect transition="in" filter="fade">
+                                      <p:cBhvr>
+                                        <p:cTn id="7" dur="1000"/>
+                                        <p:tgtEl>
+                                          <p:spTgt spid="7"/>
+                                        </p:tgtEl>
+                                      </p:cBhvr>
+                                    </p:animEffect>
+                                    <p:anim calcmode="lin" valueType="num">
+                                      <p:cBhvr>
+                                        <p:cTn id="8" dur="1000" fill="hold"/>
+                                        <p:tgtEl>
+                                          <p:spTgt spid="7"/>
+                                        </p:tgtEl>
+                                        <p:attrNameLst>
+                                          <p:attrName>ppt_x</p:attrName>
+                                        </p:attrNameLst>
+                                      </p:cBhvr>
+                                      <p:tavLst>
+                                        <p:tav tm="0">
+                                          <p:val>
+                                            <p:strVal val="#ppt_x"/>
+                                          </p:val>
+                                        </p:tav>
+                                        <p:tav tm="100000">
+                                          <p:val>
+                                            <p:strVal val="#ppt_x"/>
+                                          </p:val>
+                                        </p:tav>
+                                      </p:tavLst>
+                                    </p:anim>
+                                    <p:anim calcmode="lin" valueType="num">
+                                      <p:cBhvr>
+                                        <p:cTn id="9" dur="1000" fill="hold"/>
+                                        <p:tgtEl>
+                                          <p:spTgt spid="7"/>
+                                        </p:tgtEl>
+                                        <p:attrNameLst>
+                                          <p:attrName>ppt_y</p:attrName>
+                                        </p:attrNameLst>
+                                      </p:cBhvr>
+                                      <p:tavLst>
+                                        <p:tav tm="0">
+                                          <p:val>
+                                            <p:strVal val="#ppt_y+.1"/>
+                                          </p:val>
+                                        </p:tav>
+                                        <p:tav tm="100000">
+                                          <p:val>
+                                            <p:strVal val="#ppt_y"/>
+                                          </p:val>
+                                        </p:tav>
+                                      </p:tavLst>
+                                    </p:anim>
+                                  </p:childTnLst>
+                                </p:cTn>
+                              </p:par>
+                            </p:childTnLst>
+                          </p:cTn>
+                        </p:par>
+                      </p:childTnLst>
+                    </p:cTn>
+                  </p:par>
+                  <p:par>
+                    <p:cTn id="10" fill="hold">
+                      <p:stCondLst>
+                        <p:cond delay="indefinite"/>
+                      </p:stCondLst>
+                      <p:childTnLst>
+                        <p:par>
+                          <p:cTn id="11" fill="hold">
+                            <p:stCondLst>
+                              <p:cond delay="0"/>
+                            </p:stCondLst>
+                            <p:childTnLst>
+                              <p:par>
+                                <p:cTn id="12" presetID="42" presetClass="entr" presetSubtype="0" fill="hold" nodeType="clickEffect">
+                                  <p:stCondLst>
+                                    <p:cond delay="0"/>
+                                  </p:stCondLst>
+                                  <p:childTnLst>
+                                    <p:set>
+                                      <p:cBhvr>
+                                        <p:cTn id="13" dur="1" fill="hold">
+                                          <p:stCondLst>
+                                            <p:cond delay="0"/>
+                                          </p:stCondLst>
+                                        </p:cTn>
+                                        <p:tgtEl>
+                                          <p:spTgt spid="13"/>
+                                        </p:tgtEl>
+                                        <p:attrNameLst>
+                                          <p:attrName>style.visibility</p:attrName>
+                                        </p:attrNameLst>
+                                      </p:cBhvr>
+                                      <p:to>
+                                        <p:strVal val="visible"/>
+                                      </p:to>
+                                    </p:set>
+                                    <p:animEffect transition="in" filter="fade">
+                                      <p:cBhvr>
+                                        <p:cTn id="14" dur="1000"/>
+                                        <p:tgtEl>
+                                          <p:spTgt spid="13"/>
+                                        </p:tgtEl>
+                                      </p:cBhvr>
+                                    </p:animEffect>
+                                    <p:anim calcmode="lin" valueType="num">
+                                      <p:cBhvr>
+                                        <p:cTn id="15" dur="1000" fill="hold"/>
+                                        <p:tgtEl>
+                                          <p:spTgt spid="13"/>
+                                        </p:tgtEl>
+                                        <p:attrNameLst>
+                                          <p:attrName>ppt_x</p:attrName>
+                                        </p:attrNameLst>
+                                      </p:cBhvr>
+                                      <p:tavLst>
+                                        <p:tav tm="0">
+                                          <p:val>
+                                            <p:strVal val="#ppt_x"/>
+                                          </p:val>
+                                        </p:tav>
+                                        <p:tav tm="100000">
+                                          <p:val>
+                                            <p:strVal val="#ppt_x"/>
+                                          </p:val>
+                                        </p:tav>
+                                      </p:tavLst>
+                                    </p:anim>
+                                    <p:anim calcmode="lin" valueType="num">
+                                      <p:cBhvr>
+                                        <p:cTn id="16" dur="1000" fill="hold"/>
+                                        <p:tgtEl>
+                                          <p:spTgt spid="13"/>
+                                        </p:tgtEl>
+                                        <p:attrNameLst>
+                                          <p:attrName>ppt_y</p:attrName>
+                                        </p:attrNameLst>
+                                      </p:cBhvr>
+                                      <p:tavLst>
+                                        <p:tav tm="0">
+                                          <p:val>
+                                            <p:strVal val="#ppt_y+.1"/>
+                                          </p:val>
+                                        </p:tav>
+                                        <p:tav tm="100000">
+                                          <p:val>
+                                            <p:strVal val="#ppt_y"/>
+                                          </p:val>
+                                        </p:tav>
+                                      </p:tavLst>
+                                    </p:anim>
+                                  </p:childTnLst>
+                                </p:cTn>
+                              </p:par>
+                              <p:par>
+                                <p:cTn id="17" presetID="42" presetClass="entr" presetSubtype="0" fill="hold" nodeType="withEffect">
+                                  <p:stCondLst>
+                                    <p:cond delay="0"/>
+                                  </p:stCondLst>
+                                  <p:childTnLst>
+                                    <p:set>
+                                      <p:cBhvr>
+                                        <p:cTn id="18" dur="1" fill="hold">
+                                          <p:stCondLst>
+                                            <p:cond delay="0"/>
+                                          </p:stCondLst>
+                                        </p:cTn>
+                                        <p:tgtEl>
+                                          <p:spTgt spid="54"/>
+                                        </p:tgtEl>
+                                        <p:attrNameLst>
+                                          <p:attrName>style.visibility</p:attrName>
+                                        </p:attrNameLst>
+                                      </p:cBhvr>
+                                      <p:to>
+                                        <p:strVal val="visible"/>
+                                      </p:to>
+                                    </p:set>
+                                    <p:animEffect transition="in" filter="fade">
+                                      <p:cBhvr>
+                                        <p:cTn id="19" dur="1000"/>
+                                        <p:tgtEl>
+                                          <p:spTgt spid="54"/>
+                                        </p:tgtEl>
+                                      </p:cBhvr>
+                                    </p:animEffect>
+                                    <p:anim calcmode="lin" valueType="num">
+                                      <p:cBhvr>
+                                        <p:cTn id="20" dur="1000" fill="hold"/>
+                                        <p:tgtEl>
+                                          <p:spTgt spid="54"/>
+                                        </p:tgtEl>
+                                        <p:attrNameLst>
+                                          <p:attrName>ppt_x</p:attrName>
+                                        </p:attrNameLst>
+                                      </p:cBhvr>
+                                      <p:tavLst>
+                                        <p:tav tm="0">
+                                          <p:val>
+                                            <p:strVal val="#ppt_x"/>
+                                          </p:val>
+                                        </p:tav>
+                                        <p:tav tm="100000">
+                                          <p:val>
+                                            <p:strVal val="#ppt_x"/>
+                                          </p:val>
+                                        </p:tav>
+                                      </p:tavLst>
+                                    </p:anim>
+                                    <p:anim calcmode="lin" valueType="num">
+                                      <p:cBhvr>
+                                        <p:cTn id="21" dur="1000" fill="hold"/>
+                                        <p:tgtEl>
+                                          <p:spTgt spid="54"/>
+                                        </p:tgtEl>
+                                        <p:attrNameLst>
+                                          <p:attrName>ppt_y</p:attrName>
+                                        </p:attrNameLst>
+                                      </p:cBhvr>
+                                      <p:tavLst>
+                                        <p:tav tm="0">
+                                          <p:val>
+                                            <p:strVal val="#ppt_y+.1"/>
+                                          </p:val>
+                                        </p:tav>
+                                        <p:tav tm="100000">
+                                          <p:val>
+                                            <p:strVal val="#ppt_y"/>
+                                          </p:val>
+                                        </p:tav>
+                                      </p:tavLst>
+                                    </p:anim>
+                                  </p:childTnLst>
+                                </p:cTn>
+                              </p:par>
+                              <p:par>
+                                <p:cTn id="22" presetID="42" presetClass="entr" presetSubtype="0" fill="hold" nodeType="withEffect">
+                                  <p:stCondLst>
+                                    <p:cond delay="0"/>
+                                  </p:stCondLst>
+                                  <p:childTnLst>
+                                    <p:set>
+                                      <p:cBhvr>
+                                        <p:cTn id="23" dur="1" fill="hold">
+                                          <p:stCondLst>
+                                            <p:cond delay="0"/>
+                                          </p:stCondLst>
+                                        </p:cTn>
+                                        <p:tgtEl>
+                                          <p:spTgt spid="30"/>
+                                        </p:tgtEl>
+                                        <p:attrNameLst>
+                                          <p:attrName>style.visibility</p:attrName>
+                                        </p:attrNameLst>
+                                      </p:cBhvr>
+                                      <p:to>
+                                        <p:strVal val="visible"/>
+                                      </p:to>
+                                    </p:set>
+                                    <p:animEffect transition="in" filter="fade">
+                                      <p:cBhvr>
+                                        <p:cTn id="24" dur="1000"/>
+                                        <p:tgtEl>
+                                          <p:spTgt spid="30"/>
+                                        </p:tgtEl>
+                                      </p:cBhvr>
+                                    </p:animEffect>
+                                    <p:anim calcmode="lin" valueType="num">
+                                      <p:cBhvr>
+                                        <p:cTn id="25" dur="1000" fill="hold"/>
+                                        <p:tgtEl>
+                                          <p:spTgt spid="30"/>
+                                        </p:tgtEl>
+                                        <p:attrNameLst>
+                                          <p:attrName>ppt_x</p:attrName>
+                                        </p:attrNameLst>
+                                      </p:cBhvr>
+                                      <p:tavLst>
+                                        <p:tav tm="0">
+                                          <p:val>
+                                            <p:strVal val="#ppt_x"/>
+                                          </p:val>
+                                        </p:tav>
+                                        <p:tav tm="100000">
+                                          <p:val>
+                                            <p:strVal val="#ppt_x"/>
+                                          </p:val>
+                                        </p:tav>
+                                      </p:tavLst>
+                                    </p:anim>
+                                    <p:anim calcmode="lin" valueType="num">
+                                      <p:cBhvr>
+                                        <p:cTn id="26" dur="1000" fill="hold"/>
+                                        <p:tgtEl>
+                                          <p:spTgt spid="30"/>
+                                        </p:tgtEl>
+                                        <p:attrNameLst>
+                                          <p:attrName>ppt_y</p:attrName>
+                                        </p:attrNameLst>
+                                      </p:cBhvr>
+                                      <p:tavLst>
+                                        <p:tav tm="0">
+                                          <p:val>
+                                            <p:strVal val="#ppt_y+.1"/>
+                                          </p:val>
+                                        </p:tav>
+                                        <p:tav tm="100000">
+                                          <p:val>
+                                            <p:strVal val="#ppt_y"/>
+                                          </p:val>
+                                        </p:tav>
+                                      </p:tavLst>
+                                    </p:anim>
+                                  </p:childTnLst>
+                                </p:cTn>
+                              </p:par>
+                              <p:par>
+                                <p:cTn id="27" presetID="42" presetClass="entr" presetSubtype="0" fill="hold" grpId="0" nodeType="withEffect">
+                                  <p:stCondLst>
+                                    <p:cond delay="0"/>
+                                  </p:stCondLst>
+                                  <p:childTnLst>
+                                    <p:set>
+                                      <p:cBhvr>
+                                        <p:cTn id="28" dur="1" fill="hold">
+                                          <p:stCondLst>
+                                            <p:cond delay="0"/>
+                                          </p:stCondLst>
+                                        </p:cTn>
+                                        <p:tgtEl>
+                                          <p:spTgt spid="31"/>
+                                        </p:tgtEl>
+                                        <p:attrNameLst>
+                                          <p:attrName>style.visibility</p:attrName>
+                                        </p:attrNameLst>
+                                      </p:cBhvr>
+                                      <p:to>
+                                        <p:strVal val="visible"/>
+                                      </p:to>
+                                    </p:set>
+                                    <p:animEffect transition="in" filter="fade">
+                                      <p:cBhvr>
+                                        <p:cTn id="29" dur="1000"/>
+                                        <p:tgtEl>
+                                          <p:spTgt spid="31"/>
+                                        </p:tgtEl>
+                                      </p:cBhvr>
+                                    </p:animEffect>
+                                    <p:anim calcmode="lin" valueType="num">
+                                      <p:cBhvr>
+                                        <p:cTn id="30" dur="1000" fill="hold"/>
+                                        <p:tgtEl>
+                                          <p:spTgt spid="31"/>
+                                        </p:tgtEl>
+                                        <p:attrNameLst>
+                                          <p:attrName>ppt_x</p:attrName>
+                                        </p:attrNameLst>
+                                      </p:cBhvr>
+                                      <p:tavLst>
+                                        <p:tav tm="0">
+                                          <p:val>
+                                            <p:strVal val="#ppt_x"/>
+                                          </p:val>
+                                        </p:tav>
+                                        <p:tav tm="100000">
+                                          <p:val>
+                                            <p:strVal val="#ppt_x"/>
+                                          </p:val>
+                                        </p:tav>
+                                      </p:tavLst>
+                                    </p:anim>
+                                    <p:anim calcmode="lin" valueType="num">
+                                      <p:cBhvr>
+                                        <p:cTn id="31" dur="1000" fill="hold"/>
+                                        <p:tgtEl>
+                                          <p:spTgt spid="31"/>
+                                        </p:tgtEl>
+                                        <p:attrNameLst>
+                                          <p:attrName>ppt_y</p:attrName>
+                                        </p:attrNameLst>
+                                      </p:cBhvr>
+                                      <p:tavLst>
+                                        <p:tav tm="0">
+                                          <p:val>
+                                            <p:strVal val="#ppt_y+.1"/>
+                                          </p:val>
+                                        </p:tav>
+                                        <p:tav tm="100000">
+                                          <p:val>
+                                            <p:strVal val="#ppt_y"/>
+                                          </p:val>
+                                        </p:tav>
+                                      </p:tavLst>
+                                    </p:anim>
+                                  </p:childTnLst>
+                                </p:cTn>
+                              </p:par>
+                              <p:par>
+                                <p:cTn id="32" presetID="42" presetClass="entr" presetSubtype="0" fill="hold" grpId="0" nodeType="withEffect">
+                                  <p:stCondLst>
+                                    <p:cond delay="0"/>
+                                  </p:stCondLst>
+                                  <p:childTnLst>
+                                    <p:set>
+                                      <p:cBhvr>
+                                        <p:cTn id="33" dur="1" fill="hold">
+                                          <p:stCondLst>
+                                            <p:cond delay="0"/>
+                                          </p:stCondLst>
+                                        </p:cTn>
+                                        <p:tgtEl>
+                                          <p:spTgt spid="61"/>
+                                        </p:tgtEl>
+                                        <p:attrNameLst>
+                                          <p:attrName>style.visibility</p:attrName>
+                                        </p:attrNameLst>
+                                      </p:cBhvr>
+                                      <p:to>
+                                        <p:strVal val="visible"/>
+                                      </p:to>
+                                    </p:set>
+                                    <p:animEffect transition="in" filter="fade">
+                                      <p:cBhvr>
+                                        <p:cTn id="34" dur="1000"/>
+                                        <p:tgtEl>
+                                          <p:spTgt spid="61"/>
+                                        </p:tgtEl>
+                                      </p:cBhvr>
+                                    </p:animEffect>
+                                    <p:anim calcmode="lin" valueType="num">
+                                      <p:cBhvr>
+                                        <p:cTn id="35" dur="1000" fill="hold"/>
+                                        <p:tgtEl>
+                                          <p:spTgt spid="61"/>
+                                        </p:tgtEl>
+                                        <p:attrNameLst>
+                                          <p:attrName>ppt_x</p:attrName>
+                                        </p:attrNameLst>
+                                      </p:cBhvr>
+                                      <p:tavLst>
+                                        <p:tav tm="0">
+                                          <p:val>
+                                            <p:strVal val="#ppt_x"/>
+                                          </p:val>
+                                        </p:tav>
+                                        <p:tav tm="100000">
+                                          <p:val>
+                                            <p:strVal val="#ppt_x"/>
+                                          </p:val>
+                                        </p:tav>
+                                      </p:tavLst>
+                                    </p:anim>
+                                    <p:anim calcmode="lin" valueType="num">
+                                      <p:cBhvr>
+                                        <p:cTn id="36" dur="1000" fill="hold"/>
+                                        <p:tgtEl>
+                                          <p:spTgt spid="61"/>
+                                        </p:tgtEl>
+                                        <p:attrNameLst>
+                                          <p:attrName>ppt_y</p:attrName>
+                                        </p:attrNameLst>
+                                      </p:cBhvr>
+                                      <p:tavLst>
+                                        <p:tav tm="0">
+                                          <p:val>
+                                            <p:strVal val="#ppt_y+.1"/>
+                                          </p:val>
+                                        </p:tav>
+                                        <p:tav tm="100000">
+                                          <p:val>
+                                            <p:strVal val="#ppt_y"/>
+                                          </p:val>
+                                        </p:tav>
+                                      </p:tavLst>
+                                    </p:anim>
+                                  </p:childTnLst>
+                                </p:cTn>
+                              </p:par>
+                              <p:par>
+                                <p:cTn id="37" presetID="42" presetClass="entr" presetSubtype="0" fill="hold" grpId="0" nodeType="withEffect">
+                                  <p:stCondLst>
+                                    <p:cond delay="0"/>
+                                  </p:stCondLst>
+                                  <p:childTnLst>
+                                    <p:set>
+                                      <p:cBhvr>
+                                        <p:cTn id="38" dur="1" fill="hold">
+                                          <p:stCondLst>
+                                            <p:cond delay="0"/>
+                                          </p:stCondLst>
+                                        </p:cTn>
+                                        <p:tgtEl>
+                                          <p:spTgt spid="62"/>
+                                        </p:tgtEl>
+                                        <p:attrNameLst>
+                                          <p:attrName>style.visibility</p:attrName>
+                                        </p:attrNameLst>
+                                      </p:cBhvr>
+                                      <p:to>
+                                        <p:strVal val="visible"/>
+                                      </p:to>
+                                    </p:set>
+                                    <p:animEffect transition="in" filter="fade">
+                                      <p:cBhvr>
+                                        <p:cTn id="39" dur="1000"/>
+                                        <p:tgtEl>
+                                          <p:spTgt spid="62"/>
+                                        </p:tgtEl>
+                                      </p:cBhvr>
+                                    </p:animEffect>
+                                    <p:anim calcmode="lin" valueType="num">
+                                      <p:cBhvr>
+                                        <p:cTn id="40" dur="1000" fill="hold"/>
+                                        <p:tgtEl>
+                                          <p:spTgt spid="62"/>
+                                        </p:tgtEl>
+                                        <p:attrNameLst>
+                                          <p:attrName>ppt_x</p:attrName>
+                                        </p:attrNameLst>
+                                      </p:cBhvr>
+                                      <p:tavLst>
+                                        <p:tav tm="0">
+                                          <p:val>
+                                            <p:strVal val="#ppt_x"/>
+                                          </p:val>
+                                        </p:tav>
+                                        <p:tav tm="100000">
+                                          <p:val>
+                                            <p:strVal val="#ppt_x"/>
+                                          </p:val>
+                                        </p:tav>
+                                      </p:tavLst>
+                                    </p:anim>
+                                    <p:anim calcmode="lin" valueType="num">
+                                      <p:cBhvr>
+                                        <p:cTn id="41" dur="1000" fill="hold"/>
+                                        <p:tgtEl>
+                                          <p:spTgt spid="62"/>
+                                        </p:tgtEl>
+                                        <p:attrNameLst>
+                                          <p:attrName>ppt_y</p:attrName>
+                                        </p:attrNameLst>
+                                      </p:cBhvr>
+                                      <p:tavLst>
+                                        <p:tav tm="0">
+                                          <p:val>
+                                            <p:strVal val="#ppt_y+.1"/>
+                                          </p:val>
+                                        </p:tav>
+                                        <p:tav tm="100000">
+                                          <p:val>
+                                            <p:strVal val="#ppt_y"/>
+                                          </p:val>
+                                        </p:tav>
+                                      </p:tavLst>
+                                    </p:anim>
+                                  </p:childTnLst>
+                                </p:cTn>
+                              </p:par>
+                            </p:childTnLst>
+                          </p:cTn>
+                        </p:par>
+                      </p:childTnLst>
+                    </p:cTn>
+                  </p:par>
+                  <p:par>
+                    <p:cTn id="42" fill="hold">
+                      <p:stCondLst>
+                        <p:cond delay="indefinite"/>
+                      </p:stCondLst>
+                      <p:childTnLst>
+                        <p:par>
+                          <p:cTn id="43" fill="hold">
+                            <p:stCondLst>
+                              <p:cond delay="0"/>
+                            </p:stCondLst>
+                            <p:childTnLst>
+                              <p:par>
+                                <p:cTn id="44" presetID="10" presetClass="entr" presetSubtype="0" fill="hold" nodeType="clickEffect">
+                                  <p:stCondLst>
+                                    <p:cond delay="0"/>
+                                  </p:stCondLst>
+                                  <p:childTnLst>
+                                    <p:set>
+                                      <p:cBhvr>
+                                        <p:cTn id="45" dur="1" fill="hold">
+                                          <p:stCondLst>
+                                            <p:cond delay="0"/>
+                                          </p:stCondLst>
+                                        </p:cTn>
+                                        <p:tgtEl>
+                                          <p:spTgt spid="64"/>
+                                        </p:tgtEl>
+                                        <p:attrNameLst>
+                                          <p:attrName>style.visibility</p:attrName>
+                                        </p:attrNameLst>
+                                      </p:cBhvr>
+                                      <p:to>
+                                        <p:strVal val="visible"/>
+                                      </p:to>
+                                    </p:set>
+                                    <p:animEffect transition="in" filter="fade">
+                                      <p:cBhvr>
+                                        <p:cTn id="46" dur="500"/>
+                                        <p:tgtEl>
+                                          <p:spTgt spid="64"/>
+                                        </p:tgtEl>
+                                      </p:cBhvr>
+                                    </p:animEffect>
+                                  </p:childTnLst>
+                                </p:cTn>
+                              </p:par>
+                              <p:par>
+                                <p:cTn id="47" presetID="10" presetClass="entr" presetSubtype="0" fill="hold" nodeType="withEffect">
+                                  <p:stCondLst>
+                                    <p:cond delay="0"/>
+                                  </p:stCondLst>
+                                  <p:childTnLst>
+                                    <p:set>
+                                      <p:cBhvr>
+                                        <p:cTn id="48" dur="1" fill="hold">
+                                          <p:stCondLst>
+                                            <p:cond delay="0"/>
+                                          </p:stCondLst>
+                                        </p:cTn>
+                                        <p:tgtEl>
+                                          <p:spTgt spid="66"/>
+                                        </p:tgtEl>
+                                        <p:attrNameLst>
+                                          <p:attrName>style.visibility</p:attrName>
+                                        </p:attrNameLst>
+                                      </p:cBhvr>
+                                      <p:to>
+                                        <p:strVal val="visible"/>
+                                      </p:to>
+                                    </p:set>
+                                    <p:animEffect transition="in" filter="fade">
+                                      <p:cBhvr>
+                                        <p:cTn id="49" dur="500"/>
+                                        <p:tgtEl>
+                                          <p:spTgt spid="66"/>
+                                        </p:tgtEl>
+                                      </p:cBhvr>
+                                    </p:animEffect>
+                                  </p:childTnLst>
+                                </p:cTn>
+                              </p:par>
+                              <p:par>
+                                <p:cTn id="50" presetID="10" presetClass="entr" presetSubtype="0" fill="hold" nodeType="withEffect">
+                                  <p:stCondLst>
+                                    <p:cond delay="0"/>
+                                  </p:stCondLst>
+                                  <p:childTnLst>
+                                    <p:set>
+                                      <p:cBhvr>
+                                        <p:cTn id="51" dur="1" fill="hold">
+                                          <p:stCondLst>
+                                            <p:cond delay="0"/>
+                                          </p:stCondLst>
+                                        </p:cTn>
+                                        <p:tgtEl>
+                                          <p:spTgt spid="75"/>
+                                        </p:tgtEl>
+                                        <p:attrNameLst>
+                                          <p:attrName>style.visibility</p:attrName>
+                                        </p:attrNameLst>
+                                      </p:cBhvr>
+                                      <p:to>
+                                        <p:strVal val="visible"/>
+                                      </p:to>
+                                    </p:set>
+                                    <p:animEffect transition="in" filter="fade">
+                                      <p:cBhvr>
+                                        <p:cTn id="52" dur="500"/>
+                                        <p:tgtEl>
+                                          <p:spTgt spid="75"/>
+                                        </p:tgtEl>
+                                      </p:cBhvr>
+                                    </p:animEffect>
+                                  </p:childTnLst>
+                                </p:cTn>
+                              </p:par>
+                              <p:par>
+                                <p:cTn id="53" presetID="10" presetClass="entr" presetSubtype="0" fill="hold" nodeType="withEffect">
+                                  <p:stCondLst>
+                                    <p:cond delay="0"/>
+                                  </p:stCondLst>
+                                  <p:childTnLst>
+                                    <p:set>
+                                      <p:cBhvr>
+                                        <p:cTn id="54" dur="1" fill="hold">
+                                          <p:stCondLst>
+                                            <p:cond delay="0"/>
+                                          </p:stCondLst>
+                                        </p:cTn>
+                                        <p:tgtEl>
+                                          <p:spTgt spid="94"/>
+                                        </p:tgtEl>
+                                        <p:attrNameLst>
+                                          <p:attrName>style.visibility</p:attrName>
+                                        </p:attrNameLst>
+                                      </p:cBhvr>
+                                      <p:to>
+                                        <p:strVal val="visible"/>
+                                      </p:to>
+                                    </p:set>
+                                    <p:animEffect transition="in" filter="fade">
+                                      <p:cBhvr>
+                                        <p:cTn id="55" dur="500"/>
+                                        <p:tgtEl>
+                                          <p:spTgt spid="94"/>
+                                        </p:tgtEl>
+                                      </p:cBhvr>
+                                    </p:animEffect>
+                                  </p:childTnLst>
+                                </p:cTn>
+                              </p:par>
+                              <p:par>
+                                <p:cTn id="56" presetID="10" presetClass="entr" presetSubtype="0" fill="hold" grpId="0" nodeType="withEffect">
+                                  <p:stCondLst>
+                                    <p:cond delay="0"/>
+                                  </p:stCondLst>
+                                  <p:childTnLst>
+                                    <p:set>
+                                      <p:cBhvr>
+                                        <p:cTn id="57" dur="1" fill="hold">
+                                          <p:stCondLst>
+                                            <p:cond delay="0"/>
+                                          </p:stCondLst>
+                                        </p:cTn>
+                                        <p:tgtEl>
+                                          <p:spTgt spid="22"/>
+                                        </p:tgtEl>
+                                        <p:attrNameLst>
+                                          <p:attrName>style.visibility</p:attrName>
+                                        </p:attrNameLst>
+                                      </p:cBhvr>
+                                      <p:to>
+                                        <p:strVal val="visible"/>
+                                      </p:to>
+                                    </p:set>
+                                    <p:animEffect transition="in" filter="fade">
+                                      <p:cBhvr>
+                                        <p:cTn id="58" dur="500"/>
+                                        <p:tgtEl>
+                                          <p:spTgt spid="22"/>
+                                        </p:tgtEl>
+                                      </p:cBhvr>
+                                    </p:animEffect>
+                                  </p:childTnLst>
+                                </p:cTn>
+                              </p:par>
+                            </p:childTnLst>
+                          </p:cTn>
+                        </p:par>
+                      </p:childTnLst>
+                    </p:cTn>
+                  </p:par>
+                  <p:par>
+                    <p:cTn id="59" fill="hold">
+                      <p:stCondLst>
+                        <p:cond delay="indefinite"/>
+                      </p:stCondLst>
+                      <p:childTnLst>
+                        <p:par>
+                          <p:cTn id="60" fill="hold">
+                            <p:stCondLst>
+                              <p:cond delay="0"/>
+                            </p:stCondLst>
+                            <p:childTnLst>
+                              <p:par>
+                                <p:cTn id="61" presetID="10" presetClass="entr" presetSubtype="0" fill="hold" nodeType="clickEffect">
+                                  <p:stCondLst>
+                                    <p:cond delay="0"/>
+                                  </p:stCondLst>
+                                  <p:childTnLst>
+                                    <p:set>
+                                      <p:cBhvr>
+                                        <p:cTn id="62" dur="1" fill="hold">
+                                          <p:stCondLst>
+                                            <p:cond delay="0"/>
+                                          </p:stCondLst>
+                                        </p:cTn>
+                                        <p:tgtEl>
+                                          <p:spTgt spid="84"/>
+                                        </p:tgtEl>
+                                        <p:attrNameLst>
+                                          <p:attrName>style.visibility</p:attrName>
+                                        </p:attrNameLst>
+                                      </p:cBhvr>
+                                      <p:to>
+                                        <p:strVal val="visible"/>
+                                      </p:to>
+                                    </p:set>
+                                    <p:animEffect transition="in" filter="fade">
+                                      <p:cBhvr>
+                                        <p:cTn id="63" dur="500"/>
+                                        <p:tgtEl>
+                                          <p:spTgt spid="84"/>
+                                        </p:tgtEl>
+                                      </p:cBhvr>
+                                    </p:animEffect>
+                                  </p:childTnLst>
+                                </p:cTn>
+                              </p:par>
+                              <p:par>
+                                <p:cTn id="64" presetID="10" presetClass="entr" presetSubtype="0" fill="hold" grpId="0" nodeType="withEffect">
+                                  <p:stCondLst>
+                                    <p:cond delay="0"/>
+                                  </p:stCondLst>
+                                  <p:childTnLst>
+                                    <p:set>
+                                      <p:cBhvr>
+                                        <p:cTn id="65" dur="1" fill="hold">
+                                          <p:stCondLst>
+                                            <p:cond delay="0"/>
+                                          </p:stCondLst>
+                                        </p:cTn>
+                                        <p:tgtEl>
+                                          <p:spTgt spid="83"/>
+                                        </p:tgtEl>
+                                        <p:attrNameLst>
+                                          <p:attrName>style.visibility</p:attrName>
+                                        </p:attrNameLst>
+                                      </p:cBhvr>
+                                      <p:to>
+                                        <p:strVal val="visible"/>
+                                      </p:to>
+                                    </p:set>
+                                    <p:animEffect transition="in" filter="fade">
+                                      <p:cBhvr>
+                                        <p:cTn id="66" dur="500"/>
+                                        <p:tgtEl>
+                                          <p:spTgt spid="83"/>
+                                        </p:tgtEl>
+                                      </p:cBhvr>
+                                    </p:animEffect>
+                                  </p:childTnLst>
+                                </p:cTn>
+                              </p:par>
+                              <p:par>
+                                <p:cTn id="67" presetID="10" presetClass="entr" presetSubtype="0" fill="hold" nodeType="withEffect">
+                                  <p:stCondLst>
+                                    <p:cond delay="0"/>
+                                  </p:stCondLst>
+                                  <p:childTnLst>
+                                    <p:set>
+                                      <p:cBhvr>
+                                        <p:cTn id="68" dur="1" fill="hold">
+                                          <p:stCondLst>
+                                            <p:cond delay="0"/>
+                                          </p:stCondLst>
+                                        </p:cTn>
+                                        <p:tgtEl>
+                                          <p:spTgt spid="87"/>
+                                        </p:tgtEl>
+                                        <p:attrNameLst>
+                                          <p:attrName>style.visibility</p:attrName>
+                                        </p:attrNameLst>
+                                      </p:cBhvr>
+                                      <p:to>
+                                        <p:strVal val="visible"/>
+                                      </p:to>
+                                    </p:set>
+                                    <p:animEffect transition="in" filter="fade">
+                                      <p:cBhvr>
+                                        <p:cTn id="69" dur="500"/>
+                                        <p:tgtEl>
+                                          <p:spTgt spid="87"/>
+                                        </p:tgtEl>
+                                      </p:cBhvr>
+                                    </p:animEffect>
+                                  </p:childTnLst>
+                                </p:cTn>
+                              </p:par>
+                            </p:childTnLst>
+                          </p:cTn>
+                        </p:par>
+                      </p:childTnLst>
+                    </p:cTn>
+                  </p:par>
+                </p:childTnLst>
+              </p:cTn>
+              <p:prevCondLst>
+                <p:cond evt="onPrev" delay="0">
+                  <p:tgtEl>
+                    <p:sldTgt/>
+                  </p:tgtEl>
+                </p:cond>
+              </p:prevCondLst>
+              <p:nextCondLst>
+                <p:cond evt="onNext" delay="0">
+                  <p:tgtEl>
+                    <p:sldTgt/>
+                  </p:tgtEl>
+                </p:cond>
+              </p:nextCondLst>
+            </p:seq>
+          </p:childTnLst>
+        </p:cTn>
+      </p:par>
+    </p:tnLst>
+    <p:bldLst>
+      <p:bldP spid="7" grpId="0"/>
+      <p:bldP spid="22" grpId="0" animBg="1"/>
+      <p:bldP spid="31" grpId="0" animBg="1"/>
+      <p:bldP spid="61" grpId="0" animBg="1"/>
+      <p:bldP spid="62" grpId="0" animBg="1"/>
+      <p:bldP spid="83" grpId="0" animBg="1"/>
+    </p:bldLst>
+  </p:timing>
+</p:sld>
+</file>
+
+<file path=ppt/slides/slide8.xml><?xml version="1.0" encoding="utf-8"?>
+<p:sld xmlns:a="http://schemas.openxmlformats.org/drawingml/2006/main" xmlns:r="http://schemas.openxmlformats.org/officeDocument/2006/relationships" xmlns:p="http://schemas.openxmlformats.org/presentationml/2006/main">
+  <p:cSld>
+    <p:spTree>
+      <p:nvGrpSpPr>
+        <p:cNvPr id="1" name=""/>
+        <p:cNvGrpSpPr/>
+        <p:nvPr/>
+      </p:nvGrpSpPr>
+      <p:grpSpPr>
+        <a:xfrm>
+          <a:off x="0" y="0"/>
+          <a:ext cx="0" cy="0"/>
+          <a:chOff x="0" y="0"/>
+          <a:chExt cx="0" cy="0"/>
+        </a:xfrm>
+      </p:grpSpPr>
+      <p:pic>
+        <p:nvPicPr>
+          <p:cNvPr id="5" name="Immagine 4">
+            <a:extLst>
+              <a:ext uri="{FF2B5EF4-FFF2-40B4-BE49-F238E27FC236}">
                 <a16:creationId xmlns:a16="http://schemas.microsoft.com/office/drawing/2014/main" id="{FA3C6BD7-8FBF-6EDA-7981-2218C1F6E17D}"/>
               </a:ext>
             </a:extLst>
@@ -9676,462 +12389,6 @@
                                         <p:cTn id="16" dur="1000" fill="hold"/>
                                         <p:tgtEl>
                                           <p:spTgt spid="3"/>
-                                        </p:tgtEl>
-                                        <p:attrNameLst>
-                                          <p:attrName>ppt_y</p:attrName>
-                                        </p:attrNameLst>
-                                      </p:cBhvr>
-                                      <p:tavLst>
-                                        <p:tav tm="0">
-                                          <p:val>
-                                            <p:strVal val="#ppt_y+.1"/>
-                                          </p:val>
-                                        </p:tav>
-                                        <p:tav tm="100000">
-                                          <p:val>
-                                            <p:strVal val="#ppt_y"/>
-                                          </p:val>
-                                        </p:tav>
-                                      </p:tavLst>
-                                    </p:anim>
-                                  </p:childTnLst>
-                                </p:cTn>
-                              </p:par>
-                            </p:childTnLst>
-                          </p:cTn>
-                        </p:par>
-                      </p:childTnLst>
-                    </p:cTn>
-                  </p:par>
-                </p:childTnLst>
-              </p:cTn>
-              <p:prevCondLst>
-                <p:cond evt="onPrev" delay="0">
-                  <p:tgtEl>
-                    <p:sldTgt/>
-                  </p:tgtEl>
-                </p:cond>
-              </p:prevCondLst>
-              <p:nextCondLst>
-                <p:cond evt="onNext" delay="0">
-                  <p:tgtEl>
-                    <p:sldTgt/>
-                  </p:tgtEl>
-                </p:cond>
-              </p:nextCondLst>
-            </p:seq>
-          </p:childTnLst>
-        </p:cTn>
-      </p:par>
-    </p:tnLst>
-    <p:bldLst>
-      <p:bldP spid="7" grpId="0"/>
-    </p:bldLst>
-  </p:timing>
-</p:sld>
-</file>
-
-<file path=ppt/slides/slide8.xml><?xml version="1.0" encoding="utf-8"?>
-<p:sld xmlns:a="http://schemas.openxmlformats.org/drawingml/2006/main" xmlns:r="http://schemas.openxmlformats.org/officeDocument/2006/relationships" xmlns:p="http://schemas.openxmlformats.org/presentationml/2006/main">
-  <p:cSld>
-    <p:spTree>
-      <p:nvGrpSpPr>
-        <p:cNvPr id="1" name=""/>
-        <p:cNvGrpSpPr/>
-        <p:nvPr/>
-      </p:nvGrpSpPr>
-      <p:grpSpPr>
-        <a:xfrm>
-          <a:off x="0" y="0"/>
-          <a:ext cx="0" cy="0"/>
-          <a:chOff x="0" y="0"/>
-          <a:chExt cx="0" cy="0"/>
-        </a:xfrm>
-      </p:grpSpPr>
-      <p:pic>
-        <p:nvPicPr>
-          <p:cNvPr id="5" name="Immagine 4">
-            <a:extLst>
-              <a:ext uri="{FF2B5EF4-FFF2-40B4-BE49-F238E27FC236}">
-                <a16:creationId xmlns:a16="http://schemas.microsoft.com/office/drawing/2014/main" id="{FA3C6BD7-8FBF-6EDA-7981-2218C1F6E17D}"/>
-              </a:ext>
-            </a:extLst>
-          </p:cNvPr>
-          <p:cNvPicPr>
-            <a:picLocks noChangeAspect="1"/>
-          </p:cNvPicPr>
-          <p:nvPr/>
-        </p:nvPicPr>
-        <p:blipFill>
-          <a:blip r:embed="rId2">
-            <a:extLst>
-              <a:ext uri="{28A0092B-C50C-407E-A947-70E740481C1C}">
-                <a14:useLocalDpi xmlns:a14="http://schemas.microsoft.com/office/drawing/2010/main" val="0"/>
-              </a:ext>
-            </a:extLst>
-          </a:blip>
-          <a:stretch>
-            <a:fillRect/>
-          </a:stretch>
-        </p:blipFill>
-        <p:spPr>
-          <a:xfrm>
-            <a:off x="0" y="0"/>
-            <a:ext cx="12192000" cy="6858000"/>
-          </a:xfrm>
-          <a:prstGeom prst="rect">
-            <a:avLst/>
-          </a:prstGeom>
-        </p:spPr>
-      </p:pic>
-      <p:sp>
-        <p:nvSpPr>
-          <p:cNvPr id="7" name="Rettangolo 6">
-            <a:extLst>
-              <a:ext uri="{FF2B5EF4-FFF2-40B4-BE49-F238E27FC236}">
-                <a16:creationId xmlns:a16="http://schemas.microsoft.com/office/drawing/2014/main" id="{DF1285BF-ADAE-853A-DFD0-E28672837DB2}"/>
-              </a:ext>
-            </a:extLst>
-          </p:cNvPr>
-          <p:cNvSpPr/>
-          <p:nvPr/>
-        </p:nvSpPr>
-        <p:spPr>
-          <a:xfrm>
-            <a:off x="2817131" y="2032889"/>
-            <a:ext cx="6970623" cy="523220"/>
-          </a:xfrm>
-          <a:prstGeom prst="rect">
-            <a:avLst/>
-          </a:prstGeom>
-          <a:noFill/>
-        </p:spPr>
-        <p:txBody>
-          <a:bodyPr wrap="square" lIns="91440" tIns="45720" rIns="91440" bIns="45720">
-            <a:spAutoFit/>
-            <a:scene3d>
-              <a:camera prst="orthographicFront"/>
-              <a:lightRig rig="harsh" dir="t"/>
-            </a:scene3d>
-            <a:sp3d extrusionH="57150" prstMaterial="matte">
-              <a:bevelT w="63500" h="12700" prst="angle"/>
-              <a:contourClr>
-                <a:schemeClr val="bg1">
-                  <a:lumMod val="65000"/>
-                </a:schemeClr>
-              </a:contourClr>
-            </a:sp3d>
-          </a:bodyPr>
-          <a:lstStyle/>
-          <a:p>
-            <a:pPr algn="ctr"/>
-            <a:r>
-              <a:rPr lang="it-IT" sz="2800" b="1" dirty="0">
-                <a:ln/>
-                <a:solidFill>
-                  <a:schemeClr val="tx1">
-                    <a:lumMod val="65000"/>
-                    <a:lumOff val="35000"/>
-                  </a:schemeClr>
-                </a:solidFill>
-              </a:rPr>
-              <a:t>CREAZIONE GRAFICA HTML - SPRING</a:t>
-            </a:r>
-            <a:endParaRPr lang="it-IT" sz="2800" b="1" cap="none" spc="0" dirty="0">
-              <a:ln/>
-              <a:solidFill>
-                <a:schemeClr val="tx1">
-                  <a:lumMod val="65000"/>
-                  <a:lumOff val="35000"/>
-                </a:schemeClr>
-              </a:solidFill>
-              <a:effectLst/>
-            </a:endParaRPr>
-          </a:p>
-        </p:txBody>
-      </p:sp>
-      <p:sp>
-        <p:nvSpPr>
-          <p:cNvPr id="8" name="Rettangolo 7">
-            <a:extLst>
-              <a:ext uri="{FF2B5EF4-FFF2-40B4-BE49-F238E27FC236}">
-                <a16:creationId xmlns:a16="http://schemas.microsoft.com/office/drawing/2014/main" id="{6BE559C5-BD60-4AF6-C0B7-5BFEF642CDF3}"/>
-              </a:ext>
-            </a:extLst>
-          </p:cNvPr>
-          <p:cNvSpPr/>
-          <p:nvPr/>
-        </p:nvSpPr>
-        <p:spPr>
-          <a:xfrm>
-            <a:off x="-565607" y="253632"/>
-            <a:ext cx="13338928" cy="646331"/>
-          </a:xfrm>
-          <a:prstGeom prst="rect">
-            <a:avLst/>
-          </a:prstGeom>
-          <a:noFill/>
-        </p:spPr>
-        <p:txBody>
-          <a:bodyPr wrap="square" lIns="91440" tIns="45720" rIns="91440" bIns="45720">
-            <a:spAutoFit/>
-            <a:scene3d>
-              <a:camera prst="orthographicFront"/>
-              <a:lightRig rig="harsh" dir="t"/>
-            </a:scene3d>
-            <a:sp3d extrusionH="57150" prstMaterial="matte">
-              <a:bevelT w="63500" h="12700" prst="angle"/>
-              <a:contourClr>
-                <a:schemeClr val="bg1">
-                  <a:lumMod val="65000"/>
-                </a:schemeClr>
-              </a:contourClr>
-            </a:sp3d>
-          </a:bodyPr>
-          <a:lstStyle/>
-          <a:p>
-            <a:pPr algn="ctr"/>
-            <a:r>
-              <a:rPr lang="it-IT" sz="3600" b="1" cap="none" spc="0" dirty="0">
-                <a:ln/>
-                <a:solidFill>
-                  <a:schemeClr val="tx1">
-                    <a:lumMod val="65000"/>
-                    <a:lumOff val="35000"/>
-                  </a:schemeClr>
-                </a:solidFill>
-                <a:effectLst/>
-              </a:rPr>
-              <a:t>PRESENTAZIONE PROJECT WORK FINALE: GIORNALE ONLINE</a:t>
-            </a:r>
-          </a:p>
-        </p:txBody>
-      </p:sp>
-      <p:pic>
-        <p:nvPicPr>
-          <p:cNvPr id="4" name="Immagine 3">
-            <a:extLst>
-              <a:ext uri="{FF2B5EF4-FFF2-40B4-BE49-F238E27FC236}">
-                <a16:creationId xmlns:a16="http://schemas.microsoft.com/office/drawing/2014/main" id="{B4E62A2A-5024-DD90-B147-E70413D16FEB}"/>
-              </a:ext>
-            </a:extLst>
-          </p:cNvPr>
-          <p:cNvPicPr>
-            <a:picLocks noChangeAspect="1"/>
-          </p:cNvPicPr>
-          <p:nvPr/>
-        </p:nvPicPr>
-        <p:blipFill>
-          <a:blip r:embed="rId3">
-            <a:extLst>
-              <a:ext uri="{28A0092B-C50C-407E-A947-70E740481C1C}">
-                <a14:useLocalDpi xmlns:a14="http://schemas.microsoft.com/office/drawing/2010/main" val="0"/>
-              </a:ext>
-            </a:extLst>
-          </a:blip>
-          <a:stretch>
-            <a:fillRect/>
-          </a:stretch>
-        </p:blipFill>
-        <p:spPr>
-          <a:xfrm>
-            <a:off x="2737253" y="2646900"/>
-            <a:ext cx="7337771" cy="4120309"/>
-          </a:xfrm>
-          <a:prstGeom prst="rect">
-            <a:avLst/>
-          </a:prstGeom>
-        </p:spPr>
-      </p:pic>
-    </p:spTree>
-    <p:extLst>
-      <p:ext uri="{BB962C8B-B14F-4D97-AF65-F5344CB8AC3E}">
-        <p14:creationId xmlns:p14="http://schemas.microsoft.com/office/powerpoint/2010/main" val="3944497476"/>
-      </p:ext>
-    </p:extLst>
-  </p:cSld>
-  <p:clrMapOvr>
-    <a:masterClrMapping/>
-  </p:clrMapOvr>
-  <p:timing>
-    <p:tnLst>
-      <p:par>
-        <p:cTn id="1" dur="indefinite" restart="never" nodeType="tmRoot">
-          <p:childTnLst>
-            <p:seq concurrent="1" nextAc="seek">
-              <p:cTn id="2" dur="indefinite" nodeType="mainSeq">
-                <p:childTnLst>
-                  <p:par>
-                    <p:cTn id="3" fill="hold">
-                      <p:stCondLst>
-                        <p:cond delay="indefinite"/>
-                      </p:stCondLst>
-                      <p:childTnLst>
-                        <p:par>
-                          <p:cTn id="4" fill="hold">
-                            <p:stCondLst>
-                              <p:cond delay="0"/>
-                            </p:stCondLst>
-                            <p:childTnLst>
-                              <p:par>
-                                <p:cTn id="5" presetID="42" presetClass="entr" presetSubtype="0" fill="hold" grpId="0" nodeType="clickEffect">
-                                  <p:stCondLst>
-                                    <p:cond delay="0"/>
-                                  </p:stCondLst>
-                                  <p:childTnLst>
-                                    <p:set>
-                                      <p:cBhvr>
-                                        <p:cTn id="6" dur="1" fill="hold">
-                                          <p:stCondLst>
-                                            <p:cond delay="0"/>
-                                          </p:stCondLst>
-                                        </p:cTn>
-                                        <p:tgtEl>
-                                          <p:spTgt spid="7"/>
-                                        </p:tgtEl>
-                                        <p:attrNameLst>
-                                          <p:attrName>style.visibility</p:attrName>
-                                        </p:attrNameLst>
-                                      </p:cBhvr>
-                                      <p:to>
-                                        <p:strVal val="visible"/>
-                                      </p:to>
-                                    </p:set>
-                                    <p:animEffect transition="in" filter="fade">
-                                      <p:cBhvr>
-                                        <p:cTn id="7" dur="1000"/>
-                                        <p:tgtEl>
-                                          <p:spTgt spid="7"/>
-                                        </p:tgtEl>
-                                      </p:cBhvr>
-                                    </p:animEffect>
-                                    <p:anim calcmode="lin" valueType="num">
-                                      <p:cBhvr>
-                                        <p:cTn id="8" dur="1000" fill="hold"/>
-                                        <p:tgtEl>
-                                          <p:spTgt spid="7"/>
-                                        </p:tgtEl>
-                                        <p:attrNameLst>
-                                          <p:attrName>ppt_x</p:attrName>
-                                        </p:attrNameLst>
-                                      </p:cBhvr>
-                                      <p:tavLst>
-                                        <p:tav tm="0">
-                                          <p:val>
-                                            <p:strVal val="#ppt_x"/>
-                                          </p:val>
-                                        </p:tav>
-                                        <p:tav tm="100000">
-                                          <p:val>
-                                            <p:strVal val="#ppt_x"/>
-                                          </p:val>
-                                        </p:tav>
-                                      </p:tavLst>
-                                    </p:anim>
-                                    <p:anim calcmode="lin" valueType="num">
-                                      <p:cBhvr>
-                                        <p:cTn id="9" dur="1000" fill="hold"/>
-                                        <p:tgtEl>
-                                          <p:spTgt spid="7"/>
-                                        </p:tgtEl>
-                                        <p:attrNameLst>
-                                          <p:attrName>ppt_y</p:attrName>
-                                        </p:attrNameLst>
-                                      </p:cBhvr>
-                                      <p:tavLst>
-                                        <p:tav tm="0">
-                                          <p:val>
-                                            <p:strVal val="#ppt_y+.1"/>
-                                          </p:val>
-                                        </p:tav>
-                                        <p:tav tm="100000">
-                                          <p:val>
-                                            <p:strVal val="#ppt_y"/>
-                                          </p:val>
-                                        </p:tav>
-                                      </p:tavLst>
-                                    </p:anim>
-                                  </p:childTnLst>
-                                </p:cTn>
-                              </p:par>
-                            </p:childTnLst>
-                          </p:cTn>
-                        </p:par>
-                      </p:childTnLst>
-                    </p:cTn>
-                  </p:par>
-                  <p:par>
-                    <p:cTn id="10" fill="hold">
-                      <p:stCondLst>
-                        <p:cond delay="indefinite"/>
-                      </p:stCondLst>
-                      <p:childTnLst>
-                        <p:par>
-                          <p:cTn id="11" fill="hold">
-                            <p:stCondLst>
-                              <p:cond delay="0"/>
-                            </p:stCondLst>
-                            <p:childTnLst>
-                              <p:par>
-                                <p:cTn id="12" presetID="42" presetClass="entr" presetSubtype="0" fill="hold" nodeType="clickEffect">
-                                  <p:stCondLst>
-                                    <p:cond delay="0"/>
-                                  </p:stCondLst>
-                                  <p:childTnLst>
-                                    <p:set>
-                                      <p:cBhvr>
-                                        <p:cTn id="13" dur="1" fill="hold">
-                                          <p:stCondLst>
-                                            <p:cond delay="0"/>
-                                          </p:stCondLst>
-                                        </p:cTn>
-                                        <p:tgtEl>
-                                          <p:spTgt spid="4"/>
-                                        </p:tgtEl>
-                                        <p:attrNameLst>
-                                          <p:attrName>style.visibility</p:attrName>
-                                        </p:attrNameLst>
-                                      </p:cBhvr>
-                                      <p:to>
-                                        <p:strVal val="visible"/>
-                                      </p:to>
-                                    </p:set>
-                                    <p:animEffect transition="in" filter="fade">
-                                      <p:cBhvr>
-                                        <p:cTn id="14" dur="1000"/>
-                                        <p:tgtEl>
-                                          <p:spTgt spid="4"/>
-                                        </p:tgtEl>
-                                      </p:cBhvr>
-                                    </p:animEffect>
-                                    <p:anim calcmode="lin" valueType="num">
-                                      <p:cBhvr>
-                                        <p:cTn id="15" dur="1000" fill="hold"/>
-                                        <p:tgtEl>
-                                          <p:spTgt spid="4"/>
-                                        </p:tgtEl>
-                                        <p:attrNameLst>
-                                          <p:attrName>ppt_x</p:attrName>
-                                        </p:attrNameLst>
-                                      </p:cBhvr>
-                                      <p:tavLst>
-                                        <p:tav tm="0">
-                                          <p:val>
-                                            <p:strVal val="#ppt_x"/>
-                                          </p:val>
-                                        </p:tav>
-                                        <p:tav tm="100000">
-                                          <p:val>
-                                            <p:strVal val="#ppt_x"/>
-                                          </p:val>
-                                        </p:tav>
-                                      </p:tavLst>
-                                    </p:anim>
-                                    <p:anim calcmode="lin" valueType="num">
-                                      <p:cBhvr>
-                                        <p:cTn id="16" dur="1000" fill="hold"/>
-                                        <p:tgtEl>
-                                          <p:spTgt spid="4"/>
                                         </p:tgtEl>
                                         <p:attrNameLst>
                                           <p:attrName>ppt_y</p:attrName>
@@ -10254,7 +12511,7 @@
         </p:nvSpPr>
         <p:spPr>
           <a:xfrm>
-            <a:off x="2817131" y="2032889"/>
+            <a:off x="2935216" y="2032889"/>
             <a:ext cx="6970623" cy="523220"/>
           </a:xfrm>
           <a:prstGeom prst="rect">
@@ -10291,7 +12548,7 @@
                   </a:schemeClr>
                 </a:solidFill>
               </a:rPr>
-              <a:t>CREAZIONE GRAFICA CSS - SPRING</a:t>
+              <a:t>CREAZIONE GRAFICA HTML - SPRING</a:t>
             </a:r>
             <a:endParaRPr lang="it-IT" sz="2800" b="1" cap="none" spc="0" dirty="0">
               <a:ln/>
@@ -10365,10 +12622,10 @@
       </p:sp>
       <p:pic>
         <p:nvPicPr>
-          <p:cNvPr id="3" name="Immagine 2">
-            <a:extLst>
-              <a:ext uri="{FF2B5EF4-FFF2-40B4-BE49-F238E27FC236}">
-                <a16:creationId xmlns:a16="http://schemas.microsoft.com/office/drawing/2014/main" id="{D6F94A61-14EF-BAAB-0762-2A7496B7F0D9}"/>
+          <p:cNvPr id="4" name="Immagine 3">
+            <a:extLst>
+              <a:ext uri="{FF2B5EF4-FFF2-40B4-BE49-F238E27FC236}">
+                <a16:creationId xmlns:a16="http://schemas.microsoft.com/office/drawing/2014/main" id="{B4E62A2A-5024-DD90-B147-E70413D16FEB}"/>
               </a:ext>
             </a:extLst>
           </p:cNvPr>
@@ -10391,8 +12648,44 @@
         </p:blipFill>
         <p:spPr>
           <a:xfrm>
-            <a:off x="4638611" y="2633103"/>
-            <a:ext cx="3327661" cy="3792218"/>
+            <a:off x="2935216" y="2646900"/>
+            <a:ext cx="7337771" cy="4120309"/>
+          </a:xfrm>
+          <a:prstGeom prst="rect">
+            <a:avLst/>
+          </a:prstGeom>
+        </p:spPr>
+      </p:pic>
+      <p:pic>
+        <p:nvPicPr>
+          <p:cNvPr id="3" name="Immagine 2">
+            <a:extLst>
+              <a:ext uri="{FF2B5EF4-FFF2-40B4-BE49-F238E27FC236}">
+                <a16:creationId xmlns:a16="http://schemas.microsoft.com/office/drawing/2014/main" id="{7E2AD28A-579D-7486-A6B4-8832D2293AB9}"/>
+              </a:ext>
+            </a:extLst>
+          </p:cNvPr>
+          <p:cNvPicPr>
+            <a:picLocks noChangeAspect="1"/>
+          </p:cNvPicPr>
+          <p:nvPr/>
+        </p:nvPicPr>
+        <p:blipFill>
+          <a:blip r:embed="rId4">
+            <a:extLst>
+              <a:ext uri="{28A0092B-C50C-407E-A947-70E740481C1C}">
+                <a14:useLocalDpi xmlns:a14="http://schemas.microsoft.com/office/drawing/2010/main" val="0"/>
+              </a:ext>
+            </a:extLst>
+          </a:blip>
+          <a:stretch>
+            <a:fillRect/>
+          </a:stretch>
+        </p:blipFill>
+        <p:spPr>
+          <a:xfrm>
+            <a:off x="2935196" y="2646900"/>
+            <a:ext cx="7358874" cy="4120308"/>
           </a:xfrm>
           <a:prstGeom prst="rect">
             <a:avLst/>
@@ -10402,7 +12695,7 @@
     </p:spTree>
     <p:extLst>
       <p:ext uri="{BB962C8B-B14F-4D97-AF65-F5344CB8AC3E}">
-        <p14:creationId xmlns:p14="http://schemas.microsoft.com/office/powerpoint/2010/main" val="636635174"/>
+        <p14:creationId xmlns:p14="http://schemas.microsoft.com/office/powerpoint/2010/main" val="3944497476"/>
       </p:ext>
     </p:extLst>
   </p:cSld>
@@ -10542,7 +12835,7 @@
                                           </p:stCondLst>
                                         </p:cTn>
                                         <p:tgtEl>
-                                          <p:spTgt spid="3"/>
+                                          <p:spTgt spid="4"/>
                                         </p:tgtEl>
                                         <p:attrNameLst>
                                           <p:attrName>style.visibility</p:attrName>
@@ -10556,7 +12849,7 @@
                                       <p:cBhvr>
                                         <p:cTn id="14" dur="1000"/>
                                         <p:tgtEl>
-                                          <p:spTgt spid="3"/>
+                                          <p:spTgt spid="4"/>
                                         </p:tgtEl>
                                       </p:cBhvr>
                                     </p:animEffect>
@@ -10564,7 +12857,7 @@
                                       <p:cBhvr>
                                         <p:cTn id="15" dur="1000" fill="hold"/>
                                         <p:tgtEl>
-                                          <p:spTgt spid="3"/>
+                                          <p:spTgt spid="4"/>
                                         </p:tgtEl>
                                         <p:attrNameLst>
                                           <p:attrName>ppt_x</p:attrName>
@@ -10586,6 +12879,150 @@
                                     <p:anim calcmode="lin" valueType="num">
                                       <p:cBhvr>
                                         <p:cTn id="16" dur="1000" fill="hold"/>
+                                        <p:tgtEl>
+                                          <p:spTgt spid="4"/>
+                                        </p:tgtEl>
+                                        <p:attrNameLst>
+                                          <p:attrName>ppt_y</p:attrName>
+                                        </p:attrNameLst>
+                                      </p:cBhvr>
+                                      <p:tavLst>
+                                        <p:tav tm="0">
+                                          <p:val>
+                                            <p:strVal val="#ppt_y+.1"/>
+                                          </p:val>
+                                        </p:tav>
+                                        <p:tav tm="100000">
+                                          <p:val>
+                                            <p:strVal val="#ppt_y"/>
+                                          </p:val>
+                                        </p:tav>
+                                      </p:tavLst>
+                                    </p:anim>
+                                  </p:childTnLst>
+                                </p:cTn>
+                              </p:par>
+                            </p:childTnLst>
+                          </p:cTn>
+                        </p:par>
+                      </p:childTnLst>
+                    </p:cTn>
+                  </p:par>
+                  <p:par>
+                    <p:cTn id="17" fill="hold">
+                      <p:stCondLst>
+                        <p:cond delay="indefinite"/>
+                      </p:stCondLst>
+                      <p:childTnLst>
+                        <p:par>
+                          <p:cTn id="18" fill="hold">
+                            <p:stCondLst>
+                              <p:cond delay="0"/>
+                            </p:stCondLst>
+                            <p:childTnLst>
+                              <p:par>
+                                <p:cTn id="19" presetID="1" presetClass="exit" presetSubtype="0" fill="hold" nodeType="clickEffect">
+                                  <p:stCondLst>
+                                    <p:cond delay="0"/>
+                                  </p:stCondLst>
+                                  <p:childTnLst>
+                                    <p:set>
+                                      <p:cBhvr>
+                                        <p:cTn id="20" dur="1" fill="hold">
+                                          <p:stCondLst>
+                                            <p:cond delay="0"/>
+                                          </p:stCondLst>
+                                        </p:cTn>
+                                        <p:tgtEl>
+                                          <p:spTgt spid="4"/>
+                                        </p:tgtEl>
+                                        <p:attrNameLst>
+                                          <p:attrName>style.visibility</p:attrName>
+                                        </p:attrNameLst>
+                                      </p:cBhvr>
+                                      <p:to>
+                                        <p:strVal val="hidden"/>
+                                      </p:to>
+                                    </p:set>
+                                  </p:childTnLst>
+                                </p:cTn>
+                              </p:par>
+                            </p:childTnLst>
+                          </p:cTn>
+                        </p:par>
+                      </p:childTnLst>
+                    </p:cTn>
+                  </p:par>
+                  <p:par>
+                    <p:cTn id="21" fill="hold">
+                      <p:stCondLst>
+                        <p:cond delay="indefinite"/>
+                      </p:stCondLst>
+                      <p:childTnLst>
+                        <p:par>
+                          <p:cTn id="22" fill="hold">
+                            <p:stCondLst>
+                              <p:cond delay="0"/>
+                            </p:stCondLst>
+                            <p:childTnLst>
+                              <p:par>
+                                <p:cTn id="23" presetID="42" presetClass="entr" presetSubtype="0" fill="hold" nodeType="clickEffect">
+                                  <p:stCondLst>
+                                    <p:cond delay="0"/>
+                                  </p:stCondLst>
+                                  <p:childTnLst>
+                                    <p:set>
+                                      <p:cBhvr>
+                                        <p:cTn id="24" dur="1" fill="hold">
+                                          <p:stCondLst>
+                                            <p:cond delay="0"/>
+                                          </p:stCondLst>
+                                        </p:cTn>
+                                        <p:tgtEl>
+                                          <p:spTgt spid="3"/>
+                                        </p:tgtEl>
+                                        <p:attrNameLst>
+                                          <p:attrName>style.visibility</p:attrName>
+                                        </p:attrNameLst>
+                                      </p:cBhvr>
+                                      <p:to>
+                                        <p:strVal val="visible"/>
+                                      </p:to>
+                                    </p:set>
+                                    <p:animEffect transition="in" filter="fade">
+                                      <p:cBhvr>
+                                        <p:cTn id="25" dur="1000"/>
+                                        <p:tgtEl>
+                                          <p:spTgt spid="3"/>
+                                        </p:tgtEl>
+                                      </p:cBhvr>
+                                    </p:animEffect>
+                                    <p:anim calcmode="lin" valueType="num">
+                                      <p:cBhvr>
+                                        <p:cTn id="26" dur="1000" fill="hold"/>
+                                        <p:tgtEl>
+                                          <p:spTgt spid="3"/>
+                                        </p:tgtEl>
+                                        <p:attrNameLst>
+                                          <p:attrName>ppt_x</p:attrName>
+                                        </p:attrNameLst>
+                                      </p:cBhvr>
+                                      <p:tavLst>
+                                        <p:tav tm="0">
+                                          <p:val>
+                                            <p:strVal val="#ppt_x"/>
+                                          </p:val>
+                                        </p:tav>
+                                        <p:tav tm="100000">
+                                          <p:val>
+                                            <p:strVal val="#ppt_x"/>
+                                          </p:val>
+                                        </p:tav>
+                                      </p:tavLst>
+                                    </p:anim>
+                                    <p:anim calcmode="lin" valueType="num">
+                                      <p:cBhvr>
+                                        <p:cTn id="27" dur="1000" fill="hold"/>
                                         <p:tgtEl>
                                           <p:spTgt spid="3"/>
                                         </p:tgtEl>

</xml_diff>